<commit_message>
Auto-updater Bot Study material SAC_merckgroup
</commit_message>
<xml_diff>
--- a/day 2/SAC_Training Day 2.pptx
+++ b/day 2/SAC_Training Day 2.pptx
@@ -2886,7 +2886,7 @@
           <inkml:channelProperty channel="T" name="resolution" value="1" units="1/dev"/>
         </inkml:channelProperties>
       </inkml:inkSource>
-      <inkml:timestamp xml:id="ts0" timeString="2023-05-24T03:55:43.238"/>
+      <inkml:timestamp xml:id="ts0" timeString="2023-06-22T05:42:30.356"/>
     </inkml:context>
     <inkml:brush xml:id="br0">
       <inkml:brushProperty name="width" value="0.05292" units="cm"/>
@@ -2894,162 +2894,119 @@
       <inkml:brushProperty name="color" value="#FF0000"/>
     </inkml:brush>
   </inkml:definitions>
-  <inkml:trace contextRef="#ctx0" brushRef="#br0">8449 14411 0,'0'-18'47,"18"36"16,17 0-32,-17-1-31,34 19 16,-16-19-1,-19-17 1,36 18 0,-17-18-16,34 17 15,54 1 1,-1 17-1,1-35 1,52 36 0,-141-36-1,106 17 1,18 1 0,-71 0-1,-52-1-15,52 1 16,53-1-1,18 1 1,-1-18 0,-52-18 15,71 18-15,-124-17-16,70 17 15,71-18 1,0 1-1,124-19 17,-195 36-17,-70-17-15,159-1 16,-89 0 0,-52 1-16,70-1 15,70-17 1,-34 0-1,17-1 1,-71 36 0,71-17 15,36-1-15,-160 0-16,71 18 15,53-17 1,-70 17-1,-54 0-15,36 0 16,88 0 0,0 17-1,-70 1 1,-71-18-16,52 18 16,37-1-1,-1 19 1,-71-19-1,-34-17 1,16 35-16,1 1 31,0 17-15,-17-18 0,-19-17-16,54 17 15,-18 0 1,-36-35-16,1 35 15,0 1 1,-18-19 15,0-34 32,35-19-32,-35 19-15,0-1-16,35-17 15,-35 17 1,18 1-16,17-19 16,36-34-1,-54 52 1,36-17-1,-18 35-15,18-35 16,194-18 15,-211 53-31,34 0 16,1-18 0,-36 18-16,36-18 15,70 18 1,17-17-1,19 17 1,-54-18 15,-52 18-31,52 0 16,54 0 0,-107 0-16,54 0 15,52 0 1,-52-18-1,87 18 1,89 0 0,-159-17-1,0 17 1,-70 0-16,52 0 16,-52 0-16,229 0 31,-230 0-31,71 0 15,-70 17 1,70-17-16,71 18 31,-159-18-31,88 18 16,88-1 0,-88-17-1,88 36 1,18-19-1,-35 19 1,-53-36 0,-89 17-16,89 1 15,70-1 1,160 1 15,-319 0-31,195 17 31,-195-35-31,124 18 32,0-1-17,53-17 1,-194 0 0,124 18-1,-19-18 1,1 0-1,-53 0 1,-53 0-16,106 0 31,-107-18-31,54 18 16,0 0-16,106-17 31,-124 17-31,-17-18 16,52 0-1,0-35 17,-87 53-17,-19-17-15,36-18 16,18-1 0,-1-34-1,-17 34 1,-35 19-16,70-54 31,-70 54-31,70-36 31,-70 53-31,-1-18 0,19-17 16,-1-1 0,-35 1-1,17 18 1,-17-19-16,18 1 15,-18-18 17,18 35-17,-18 1 1,0-1 15,-18 18 16</inkml:trace>
-  <inkml:trace contextRef="#ctx0" brushRef="#br0" timeOffset="2559.81">9049 7849 0,'17'0'15,"19"-17"-15,52-1 16,53-17-1,35-1 1,1 1 0,-1 18-1,36-1 1,-71 18 0,-106 18-1,-17-18 1,-1 0 78</inkml:trace>
-  <inkml:trace contextRef="#ctx0" brushRef="#br0" timeOffset="4115.92">11465 7761 0,'0'18'32,"53"-18"-17,35 0 1,18 17 0,159-17-1,-71 0 1,-71 0-16,71 0 15,247 0 17,-370-17-32,52 17 15,36-36 17,-106 19-32,0-1 15,-35 1 1,-18-19-1,-36-17 17,-17-17-17,36 35 1,-1-1-16,-52-87 16,34 17-1,-34-35 1,-1 35-1,36 53 1,-18-17 0,-35 17-1,-18 35 1,0 0 0,36 18-16,-54 0 15,-105 0 1,-18 36 15,-18-19-15,-17 36-1,123 0 1,-35 0 0,106 35-1,88 0 1,18-17-1,52 52 1,18 36 0,-17-71-1,-53-35-15,35 18 16,-18-54-16,18 36 16,88-17-1,35-72 1,-105 36-1</inkml:trace>
-  <inkml:trace contextRef="#ctx0" brushRef="#br0" timeOffset="6097.91">15240 6756 0,'0'0'0,"18"-18"0,-18 0 16,-18 1 15,-53 17-15,-17-18 0,35 18-16,-35 0 15,-18 18 1,36-18-16,-71 17 15,-89 36 1,1 0 0,106 18-1,-71 105 17,176-123-32,-17 53 15,17-71-15,0 71 16,36 53-1,35-36 17,17-35-17,-34-52-15,52 34 16,88 1 0,89-54-1,35-17 1,88-52 15,-300 34-31,177-70 31,-160 52-31,-16-16 16,16-54 0,-34-35-1,-53-18 1,-18 35-1,0 71 1,-36-52 0,19 69-16,-107-105 15,36 88 1,35 36-16,18-1 16,-89-35-1,19 18 1,52 35-1,-36 0 17,54 0-32,-18 0 15,36 0 17,17 17-17</inkml:trace>
-  <inkml:trace contextRef="#ctx0" brushRef="#br0" timeOffset="7212.56">17833 6720 0,'-35'-17'0,"70"34"0,-88-34 15,18 17-15,-36 17 16,-52 19 0,17-1-1,53-17-15,-141 87 31,141-69-31,-35 87 16,35 36 0,35-53-1,18 70 1,53-35 0,35-17-1,36-18 16,-18-71-15,141 0 0,-89-35-1,54-53 1,-89 0 0,-70 36-16,53-54 15,0-70 1,-35-18-1,-18 0 1,-36 71 0,-17-18-1,0 18 1,-53 18 0,-35-1 15,53 54-31,-36-19 15,-35 1 1,-52-18 0,69 53-1,72 0-15,-36 0 16,18 0 0,-1 35-1,19-17-15</inkml:trace>
-  <inkml:trace contextRef="#ctx0" brushRef="#br0" timeOffset="8234.51">20726 6879 0,'0'0'0,"0"-17"0,-18-1 16,0 0-1,-17 18 1,-18 0-1,-53 18 1,1 17 0,16 0-1,54-17-15,-35 53 16,-19 17 0,54 18-1,35-71 1,0 71-16,35 70 31,36-35-15,17-17-1,106-18 17,-70-71-32,87-35 15,-52-18 1,-18-17-1,-53 17-15,106-88 16,-88 18 0,35-53-1,-70 0 1,-71 0 15,-71 0-15,1 70-1,-71-17 1,52 35 0,-34 36-1,17-1 1,-70 36 15,140-18-31,-34 17 16,17-17-1</inkml:trace>
-  <inkml:trace contextRef="#ctx0" brushRef="#br0" timeOffset="10618.52">24095 6703 0,'-36'-18'0,"72"36"0,-89-36 0,18 18 16,-142 0 15,124 0-31,-17 0 0,-1 0 16,-17 0-16,-141 18 15,158-1-15,-35 1 16,18 17 0,-18 36-1,18 17 1,35-17-1,-17 34 1,34-16 0,19 16-1,34 1 17,1-70-32,17 34 15,0-17-15,36 35 31,-18-52-15,-18-19-16,53 18 16,53 1-1,36-1 1,-1-17 0,-52-1-1,-54-17-15,89 18 16,-53 0-1,70-18 1,18 0 0,0-36-1,-53 19 1,36-19 0,-18 1-1,-71 17 1,18-17 15,-1 0-15,-69 17-1,34-35 1,-17 18 0,-18 17-16,54-52 15,-54 17 1,18-18-1,-36 18 1,-17 36 0,0-18-1,0-18 1,0 17 0,0 19-1,0-36 1,-17-18-1,-18 1 1,-36 17 0,18 18-1,0-1 1,18 19 0,17-1-16,-35 0 15,-52-17 1,16 17-1,-52-17 1,35 0 0,18 17-1,53 1 1,0 17-16,-1-18 16,-34 18-1,-1-35 16,36 35-15,17-18 0,-17 18-1,0-18 1,-18 18 0,-18-17 15,54 17 0,-1 0-15,0 0-1,1 0 1,-1 0 0,0 0-1,1 0 1,-1 0-1</inkml:trace>
-  <inkml:trace contextRef="#ctx0" brushRef="#br0" timeOffset="16931.66">9313 4480 0,'0'0'16,"0"-17"-1,-17 34 17,-1 1-32,0 52 15,1-52 1,-19 70 0,1 53-1,18 18 1,17-71-1,-18 36 1,18-54 0,0-52-1</inkml:trace>
-  <inkml:trace contextRef="#ctx0" brushRef="#br0" timeOffset="17366.09">9013 5115 0,'0'18'31,"18"-18"-31,-18 18 16,18-1-16,-1 36 15,1-18 1,0 1 0,-18-19-1,0 1-15,17-18 16,1 18-1,17-54 1,18-34 0,0 17 15,-18 18-31,1-1 31,-19 19-15,-17 34-1,0 1-15</inkml:trace>
-  <inkml:trace contextRef="#ctx0" brushRef="#br0" timeOffset="18532.91">9207 4127 0,'0'-17'0,"0"34"0,-17-52 16,-1 35 0,18 18 15,0-1-31,0 19 0,18 17 15,-1 35 1,-17 0 0,0-70-1</inkml:trace>
-  <inkml:trace contextRef="#ctx0" brushRef="#br0" timeOffset="19000.45">9031 4075 0,'0'-36'0,"0"72"0,-35-160 16,35 71-16,0-17 16,0-1-1,70 18 1,-34 36-16,34 17 15,1 17 1,-54 18-16,54 71 31,-71-18-31,-35 36 32,-54-36-17,19-35 1,52-53-16,-35 18 15,36-36 1,52-17 0,36-1-1,-19 36 1,37 36 0,-19 34-1,-34 1 1,-19-36-1,1-17-15</inkml:trace>
-  <inkml:trace contextRef="#ctx0" brushRef="#br0" timeOffset="19401.84">9419 4163 0,'18'0'15,"-1"0"1,36 0 0,-35 0-1,0-18-15,-1 0 16,1 18-16,-18-17 15,18-18 1,-54-1 0,19 36 15,-19 0-15,36 18-1,-17-18-15,17 35 16,0 18-1,35 0 1,-17-18 0,35-17-1</inkml:trace>
-  <inkml:trace contextRef="#ctx0" brushRef="#br0" timeOffset="20359.52">9737 4022 0,'0'0'0,"-18"0"0,18-18 15,-18 0 1,1 18 0,-1 0-16,18 36 15,-18 17 1,18 17-1,18-52 1,0 17 0,17-35-1,-17-18 1,-1 1 0,1-19-1,-18 1 1,0 18-1,0 52 17,0-18-17,18 19-15,-1-1 32,18-17-17,-17-36 1,0-17-1,-1-18 1,1-35 0,-36 35-1,18 17-15,-17-34 16,-19-36 0,1 71-1,53 70 16,-1-17-15,-17 52-16,18 18 31,0-17-15,-18-36 0,0-17-16,35 17 15,-17 0 1,-1 1-1,1-19 1,0 1 0,-1-36 15,1 18-15,-18-17-16,18 17 15,-18-18 1</inkml:trace>
-  <inkml:trace contextRef="#ctx0" brushRef="#br0" timeOffset="20635.91">10089 3986 0,'0'0'0,"0"18"62,0 0-62,0-1 16,0 19-1,0 34 1,0-52 0</inkml:trace>
-  <inkml:trace contextRef="#ctx0" brushRef="#br0" timeOffset="20800.22">10072 3757 0,'0'0'0,"0"-18"15</inkml:trace>
-  <inkml:trace contextRef="#ctx0" brushRef="#br0" timeOffset="21018.01">10231 3722 0,'-18'0'16,"0"35"0,18 18-1,0-35-15,18 52 16,-18-35-16,35 36 15,-17 0 1,-18-54 0</inkml:trace>
-  <inkml:trace contextRef="#ctx0" brushRef="#br0" timeOffset="21713.02">10266 4004 0,'-18'0'0,"36"0"0,-36-18 16,18 1 0,35-1-1,18 0 1,0 1 0,-35 17-16,17-18 15,-17 1 1,-18-1-1,-18 53 32,1-17-47,17 17 32,17-35-32,1 18 15,17-1 1,0-17-1,18-17 1,0-19 0,-35-16 15,-18 34-15,0 0-1,-18 36 1,18 0-16,-17 34 15,-1 54 1,18 0 0,-18 18 15,18-54-15,0 1-1,0-54 1,18-17-1,-18-17 17,0-1-17,0 0 1,0 1 15,-18 17-15</inkml:trace>
-  <inkml:trace contextRef="#ctx0" brushRef="#br0" timeOffset="24838.88">10848 5838 0,'0'0'0,"18"0"16,17 0-1,0 0-15,36 0 16,-36 0-16,53 0 16,53 0-1,0 0 1,-52 0-1,-37 0 1,19 18-16,0-18 31,-19 0-15,-34 0 15</inkml:trace>
-  <inkml:trace contextRef="#ctx0" brushRef="#br0" timeOffset="55681.28">18803 6544 0,'18'-18'16,"-18"1"-1,0-1 1,17 18 0,-17-18-16,0 1 31,0-1-16,0 36 32,0 17-31,-17 0 0,17 71-1,0 18 1,0-71-1,0 35 1,0-35 0,0-36-1,0 1-15,0-36 16</inkml:trace>
-  <inkml:trace contextRef="#ctx0" brushRef="#br0" timeOffset="55949.65">18574 6809 0,'0'17'15,"88"19"32,-70-19-47,34-17 16,1 18 0,-17-18-1</inkml:trace>
-  <inkml:trace contextRef="#ctx0" brushRef="#br0" timeOffset="56250.46">18997 6756 0,'0'0'15,"0"17"1,-18-17-1,1 18 1,-1 0-16,-17 17 16,0 0-1,-18 0 1,17-17 0,19 0-16,-1-18 15,0 17 1</inkml:trace>
-  <inkml:trace contextRef="#ctx0" brushRef="#br0" timeOffset="56981.18">21026 6103 0,'0'0'0,"-18"-35"31,18 52 16,0 1-31,0 0-1,0 17-15,0 194 32,0-176-32,0 35 15,18 18 1,-1-53 0,-17-18-16,0-17 15,0 17 1</inkml:trace>
-  <inkml:trace contextRef="#ctx0" brushRef="#br0" timeOffset="57218.92">20867 6597 0,'0'0'0,"17"18"47,1-18-47,0 0 16,35 35-1,-18-18 1</inkml:trace>
-  <inkml:trace contextRef="#ctx0" brushRef="#br0" timeOffset="57481.68">21167 6615 0,'0'-18'31,"-18"18"0,0 18-15,1-18-1,-1 17-15,-35 18 16,18 1 0,0-1-1,17-17 1,0-18-16</inkml:trace>
-  <inkml:trace contextRef="#ctx0" brushRef="#br0" timeOffset="59583.01">14993 5856 0,'-18'0'15,"1"0"1,34-18 15,1 18-15,0 0-16,35 0 16,70-17-1,-70 17-15,70 0 16,54-18-1,-71 18 1,0 0 15,-89 0-31,-34 0 32,-1 0-17,0 0-15</inkml:trace>
-  <inkml:trace contextRef="#ctx0" brushRef="#br0" timeOffset="59886.38">15028 5962 0,'0'0'0,"0"18"15,18-18 17,0 0-32,-1 0 0,54 0 15,88-18 1,140 0 31,-246 1-47,-17 17 0,17 0 15,-36 0 1</inkml:trace>
-  <inkml:trace contextRef="#ctx0" brushRef="#br0" timeOffset="62533.74">16157 5944 0,'0'0'32,"35"0"-17,18 0 1,0 0-1,-35 0-15,17 0 16,18 0 15,-35 0-31</inkml:trace>
-  <inkml:trace contextRef="#ctx0" brushRef="#br0" timeOffset="63087.55">18344 6032 0,'18'0'0,"0"0"16,17-17-1,18 17 1,-35 0-16,34-18 16,-16 18-1,17 0-15,105-17 47</inkml:trace>
-  <inkml:trace contextRef="#ctx0" brushRef="#br0" timeOffset="63884.16">21272 5944 0,'0'0'0,"18"0"16,0 0-16,-1 0 15,36 0 1,88 0 0,-70 0-1,0 0 1,-36 0-1,-18 0 1</inkml:trace>
-  <inkml:trace contextRef="#ctx0" brushRef="#br0" timeOffset="130431.4">9913 6650 0,'0'0'0,"0"-18"31,18 18 63,-1 0-78,1 0-16,0 0 15,17 0-15,18 0 16,-36 0-16,36 0 15,36 0 1,-19 0 15</inkml:trace>
-  <inkml:trace contextRef="#ctx0" brushRef="#br0" timeOffset="130766.43">10001 6756 0,'18'0'16,"17"0"-1,-35-18 1,53 18 0,53-35-1,-18 17 1,-53 18-16,36-18 15,-36 18 1,-35 0 0</inkml:trace>
-  <inkml:trace contextRef="#ctx0" brushRef="#br0" timeOffset="154806.25">6932 13106 0,'0'0'0,"-18"0"15,18 17 1,-17-17 0,-1 0-1,1 0 1,-1 0-1,18 18 1,18-18 15,-1-18-15,18 1 0,-35-1 15,18 18 234,0 0-202</inkml:trace>
-  <inkml:trace contextRef="#ctx0" brushRef="#br0" timeOffset="156087.25">6385 13070 0,'-17'18'15,"34"-36"-15,-34 18 31,34 0-31,1 0 32,-18 18 30,0 0-46,0-1-1,0 1-15,-18 35 32,18-18-17,18-17 1,70-36 0,0-17-1,-35 17-15,53-52 16,-71 52-16,71-35 15,-18 0 1,-88 36 0,-35 34-1,17-17-15,-52 35 16,-18 1 0,52-19-1,1 1-15,17 0 16,18-1-1,71 1 1,35-18 15,70-35-15,-158 35 0,17 0-16,0-18 15,-70 36 16,-18-1-15,36-17-16,-19 0 16,1 18-1,35-36 48,0 36-1,18-18-46,-18 18 15</inkml:trace>
-  <inkml:trace contextRef="#ctx0" brushRef="#br0" timeOffset="158006.34">13388 6720 0,'0'-17'0,"18"17"31,-1 0-16,1 0-15,70 0 16,0 0 0,71 0-1,0 0 1,-89 0 0,-34 0-16,-1 0 15,-18 0 1,-69 0 15</inkml:trace>
-  <inkml:trace contextRef="#ctx0" brushRef="#br0" timeOffset="158272.5">13406 6791 0,'0'0'0,"-18"18"0,36-18 31,-1 0-31,1 0 0,88 0 16,-1-18 15,72 0-16,-18 1 1,-124 17-16,0-18 16,-17 18-16</inkml:trace>
-  <inkml:trace contextRef="#ctx0" brushRef="#br0" timeOffset="172446.5">18292 13758 0,'0'0'16,"0"53"15,-18-35-31,0 52 15,18-34-15,-17 52 16,17 71 0,-18-18 15,0 0-15,18-123-1</inkml:trace>
-  <inkml:trace contextRef="#ctx0" brushRef="#br0" timeOffset="172848.98">18186 13723 0,'-18'0'0,"36"0"0,-36-18 0,-35 18 15,-17 53 1,-19 18 15,72-36-31,-19 0 16,19 1 0,34-54 15,54-52-16,17-19 1,-35 19 0,-18 52-16,36 0 15,0 54 1,-36 34 0,-18-34-16,1 34 15,17 36 1</inkml:trace>
-  <inkml:trace contextRef="#ctx0" brushRef="#br0" timeOffset="173378.63">20902 13529 0,'35'18'16,"-35"35"-1,18 229 17,-36-212-32,18 1 0,-17 52 15,-19 54 16,19-107-31,17 1 16</inkml:trace>
-  <inkml:trace contextRef="#ctx0" brushRef="#br0" timeOffset="173800.26">20867 13635 0,'-18'0'0,"36"0"0,-53 0 16,17 0-16,-17 35 31,-1-17-31,1 35 0,-18 0 16,0 35-1,36-35 17,52-106-1,-18 35-31,19-35 16,-1-17-1,18-1 1,-18 36-16,53-18 15,-35 53 1,36 106 0,-1 53-1,-35-18 1</inkml:trace>
-  <inkml:trace contextRef="#ctx0" brushRef="#br0" timeOffset="175063.03">9472 14305 0,'-18'0'15,"36"0"-15,-53-18 16,17 18-16,18 18 31,0 0-15,18 35 0,-18 17-1,0-52-15,17 105 31,1-105-31,17-36 16,36-17 0,88-88-1,70-19 1,-17 54 0</inkml:trace>
-  <inkml:trace contextRef="#ctx0" brushRef="#br0" timeOffset="176127.55">12682 14270 0,'-17'-18'47,"17"36"-15,0-1-17,0 19 1,0-19-16,17 54 15,-17-53-15,0 35 16,18-1 0,35-34-1,53-36 1,70-70 0,-17 0-1,-71 35-15,177-70 31,-89 70-31,-105 35 16</inkml:trace>
-  <inkml:trace contextRef="#ctx0" brushRef="#br0" timeOffset="208172.24">2469 2364 0,'0'0'16,"-17"-18"-16,17 0 15,-18 18 1,36 18 0,-1 17-1,-17 53 16,0 36-15,-17-1 0,17-52-1,17-18 1,19-36 0,-1-52-1,-17 18-15,52-19 16,18-34-1,18 17 1,-53 35 0,-35 1-16,17 17 15</inkml:trace>
-  <inkml:trace contextRef="#ctx0" brushRef="#br0" timeOffset="208372.31">2663 2628 0,'-35'0'16,"70"0"-16,-70-17 0,35-1 15,35-35 1,18 0 0,53-53-1,35 0 1,-52 18-1,-72 71-15</inkml:trace>
-  <inkml:trace contextRef="#ctx0" brushRef="#br0" timeOffset="210224.59">1464 4339 0,'0'-17'16,"18"17"-1,-1 0-15,19 0 16,-1 0 0,35 0-1,54-18 17,-36 0-32,53 1 31,-35-36-16</inkml:trace>
-  <inkml:trace contextRef="#ctx0" brushRef="#br0" timeOffset="212925.26">3598 4233 0,'0'-17'31,"18"17"-15,0 0-1,17 0 1,-17-18-16,52 18 16,1 0-1,70 0 1,-18-18-1,-35 1 17,-52 17-32,-36-18 31</inkml:trace>
-  <inkml:trace contextRef="#ctx0" brushRef="#br0" timeOffset="214053.49">1217 4868 0,'-18'0'16,"36"0"30,35 0-14,-35 0-17,-1 0-15,19 0 16,-19 0 0,1-17-1,17 17 1,-17 0-1</inkml:trace>
-  <inkml:trace contextRef="#ctx0" brushRef="#br0" timeOffset="214641.11">2258 4798 0,'0'0'0,"17"0"16,1 17-1,35-17 1,0 0 0,-35 0-16,52-17 15,18 17 1,-17-18-1,-36 0 1,-17 18 0</inkml:trace>
-  <inkml:trace contextRef="#ctx0" brushRef="#br0" timeOffset="-214555.53">2540 4692 0,'-18'0'0,"36"0"0,-53 0 16,52 0 15,1 0-15,35 35-1,0-17 1,-36-18-16,36 17 15,0 19 17,-53-19-32,-53 54 31,0-18-15,18-35-16</inkml:trace>
-  <inkml:trace contextRef="#ctx0" brushRef="#br0" timeOffset="-213717.59">2240 5627 0,'18'0'32,"-1"0"-17,19 0 1,-1 0 0,71-18-1,17 1 1,-17-1-1,-53 0 1,-35 18 0,-18-17-1</inkml:trace>
-  <inkml:trace contextRef="#ctx0" brushRef="#br0" timeOffset="-213421.46">2558 5415 0,'17'0'62,"36"35"-31,-53-17-31,53 0 16,-35-1 0,-1 1-16,1 0 15,-36 35 1,-17-18 0,0 0-16,0-17 0</inkml:trace>
-  <inkml:trace contextRef="#ctx0" brushRef="#br0" timeOffset="-212732.49">2311 6332 0,'35'0'63,"0"0"-63,-17 0 15,123 0 1,-53-17 0,0-1-1,-17 18 1,-53-18-1,-18 1 1,-18 17 0</inkml:trace>
-  <inkml:trace contextRef="#ctx0" brushRef="#br0" timeOffset="-212454.56">2681 6156 0,'0'0'0,"-18"0"0,18-18 16,-17 18 15,34 0-15,1 0-1,17 18 1,-17 17-1,0-17 1,-1 35 0,-87 35-1,34-53-15</inkml:trace>
-  <inkml:trace contextRef="#ctx0" brushRef="#br0" timeOffset="-207234.52">776 4304 0,'-18'0'16,"18"18"15,-17-18 32,-36 35-48,-18 18 1,54-36-16,-71 72 16,17 16-1,18 36 1,53 18-1,35-18 1,18-35 0,-17-88-16,69 70 15,54-53 1,70-35 0,-70-35-1,-35-36 1,-54 1-1,-35 17 1,18-35-16,-17-159 31,-54 194-31,-53-176 16,-52 123 0,-177 71 15,194 52-31,0 1 15,-52 17 1,122-17 0</inkml:trace>
-  <inkml:trace contextRef="#ctx0" brushRef="#br0" timeOffset="-204177.19">1393 4762 0,'18'0'93,"0"0"-77,-1 0 0,1 0-1,17 0 16,-17 0-31,35 0 0,0 0 32,0 0-32,53 0 15,-54 0-15,90 0 16,69 18 0,-52 17-1,-106-17-15,88 17 16,53 54-1,0-1 1,18 0 0,70 53 15,-212-106-31,-17 1 16,124 52-1,-71-18-15,35 19 16,-35-37-1,35 37 17,-35-1-17,-1 0 1,1 0 0,-53-70-1,18 52-15,-1-17 16,54 36-1,-18-19 1,-54-17 0,-16-18-16,17 18 15,-36-18-15,19 36 16,34 0 0,1-1 15,-54-52-31,1-1 0,70 72 31,-53-36-15,18 35-1,0-53 1,-35 0-16,35 1 16,17 16-1,1 1 1,-1 0-1,1 18 1,17-18 15,-17 0-31,35 17 16,-18 1 15,-35-18-31,53 0 16,-18 0 15,0-18-15,-53-18-16,71 1 15,35 17 1,71 18 0,-106-35-1,70 0 1,-70-18-1,70 17 1,89 1 15,-124-1-31,18-17 16,88 18 0,-36 0-1,-34-1 1,-71 1 15,52 0-15,-17-1-1,18-17 1,0 18 0,-36 0-1,36-18 1,0 17-1,-36 1 1,-52 0 0,-36-18-16,53 17 15,1 1 1,-1-18 0,-35 17-1,-18-17 1,18 18-1,-18-18-15,36 18 16,35 17 0,-89-35-16,54 18 15,17-1 1,-18 1 0,-17-18-1,36 18 1,-19-18-1,-52 17 1,-36-17 31,1-17-47,-1 17 16,0 0-16</inkml:trace>
-  <inkml:trace contextRef="#ctx0" brushRef="#br0" timeOffset="-203450.52">11712 8008 0,'0'0'0,"18"-18"0,-18 1 16,-35-19 15,-1 19-31,-17-1 31,18 18-31,17 0 16,-34-17 0,-1 17-1,-36 17 1,37 18 0,16-35-16,-52 71 15,35-18 1,-17 53-1,52 35 1,18-53 0,18-53-16,34 54 15,37-1 1,52-35 0,18-53-1,35-36 16,-71 1-15,36-35 0,-36-54-1,-70 36 1,-35 35-16,-36-194 31,1 194-31,-72-70 16,-34 52-1,35 53 1,-89 18 0,36 18-1,53 17 1</inkml:trace>
-  <inkml:trace contextRef="#ctx0" brushRef="#br0" timeOffset="-202149.83">10707 8308 0,'0'0'0,"0"-18"0,0 1 31,-18 34-15,1 1-1,-19 70 1,19-17 0,-36 87-1,53-105-15,0 0 16,0 0-16,-18 35 15,0 142 17,18-177-32,-35 70 15,35-17 1,-18 17 15,1 1-31,34-36 31,-17-53-31,36 36 16,-1 17 0,18 0-1,0 0 1,-35-52 0,34 17-1,-16-18 1,34-17-1,-34-18 1,-19 17-16,18-17 16,1 0-1,-19 0 17,1 0-1,0-17-31</inkml:trace>
-  <inkml:trace contextRef="#ctx0" brushRef="#br0" timeOffset="-200683.05">11677 9737 0,'0'0'0,"-18"-18"16,1 18 0,-1 0-16,-17 0 15,-18-18 1,0 18-1,-18 18 1,1 17 0,-1-17-1,1 52 1,-19 36 15,54-70-31,-35 105 16,52-106-16,0 18 15,-17 35 1,35 36 0,0-89-16,0 53 15,-18 18 1,-17 17 0,18-34-1,-1 52 1,18 0 15,18-71-31,-1-17 16,18 35-1,1-17 1,34 35 15,-52-71-31,0-17 16,34 52-1,-16-34 1,17-1 0,0-18-1,-36-17-15,54 18 16,35-36 0,17 1-1,36-18 1,-36-1-1,18 1 1,-17 0 0,-18-18 15,-36 0-31,1-18 31,-36 18-31,0-35 31,-17-18-15,0-70 0,-1 141-1,-17-106 1,0 17 0,0 36-1,-17 35-15,-1-53 16,-17-35-1,17 18 1,-17 34 0,17 37-1,1 34-15,-36-70 32,0 35-32,-53-35 15,0 17 16,53 36-15,-17-1 0,17 19-1,-18 17 1,36 0 0,0 0-16,-1 0 15,1 0 1,-18 17-1,18-17 1,17 0 0,1 0-1,-1 18 1,0-18-16,1 18 16</inkml:trace>
-  <inkml:trace contextRef="#ctx0" brushRef="#br0" timeOffset="-191728.8">4180 8167 0,'0'-18'0,"18"18"63,-18 18-1,0-1-30,18-17-17,-18 18-15,17-18 16,-17 18-1,18-18-15,0 17 16,52-52 0,18-18-1,1 0 1,-37 18-16,37-36 16,34-17-1,-35 35 1,-52 36-1,-19 17 1,19 0 0</inkml:trace>
-  <inkml:trace contextRef="#ctx0" brushRef="#br0" timeOffset="-188990.62">20126 8502 0,'0'0'0,"18"0"47,-18 18-32,17-18 1,36 17-1,18-17 1,70 0 0,35 0-1,-123-17 1,0 17-16,0-18 0,35 18 16,-35-18-1,-35 18 1</inkml:trace>
-  <inkml:trace contextRef="#ctx0" brushRef="#br0" timeOffset="-187311.38">20461 10442 0,'-18'0'31,"36"0"0,-18 18-15,35-18 0,1 0-16,69 0 15,107 0 1,-35 0-1,34-18 1,-87 18 0,-89 0-1,-35-17-15,-35 17 32</inkml:trace>
-  <inkml:trace contextRef="#ctx0" brushRef="#br0" timeOffset="-186457.25">20461 11359 0,'0'0'0,"-18"18"0,1-18 16,34 0 31,54 18-16,-36-18-31,18 0 0,177 0 31,-54-18-31,53 0 32,-88 1-17,-123-1 1</inkml:trace>
-  <inkml:trace contextRef="#ctx0" brushRef="#br0" timeOffset="-180597.62">4233 8961 0,'-17'0'62,"17"17"-15,53 1-16,-36-18-15,54 0 0,-18 0-1,70-35 1,1-1-1,70-52 1,-18-18 0,-123 89-16</inkml:trace>
-  <inkml:trace contextRef="#ctx0" brushRef="#br0" timeOffset="-179004.58">4004 9666 0,'0'0'0,"0"-18"16,0 36 15,18-18 0,-18 18-31,17-1 32,89-17-17,18-35 1,-36 0-1,18-18-15,158-53 0</inkml:trace>
-  <inkml:trace contextRef="#ctx0" brushRef="#br0" timeOffset="-176090.29">335 7990 0,'0'0'0,"18"0"31,-1 0-16,1 0 1,-18 18 31,0 17-31,0 18-1,0-35-15,18 52 16,17-17-1,-35-35-15,35 35 16,1 0 0,-1 17-1,0 1 1,-17-1 0,-18 1 15,0 17-16,0-35 1,0 0 0,-71-18-1,54-35 1,52 0 0,-70 0-1,17 0 1,18 0-1,18 0 1,-1 0 0,1 0 15,-18 18-15,0 0-16,35 35 31,-35-1-16,0-34 1,0 53 0,0-1-1,0-52-15,-18 35 16,18-36-16,-35 36 16,18 0-1,-1 0 1,18-35-16,-35 17 15,17 18 1,0-18 0,1 18-1,17 18 17,0-18-32,0 17 31,0 1-16,0-54-15,0 19 16,0-1 0,17 0-1,1 1 1,0-19 0,-18 1-1,17-18 1,1 17-1,0-17 1,17 0 0,-18-17-1</inkml:trace>
-  <inkml:trace contextRef="#ctx0" brushRef="#br0" timeOffset="-162481.46">5450 7955 0,'-17'-18'31,"17"1"-31,0-18 31,0 17-31,17-17 31,19-1-15,-1 36 0,0 0-1,18 36 1,-18-1-1,-17 0 1,0-17-16,-1 35 16,-17 0-1,-35 17 1,0 18 0,0-35-1,-18 36 1,0 16-1,0-16 17,17-19-17,19 1 1,17-18 0,17 0-1,19-1 1,-19-16-1,1-36-15,17 17 16,18-17 0,0-17-1,-18 17 1,-17 0-16,0-18 16,-36 36 30,0-1-30,1 19 15,-36-1-15,35 0-16,-17 0 16,17 1-16,1-19 15,-1 1-15,0 35 16,1 17-1,52 1 1,0-18 0,-17 0-1,0-35-15,17 70 16,-17-35 0,-1 35 15,1 53 0,-18-123-31,0-1 16,-53 36-1,-18 0 1,1-53 0,34 18-16,-16-18 15,-1-18 1,17 0-1,36 1 17,0-1-32</inkml:trace>
-  <inkml:trace contextRef="#ctx0" brushRef="#br0" timeOffset="-150913.34">4692 2593 0,'-18'0'16,"36"0"-16,-53 0 15,-1-18 1,1 1-1,17 17-15,-34-18 16,-19 18 0,18 0-1,-53 0 1,18 35 0,17-17-1,36 0-15,-124 52 31,89-35-31,17 18 16,0 18 0,35-36-1,1 0 1,17 18-16,-18 36 31,-17 16-15,35-87-16,0 0 15,-18 35 1,36-1 0,0 1-1,34 0 1,1 0 0,-17-18-1,-19-17-15,54 17 31,-1-17-15,-34 0-16,-1-18 0,35 17 16,-17-17-16,36 18 15,69 0 17,-17-1-17,-35-17 1,35 18-1,18-18 1,-106 0-16,71-18 16,34 18-1,54 0 1,-159 0 0,70 0-1,18 0 1,-35-17-1,18-1 1,-1 18 0,-35-18-1,-17 18 17,-18-17-17,-18 17-15,53-36 16,-70 36-1,0 0-15,17-17 16,0-19 0,-17 19-1,17-18 1,-17-1 0,-1-17-1,-17 18 1,-17-18-1,-19-17 1,-16-19 0,-1 19-1,35 52 1,-35-35-16,-35-35 31,-18 18-15,0-1-1,36 36 1,-71-36 0,-1 36-1,19 0 1,-18 17 0,70 18-1,-70-18 1,-141 18 15,229 0-31,-176 18 31,70-18-31,-70 18 32,52-1-17,89 1-15</inkml:trace>
-  <inkml:trace contextRef="#ctx0" brushRef="#br0" timeOffset="-140141.04">6720 2628 0,'0'0'15,"-17"0"-15,-19 0 16,36 18 15,0-1 1,-17 1-32,-18 17 15,17-17 1,0 17-16,-35 18 31,36 0-15,17-18-1,53 18 1,17-17 15,-17-19-31,0 1 16,0 0-1</inkml:trace>
-  <inkml:trace contextRef="#ctx0" brushRef="#br0" timeOffset="-139901.15">6650 2910 0,'-18'-17'15,"36"34"-15,-53-34 16,52-1 0,36 0-1,18 1 1,87-18 0,19-18-1,-54 35 1</inkml:trace>
-  <inkml:trace contextRef="#ctx0" brushRef="#br0" timeOffset="-127089.99">15028 9543 0,'-17'0'15,"34"0"-15,-52 0 63,53-18-32,-1 18-15,1 0-1</inkml:trace>
-  <inkml:trace contextRef="#ctx0" brushRef="#br0" timeOffset="-119863.33">8855 8202 0,'0'-18'15,"0"36"-15,0-53 16,0 0 0,0-1 15,-18 19-31,18-1 31,-18 0-31,1 1 31,-1 17-31,1 0 16,-19-18 0,19 18-1,-36-18 1,17 18-1,1 0 1,0 0 0,0 0-1,-18 18 17,35-18-17,18 18-15,-53-1 31,18 1-31,-36 17 32,54-17-17,-19 17 1,1 36 0,-18-18-1,36 0 1,-1-1-1,0-16-15,1 34 16,-36 107 0,35-71-1,-35 52 1,35-70 0,1-52-16,17 52 15,-18 35 1,-17 36 15,17-71-15,1 53-1,-1 1 1,0-19 0,18-35-1,-17 36 1,-1-36-1,-17 35 1,17 71 15,1-176-31,17 53 16,-18 52 0,0-52-1,18-36 1,-17 53-16,-19 71 31,19-71-15,-19 53-1,19-17 1,17-19 0,0-34-1,17 52 1,-17 1-1,18-1 1,-18 19 15,18-72-31,-1-17 16,1 18 0,-18-54-16,0 36 15,0 53 16,0-88-31,0 52 16,-18 1 15,18-36-15,0 0-16,36 36 16,-19-71-1,-17 17-15,18 19 16,17 17-1,-17-36 1,-18 1-16,17 17 16,1-17-1,-18 17 1,18-17 0,-1-18-16,1 17 15,17 1 1,18 0-1,-18-1 17,1 1-17,34 0 1,-17-1 0,18 1-1,-1 17 1,-17-35-1,0 0 1,0-17 0,53-19 15,-53 19-31,0 17 16,-18 0-16,0 0 31,-17 0-31,17 0 0,1-18 15,-19 18 1,36-18-16,88-17 31,-106 35-15,1 0 0,-1-18-1,-17 18-15,17-35 16,0 17-1,0-17 1,1 18 0,-1-1-1,18-53 17,-35 36-17,-1 0-15,1-18 16,0 35-16,-1-52 31,1 52-31,-1-52 0,36-125 31,-17 90-15,-1-72 0,-17 124-1,17-158 1,-35 158-16,17-71 15,19-17 1,-1 18 0,0 52-1,1-70 1,-19-35 0,1 52-1,-1-70 1,1 71-1,-18 34 17,18 1-17,-18 71 1,0-19-16,0 19 0,17-54 16,-17-17-1,0-53 1,18 53-1,-18 52-15,0-34 16,0-36 0,0 0-1,0 53 1,0 18-16,-18-53 16,18-18-1,-17-35 16,17 70-15,-18-35 15,18 71-31,0 0 16,-18-36 0,-17 1-1,18 17 1,17 18-1,-18-1 1,0-17 0,1 18-1,-54-53 17,36 35-32,-18 0 15,18 35 1,35 1-1,-18-1-15,0 1 32,-17-19-17,-35-17 1,17 53 0,35-17-1,-17 17-15,-18-18 16,-35-17-1,70 35-15,0 0 16,1-18-16,-1 1 16,0-1-1,-17 18 1,-18-18 0,0 18-1,18 0-15,-36 0 31,54-17-31,-1 17 16,1 0 0,-1-18-1,18 0 1,-18 1 0,18-1 15,-17 18-16,-1 0 1,18-18-16,-18 18 47,1 0 0</inkml:trace>
-  <inkml:trace contextRef="#ctx0" brushRef="#br0" timeOffset="-93559.29">7020 9507 0,'0'0'0,"18"0"47,17-17-31,-17 17-16,52-18 15,89 0 1,-53-17-1,88 0 1,-141 35 0,-35-18-1,-36 36 1</inkml:trace>
-  <inkml:trace contextRef="#ctx0" brushRef="#br0" timeOffset="-93258.33">7567 9278 0,'0'0'0,"-18"0"32,89 18-1,-53-18-15,35 17-16,-18 19 15,-35-19 1,0 54-16,-124 88 15</inkml:trace>
-  <inkml:trace contextRef="#ctx0" brushRef="#br0" timeOffset="-59692.82">27940 3175 0,'0'0'0,"-18"-18"15,1 1 16,17-1-31,-18 18 16,18-18 0,-18 18-16,-34-35 31,-37 18-15,-34-19-1,-18 19 1,-18 17-1,36 35 1,-54 53 0,-17 53-1,88-17 1,-17 123 0,35 35-1,-18 124 16,70-212-31,1 0 16,0 88 0,17 71 15,18-283-31,0 1 16,0 52-1,0-70-15,18 53 16,-18-53-16,123 247 31,-87-265-15,-1 18-16,53 35 15,36 18 1,34-36 0,-17 1 15,-70-53-31,35 17 0,17-17 15,71-18 1,-17-36 0,123-211 15,-177 89-15,1-36-1,-19 0 1,-52 105-16,0 1 15,0 18-15,53-195 16,-71 89 0,-17-107-1,-18 1 1,0 18 15,0 175-31,-35-87 0,17 0 16,-158-195 15,123 318-15,0 0-16,-71-35 15,18 0 1,54 53-16</inkml:trace>
-  <inkml:trace contextRef="#ctx0" brushRef="#br0" timeOffset="-55661.16">14781 7973 0,'0'-18'0,"0"36"15,0-54-15,-17 36 0,-19-35 32,19 35-32,-36 0 15,-71 18 1,-70 17 0,89 0-1,-37 54 1,90 16-1,34 54 1,36-35 0,87 17-1,89-53 1,71-70 0,-53-71-1,-124 17-15,176-122 31,-140 52-31,-36-88 32,-176 35-17,-36 53 1,-123 36 0,-17 87-1,105 19-15</inkml:trace>
-  <inkml:trace contextRef="#ctx0" brushRef="#br0" timeOffset="-54926.76">14658 8837 0,'0'0'0,"-53"-18"0,-159 36 31,142 0-31,17 17 16,-141 71 0,106-18-1,52-35-15,-17 53 16,89 53-1,105-36 1,0-52 0,-53-54-16,106 18 15,106-52 1,-212-1-16,71-52 16,35-71-1,-106 17 1,-53-70-1,-87-18 17,-142 36-17,52 158 1,-16 36 0,69 0-16</inkml:trace>
-  <inkml:trace contextRef="#ctx0" brushRef="#br0" timeOffset="-54141.34">14993 9790 0,'0'0'0,"-71"-36"16,36 19 0,-35 34-1,-107 89 1,142-53 0,-53 53-16,35-53 15,-35 141 1,70-35-1,18-107-15,53 37 16,106-19 0,-1-52-1,-69-18-15,87 0 16,71-71 0,-53-17-1,-123 18 1,-54 34-1,-17-122 1,-17 87-16,-72-52 16,-16-19-1,-125-34 1,54 123 0,-106 53-1,35 71 1,176-36-16</inkml:trace>
-  <inkml:trace contextRef="#ctx0" brushRef="#br0" timeOffset="-52238.19">29968 8396 0,'0'-35'32,"18"35"14,0 0-30,17 0-16,-17 0 16,17 0-16,124 0 15,-53 0 1,-1 0 0,-34 0-1,-36 0 16,-17 0-15</inkml:trace>
-  <inkml:trace contextRef="#ctx0" brushRef="#br0" timeOffset="-51805.04">32191 8396 0,'0'0'16,"53"18"15,176 17-15,-176-35-1,-18 0-15,18 0 0,71 18 16,35-1-1,-36-17 1,-52 0 0,-36 0 15,-53 0-15</inkml:trace>
-  <inkml:trace contextRef="#ctx0" brushRef="#br0" timeOffset="-51207.09">28152 8996 0,'0'0'16,"17"0"-1,1 0-15,52-18 31,-34 18-31,17 0 16,0-17-16,123-1 16,-35-17-1,-123 35-15</inkml:trace>
-  <inkml:trace contextRef="#ctx0" brushRef="#br0" timeOffset="-47441.17">27481 9525 0,'0'0'0,"0"-18"16,0 1 15,0 34 0,0 1-31,0 53 16,0-36-1,-17 53-15,-1 18 16,0-53 0,54 35 15,-19-88-16,54 18 1,70-36 0,-106 18-1,1 0-15,-1 0 16,0 0-16</inkml:trace>
-  <inkml:trace contextRef="#ctx0" brushRef="#br0" timeOffset="-46871.84">28857 9684 0,'18'0'62,"17"0"-46,-17 0-16,35 0 16,35 0-1,-53-18 1,0 18 15</inkml:trace>
-  <inkml:trace contextRef="#ctx0" brushRef="#br0" timeOffset="-46539.84">29792 9472 0,'0'0'0,"0"18"31,0 17-15,0 18 0,0-18-16,-18 36 15,18-36-15,-17 36 16,17-1 0</inkml:trace>
-  <inkml:trace contextRef="#ctx0" brushRef="#br0" timeOffset="-46173.21">29951 9507 0,'0'0'15,"-18"0"1,18 18-1,0 17 1,0-17-16,0 35 16,18 35-1,35 0 1,17-35 0,1-71 15,-36 1-16,-17-124 1,-36 123 0,0-17-16,-17 0 15,-53-1 1,53 36 0,17 0-16</inkml:trace>
-  <inkml:trace contextRef="#ctx0" brushRef="#br0" timeOffset="-45902.76">30409 9525 0,'18'0'31,"-18"18"0,0-1-15,0 1-16,35 17 16,1 36-1,-1-18 1,-17-18-16,-1 35 31,-34-52-31,17 0 16,-36-18-16</inkml:trace>
-  <inkml:trace contextRef="#ctx0" brushRef="#br0" timeOffset="-45103.27">30727 9490 0,'0'0'0,"35"17"16,0-17-1,1 18 1,-19-18 0,1 0-1,-36 18 1,18 17-1,0 53 1,0-53 0,36 18-1,-1-17 1,18-19 0,-18-34 15,-17-19-16,-18-17 1,0-35 0,-35 18-1,-18 52 17,35 18-32,71 0 46,-35 0-46,52 0 16,1 0 0,-36 0-16,0 0 31,-17 18-15,-1-18-16,-17 53 31,0-36-31,0 18 15,18 36 1,17-18 0,-17-35-1,0-1-15,35 1 16,-1-36 0,1-35-1,-17 0 1,-36 18-16,-18-35 15,-70-19 1,-36 72 0</inkml:trace>
-  <inkml:trace contextRef="#ctx0" brushRef="#br0" timeOffset="-43739.25">27605 10619 0,'0'-18'16,"17"36"15,-17-1-15,18 36-16,17 53 31,-35-71-31,18 71 15,-18-88 1,0 17-16</inkml:trace>
-  <inkml:trace contextRef="#ctx0" brushRef="#br0" timeOffset="-43449.33">27570 10566 0,'0'0'0,"-36"-36"0,19-17 15,-19 1 1,36 34 0,36 0-1,52 1 17,35 17-17,-17 35 1,-53 35-1,-71-52 1,-34 35 0,-37 0-1,36-35 1</inkml:trace>
-  <inkml:trace contextRef="#ctx0" brushRef="#br0" timeOffset="-43140.34">28663 10636 0,'0'0'0,"18"0"47,17 0-31,53 0-1,-17 0 1,17-17 0,-35 17-1,-35 0 1</inkml:trace>
-  <inkml:trace contextRef="#ctx0" brushRef="#br0" timeOffset="-42603.17">29774 10513 0,'0'-18'15,"0"36"-15,-17-36 0,-1-35 16,18 36 0,0-1-16,18 18 0,17-35 31,-17 35-31,35 0 0,17 0 31,-17 53-15,-53-1-1,0-16-15,-18 17 16,-70 17 0,0-17-1,53-35 1,17-18-16,1 0 16,52 0-1,-18 0-15,54 0 16,-18 0-1,17 17 17,-17-17-32</inkml:trace>
-  <inkml:trace contextRef="#ctx0" brushRef="#br0" timeOffset="-42251.19">30286 10513 0,'0'0'0,"0"-18"16,-18-17 0,1 35-16,-1 0 15,0 17 1,18 19 0,0-19-16,-17 19 15,17 34 1,35-34-1,-17-19-15,17-17 16,18 0 0,0-35-1,-53-18 1,0 35 0,-18-35-1,-52 18 1,-1 17-1,18 36 1</inkml:trace>
-  <inkml:trace contextRef="#ctx0" brushRef="#br0" timeOffset="-41269.28">30462 10477 0,'18'-35'31,"0"35"-31,-1-35 16,1 35-16,17-18 15,18 18 1,-35 36 15,-18 16-15,-53 19-1,18-36 1,-1 1 0,54-19-1,35-17 1,0 0 0,-36 0-16,54 0 15,-1-35 1,1 17-1,-36-17 1,-17 17-16,17 1 16,-35-1-1,18 0-15,-18 1 32,-18 34-17,1 1 16,-1 0-31,-17-1 16,35 1-16,-18 0 16,18 17-1,18-35 1,17 18 0,0-36-1,1 0 1,-36-17-1,0 17-15,0-17 16,-18-18 0,0 53-1,36 0 32,0 0-31,-1 18-16,36-18 15,0 17 1,-18 1 0,-17 0-1,0 17 1,-18 0 0,17 18-1,1-35 1,17 17-1,18-35 1,18-17 0,-54-1-1,-17 0 1,0-17-16,-35-53 31,-71 35-15,53 35-16,0 18 0</inkml:trace>
-  <inkml:trace contextRef="#ctx0" brushRef="#br0" timeOffset="-39987.06">27428 11465 0,'0'18'62,"18"-18"-62,-18 18 0,0-1 16,18 18 0,17 36-1,-35-36 1,18-17-16,-18 0 15,0-1 1,-18-34 15,18-1-31,-18-35 16,1 18-16,17-53 16,0-54-1,35 37 1,18 69-1,-35 19-15,34 17 16,72 53 15,-89-18-31,-17 35 32,-53-17-17,-1-35 1,-34 17-1,17-35 1,53-17 0</inkml:trace>
-  <inkml:trace contextRef="#ctx0" brushRef="#br0" timeOffset="-39303.07">28169 11501 0,'-17'0'0,"34"0"0,-52-18 0,17 0 15,36 1 17,-18-1-32,35 18 15,18-18 1,-18 36-1,-17-18-15,0 35 16,-1 18 0,-34 0-1,-1-18 1,0-35-16,-17 18 16,-18-36-1,53 1 1,0-19-16,36-34 15,34 17 1,-17 35 0,35 18 15,-35 36-15,-18-19-16</inkml:trace>
-  <inkml:trace contextRef="#ctx0" brushRef="#br0" timeOffset="-38842.16">29228 11465 0,'0'0'16,"17"-17"15,1 17-31,35-18 31,-18 0-31</inkml:trace>
-  <inkml:trace contextRef="#ctx0" brushRef="#br0" timeOffset="-37670.81">30145 11254 0,'0'-18'15,"17"-17"17,-17 17-32,0 0 31,-17 18-16,-1 18 17,1 0-17,-1-1-15,0 54 32,18-53-32,0 17 15,53 35 1,18-52-1,17 17 1,-35-35 0,-53 18-1,-18-18-15,-70 0 32,53 0-32,-53-18 15,52 18-15</inkml:trace>
-  <inkml:trace contextRef="#ctx0" brushRef="#br0" timeOffset="-37502.79">30092 11165 0,'35'-17'15,"-70"34"-15,88-52 0,-36 17 16,19 1-16,-1-1 16,36 1-1,34 17 1,-34 0-1,-18 0-15</inkml:trace>
-  <inkml:trace contextRef="#ctx0" brushRef="#br0" timeOffset="-37102.99">30780 11060 0,'-18'0'31,"1"0"-31,-1 35 16,-17 18 15,-1 0-15,19-18-16,-19 53 16,72 18-1,-19-88 1,19 17-1,-1-17-15,18-18 16,17-18 0,-70-17-1,-35-18 1,-18 35 0,36 18-16,-19 0 15,1 18 1,17 17-1,18 0 1,18-17 0</inkml:trace>
-  <inkml:trace contextRef="#ctx0" brushRef="#br0" timeOffset="-36735.1">31097 11271 0,'0'-17'0,"0"34"0,0-52 16,-35 0 0,17 35-1,-34 35 1,34 18 0,18 35 15,18-70-31,-18-1 0,52 19 31,1-19-31,36-52 31,-72 0-15,-34-36 0,-36 18-1,17 36 1,-17-1-1,36 36 1,34-1 0</inkml:trace>
-  <inkml:trace contextRef="#ctx0" brushRef="#br0" timeOffset="-36430.21">31432 11289 0,'18'0'16,"-36"0"-16,18 0 31,-17 18-15,-1-1-16,1 1 31,-1-1-31,18 19 16,18 17-1,34-18 1,19-17-1,35-71 17,-88 35-32,-18 0 0,17-35 15,-52-52 1,-71 52 0</inkml:trace>
-  <inkml:trace contextRef="#ctx0" brushRef="#br0" timeOffset="-34902.08">31715 9137 0,'0'-18'31,"17"18"1,1 0-32,35 0 31,35 18-15,-53-18-16,18 18 15,0 17 1,-35-18-16,-1 36 15,-17 18 1,-52 35 0,-19 105 15,53-175-15,1 17-16,-1 35 0,18 0 15,18 36 1,17-54-1,0-35 1,18 1-16,141 52 31,-158-88-15,34 17 0,-52-17-1,-71 0 16,35 0-31,-123 53 32,123-35-32,-35 17 15,53 1-15,-17-1 16,17 0-16,35 18 16,18 53-1,0-18 1,53 106 15,-36-53-31,-34-17 31,-19-71-31,1 35 16,-18 0 0,-18 18 15,1-89-31,17 1 15,0 0-15,-18-1 16,0-17 0,1-17 31,-1 17-47,0-18 15,1 0 1,-36 18-16</inkml:trace>
-  <inkml:trace contextRef="#ctx0" brushRef="#br0" timeOffset="-9777.87">27658 14058 0,'0'-17'31,"35"17"-15,18 0-1,0 0 1,-18 0-16,53-18 16,-35 18-16,18 0 15,35 0 1,-53 0 15</inkml:trace>
-  <inkml:trace contextRef="#ctx0" brushRef="#br0" timeOffset="-8939.43">27905 14623 0,'17'0'16,"1"0"-16,35 0 15,-18 0 1,71-18 0,53 0-1,0-17 1,-142 35-16</inkml:trace>
-  <inkml:trace contextRef="#ctx0" brushRef="#br0" timeOffset="-8343.01">28134 15628 0,'0'0'0,"18"0"31,17 0-15,18 0-1,0-18-15,158-35 32,-158 53-32,0-17 0</inkml:trace>
-  <inkml:trace contextRef="#ctx0" brushRef="#br0" timeOffset="-4507.87">3140 16669 0,'0'0'0,"-18"0"16,36 0 15,-1 0-31,36 0 16,53-36-1,35 1 1,-35 0 0,-71 17-16,18 1 31,-35-1-31,0 18 15</inkml:trace>
-  <inkml:trace contextRef="#ctx0" brushRef="#br0" timeOffset="-4290.37">3298 16969 0,'0'0'0,"0"17"0,18-34 32,35-36-17,-35 35-15,105-105 32,-35 70-32,18 0 15</inkml:trace>
-  <inkml:trace contextRef="#ctx0" brushRef="#br0" timeOffset="-2670.84">7056 16457 0,'-18'-53'15,"36"53"1,-1 18-1,1 17 1,-1-17-16,19 52 16,-19-34-16,36 16 15,18 1 1,-36-35 0,-17-18-16,17-18 15,18-87 1,-18 34-1,-35-35 1,-17 36 0,-1 52 15,0 53-15,1 89-16,34-18 15,-17-54 1,36 72-1,-19-71-15,19 53 16,-19 35 0,-17-18-1,0-70 1,-17-53 0,-1 0-16</inkml:trace>
-  <inkml:trace contextRef="#ctx0" brushRef="#br0" timeOffset="-2200.79">8061 16827 0,'0'0'0,"-18"-17"0,-17 17 31,0 17-15,17 1-16,18 53 16,-18 105 15</inkml:trace>
-  <inkml:trace contextRef="#ctx0" brushRef="#br0" timeOffset="-1740.36">8378 16404 0,'0'0'0,"-17"0"16,17-17-16,-18 17 15,53 35 17,1 53-17,-19-53 1,1 36-1,17 35 1,-17-53-16</inkml:trace>
-  <inkml:trace contextRef="#ctx0" brushRef="#br0" timeOffset="-1385.51">8431 16651 0,'0'0'0,"0"-18"15,0 1-15,0-1 0,36 1 16,-1-1 0,18 0-1,-18 18-15,18-17 16,53-72 15,-106 72-15,18-54-1,-54 36 1,36 17-16,-35-17 16,17 17-16,1 18 15,17 18 1,35 88 0,18 35-1,-18-35 1,36 17-1</inkml:trace>
-  <inkml:trace contextRef="#ctx0" brushRef="#br0" timeOffset="-1023.11">9243 16651 0,'0'-18'0,"0"36"16,0-53-16,0 17 15,0 36 1,0-1-16,0 36 16,0-17-1,0 34 1,0-17-16,0-18 0</inkml:trace>
-  <inkml:trace contextRef="#ctx0" brushRef="#br0" timeOffset="-398.35">9807 16192 0,'0'-17'0,"0"34"0,-17-87 16,-1 52-16,0-35 15,-35 18 1,18 35 0,17 18-16,1 52 15,17 71 1,35 18 15,53-18-15,18-88-1,-18-53 1,1-70 0,-72-124-1,-34 141 1,-19 0-16,-87-124 16,-54 54 15,124 105-31</inkml:trace>
-  <inkml:trace contextRef="#ctx0" brushRef="#br0" timeOffset="-70.98">9825 16404 0,'0'-17'16,"17"17"15,1 0-15,0 0-16,17 17 15,18 36 1,18 71 15,-54-72-15,1 1-16,-1-17 15,-17-36 1</inkml:trace>
-  <inkml:trace contextRef="#ctx0" brushRef="#br0" timeOffset="243.11">10372 16422 0,'0'-18'32,"0"36"15,0-1-47,17-17 15,1 53 1,-18 0-1,0-35-15</inkml:trace>
-  <inkml:trace contextRef="#ctx0" brushRef="#br0" timeOffset="2928.94">10742 15875 0,'0'0'15,"-18"-18"1,18 36 0,0 0-1,18 105 1,0-52-1,-1 17 1,1 0 0,0-35-1,-18-35 1,0-36 0,0 0-16,-18-35 15,18-211 16,0 211-31,0-106 16,35 89 15,1 70-15,34 123 0,-35-52-1,18 17 1,-53-53-16,36 18 15,-19 0 1,1-53 0,-18-71-1,0 1 1,0 17-16,0-35 16,35 0-1,36 70 1,-36 53-1,-17 0-15,35 54 16,-18 105 15,-35-106-15,0-35-16</inkml:trace>
-  <inkml:trace contextRef="#ctx0" brushRef="#br0" timeOffset="3164.81">11553 16087 0,'0'0'0,"18"-18"15,0 18 1,-18 18-16,17 52 15,1-35 1,-18 36-16,0 17 16,-18-17 15</inkml:trace>
-  <inkml:trace contextRef="#ctx0" brushRef="#br0" timeOffset="4580.79">11906 15699 0,'0'0'16,"0"-18"-16,-17 18 0,17-18 0,0 1 16,0 34 15,0 1-31,35 88 31,0 35-15,18-18-1,-18-70 1,-17-17-16,17-19 16,-17-34-1,-18-19 1,0-52 0,-18-35-1,18 87-15,-17 1 16,34 17-1,36 71 1,71 71 15,-54-89-15,-17 0 0,18-52-1,-36-19 1,-35-69-1,-53-54 1,-18 18 0,36 88-1,-18 18 1,36 87 0,17-34-1</inkml:trace>
-  <inkml:trace contextRef="#ctx0" brushRef="#br0" timeOffset="4880.82">12876 15928 0,'-17'0'0,"34"0"0,-34-18 16,-1 1-16,18 34 31,0 1-31,18 70 16,-18 0-1,0 18 1</inkml:trace>
-  <inkml:trace contextRef="#ctx0" brushRef="#br0" timeOffset="5612.17">13388 15399 0,'-18'-18'0,"36"36"0,-36-18 31,54 53-15,16 70 0,19 36-1,-36-71 1,-17-17-1</inkml:trace>
-  <inkml:trace contextRef="#ctx0" brushRef="#br0" timeOffset="5946.6">13088 15575 0,'-53'-35'15,"106"70"-15,-141-105 16,88 52-16,17-17 16,1-1-16,53 1 15,87-35 1,-34 34 0,52 72-1,-52 69 1,-89 1-1,-17-53-15,-36 71 16,-53 17 0,-52-53 15,-18-70-15,70-54-16</inkml:trace>
-  <inkml:trace contextRef="#ctx0" brushRef="#br0" timeOffset="6298.23">14093 15699 0,'0'0'15,"0"-18"1,0 36 15,0-1-31,0 71 16,0 1-1,0-54-15,18 35 16</inkml:trace>
-  <inkml:trace contextRef="#ctx0" brushRef="#br0" timeOffset="7379.82">14482 15222 0,'0'0'0,"0"-17"16,0-1-1,17 53 1,1 18 0,-1-17-16,1 52 15,17 35 1,-17-35 15,0-70-31</inkml:trace>
-  <inkml:trace contextRef="#ctx0" brushRef="#br0" timeOffset="7747.13">14482 15434 0,'0'0'0,"0"-18"15,0 1 1,52-1 0,37-17-1,-19 17 1,18-17 0,-52 35-16,-19-35 15,-34-1 16,-1 19-31,0-1 16,1-17 0,-1 17-16,18-17 15,0 53 1,18-1-16,-1 36 16,19 35-1,17 53 1,-36-17-1,-17-89-15</inkml:trace>
-  <inkml:trace contextRef="#ctx0" brushRef="#br0" timeOffset="8031.15">15205 15469 0,'0'0'0,"-18"0"32,18 18-17,0 0 1,0-1-16,0 18 15,18 18 1,-18-35-16,17 17 16,-17-17-16</inkml:trace>
-  <inkml:trace contextRef="#ctx0" brushRef="#br0" timeOffset="8679.99">15487 15240 0,'0'0'0,"0"-18"15,-18 1 1,1 34 0,17 36-1,0 0 1,17-35-16,1 70 15,-18-70 1,18-18-16,-18 17 16,0-34-1,0-1 1,0 0-16,0-52 16,0 35-16,0-71 15,17-18 16,1 54-31,-1 70 0,19 0 32,-1 53-17,36 52 1,-18 19 0,-36-71-1,18 0 1,-35-36-16,18-34 15,-18-19 1,0 1-16,0-53 16,18 35-16,-1-53 15,19-17 1,-1 105 0,-17 18-1,-1 35-15,36 71 16,-18 18 15,1-54-15,-1 1-1,-17-54 1</inkml:trace>
-  <inkml:trace contextRef="#ctx0" brushRef="#br0" timeOffset="8919.56">16369 15311 0,'35'0'16,"-70"0"-16,70 17 31,-35 1-31,0 35 15,0 17 1,18-17 15,-18-35-31,0-1 0</inkml:trace>
-  <inkml:trace contextRef="#ctx0" brushRef="#br0" timeOffset="9330.94">16775 14975 0,'0'0'0,"0"-17"0,17-54 31,-17 54-31,-17 17 16,-19 17 15,19 1-31,-1-1 16,0 1-16,1 35 16,17 0-1,17-35-15,36 17 16,0 0-1,35 18 1,-70-35-16,17 35 31,-52-18-31,-54-17 16,-70 17 0,18-35-1</inkml:trace>
-  <inkml:trace contextRef="#ctx0" brushRef="#br0" timeOffset="10997.64">11183 17251 0,'0'0'16,"0"-18"-16,-18 124 31,18-53-31,36 88 16,-19-53-16,124 283 15,1-1 1,-90-264-1,-34-88-15</inkml:trace>
-  <inkml:trace contextRef="#ctx0" brushRef="#br0" timeOffset="11334.62">10425 18574 0,'0'0'0,"-18"17"0,0 1 16,159-53 0,-88 17-16,247-52 15,176-54 1,283-70-1,282-71 1,-283 89 0,-405 88-16,299-36 15,1 19 1,-406 52 0,-317 70-1</inkml:trace>
-  <inkml:trace contextRef="#ctx0" brushRef="#br0" timeOffset="12115.32">11871 17727 0,'0'35'16,"0"106"0,18-52-1,-1-54-15,71 71 31,-70-106-31</inkml:trace>
-  <inkml:trace contextRef="#ctx0" brushRef="#br0" timeOffset="12481.69">11818 17709 0,'0'0'0,"-18"-17"0,1-1 15,17 1-15,17 17 16,54-18 0,-36 0-16,71 1 15,53-19 1,-53 36 15,-89-17-15,-17 52-1,18 71 17,0-18-32,17-17 15,35 70 1,-52-106-16</inkml:trace>
-  <inkml:trace contextRef="#ctx0" brushRef="#br0" timeOffset="13032.79">12665 17533 0,'0'-18'0,"0"36"0,-18-71 16,18 35 0,18 36 30,-18 0-30,17-1 0,-17 19-1,0-19 1,18 19 0,-18-19-1,18 1-15,-1 17 16,19 53-1,-1-17 1,-18-18 0,1-36-16</inkml:trace>
-  <inkml:trace contextRef="#ctx0" brushRef="#br0" timeOffset="13483.22">12629 17410 0,'-17'-18'31,"70"-17"-15,53 17 0,-54 0-1,54 1-15,0-1 16,0 18 0,-53 0-1,-35 0 1,-18 18 15,17 17 0,1 0-31,-1 36 16,54 35 0,-18 0-1,-18-36 1,-17-35-16,-1 1 15</inkml:trace>
-  <inkml:trace contextRef="#ctx0" brushRef="#br0" timeOffset="13916.97">13617 17074 0,'0'0'15,"35"71"17,-17-36-32,53 106 15,17 18 16,-53-106-31,0 35 16,18 0 0,-35-35-1,-18-35-15</inkml:trace>
-  <inkml:trace contextRef="#ctx0" brushRef="#br0" timeOffset="14349.75">13582 16739 0,'0'0'0,"-18"-17"15,1-36-15,17 17 31,53 1-15,17 18 0,71-19-1,0 19 1,-52 34 0,-54 19-1,-18-1-15,-17 18 16,36 53-1,17 35 1,35 17 0,-35-52-1,35 53 1,-17-36 0,-36-34 15,-18-72-31</inkml:trace>
-  <inkml:trace contextRef="#ctx0" brushRef="#br0" timeOffset="14915.87">14746 16757 0,'0'0'0,"0"-18"15,0 1 1,-18-1 0,1 0-1,17 1 1,17 34 62,-17 1-62,18 17-16,53 124 15,17 35 1,-35-53-1,-18-70 1,0 17 0,18 0-1,-53-70-15</inkml:trace>
-  <inkml:trace contextRef="#ctx0" brushRef="#br0" timeOffset="15467.47">14764 16616 0,'-18'-18'16,"0"1"-1,54-1 1,17 18 0,-18-18-16,53 18 15,36-17 1,-36-1 0,-53 18-1,-17 35 16,-1 53 1,54 54-17,35 69 1,-53-70 0,0 53-1,-53-123-15</inkml:trace>
-  <inkml:trace contextRef="#ctx0" brushRef="#br0" timeOffset="16801.43">12259 18274 0,'0'-18'0,"0"36"0,0-53 16,0 17-1,0 0 1,-18 18-16,1 0 15,-36 18 1,0 35 0,18-35-16,17 34 15,18-34 1,35 70-16,36-17 31,17-36-31,-35-35 16,70-18-1,-70-34 1,-53 16 0,-17 19-16,-19-36 15,-34 0 1,-18 0 0,52 18-1,54 88 1,17-1-1,1-16-15,69 105 16,-16-71 0,-36-34-1,-36-36 1</inkml:trace>
-  <inkml:trace contextRef="#ctx0" brushRef="#br0" timeOffset="17018.6">12524 18327 0,'0'0'0,"0"-18"0,0 1 16,17 34 0,1 1-1,0-1-15,52 72 16,-35-36-1,-35-36 1</inkml:trace>
-  <inkml:trace contextRef="#ctx0" brushRef="#br0" timeOffset="17533.28">12876 18133 0,'0'0'0,"0"-36"15,-35 72 32,35-19-47,0 36 16,18 0-1,-1-35-15,36 35 16,35-36 0,1-34-1,-36-18 16,-53-18-15,-53-36 0,-53-16-1,53 87 1,18 18 0,52 70-1,36 1 1,35 35-1,1-18 1,-36-53 0,-36-35-16</inkml:trace>
-  <inkml:trace contextRef="#ctx0" brushRef="#br0" timeOffset="17870.41">13264 18150 0,'0'-17'0,"0"-1"15,0 0 1,0 1 0,36-1-1,34 36 1,-34-1-1,-19 1-15,1 35 16,-18-35-16,0 17 16,-18 18-1,1-35 1,17-1 0,35-17 15,35 0-16,-17 0-15</inkml:trace>
-  <inkml:trace contextRef="#ctx0" brushRef="#br0" timeOffset="18400.64">14005 17903 0,'0'0'0,"-17"-17"0,-1 17 15,0 0-15,-17 0 31,35 35-15,-18-17-16,18 17 16,36 53-1,34-17 1,1-54 0,-18-17-1,17-35 1,-34-18-1,-54-35 1,-35 35 0,35 35-16,-52-17 15,17 35 1,18 18 15,52 35-15,71 17-1,-35 1 1,53-1 0,-53-34-16</inkml:trace>
-  <inkml:trace contextRef="#ctx0" brushRef="#br0" timeOffset="18850.96">14340 17886 0,'0'0'0,"-17"-18"15,17 1-15,-18-36 16,53 35 15,18 0-31,36 18 31,-37 36-15,-16-1 0,-54-17-1,-17 17 1,-18 0 0,35-35-1,36 0 1,0-18-16,17 18 15,53-17 1,-70 17-16,35 0 16,-1 17-1,-52 19 1,-17-19 0,-1 19-1,-70-1 1,53-17-16</inkml:trace>
-  <inkml:trace contextRef="#ctx0" brushRef="#br0" timeOffset="19386.94">15346 17621 0,'0'0'0,"-88"-17"31,70 34-31,-70 19 16,70-1-1,18 0 1,18 18-1,-18-35-15,53 17 16,53 0 0,-1-17-1,-34-36 1,-36-17 0,-52 0-1,-72-36 1,-16 1-1,52 52 1,17 18-16,1 0 16,35 53-1,71 17 1,-1 1 0,-17-53-1,18 34 1,17 19-1,-71-36 1,-17-17-16</inkml:trace>
-  <inkml:trace contextRef="#ctx0" brushRef="#br0" timeOffset="19784.9">15540 17639 0,'0'0'16,"-18"0"-16,18 35 47,0-17-47,53 35 15,35 0 16,-35-36-15,0-34 0,-35-1-1,-18 0-15,0-17 16,0-53 0,-18 53-1,18 17-15,0 0 16,18 54-1,35 52 1,17 35 0,-34-70-1</inkml:trace>
-  <inkml:trace contextRef="#ctx0" brushRef="#br0" timeOffset="20236.87">16192 17621 0,'0'0'0,"-17"0"16,34 0-1</inkml:trace>
-  <inkml:trace contextRef="#ctx0" brushRef="#br0" timeOffset="20387.25">16475 17621 0,'0'-17'31,"0"-1"-15</inkml:trace>
-  <inkml:trace contextRef="#ctx0" brushRef="#br0" timeOffset="20518.97">16810 17568 0,'0'0'0,"35"-17"15,-17 17 1,-18-18 0</inkml:trace>
-  <inkml:trace contextRef="#ctx0" brushRef="#br0" timeOffset="54219.08">8220 10213 0,'0'18'0,"-18"-36"78,18 0-78,-18-17 16,-17-36-1,-53-70 1,-18-88-1,-53-53 1,36 70 0,52 89-1,-70-142 1,-106-176-16,-35-141 31,159 300-15,-19-106-1,72 176 1,-54-53 0,54 107-1,35 70-15,-36-71 16,-17-35 0,53 141-16,-18-35 15,0-36 1,17 71-1,1 0 1,18 18 0,-1 0-1,0 35 1,18-18 0,18 18 77,0 0-77,-1 18 0,142 35 15,-106-36-31,53 36 15,123 18 1,-53-1 0,-87-17-16,122 35 15,-87-35 1,123 71-16,405 176 31,-352-159-15,-123-88-1,-1 17-15,406 124 16,159 124 0,-565-230-1,1-17-15,158 87 16,0-17 0,-159-70-16,142 52 15,158 19 1,-88-1-1,-88 0 1,-141-71 0,70 54-1,-17-36 17,-18-17-17,-36-18 1,-34-1-1,-106-34-15,35 0 16,-1 17 0,37 0-1,-54-17 1,35 0 0,-34-1-1,-1-17 1,-17 0-1,-1-17 32,1 17-47,0-18 0,52-17 32,-17-36-17,88-141 1,-53 54-1,53-160 1,1-88 0,-37 107-1,-34 157-15,35-175 16,53-124 0,-54 159-1,-52 141-15,35-124 16,71-123-1,18 35 1,17 18 0,-71 123-1,-70 107 1,123-178 0,-70 107-1,71-247 16,-142 299-31,-35 71 16,18-88 0,-18 0-1,0 0 1,17 17 0,-17 54-1,35-1 1,1 18-1,-19 1 1,1 16 0,0 19-1,-1-1 1,1 0 15,0 18-15,-1 18-1,1 17 1,35 36 0,35 52-1,-35-52 1,53 70 0,0 0-1,17 53 1,-52-53-1,-36-53-15,106 300 32,-70-194-17,34 18-15,54 70 32,53 1-17,17 34 1,18-17-1,-88-106 1,70 88 0,-88-88-1,89 88 1,-1-17 0,-18-36-1,-69-70 1,-72-71-16,54 89 15,70 70 1,-36-18 0,107 141 31,-230-317-47,18 53 15,0 0 1,-35 70-1,-18-17 1,-18 17 0,18-140-1,-18 52 1,18-35 0,-17 0-1,17-36 1,-18 1-1,36-36 79,-18 1-78,35-1-1,0-17 1,-17 17-16,53-17 16,70-71-1,141-123 17,-212 158-32,19-17 0,87-71 15,124-52 1,-88 105-1,-89 53-15,353-124 32,-229 89-17,124-53 1,-142 18 0,0-1-1,-123 71-15,229-105 16,-141 69-1,106-16 1,0-1 0,-88 53-1,88-53 1,-18 0 0,-18 0-1,1-17 16,-212 105-31,70-35 16,-70 36-16,106-89 16,-71 35-1,-35 36 1,88-106 0,-53 53-1,89-53 1,-107 105-1,-17 1 1,-17 17-16,-19 1 16,18-1-1,-17-17 1,0 17 0,-1 1-1,1 17 1,-18-18-1,0 36 48,0-1-32,-18 1-15,-17 17-1,17-17-15,-52 70 16,17-35 0,-35 53-1,17-36 1,54-17-16,-54 35 16,-70 89-1,-35 17 1,-1 17-1,71-52 1,-52 88 15,-1 18-15,-35 17 0,-88-35-1,52-71 1,-140 71-1,229-159-15,-106 89 16,-124 52 0,1-17-1,141-89 1,-89 54 0,54 34-1,-72 124 16,178-158 1,105-142-32,17 18 0,-16-18 0,-142 106 31,105-88-15,1 18-1,35-36 1,-17 18-1,17-18 1,35-17-16,0 17 16,-17 1-1,18-1 1,17 0 0,0 0-1,0-17 1,0 0-1,0-1 1,17-17 109,1 0-109,-1 0-16,19 0 15,17 0 1,-36-17-16,71 17 16,1-18-1,87 18 1,71 0-1,-53 18 1,-88-18 0,123 0-16,283 35 31,-248-17-15,124 34-1,-264-34-15,-18 0 16,211 17-1,-17 18 1,-18-18 0,18 0-1,-35 1 1,-89-1 0,53 0-1,1 1 1,-19-1 15,-87-17-31,35-1 16,-36 1 15,-52-18-15,-54 0-16,54 0 15,17 17 1,-17-17-1,-36 18 1,-18-18-16,1 0 16,0 0-1,-1 0 1,-17 18 0,-17-18 15,-1 17-16,-70 19 1,17-19 0,18 1-1,-52 0 1,34-1-16,-52 18 16,-89 18-1,-106 0 1,89 0-1,88-35-15,-88 35 16,-106 35 0,246-70-16,-105 52 15,88-52-15,-70 17 16,-124 0 0,141-17-1,-123 17 16,247-17-31,-106 0 16,53-1 0,-124 1-16,-176 35 15,-18-18 17,71 0-17,-18 53 16,300-70-31,-88 17 16,-70 18 0,34-17-1,71-19 1,54 1-16,-19-18 16,18 0-1,35 0 1,1 0 15,-1 0 0,18 18-15,-18-18 0,1 0-16,-1 0 31,18 17-31,18-17 78,-18 18-78,106 35 31,-71-36-31,36 1 16,87 53-1,19 17 1,-36-18 0,-71-17-1,177 106 1,-70-36 0,87 71-1,71 53 1,-264-194-1,-1 18-15,160 88 16,-71-54 0,-89-52-16,89 53 15,70 53 1,-17 0 0,-106-71-1,35 53 1,-35-18-1,-1-17 1,-52-35 0,36 17 15,-37-17-15,1-1-1,-17-17 1,-19-35-16,19 17 15,16 18 1,1-18 0,0 36-1,-35-36 1,17 36 0,-17-1-1,0-35 1,-18-17-1,-18-18 95,-35 0-95,-53-18 1,-35 1 0,18-18-1,-71-18 1,-142-36 15,248 54-31,-35 0 0,-107-36 16,89 36-16,-123-36 15,-124-34 1,35-36 15,53-54-15,0-34 0,212 141-16,-106-53 15,-88-53 1,-1 53-1,89 70 1,36 18 0,70 36-16,-71-36 15,-53 0 1,18-18 0,71 18-1,-19 0 1,19 0-1,52 1 1,36 34 0,-71-35-1,18 18 1,-18-36 0,0 1-1,18-1 1,53 36-16,17 17 15,-52-35 1,-18 0 15,52 36-31,-17 17 16,36-18 0,-18 18 15,17 0 0,0 0-15,18 18 15,-17-1-15,-19 36-1,19 0 1,-19 35-1,-17 36 1,-17-1 0,-1-17-1,54-71-15,-54 71 16,-52 53 0,-18 17-1,-18 1 1,18-18-1,-53 87 1,-18 1 15,36 0-15,87-106 0,37-52-16,-19 52 15,-70 123 1,53-140-1,-71 52 1,53-70 0,-35 35-1,18-17 1,34-1 0,19-35-1,-36 36 1,-18 17-1,1-53 1,52-17 0,36-54-1,-53 36 1,35 0 0,18-35-16,-18 35 15,-35 17 1,17-17-1,53-35-15,-17-1 16,-18 19 0,0-36-1,36 0 1,-1-18 0,0-17-1,1-53 1,17-18-1,0-18 1,0-70 15,-18 0-15,1 124-16,-19-54 16,-52-87-1,-18-142 16,53 141-31,0 0 16,0 18 0,18 106-16,-18-88 15,-53-89 1,1-35 0,-19 18-1,54 88 1,34 106-16,-70-212 31,89 229-31,-18-70 31,-18-17-15,35 87 0,0-52-1,1 52 1,17 36-16,-18-18 15,0 0 1,1 35-16,-1-17 16,1-18-1,-19 18 1,1-18 0,35 35-1,-18-17 1,18 17 15,0 1-31,-17 17 31,17 17-15,-18 1 0,-17 0-1,-1-1 1,1 19-1,-35-1 1,-1 18 0,-17 17-1,17-17 1,36-35-16,-53 35 16,35-18-1,-35 36-15,-106 34 16,-18 19 15,-17 17-15,-36-18-1,18 1 1,106-36 0,-88 18-1,-18 17 1,106-52-1,-106 52 1,0 1 0,88-36-1,-70 53 1,-18 0 0,18-17-1,-1-1 16,72-52-15,69-36-16,-193 124 16,212-124-1,-177 71 1,88-18 0,-88 36-1,0 17 1,18 0-1,88-53 1,70-35-16,-211 123 31,211-140-31,-140 87 16,17-17 0,52-35-1,89-36-15,-141 71 31,71-53-15,-89 70 0,106-70-1,-52 35 1,70-35 0,-36 0-1,54-18 1,34-17-16,-17-18 15,18 18 1,35-36 15,0 0 16,0-17-31,0 17-1,0-17-15,0-18 32,18 36-32,-18-36 15,17 0 1,-17-18 0,18 18-1,-18 18-15,0-71 16,18 36-1,17-89 1,0 0 0,-17 53-1,-18-70 1,0 88 0,0-89-1,35-52 1,53-18 15,-17 71-31,52-107 31,-17 1-15,-71 123 0,1 89-16,-1-71 15,18-89 1,35-17-1,36-35 1,-36 106 0,35-36-1,-35 53 1,-35 18 0,18-17-1,-36 52 1,0 35-1,1-35-15,52-88 32,-70 106-17,-1 35 1,1-35 0,17-18-1,0-17 1,-17 52-1,0 36-15,-18-89 32,0 107-32,0-18 0,0-18 15,0-36 1,-18-34 0,18 35-1,18-18 1,-1 18-1,-17 52 1,0 19 0,18-1-1,0-35 1,-1 0 0,1 18-1,-18 17-15,17-17 16,1 0-1,0 0 1,-1-1 0,-17 1-1,18 17 1,-18-17 0,18-18-1,-1 18 1,-17 17-1,18-17 1,0 17 15,-1 1-15,-17-1 0,18 18-16,-18-18 15,18-17 16,-18 18-15,0-1 0,0 0-1,0 1 17,17 17 14,-17-18-30,-17 36 78</inkml:trace>
-  <inkml:trace contextRef="#ctx0" brushRef="#br0" timeOffset="60621.77">18327 3881 0,'0'-18'31,"-18"71"-15,18 0 0,-17-18-16,-19 71 15,-52 53 1,35-89-1,18 18 1,35-70 0,35-18-1,0 0-15,18 0 16,71 0 0,17 18 15,-18 17-16,-105-35-15</inkml:trace>
-  <inkml:trace contextRef="#ctx0" brushRef="#br0" timeOffset="60854.71">18450 4374 0,'-70'-52'16,"140"104"-16,-158-122 0,106 35 15,88-18 1,105-18 0,-52 18-1,53-35 1,-71 35 0,-124 35 15,-34 1-31</inkml:trace>
-  <inkml:trace contextRef="#ctx0" brushRef="#br0" timeOffset="61350.37">19844 3528 0,'0'0'16,"0"-18"-16,0 0 0,0 1 15,-18-36 1,18 35-16,-18-17 15,-34 0 1,16 35 0,19 17-16,-36 1 15,0 53 1,70-1 0,72-17-1,16-18 1,-69-17-16,70 17 15,-1 18 1,-87-18-16,-18 18 16,-88 53-1,-71-18 17,53-70-32,18-18 15,53-35 1</inkml:trace>
-  <inkml:trace contextRef="#ctx0" brushRef="#br0" timeOffset="61573.15">20091 3157 0,'0'0'0,"17"-35"0,19 0 15,-36 70 16,35 71-15,18 35 0,17 18-1,-17-53 1,-17 17 15,-36-88-31</inkml:trace>
-  <inkml:trace contextRef="#ctx0" brushRef="#br0" timeOffset="62317.84">20214 3669 0,'0'0'0,"-35"-88"16,35 35 0,0 35-16,18-35 15,70 18 1,53 17-1,-35 36 1,-71 0-16,71 34 16,-71-16 15,-35-19-31,0 19 16,-71-1-1,54-35-15,-1 0 16,-17-18-1,53-52 1,34-54 0,19 54-1,-53 34-15,52 1 16,1 0 0,-18 35-1,-18 0 1,-17 18-1,-1-18 1,-17-18 0,-35 18-1,0 0 1,17 18-16,0 17 16,-34 35-1,52 36 16,17-88-15,1-1 0,-1-17-16,19 0 15,-1-35 1,0-53 0,-35 17-1,0 36-15,0-53 31,0 106-15,36 70 0,-1-18-1,-18-52 1,19 35-16,-19 0 16</inkml:trace>
-  <inkml:trace contextRef="#ctx0" brushRef="#br0" timeOffset="62750.5">21255 3157 0,'-18'-17'0,"36"34"0,-71-52 16,35 17-16,1 18 16,17-17-1,35 34 1,35 1 0,-52 0-1,53 35 1,-54-36-16,36 36 15,-35 18 1,-36-54 0,-17-34-1,0-54 1,35-17 0,53-71-1,52 53 1,-16 71-1,-36 53 1</inkml:trace>
-  <inkml:trace contextRef="#ctx0" brushRef="#br0" timeOffset="63901.49">20990 4022 0,'0'0'15,"18"-18"-15,0-17 16,-1-18 0,-34 18-1,-36 17 1,-53 36 0,18 17-1,52 0-15,-17 18 16,53 35-1,106 0 1,71 1 0,-54-54-1,-17 35 1,-124 1 15,-17-53-31,-71 17 16,-88 18-1,88-53 1,53-53 0,71 18-16</inkml:trace>
-  <inkml:trace contextRef="#ctx0" brushRef="#br0" timeOffset="65619.08">21414 4110 0,'0'0'0,"158"-88"16,-105 35-1,-88 35 1,-36 18 0,-17 53-1,35 18 1,36 34 15,52-52-31,36 18 31,-36-53-31,35-18 16,36-36 0,-53-34-1,-53-19 1,-35-69 0,-18-1-1,35 71 1,36 105-1,35 72 1,17 52 0,-17 0-1,-17-53 17,-19-70-17,-17-54 1,0-34-1,35-54 1,1 19 0,-1 87-1,18 53 1,0 53 0,17 1-1,-17-54 1,53-18-1,-35-52 1,-18-71 0,-53 36-1,0 35 1,-36-71 0,19 70-1,-19 54 1,19 53-1,34-1 1,1 18 0,35-17-1,18-71 1,-36-18 0,-35 1-16,35-54 15,-35-52 1,0 17-1,0 35 1,0 124 15,18-18-15,-1 36-16,19 17 31,-1-53-15,-35-17-16,18 0 15,-18-36 1,0-70 0,17-18-1,1 36 1,0 17 0,17 70-1,0 54 1,-17-18-1,-1-18-15,1 36 32,17-54-32,-17-17 15,0-53 1,-1 0 0,18-17 15,-17 17-16,0 88 1,-1 0 0,1-17-16,0 35 15,52 0 1,1-35 0,17-71-1,-35 0 1,17-88-1,-17 17 1,-53 36 0,-17 70 15,-19 36-31,-34 35 31,35 17-15,35 1-1,17-36 1,1-17-16,17 0 16,0-1-1,1-70 1,-19 18 0,-17 0-16,0-54 15,-17 54 1,17 18-16,17 87 31,19 36-15,-1-35-1,-17-36 1,17 18-16,18-36 31,-36-34-15,1-1-16,0-35 15,-18 0-15</inkml:trace>
+  <inkml:trace contextRef="#ctx0" brushRef="#br0">9878 4727 0,'17'0'62,"-34"18"-15,17-1-31,-18 19-1,0-19-15,1 36 16,-1 18 0,1-36-16,-1 36 15,0 17 1,-17-18-1,17-17 1</inkml:trace>
+  <inkml:trace contextRef="#ctx0" brushRef="#br0" timeOffset="371.76">9596 5098 0,'0'0'0,"0"35"63,0 53-48,0-53 1,0-17-16,0 0 16,17 17-1,18-35 1,18-18 0,-35 1-1,17-1-15,-17 18 16,0-18-16,52-17 15,-70 17 1,18 18 0</inkml:trace>
+  <inkml:trace contextRef="#ctx0" brushRef="#br0" timeOffset="6669.31">14993 5891 0,'-18'0'16,"36"0"15,17 0 1,18 0-17,-35 0-15,17 0 0,106 0 31,-70 0-15,-36 0-16,0 0 0,1-17 16,52 17-1,-71 0-15,1 0 16,0 0 0</inkml:trace>
+  <inkml:trace contextRef="#ctx0" brushRef="#br0" timeOffset="8036.19">16122 5856 0,'18'18'62,"52"-1"-46,1-17-1,70 0 1,-88 0-16,53-17 16,35-1-1,-88 0 1,-36 18 0</inkml:trace>
+  <inkml:trace contextRef="#ctx0" brushRef="#br0" timeOffset="8675.33">18292 5891 0,'0'0'0,"17"0"16,-17 18-16,35-18 16,54 0-1,-1 0 1,123-18 0,-105 18-1,-70-17-15</inkml:trace>
+  <inkml:trace contextRef="#ctx0" brushRef="#br0" timeOffset="9403.6">20937 5944 0,'18'0'16,"0"0"-1,-1 0-15,19 0 16,69 0 0,19 0-1,-36 0 1,-53 0-16,36 0 16</inkml:trace>
+  <inkml:trace contextRef="#ctx0" brushRef="#br0" timeOffset="11255.95">18133 6473 0,'0'-17'31,"0"34"16,0 54-31,0-53-16,-18 52 15,18 54 1,18-18-1,-18-54 1,0-34-16,0 17 16,0-17-1</inkml:trace>
+  <inkml:trace contextRef="#ctx0" brushRef="#br0" timeOffset="11472.67">18009 6826 0,'0'0'0,"18"0"47,17 36-16,-17-19-31,-1 1 16</inkml:trace>
+  <inkml:trace contextRef="#ctx0" brushRef="#br0" timeOffset="11687.6">18309 6773 0,'0'0'0,"0"-17"15,-35 34 17,-18 19-17,35-36-15,-17 35 16,0 35 0,17-52-1,0-18-15,18 18 0,-17-1 16</inkml:trace>
+  <inkml:trace contextRef="#ctx0" brushRef="#br0" timeOffset="12450.52">21026 6526 0,'-18'18'31,"18"0"1,0 35-17,0-36-15,18 18 16,-18 36 0,0-36-1,17 18 1,-17-17-1</inkml:trace>
+  <inkml:trace contextRef="#ctx0" brushRef="#br0" timeOffset="12672.66">20849 6791 0,'0'0'0,"-17"0"16,17 18 0,0-1-1,35 19 1,0-1 0,-17-35-1,-1 0-15</inkml:trace>
+  <inkml:trace contextRef="#ctx0" brushRef="#br0" timeOffset="12874.49">21184 6791 0,'18'0'16,"-36"0"-16,36-18 16,-36 18 15,1 36-16,17-19-15,-36 19 16,36-19-16,-35 18 16,0-17-1,17 0-15</inkml:trace>
+  <inkml:trace contextRef="#ctx0" brushRef="#br0" timeOffset="19643.89">13088 6597 0,'18'0'62,"17"0"-46,-17 0-16,35 0 15,88 0 1,35-18 15,-70 1-15,53-1 0,-106 0-16,-18 18 0,0 0 15,36-17 1,-54 17-16,1 0 0,17 0 15,-17 0 1,-18 17 0</inkml:trace>
+  <inkml:trace contextRef="#ctx0" brushRef="#br0" timeOffset="20090.66">13406 6685 0,'0'0'0,"17"0"16,18 0-16,-17 0 0,17 0 15,71-18 1,-71 18-16,1-17 16,52 17-1,-70 0-15,-1 0 16</inkml:trace>
+  <inkml:trace contextRef="#ctx0" brushRef="#br0" timeOffset="23336.5">15328 6385 0,'0'18'93,"0"17"-61,0-17-17,18 35 1,-18-18-1,17-17 1,1-54 31,35-17-16,-53 36-31,35-36 0,18-18 31,0 18-15,-18 36 0,-17-1-16</inkml:trace>
+  <inkml:trace contextRef="#ctx0" brushRef="#br0" timeOffset="24046.99">16122 6244 0,'18'18'63,"-1"-1"-47,18 36-1,18 0 16,-35-35-31,0 17 16,17 0 0,-17-17-16,-1 0 15,-17-36 17</inkml:trace>
+  <inkml:trace contextRef="#ctx0" brushRef="#br0" timeOffset="24425.76">16298 6262 0,'0'-18'31,"0"53"16,-17-17-32,-1 0-15,0-18 16,-35 53 0,36-36-16,-18 1 15,17 35 1,0-53-16,18 17 15,-17 19 1,-1-36-16,18 17 31,0-34 1</inkml:trace>
+  <inkml:trace contextRef="#ctx0" brushRef="#br0" timeOffset="44450.66">9754 6632 0,'18'0'125,"17"0"-109,-17 0-16,35-17 31,-18 17-15,-17 0-16</inkml:trace>
+  <inkml:trace contextRef="#ctx0" brushRef="#br0" timeOffset="44731.67">9790 6720 0,'17'0'31,"54"-17"-15,-18 17-1,-18-18 1,-17 18 0</inkml:trace>
+  <inkml:trace contextRef="#ctx0" brushRef="#br0" timeOffset="47134.98">13282 6174 0,'0'-18'93,"0"-17"-61,0 17-32,0-17 31,-18-18-16,18 35-15,-17 1 16,-1-19 0,1 19-16,-1-19 15,-17 1 1,-1 17 0,-17 1-1,36 17-15,-19-18 16,19 18-16,-18 0 15,-18-17 1,17 17 0,-34-18-1,17 18 1,0 0 15,35 0-31,1 0 0,-19 0 16,1 0-1,-35 18 1,17-18 0,35 17-1,0-17-15,-17 0 16,0 18 0,17-1-16,-17-17 15,17 36 1,1-36-1,17 17-15,-18-17 0,18 18 16,-18-18-16,1 18 16,17-1-1,-18-17-15,0 18 32,18 0-17,-35 17 16,18-18-15,-1-17 0,0 0-1</inkml:trace>
+  <inkml:trace contextRef="#ctx0" brushRef="#br0" timeOffset="47622.42">12047 5891 0,'0'0'16,"0"36"62,0-19-62,0 1-16,0 17 15,0 0 1,0 1-1,0-19 1,18 1 15,17-36-15,1 1 0,-1 17 15,-18-18-31,1 18 15,0 0 1,-18 18 0</inkml:trace>
+  <inkml:trace contextRef="#ctx0" brushRef="#br0" timeOffset="49156.87">11677 6632 0,'0'0'31,"0"18"31,0-1-46,18-17-16,-18 18 0,17-18 16,18 71-1,-17-36 1,0-17-16,-1-1 16,36 19-1,-35-19-15,17 1 16,18-1-1,18 1 1,-36-18 0,0 0-16,18-18 15,53 1 17,-88 17-32,17 0 0,-17-18 0,17 18 15,0-17 1,-17 17-16,-1 0 0,1 0 31,0-18-15,-36 18 15</inkml:trace>
+  <inkml:trace contextRef="#ctx0" brushRef="#br0" timeOffset="49453.86">12365 6720 0,'0'-17'0,"17"17"31,1 17-15,0-17-16,-1 18 15,54 17 1,0 1 0,-54-19-16,1 1 15,17 0 1</inkml:trace>
+  <inkml:trace contextRef="#ctx0" brushRef="#br0" timeOffset="49704.15">12629 6685 0,'-17'18'16,"-18"35"-16,17-36 15,-35 54 1,35-53-16,1-1 16,17 1-16,-36 35 15,19-36 1,17 1-1</inkml:trace>
+  <inkml:trace contextRef="#ctx0" brushRef="#br0" timeOffset="50242.78">12700 6809 0,'0'17'31,"35"1"16,18 17-31,-35-35-1,35 18 1,-36-18 0,19 0 15,-19-18-31,19 1 15,-1-19 1,-18 1 0,1 0-1,-18 17 1,0 0 0</inkml:trace>
+  <inkml:trace contextRef="#ctx0" brushRef="#br0" timeOffset="50704.56">12929 6703 0,'71'-18'47,"-54"0"-47,1 18 16,35-17-1,-35 17 17,-18 35-1,0 0-16</inkml:trace>
+  <inkml:trace contextRef="#ctx0" brushRef="#br0" timeOffset="59940.23">8996 9842 0,'0'-17'0,"0"-1"32,0 1-17,0-1 1,0 0 15,-18 1-15,1 17-1,-19-18 1,19 18-16,-36 0 16,-35 18-1,-18 17 1,17 0-1,-34 36 17,88-54-32,-36 36 15,-35 36 1,71-72-16,17 18 16,-34 54-1,52-72-15,0 36 16,35 53-1,0-53 1,53 35 0,-70-70-16,52 17 15,54-17 1,17-36 0,-35 0-1,-36 1-15,19-36 16,52-35-1,-53-36 1,-35 1 15,-36 17-15,-34-35 0,-1 88-16,-17 0 15,-18 0 1,18 35-16,-36 18 15,1 18 1,17 0-16,-35-1 16,-18 19-1,53-19 1,35-17 0,36 0 15</inkml:trace>
+  <inkml:trace contextRef="#ctx0" brushRef="#br0" timeOffset="61657.6">9507 9948 0,'18'0'15,"0"0"1,-18 36 46,35 34-30,-35-52-32,18 17 31,-1-17-31,-17-36 31,18 0-15,-1 1-16,-17-1 0,18 1 15,35-89 1,-35 88-16,-1-17 0,1-1 16,0 1-16,-1 18 0,-17-1 15,35-17 1,-17 35-1,-18 17 48</inkml:trace>
+  <inkml:trace contextRef="#ctx0" brushRef="#br0" timeOffset="62191">9560 10425 0,'36'-18'78,"-1"18"-63,-18 18-15,19-18 16,34 35 0,-52-35-16,17 17 15,0 1 1,-17-18 0</inkml:trace>
+  <inkml:trace contextRef="#ctx0" brushRef="#br0" timeOffset="62508.38">9807 10301 0,'0'0'0,"-17"18"32,-36 35-17,0 0 1,-35 17 0,35 1-1,17-18 16,19-36-31</inkml:trace>
+  <inkml:trace contextRef="#ctx0" brushRef="#br0" timeOffset="65511.48">20779 9754 0,'-18'0'16,"0"-17"0,1 17-1,-1-18-15,-17 18 16,-36 0-1,1 18 1,-19-18 0,37 17-1,-37 19 1,19-19 0,52 1-16,-17-1 15,0 1-15,-54 17 16,54-17-1,17 0-15,1-1 16,-36 19 0,53-19-16,-18 1 15,-17 70 1,17-70-16,18-1 16,-17 36-1,17-17-15,17-1 16,-17-18-16,36 19 15,-1-1 1,-17-17-16,34 17 16,37 0-1,-1 0 1,35 1 0,-52-19-1,88 1 1,-106-18-1,52 0 1,107-18 0,-53 1-1,-106-1-15,0 18 16,35-18 0,-53 18-16,53-17 15,18-18 1,-53 17-1,35-70 1,-70 52-16,17-34 16,0-54-1,-35 54 1,-70-18 0,35 70-16,-1 0 15,-17 1-15,1-1 16,-54-17-1,53 35-15,-53-35 16,0 35 0,71 0-16,-18-18 0,0 18 15,-88 0 1</inkml:trace>
+  <inkml:trace contextRef="#ctx0" brushRef="#br0" timeOffset="85667.05">18080 13423 0,'0'-17'46,"0"-1"-30,17 18-16,-17-18 63,0 89-32,0 105 0,0-70-15,0-35-1,0 17 1,0-71-16,0 1 16</inkml:trace>
+  <inkml:trace contextRef="#ctx0" brushRef="#br0" timeOffset="85917.45">17868 13794 0,'-17'0'31,"17"17"-31,17 1 32,18 17-17,-17-35-15,17 18 16,18-1 0,-35-17-16</inkml:trace>
+  <inkml:trace contextRef="#ctx0" brushRef="#br0" timeOffset="86151.9">18221 13829 0,'18'0'0,"-1"-18"16,-52 18 30,35 18-30,-18-18-16,-17 35 16,-18 18-1,35-35 1,1-1-16</inkml:trace>
+  <inkml:trace contextRef="#ctx0" brushRef="#br0" timeOffset="87485.03">9507 14305 0,'0'0'0,"0"18"47,18-18-31,0 17-16,17-17 0,0 0 15,89 0 1,-71 0-16,52 0 16,37 18-1,-90 0 1,1-1-1,-53 1 1,18-18-16</inkml:trace>
+  <inkml:trace contextRef="#ctx0" brushRef="#br0" timeOffset="88701.63">20320 13458 0,'0'0'15,"35"-17"1,-17 17 15,-18 17 16,18 36-31,-18 0-1,17 53 1,1-18 0,-18-17-1,-18-36 1,1-17-16</inkml:trace>
+  <inkml:trace contextRef="#ctx0" brushRef="#br0" timeOffset="88934.53">20144 13794 0,'-18'0'31,"36"0"-31,-18 17 16,17-17-16,19 18 15,34 35 1,-52-53 0,35 17-1,-36-17-15,19 0 16</inkml:trace>
+  <inkml:trace contextRef="#ctx0" brushRef="#br0" timeOffset="89120.43">20549 13811 0,'0'0'0,"36"-17"16,-72 34 31,19 1-32,-19 17 1,19-35-16,-19 35 16,-34 1-1</inkml:trace>
+  <inkml:trace contextRef="#ctx0" brushRef="#br0" timeOffset="90501.77">12965 14340 0,'17'0'15,"18"0"1,-35-17-16,36 17 16,-1 0-1,-17 0-15,35 0 16,35 0 0,-53 0-16,36 0 15,17 17 1,-53-17-16,-17 0 15,-1 0-15,1 0 16</inkml:trace>
+  <inkml:trace contextRef="#ctx0" brushRef="#br0" timeOffset="126300.64">17745 14182 0,'-18'-18'31,"18"0"-15,18 18 15,17 36-15,-17 17-1,-1 35 1,-17-53-16,0 18 15,0 18 1,0-54-16,18-34 31,0-54-15,-1 36-16,1-54 16,-1-16 15,1 87-31,-18-17 0,18 17 31,-18 36-15,-36 52-1,19-52-15,-1 0 16,-17 17 0,17-35-16,18 17 15,53-17 16,-18 18-15,-17-18-16,17 18 16,1 17-1,-1-17 17,-17-18-32</inkml:trace>
+  <inkml:trace contextRef="#ctx0" brushRef="#br0" timeOffset="126752.66">18062 14199 0,'0'0'0,"0"-17"15,0-1 1,0 53 15,0 1-15,18-1-1,-18-18-15,17 36 16,-17-17 0,0-19-16,0 1 15,0-36 17,-17-52-17,17 52 1,-18-35-16,18 0 15,0 0 1,0 36 0,18-1-1,17 18 1,-17 18 0,-1-1-1,1 1-15,-18 0 16,-35 17-1,17-17-15,-17-1 16,0 1 0,17-18-16</inkml:trace>
+  <inkml:trace contextRef="#ctx0" brushRef="#br0" timeOffset="127033.35">18327 14058 0,'0'18'46,"0"35"-14,0-36-32,0 1 0,0 17 0,0-17 15,17 88 1,-17-89-16,0 1 16</inkml:trace>
+  <inkml:trace contextRef="#ctx0" brushRef="#br0" timeOffset="127605.25">19950 14058 0,'17'-17'31,"-17"34"-15,18 18 0,-18 36-1,0-18 1,17-35-16,-17 17 31,0-18-15</inkml:trace>
+  <inkml:trace contextRef="#ctx0" brushRef="#br0" timeOffset="127969.23">20179 14076 0,'0'0'15,"-18"0"1,1 0 0,-19 17-1,1 36 1,17-35-16,-17 0 16,0 17-1,0-17 1,52-36 31,36 0-32,-35 18-15,-1 0 16,36 0 0,-35 18-16,0 0 15,17 17 1,-17-18-1</inkml:trace>
+  <inkml:trace contextRef="#ctx0" brushRef="#br0" timeOffset="128456.47">20338 14146 0,'0'0'0,"-18"36"62,18-19-46,0 19 0,0-19-1,0 1-15,0-1 0,18 1 31,-18-36 1,0-17-17,0 18-15,0-19 16,0-17 0,0 0-1,17 36 1,1 17-1,17 0 17,-17 0-32,-1 17 15,19 1 1,-36 0 0,-36-1-1,1 1-15,0 0 16,-18-18-1,35 0-15</inkml:trace>
+  <inkml:trace contextRef="#ctx0" brushRef="#br0" timeOffset="128706.57">20602 14058 0,'0'0'15,"0"18"-15,0 17 32,0 0-17,0 1-15,0-1 16,0 0-1,0-17-15</inkml:trace>
+  <inkml:trace contextRef="#ctx0" brushRef="#br0" timeOffset="137905.67">2011 2258 0,'0'-18'15,"17"18"32,-17-18-31,0 36 0,0 0-1,0 17 1,0 53-1,0-52-15,0-1 16,0 35-16,0-34 16,0 34-1,0-35-15,-17-17 16</inkml:trace>
+  <inkml:trace contextRef="#ctx0" brushRef="#br0" timeOffset="138305.85">1905 2611 0,'0'0'16,"0"35"15,0-18-31,18 1 0,-1 0 15,1-1 1,17 1 0,18-18-1,0-18 1,-35 1-16,17-1 16,0-35-1,-17 36-15,-18-1 16,17 0-1,-17 1 1,0 34 0,-17 1-1,17 17 1,-18-17 0,1 17-1,-19 0-15</inkml:trace>
+  <inkml:trace contextRef="#ctx0" brushRef="#br0" timeOffset="150326.12">1076 4533 0,'0'0'0,"18"-17"62,-36 17 16,-53 0-46,18 0-17,36 0-15,-18 0 16,-54 0 0,72 17-16,-36-17 15,-18 35 1,1 1-1,34-36-15,-16 35 16,16-35-16,-34 35 16,-19 18-1,72-53-15,-18 35 16,17-35 0,18 18-16,-18 17 0,1 36 15,17-36 1,17 18-16,36 71 31,-35-107-31,-1 19 0,19-1 16,52 53-1,-70-70-15,70 17 16,35-35 0,-87 0-16,69-18 15,89-88 1,-35 1-1,-53 16 1,-88 54-16,35-35 16,-1-19-1,-16 1 1,-36 18 0,0-1-1,-18 18 1,0 18-1,1 0 1,-71-1 0,52 36-16,19 0 0,-36 0 15,-53 0 1,88 0-16,-35 0 16,18 18-1,35 0 1</inkml:trace>
+  <inkml:trace contextRef="#ctx0" brushRef="#br0" timeOffset="153445.76">1411 4921 0,'0'-17'0,"0"34"0,0-52 16,0 17 15,0 1 0,53 17 16,0-18-31,-18 18-16,36 0 15,17 18 1,18-1 0,0 19-1,-36-1 1,-35-17-16,1-18 15,-1 17-15,71 36 16,0 18 0,-89-36-1,19-17-15,-1 17 0,53 18 16,18 35 0,0 0-1,-36-17 1,-34-36-1,16 18-15,37 70 32,-1-17-17,0 18 1,-17-36 0,52 35-1,-70-70-15,53 53 16,-53-71-16,35 54 15,53 34 1,-88-88 0,0 1-16,-18-19 0,53 54 15,53 17 1,-35-17 15,106 52-15,-106-52-16,70 34 31,-123-69-31,53 34 16,53 36-1,-106-71-15,0 1 16,-18-1-16,18 0 0,0-17 16,0 17-16,35 36 15,53 17 1,-106-71-16,0 19 15,89 34 1,-89-34 0,0-19-16,1 1 0,70 52 15,-71-52 1,18 17-16,17 1 16,-52-19-1,35 19-15,35-1 31,-70-18-31,35 19 16,17-1 0,-52-35-16,17 18 0,0-1 15,36 1-15,-36 0 16,71-1 0,-35 1-1,-36-1-15,35 1 16,-34-18-16,-1 0 0,0 18 15,1-18-15,34 0 16,36 17 0,-71-17-1,0 0-15,54 18 16,-19-18 15,-34 0-31,16 18 0,19-18 31,-18 0-15,17 0 0,-34 0-16,17 0 15,52-18 1,-69 18-16,52-18 16,-17 1-1,-36 17-15,53-18 16,18-17-1,-71 35-15,89-35 32,-89 35-32,0 0 0,124-36 31,0-17-15,-89 36-1,36-1 16,-71 0-31,36 1 16,52-18 0,-52 17-1,-36 18-15,0-18 0,18 1 16,53-1 0,-53 0-16,18 1 15,-18-1-15,17 0 16,-35 18-16,1 0 15,122-35 1,-87 35 0,35 0 15,-36 0-31,-52 0 16,0 18-16,70-1 31,-18 36 0,-17-17 0,-35-19-15,0 1-16,-18 0 16,35-1-1,-17 1 1,34 17-1,-34-35 1,0 18-16,-1-18 31,19 17 1,-19-17-17</inkml:trace>
+  <inkml:trace contextRef="#ctx0" brushRef="#br0" timeOffset="154169.89">11553 7796 0,'-35'-35'15,"0"17"16,17 18-31,-52-17 16,-36-1 0,53 18-16,-53 18 15,-35 35 1,70 0 0,1 52-1,52-69-15,-17 52 16,35 71-1,18-53 1,52 52 0,-35-105-16,71 53 15,0-35 1,123 17 0,-140-71-1,87 1-15,71-18 31,-18-53-15,-123-35 0,-53 53-16,-18-36 0,-17 18 15,17-247 1,-70 159 0,17 88-16,-35-53 15,18 54 1,-18 16-16,-70-34 15,-36 17 1,-17 35 0,34 1-1,90 17 1,-1 0 15</inkml:trace>
+  <inkml:trace contextRef="#ctx0" brushRef="#br0" timeOffset="155143.35">11007 8714 0,'0'-18'0,"0"36"0,0-54 31,0 19-15,0-1 0,-18 53 15,-17 18-16,17-17-15,0-1 16,1 0-16,-1 0 16,1 18-16,-1 0 0,18 0 15,-18 159 1,36-36 0,-18-105-1,18 52-15,17 54 31,0-72-15,-17-52-16,-1-17 0,1 17 16,53 70-1,-54-88-15,36 18 16,18 0 0,-54-35-16,1-1 15,0-17 1,-1 18-16,1-18 31,0 0-15,-18-18-1,17 18-15</inkml:trace>
+  <inkml:trace contextRef="#ctx0" brushRef="#br0" timeOffset="155847.46">11818 9772 0,'0'0'0,"-53"-88"31,18 70-16,17 18-15,-17 0 16,-89 18 0,19 17-1,-54 53 1,106-70 0,-53 70-16,71-53 15,0 71 1,35 53-1,35-71 1,53 18 0,36-18-1,-19-53 1,-52-17 0,71-18-16,70 0 31,-141-18-31,53 1 15,17-36 1,-105 35-16,17-17 16,-17 0-16,-18-1 0,17-17 15,-17 1-15,-17-90 16,-54-69 0,36 158-16,-1 0 15,-87-53 1,88 88-16,-54 18 15,-34 53 1</inkml:trace>
+  <inkml:trace contextRef="#ctx0" brushRef="#br0" timeOffset="156361.82">11042 10266 0,'-18'0'16,"18"35"31,0 71-31,-17-36 15,-19 72-16,36-89-15,0 35 16,0 53 0,18-106-16,0 53 15,17-35 1,0-35-16,-17-1 0,17 1 16,-17-18-16,52 0 15,19-18 1,-72 18-16,1 0 15,-18-17-15,17 17 16</inkml:trace>
+  <inkml:trace contextRef="#ctx0" brushRef="#br0" timeOffset="157095.14">11818 10672 0,'0'0'16,"-35"-36"-1,35 19-15,-18-1 16,-35-17 0,0 35-1,-17 0 16,34 0-31,-69 35 16,-19 18 0,89-18-16,-36 18 15,1 53 1,52-71-16,18 18 16,-18 141-1,36-106 1,0-35-16,17 18 15,0-36 1,36 18-16,35 0 16,-53-35-16,70-1 15,71-17 1,-53-17 15,53-54-15,-123 36-16,-36 17 0,18-35 15,-18 18-15,1-18 0,-1 0 16,-18 0-16,1-88 16,-36-88-1,1 158-15,-54-52 16,1 34 0,-71 19-1,88 52-15,-18 18 16,-193 53 15,158-18-31</inkml:trace>
+  <inkml:trace contextRef="#ctx0" brushRef="#br0" timeOffset="159946.89">4410 3422 0,'0'0'0,"0"-18"16,0 1 0,0-1-1,35 36 63,88-18-62,-70 0 0,18-18-16,-18 18 0,106-35 15,-106 35 1,-1-18 0,-16 18-1,-72 18 1</inkml:trace>
+  <inkml:trace contextRef="#ctx0" brushRef="#br0" timeOffset="160215.66">4498 3545 0,'-18'0'0,"36"0"0,-71 18 16,35-18-1,36 0 17,0 0-32,17 0 0,88-18 15,36-17 1,-53 17 15,-71 1-31,-17 17 0,17 0 16,-17-18-1,-36 18-15</inkml:trace>
+  <inkml:trace contextRef="#ctx0" brushRef="#br0" timeOffset="161013.51">6456 2787 0,'0'-18'16,"17"18"-1,1 0-15,-18-17 16,18 17 0,-18 17-1,-18 54 16,-17-18-15,17-18-16,1-17 0,-19 35 16,19 0 15,17-36-31,17-17 0,19 18 31,34 17-15,-35-17-16,36-1 15,35 1 1,-53-18 0,-36 18-16,19-18 15</inkml:trace>
+  <inkml:trace contextRef="#ctx0" brushRef="#br0" timeOffset="161315.91">6544 3052 0,'-18'0'15,"36"0"-15,-53 0 16,17-18-16,142-17 47,-36 17-32,-35 0-15,0 18 0,0-17 16,35-1 0,-53 0-16,-17 18 0,17 0 15,-35-17-15,18 17 16,-36 0 15,0 0-31</inkml:trace>
+  <inkml:trace contextRef="#ctx0" brushRef="#br0" timeOffset="170453.98">4075 8184 0,'0'0'0,"-18"0"47,53 36 62,-17-1-93,-1 0-1,1 1 1,0-1-1,-18-18 17,0 1-17,17-18 1,-17-18-16,18 1 16,0-18-1,-18-1-15,35-34 16,0-36-1,-17 71-15,0-1 16,70-70 0,-71 89-16,1-1 15,0 1-15,17-1 16,0 0 0,0 18-1,-35 18 126</inkml:trace>
+  <inkml:trace contextRef="#ctx0" brushRef="#br0" timeOffset="171584.37">4127 8943 0,'18'-18'47,"0"18"-16,-1 0-15,1 18-1,0 17 1,-18 0 15,17-17-31,-17 0 16,0 17-16,18-17 15,0-1 17,-18-34-17,17-19 1,-17 19-16,0-1 0,0-17 16,18 0-16,-18-1 0,18 1 15,-18 0-15,17-1 16,89-105-1,-71 106-15,1 17 16,-1 1-16,18-1 16,35 18-1,-53 18 1,-17-1 0,-1-17-16,-34 18 31</inkml:trace>
+  <inkml:trace contextRef="#ctx0" brushRef="#br0" timeOffset="172534.27">3545 9684 0,'0'17'62,"18"36"-46,-18-35 0,18 35-1,17-18 1,-17-35 31,-1-35-32,-17 17-15,18-17 16,17-53 0,-17 52-16,35-16 15,53-19 1,-18 36-1,70-1 1,-105 36 0,-17 18-1,-36 0 1,0 17 0</inkml:trace>
+  <inkml:trace contextRef="#ctx0" brushRef="#br0" timeOffset="177919.04">229 9155 0,'0'0'0,"53"0"16,-35 0-1,-1 0-15,178-89 78,-90 54-62,-52 17-16,-17 1 16,-1 17-1,-88 17 17,0 1-17</inkml:trace>
+  <inkml:trace contextRef="#ctx0" brushRef="#br0" timeOffset="178314.79">529 8908 0,'0'0'31,"18"0"32,35 17-48,0 1 1,-18 0-1,-17-1 1,-18 1-16,0-1 16,0 19-1,0-19 1,-18 19-16,-35 17 31,35-53-31,1 17 0,-1 1 16,18-1-16,-18 1 0</inkml:trace>
+  <inkml:trace contextRef="#ctx0" brushRef="#br0" timeOffset="207781.96">28399 2558 0,'0'0'16,"-18"0"-16,0 0 15,18 35 1,18 18 0,-18-18-16,0 18 15,0 0-15,0-18 16,0 0-16,0 1 0,0-1 15,0 0-15,0 18 16,0 0 0,0-35-16,0-1 15,-18-17 17,-17-52-17,35 16-15,-18-34 16,1-89-1,17 53 1,17-35 15,1 123-31,35-35 16,35 36 0,-35 34-1,-18 1-15,1 0 0,-19 17 16,1 0-16,0 36 15,-36 35 1,-17-71-16,17-17 16,-17 17-16,-1-18 0,1 1 15,-53 35 1,70-53-16,1 0 16</inkml:trace>
+  <inkml:trace contextRef="#ctx0" brushRef="#br0" timeOffset="208130.25">28504 2875 0,'0'0'0,"36"0"31,-19 0-31,1 0 16,17 18-1,-17-1-15,17 19 16,0 17-1,-35-36-15,0 1 16,18 0-16,-18-1 0,0 1 16,-18-18-16,1 17 15,-18 1 1,35-36-16,0-34 31,52-37-15,-34 54-16,17-36 15,36 19 1,-53 52 0,-1 0-1,1 0-15</inkml:trace>
+  <inkml:trace contextRef="#ctx0" brushRef="#br0" timeOffset="209016.07">28945 2840 0,'0'0'15,"18"0"1,-18 17 31,-35 1-31,35 0-16,-18 17 15,0 36 1,18-18-1,18-36 1,0 1 0,17-18-16,18 0 31,-18-35-15,-17-18-1,-18 35-15,0 0 0,0-17 16,-18 17-16,1-17 15,-19 0 1,19 17-16,34 36 47,54-1-31,-36-17-16,18 18 15,18-18 1,-36 0-16,18 0 15,-18-18 1,-17 1 0,-36 17 15,-17-18-15,0 18-1,17 18-15,-17-1 16,-1 36-1,19-35-15,17 17 16,0 18 0,0-35-16,17 0 15,19-1 1,-19-17-16,1 0 16,52-35-1,-52 17-15,17-52 16,1-54-1,-36 1 1,0 35 0,0 52-1,-18 1 1,0 35 0,1 18-16,17 52 15,-18 54 1,18-71-16,18-18 15,-18 18-15,17 0 0,-17-18 16,18 18-16,0 0 16,17 17-1,-17-52-15</inkml:trace>
+  <inkml:trace contextRef="#ctx0" brushRef="#br0" timeOffset="211200.71">27711 4004 0,'0'0'16,"17"0"-16,1-18 15,0-17 1,-1 17-16,-17-17 15,18 0 1,-53-18 15,-1 18-15,1 35-16,0-18 0,-1 0 16,1 18-16,-71 0 15,-88 36 1,124-19-16,-1 1 15,18 17-15,-17 1 0,-18 52 16,17 18 0,36 70-1,70-35 1,53-53 0,-35-52-16,88-1 15,124 0 1,-1-70-1,-105-36 1,-88 18 0,52-52-16,-52-107 31,-71 141-31,-36-70 16,-122 18-1,105 105-15,-18 0 16,-140 54-1</inkml:trace>
+  <inkml:trace contextRef="#ctx0" brushRef="#br0" timeOffset="212933.08">27182 4216 0,'0'-18'109,"-18"0"-62,18 1-31,-18 17-1,-35-18 1,36 0-16,-54 18 16,36-17-16,0 17 15,-18-18-15,-71 1 16,-140-19-1,158 19-15,-141-1 16,-35 0 0,140 1-16,-16 17 0,-1-18 15,18 18-15,-194-18 16,-177 18 0,318 0-1,-176 0-15,-18 18 16,194 0-1,-194-1-15,-212 54 32,406-36-32,-229 18 15,211-18-15,0 1 16,-440 105 0,440-88-16,0 0 0,18 0 15,-17-1-15,-160 72 16,-105 88-1,176-54 1,-70 89 0,246-176-16,-105 70 15,-106 71 1,123-71 0,-158 123 15,281-211-31,1 18 0,-159 123 15,0-18 1,106-70 15,71-53-31,-1-18 0,1 18 16,-107 71 0,71-36-1,53-53-15,0 0 0,18 1 16,-18 17-16,18-18 0,0 0 15,-53 89 1,70-89-16,-53 53 16,1 18-1,-1-53 1,1 17 0,52-52-16,-17 17 15,17-35 1,18 18 15,-18-18 0,1 0-15,-1 0 0,1 0-16,-1 0 15</inkml:trace>
+  <inkml:trace contextRef="#ctx0" brushRef="#br0" timeOffset="213549.75">14852 7585 0,'18'-18'15,"-18"0"17,17 1-17,-34 17 1,-19 17 0,1 1-16,0 0 0,-1-1 15,-87 89 1,70-71-16,-35 36 15,0 70 1,52-88-16,1 35 31,17 18-31,18 35 16,36-17 0,17-54-1,70 1 1,-88-54-1,89-17 1,-71 0-16,0 0 0,17-17 16,36-36-1,-35 0-15,-18 18 0,0-18 16,52-124 0,-87 107-16,0-54 15,-54-52 1,19 141-16,-19-1 15,-69-34 1,69 70-16,-52 0 16,-18 17-1,36 1 1,-1 35 0,54-35-16,-19-1 15</inkml:trace>
+  <inkml:trace contextRef="#ctx0" brushRef="#br0" timeOffset="214617.58">14834 8731 0,'0'0'16,"0"-17"-16,0-1 31,-17 0-15,-1 18-16,0 0 15,-87 36 1,69-36-16,-17 17 16,0 19-16,-105 34 15,34 36 17,89-53-32,0-18 0,17 18 15,0 0-15,-17 176 16,88-70 15,0-53-15,-18-53-16,0-18 0,1 0 15,17 1-15,35-19 16,-35-17-16,35-17 16,-35-1-16,0-17 15,106-124 1,-107 106-16,-16-18 0,-1 1 15,0 17-15,1-71 16,-72-70 0,19 142-16,-19-1 15,-87-124 1,52 124 0,1 0-1,-1 53 1,1 36 15,34-19-31,-16 1 16,-1 0-16</inkml:trace>
+  <inkml:trace contextRef="#ctx0" brushRef="#br0" timeOffset="-212761.51">29563 8237 0,'-18'0'31,"36"0"16,70 0-31,-70 0-16,52 0 15,1 18 1,-36-18-16,36 0 15,17 0 1</inkml:trace>
+  <inkml:trace contextRef="#ctx0" brushRef="#br0" timeOffset="-212408.49">29422 8608 0,'17'-18'16,"-34"36"-16,52-36 0,0 0 16,18 18-1,-18 0-15,18 0 16,-35 0 0,53 0-16,17 0 31,-35 0-16,-36 0-15</inkml:trace>
+  <inkml:trace contextRef="#ctx0" brushRef="#br0" timeOffset="-193761.64">27182 12259 0,'0'-18'16,"17"18"0,1 0-1,-1 0 1,1 18 0,0 0-16,-1-1 15,19 36 1,-19-35-16,1 52 15,17 54 1,-35-89-16,0 18 16,18 71-1,-1-89-15,-17 35 16,36 19 15,-36-72-31,17 1 0,-17-1 0,18-17 16,17 36 15,-17-54-15,-18 0-16</inkml:trace>
+  <inkml:trace contextRef="#ctx0" brushRef="#br0" timeOffset="-193201.27">27323 12982 0,'0'0'0,"17"18"63,19 35-48,-1-18 1,18 0-1,-18 1 17,18-19-17,-35 1-15,17-36 32,-18 1-17,1 17-15,-18-18 16,53-35-1,-35 35 1,-1 1 0,-17-1-16,0 0 15,18 18 1,-18-17 0,-18 17 15,1 35 0,-1-17-15,-17 35-1,17-18 1,0-17-16,18-1 0,-17 1 16,-1 0-1</inkml:trace>
+  <inkml:trace contextRef="#ctx0" brushRef="#br0" timeOffset="-189402.72">5203 12294 0,'0'0'0,"0"-17"0,-35 17 32,18-18-17,-1 36 32,0-1-31,-17 89-1,-18 0 1,35-35 15,1 17-15,17-53-16,0 36 15,17 52 1,-17-70-16,0-18 16,18 18-16,-18-18 0,0 1 15,0 52-15,0-53 16,18 89 0,-18-19-1,-18-87-15,18 17 16,0 1-16,-18-1 0,18-17 15,-17 17-15,17 0 16,-18 18 0,1-53-1,17 18-15,0-1 16,0 1 15,-18 0 360,18-1-376,-18-17-15,18 18 16,-17-18-16,-1 35 16,18-17-1,0-1 1,0 19 0,-18-1-1,18-17 1,0-1-1,0 1 1,0 0 0,0-1 31,0-34-32,-17-19 16</inkml:trace>
+  <inkml:trace contextRef="#ctx0" brushRef="#br0" timeOffset="-188952.14">4762 13776 0,'0'0'0,"-17"-18"31,34 36 32,1 17-48,-18-17-15,0 0 16,18 87 0,-18-52-1,17 18 1,1-54 0,0 19-16,17-1 31,0-17-16,1-36-15,-19 18 16,89-71 0,-71 54-16,36-18 15,-18 17 1,-36 0-16,1 18 16</inkml:trace>
+  <inkml:trace contextRef="#ctx0" brushRef="#br0" timeOffset="-187716.45">1552 13458 0,'0'-17'15,"53"52"16,-35-17-31,17 17 16,89 106 0,-72-106-16,72 107 15,-89-107-15,-17 0 16</inkml:trace>
+  <inkml:trace contextRef="#ctx0" brushRef="#br0" timeOffset="-187381.5">1376 13882 0,'0'0'0,"-247"-106"15,194 88 1,18-17-16,-54-18 0,37-35 31,52 70-31,17-17 0,18 0 0,-17-1 16,106-52-1,52 0 1,-88 70-16,89 18 16,-1 18-1,-88 17-15,0 18 0,-17 0 16,-36 0-16,36 88 16,-89 53-1,-17-141-15,17 0 16,-105 71-1,87-107 1,19 1-16,-18-18 0,-1-53 16</inkml:trace>
+  <inkml:trace contextRef="#ctx0" brushRef="#br0" timeOffset="-187176.46">2064 13494 0,'0'0'0,"17"0"16,-17-18 0,36 18-1,-19 0-15,1 18 0,0-18 16,70 53 0,-53-36-16,-17 1 15,35 35 1,-36-36-16,-17 1 15</inkml:trace>
+  <inkml:trace contextRef="#ctx0" brushRef="#br0" timeOffset="-187032.26">1923 13176 0,'-18'-17'15,"36"34"-15,-36-70 16,18 71-1,18 0-15,-1-1 16</inkml:trace>
+  <inkml:trace contextRef="#ctx0" brushRef="#br0" timeOffset="-186231.17">2258 13388 0,'0'0'0,"53"18"78,35 70-62,-70-53 15,-1 0-16,-34-88 17,-19-17-17,36 17-15,-17 18 0,-1-18 16,18-53 0,0 71-16,53 52 31,17 71-16,-34-52-15,-1 17 16,36 17 0,-54-52-1,-17-53 17,0-18-32,-35-71 31,17 18-16,18 89-15,18-19 16,52 54 0,-52 0-16,17-1 15,-17 1-15,35 35 16,-35-35-16,34 17 16,1-18-1,-35-34 1,35-36-1,-53 35-15,0-35 16,0 18-16,-18-36 16,-17 36-1,-18-18 1,18 36 15,17 70-15,18-36-16,0 18 15,35 36 1,18-18-16,-17-35 16,52 17-1,0-53 1</inkml:trace>
+  <inkml:trace contextRef="#ctx0" brushRef="#br0" timeOffset="-185532.06">3016 12859 0,'-35'-36'0,"70"72"15,-70-89-15,70 70 16,18 36 0,0 0 15,35 18-16,-70-54-15,17 19 16,-17-1 0,-36-35-1,18-18-15,-17 1 16,-19-71 0,19 35-16,-1-18 15,18-17 1,35 88-1,18 18 1,-18-1-16,18 36 16,18 18-1,-36-36 1,0-17 0,-17-36 15,-18-17-31,0-18 15,18-71 1,-18 71-16,0 18 16,-18-71-1,18 89 1,-35 34 0,0 36-1,17-18 1,18 1-16,0-1 15,53 0 1,35 1 0,-35-19-1,-18 1-15,1-1 16,-36 36 0,-18-17 15,-35-19-16,35-17-15,1 0 0</inkml:trace>
+  <inkml:trace contextRef="#ctx0" brushRef="#br0" timeOffset="-185299.79">3669 12541 0,'0'0'0,"18"-17"15,-1 52 17,36 18-1,-18-18-31,-17-17 0,0-1 16,17 54 15,-35-53-31</inkml:trace>
+  <inkml:trace contextRef="#ctx0" brushRef="#br0" timeOffset="-185159.32">3651 12418 0,'0'0'0,"-53"-88"16,36 70-16,-1-17 15,0 35-15,18-18 0,-17 36 16,17-1-1,17 19 1</inkml:trace>
+  <inkml:trace contextRef="#ctx0" brushRef="#br0" timeOffset="-183547.9">3986 12347 0,'0'0'16,"0"-17"-16,-35-1 15,0 0 1,17 18-16,1 18 16,17 35-1,17 0 1,36 53-1,18-18 1,17-53 0,-35-35-1,17-70 17,-70-1-17,-53-35 1,18 71-16,-18-36 15,0 36 1,-17 35 0,70 18-16,0 17 15,17 35 1,19-17 0,17-17-1,-36-36-15,18 0 16,-17-36-1,0 19 1,-18-36 0,0 18-16,17-107 31,89 125 0,-70 70-15,-1-36-16,-18 19 15,54 34 1,-53-52-16,-1 17 16,1-35-16,-18 18 15,18-36 1,-18-35 15,0 18-15,17 17-1,1 18 64,-18 18-79,-18-36 250,18-17-235,0 17 1,-17 18-16,17-17 0,0-19 15,0 19-15,0-18 16,0-1 0,0 19-16,17-1 15,1 0 1,-1 1 0,36 34-1,-35 1-15,0 0 16,-1-1-16,19 36 15,16 35 1,-34-52 15,17-19-15,-17-17-16,0-35 31,-18 0-31,17-18 16,1-18-1,-18-35 1,0 71-16,0 18 0,-18-1 16,18 0-16,-17 1 15,-1-1 1,18 0 15,0 36 0,35 0-15,1-1 0,17 19 15,-36-19-31,1 36 16,-1 0-1,-52 18 1,0-54-16,0 18 0,-36 1 0</inkml:trace>
+  <inkml:trace contextRef="#ctx0" brushRef="#br0" timeOffset="-182548.87">2417 14023 0,'0'0'0,"-53"0"31,35-35-15,53 17-16,53-53 15,-17 36-15,141-106 16,299-141 0,107-36-1,-54 36 17,-299 159-17,-89 34-15,-123 54 16,0 18-16</inkml:trace>
+  <inkml:trace contextRef="#ctx0" brushRef="#br0" timeOffset="-180062.92">5980 16245 0,'0'0'0,"-18"0"15,0 0-15,1 0 16,-1 0-1,0 0 1,89 0 15,141-53-15,158-52 0,124-36-1,-159 52 1,-176 54-1,-18 17-15,247-52 32,-335 70-32,17 0 31,-87 0-15,-1 0-1,1 0-15</inkml:trace>
+  <inkml:trace contextRef="#ctx0" brushRef="#br0" timeOffset="-179680.71">7832 15487 0,'-53'0'16,"17"18"31,36-1-47,18-17 15,0 18-15,52 17 31,1 0-15,-36-35-16,18 36 16,18 52-1,-54-70-15,-17 52 16,0-35 0,-17 18-16,-1-17 0,-17 16 15,-1-16-15,1 17 0,-18 0 16</inkml:trace>
+  <inkml:trace contextRef="#ctx0" brushRef="#br0" timeOffset="-178214.38">9349 14323 0,'0'-18'0,"0"36"0,0-54 32,0 89-17,0 71 1,0-71-16,0 17 15,35 124 1,18-35 0,-18-35-1,-35-71 1,0-18 0</inkml:trace>
+  <inkml:trace contextRef="#ctx0" brushRef="#br0" timeOffset="-177867.86">9102 15134 0,'0'0'0,"0"-17"15,-18 17-15,18-18 0,-18 18 16,36 0 0,0 0-16,35 0 15,-36 18-15,54 17 16,-36-35-16,0 17 15,54 36 1,-19-17 0,-35-36-1,-17-18-15,17 0 16,1-52 0,-1-18-1,-18 17 1,1 53-1,-18 71 1,-35 36 15,0-19-31</inkml:trace>
+  <inkml:trace contextRef="#ctx0" brushRef="#br0" timeOffset="-177078.49">9066 15769 0,'-35'-88'0,"70"176"16,-70-194-16,35 89 15,35 87 1,1 1-16,34 105 16,71 212-1,-35 53 1,-18 0-1,-35 18 1,18-177 0,-54-229-1,36 88 1,-35-106-16,-18 1 0,18 17 16,-36 17-16</inkml:trace>
+  <inkml:trace contextRef="#ctx0" brushRef="#br0" timeOffset="-176729.08">8855 18203 0,'0'0'0,"-212"36"15,194-36-15,-52 17 16,105-17 15,-17 0-31,193-17 16,-140-1-16,35 0 0,617-229 31,-229 89-15,-177 52-16,371-88 15,459-124 1,-794 230-16,299-71 15,-140 36 1,-18-1 0,-388 89-16,-36 0 15,-211 35 1</inkml:trace>
+  <inkml:trace contextRef="#ctx0" brushRef="#br0" timeOffset="-175859">9878 16916 0,'17'-18'16,"-34"36"-16,34-54 16,1 19-1,0 52 1,17 71 0,-17-71-16,35 89 15,17 70 1,-17-89-1,0 1 1,-35-70 0,-18-19-16,17 1 15,1-18 1</inkml:trace>
+  <inkml:trace contextRef="#ctx0" brushRef="#br0" timeOffset="-175373.57">9878 16880 0,'-18'0'15,"53"-17"32,107-1-31,-37-17 0,19 0-1,35-1 1,-124 19-16,18-1 15,-36 18 1,-17 18 0,-17-18-16,-19 35 15,1 35 1,35-52-16,18 70 16,35 71-1,53 17 1,-53-70-1,-18-53 1,-18-18-16,1 18 0,0 36 31,-18-72-31</inkml:trace>
+  <inkml:trace contextRef="#ctx0" brushRef="#br0" timeOffset="-174593.52">10813 16069 0,'-18'-53'31,"18"35"-31,18 89 0,17-53 47,53 211-31,18 53 0,0 0-1,-53-105 1,17 17-1,-34-53 1,-1-71 15,-53-70-15</inkml:trace>
+  <inkml:trace contextRef="#ctx0" brushRef="#br0" timeOffset="-174113.74">10760 16104 0,'-36'-35'0,"72"70"0,-124-105 16,88 52-1,17-17-15,71 0 16,71-18 15,-53 17-15,-53 19-16,35-19 16,-17 19-1,-54-1-15,-17 53 31,36 54-15,-36-54-16,52 71 16,19 17-1,88 212 17,-71-141-32,-53-105 0,0-1 15,89 212 1,-89-212-1,-17-18 17,-18-52-32,-18-36 15</inkml:trace>
+  <inkml:trace contextRef="#ctx0" brushRef="#br0" timeOffset="-173697.25">12171 16369 0,'0'0'0,"0"18"47,53 52-31,-36-35-1,1 1-15,35 69 16,35 37 0,-35-1-1,-18-53 1,-52-70 0</inkml:trace>
+  <inkml:trace contextRef="#ctx0" brushRef="#br0" timeOffset="-173296.62">12224 16510 0,'0'0'0,"-18"-18"15,18 1-15,53-1 31,53 0-15,35-17 0,-18 0-1,-70 17 1,-17 1 0,-19 52 46,36 35-46,-18-34-16,1-1 0,-19 18 15,54 35 1,-1 53 0,-52-53-1,0-17 1,-18-53-16</inkml:trace>
+  <inkml:trace contextRef="#ctx0" brushRef="#br0" timeOffset="-172913.96">13229 15963 0,'-35'-106'15,"70"212"-15,-88-247 0,53 123 0,18 18 16,17 36-1,0 52 1,54 124 0,-72-142-16,54 89 15,-1 53 1,1-36 0,-36-106-1,-17 1 1</inkml:trace>
+  <inkml:trace contextRef="#ctx0" brushRef="#br0" timeOffset="-172529.03">13282 15734 0,'-35'-53'0,"70"106"0,-123-230 16,53 142-16,-1-53 16,36 35-1,18 35 1,17 18-16,1 0 16,158-17-1,-142 17 1,54-18-1,0 18-15,-71 0 16,36 18 15,-53 52-15,35 124 0,-18-105-16,0 16 15,18 1-15,18 124 16,34 87-1,-69-229-15</inkml:trace>
+  <inkml:trace contextRef="#ctx0" brushRef="#br0" timeOffset="-171848.01">16210 15240 0,'0'-35'16,"0"70"-16,0-88 0,18 53 0,-1-18 16,36 54-1,-17 17-15,34 141 16,71 264 0,0 160-1,-17-36 16,-1-18-15,-87-476-16,-19 1 0,1-1 0,-18-18 16,18-17-16,-18 71 15,-18-36 1,-17-88 0</inkml:trace>
+  <inkml:trace contextRef="#ctx0" brushRef="#br0" timeOffset="-171494.19">16439 17674 0,'-35'-17'0,"0"-1"0,105 53 0,-175-70 16,34 17-1,89 18 16,70 0-31,-18 0 16,160 0 0,387-88-1,-335 53-15,424-89 16,511-87 0,-388 70-1,-441 88-15,318-53 16,-407 70-16,178-16 15,-125 34 1,-334 18-16,-36 0 16,-281 35-1</inkml:trace>
+  <inkml:trace contextRef="#ctx0" brushRef="#br0" timeOffset="-170679.73">18168 17286 0,'-18'0'16,"36"0"-16,-53-18 16,17 1-1,0 17-15,18-18 16,-17 1 0,34-1-1,1 18 1,0 0-16,-18 18 15,17-1 1,-17 1-16,-35-1 31,-18 1-15,53-36-16,-35 1 16,17-18-1,18-1 1,36-17 15,-19 36-31,1 17 16,17 0-1,-17 17-15,-18 1 16,17 17 0,-34-35-16,17 18 15,-36 0 1,19-18-16,-1 0 15,-17-18 1,70 0 15,18 1 1,-18 17-32,-17 0 15,0 0 1</inkml:trace>
+  <inkml:trace contextRef="#ctx0" brushRef="#br0" timeOffset="-167256.25">18186 17163 0,'17'-18'47,"54"-35"-16,17 18-31,-17 0 16,123-54-1,194-52 1,-247 88-16,123-17 16,54-18-1,-212 52 1,-71 19-16,-17-1 15,-89 0 1,53 18-16,-34 0 16,-1 0-1,70 18 48,-17-36-16,0 1-32,18 17 1,-18-18-16,18 18 16,-18-18-1,35 36 1,-18-18-16,-17 18 15,0-1-15,0 19 16,-17-1 15,-1-35-31,1 18 0,-1-18 0,-17 0 16,-1-18 0,54-17 15,0-1-31,-1 36 15,19-35 1,34 17 0,-35 18-1,-35 18-15,0 0 16,0 17 0,-17-35-16,-1 18 15,-17-18 1,17 0-1,1 0 1,17-18 15,17 18-15,-17-18 0,-17 18 30,17-17 1,0-1-31,0 0-16,17-17 16,54-53-1,-54 53-15,1-18 16,70-124-1,-53 107-15,36-71 16,35-71 0,-53 124-1,35 0 1,-70 88-16,17-18 16,-35 0 15,-18 18 0,1 0-31,-1 0 31,0 0 16,18-17 16,18-1-32,35 0-15,-35 18-1,17 0 16,-35 18-15,-18 0 0,1-1-16,-19 1 15,-17-18 1,36 18-16,-19-18 16,19-18-1,17 0-15,0-17 16,53-18-1,-18 36 1,18-19 0,-18 54-1,-35 17 1,-17 0 0,-19 18-1,36-35 1,-17 0-1,-1-18-15,0 17 16,18-34 0,0-1-16,0 0 15,0-17 1,18 17 0,0 1-1,-1 34 48,71 19-32,-70-19-15,17 1-16,212 141 31,53 17 0,-229-141-31,-18 18 16,123 36-1,-141-54-15,54 18 16,-37-18 0,-52-17-16,-17-18 31,-1 0-16,1 0-15,17-18 63,0 0-47,0-17-1,0 17 16,0 1-31,0-1 0,0 1 16,17-19 0,1 19-16,-18-1 0,17 18 15,19 0 1,-1 0 0,-17 35-1,-1-17-15,-17 17 16,-17 0-1,-1-17 1,0 0-16,-17-18 16,0 0-1,17-36 1,53-16 0,1 16-1,17-17 16,-18 53-15,-35 18-16,0 0 16,-18 17-1,1-17-15,-1-1 0,0 1 16,-17-1 0,17 1-16,1-18 15,-1-18 16,18 1-15,18 34 47,70-52-32,-70 0-16,87-53 1,-69 35-16,17 0 16,0-18-16,-1 1 0,1-18 15,124-230 1,-107 212-16,36-141 16,-18 18-1,-35 141-15,0-71 16,0 36-1,-35 105 1,-18 53 0,0-17-1,0 17 1,0-17 0,17-1-1,1-34 126,0-1-110,-1 0-15,1 18-1,17 18 1,-17 0 0,0 35-1,-18-36 1,-36 19-1,-17-19 1,18-17-16,0 0 16,17-17-1,18-1-15,-18 0 0,18 1 16,18-54 0,0 53-16,17-17 15,-17 18 1,-1 17-16,1 0 15,-18 17 1,0 18 0,-18-17-1</inkml:trace>
+  <inkml:trace contextRef="#ctx0" brushRef="#br0" timeOffset="-166271.9">18927 17639 0,'0'-18'16,"17"18"-16,1-17 16,123-1-1,-53 0-15,0 1 16,0-1-16,142 0 16,87-35-1,-229 36-15,1-1 16,-36 18-16,17-17 15,-87-19 1,-19 36-16</inkml:trace>
+  <inkml:trace contextRef="#ctx0" brushRef="#br0" timeOffset="-166038.45">19861 17286 0,'0'0'15,"0"-18"1,18 18-1,0 0 1,-1 18 0,1-18-16,35 18 15,53 35 1,-71-36-16,36 1 16,-54 17-1,-17-17-15,-17 17 16,-36-17-1,35-18-15</inkml:trace>
+  <inkml:trace contextRef="#ctx0" brushRef="#br0" timeOffset="-165760.73">20602 17180 0,'0'0'0,"35"-35"31,-17 35-15,0 53-1,-1-35-15,1 17 16,17 53 0,-17-53-16,17 36 15,53-1 1,-52-52-16,-1-18 15,71 18 17,-106-36-32</inkml:trace>
+  <inkml:trace contextRef="#ctx0" brushRef="#br0" timeOffset="-165619.14">20673 17392 0,'0'0'0,"-88"-18"31,140 1-15,107-19 0,-35 19-1,-71-1-15</inkml:trace>
+  <inkml:trace contextRef="#ctx0" brushRef="#br0" timeOffset="-164123.35">12753 17533 0,'0'0'16,"-18"-35"15,89-1-31,-18 19 16,17-1-16,336-88 31,-89 18-16,-246 71-15,70-19 16,-106 36-16,1-17 0,-19 17 16,-34 0-1</inkml:trace>
+  <inkml:trace contextRef="#ctx0" brushRef="#br0" timeOffset="-163743.71">13600 17163 0,'-18'0'0,"36"0"0,-54-18 15,36 0 1,18 18 0,35-17 15,-36 17-31,19 0 0,34 17 16,1 36 15,-36-17-16,-17-19-15,-18 1 0,0-1 16,0 36 0,-18-35-1,-17-18 1,17 0 0,1-18-1,34 18 1,1 0-1,17 36 1,-17-19-16,-1 1 16,1 0-16</inkml:trace>
+  <inkml:trace contextRef="#ctx0" brushRef="#br0" timeOffset="-163272.71">14023 17039 0,'18'-17'31,"-1"17"0,1 70-15,-1-17-1,19 53 1,34-18 0,-34-53-1,-1-17-15,18 0 16,17-18-1,-34-18 1,-36 0-16</inkml:trace>
+  <inkml:trace contextRef="#ctx0" brushRef="#br0" timeOffset="-163126.48">14041 17251 0,'-18'17'0,"36"-34"0,-36 17 31,71-35-15,53-1 0,-53 1-1</inkml:trace>
 </inkml:ink>
 </file>
 
@@ -3069,14 +3026,14 @@
           <inkml:channelProperty channel="F" name="resolution" value="0" units="1/dev"/>
         </inkml:channelProperties>
       </inkml:inkSource>
-      <inkml:timestamp xml:id="ts0" timeString="2023-05-24T04:48:14.441"/>
+      <inkml:timestamp xml:id="ts0" timeString="2023-05-24T04:48:13.260"/>
     </inkml:context>
     <inkml:brush xml:id="br0">
       <inkml:brushProperty name="width" value="0.05" units="cm"/>
       <inkml:brushProperty name="height" value="0.05" units="cm"/>
     </inkml:brush>
   </inkml:definitions>
-  <inkml:trace contextRef="#ctx0" brushRef="#br0">1 171 24575,'1'14'0,"2"1"0,0-1 0,0 0 0,1 0 0,1 0 0,1-1 0,6 13 0,5 14 0,-10-19 0,0 0 0,-2 0 0,0 1 0,2 23 0,-10-74 0,1 0 0,2-1 0,1 1 0,2 0 0,0-1 0,2 2 0,16-51 0,-17 67 0,1 0 0,1 0 0,0 0 0,0 1 0,1 0 0,1 0 0,0 0 0,17-17 0,-17 21 0,0 1 0,0 0 0,1 0 0,-1 1 0,1 0 0,0 0 0,1 1 0,-1 1 0,1-1 0,-1 2 0,1-1 0,20-2 0,-24 5 0,-1-1 0,0 1 0,1 0 0,-1 1 0,1-1 0,-1 1 0,0 0 0,0 0 0,1 1 0,-1-1 0,0 1 0,0 0 0,0 1 0,-1-1 0,9 6 0,-10-5 0,-1-1 0,1 1 0,-1 0 0,1-1 0,-1 1 0,0 0 0,0 0 0,-1 0 0,1 1 0,-1-1 0,1 0 0,-1 1 0,0-1 0,0 0 0,-1 1 0,1 0 0,-1-1 0,0 1 0,1-1 0,-2 1 0,1-1 0,0 1 0,-1-1 0,-1 8 0,-1-1 0,-1 0 0,0-1 0,-1 1 0,0-1 0,0 0 0,-1 0 0,-12 15 0,0-3 0,-38 33 0,43-43 0,8-8 0,0 0 0,1 1 0,-1 0 0,1 0 0,-6 7 0,10-10 0,-1 0 0,1-1 0,-1 1 0,1 0 0,0 0 0,0-1 0,-1 1 0,1 0 0,0 0 0,0 0 0,0-1 0,0 1 0,0 0 0,0 0 0,0 0 0,0 0 0,0-1 0,0 1 0,0 0 0,1 0 0,-1 0 0,0-1 0,1 1 0,-1 0 0,0-1 0,1 1 0,-1 0 0,1 0 0,-1-1 0,1 1 0,-1-1 0,1 1 0,0 0 0,-1-1 0,1 1 0,0-1 0,-1 0 0,1 1 0,0-1 0,-1 0 0,1 1 0,0-1 0,0 0 0,0 0 0,0 1 0,18 5 0,0 0 0,1-1 0,-1 0 0,1-2 0,24 1 0,16 4 0,-47-6 0,9 1 0,0 1 0,-1 1 0,1 1 0,24 10 0,-45-16 0,0 0 0,-1 0 0,1 1 0,0-1 0,-1 0 0,1 0 0,0 1 0,-1-1 0,1 0 0,0 1 0,-1-1 0,1 1 0,-1-1 0,1 1 0,-1-1 0,1 1 0,-1-1 0,1 1 0,-1 0 0,0-1 0,1 1 0,-1-1 0,0 1 0,1 0 0,-1 0 0,0-1 0,0 1 0,1 0 0,-1-1 0,0 1 0,0 0 0,0 0 0,0-1 0,0 1 0,0 0 0,0 0 0,-1-1 0,1 1 0,0 0 0,0-1 0,0 1 0,-1 0 0,1-1 0,0 1 0,-1 0 0,1-1 0,-1 1 0,1-1 0,-1 1 0,1 0 0,-1-1 0,1 1 0,-1-1 0,1 0 0,-2 1 0,-3 3 0,0 0 0,-1 0 0,0-1 0,1 0 0,-8 3 0,-76 25-203,-2-4 0,-131 23-1,172-40-551,-5 1-6071</inkml:trace>
+  <inkml:trace contextRef="#ctx0" brushRef="#br0">1 8 24575,'0'0'0,"1"-1"0,-1 0 0,1 1 0,0-1 0,-1 1 0,1-1 0,0 1 0,-1-1 0,1 1 0,0-1 0,0 1 0,-1 0 0,1-1 0,0 1 0,0 0 0,0 0 0,-1-1 0,1 1 0,0 0 0,0 0 0,0 0 0,0 0 0,0 0 0,-1 0 0,1 1 0,0-1 0,0 0 0,0 0 0,1 1 0,-1 0 0,1 0 0,-1 1 0,1-1 0,-1 1 0,0-1 0,1 1 0,-1-1 0,0 1 0,0 0 0,0-1 0,-1 1 0,2 3 0,2 6 0,-1 1 0,0 0 0,1 13 0,-3-25 0,52 493 0,-12-99 0,-5-137 0,24 243 0,-54-229-1365,-7-242-5461</inkml:trace>
 </inkml:ink>
 </file>
 
@@ -3366,14 +3323,14 @@
           <inkml:channelProperty channel="F" name="resolution" value="0" units="1/dev"/>
         </inkml:channelProperties>
       </inkml:inkSource>
-      <inkml:timestamp xml:id="ts0" timeString="2023-05-24T04:48:14.830"/>
+      <inkml:timestamp xml:id="ts0" timeString="2023-05-24T04:48:14.441"/>
     </inkml:context>
     <inkml:brush xml:id="br0">
       <inkml:brushProperty name="width" value="0.05" units="cm"/>
       <inkml:brushProperty name="height" value="0.05" units="cm"/>
     </inkml:brush>
   </inkml:definitions>
-  <inkml:trace contextRef="#ctx0" brushRef="#br0">296 25 24575,'-4'-3'0,"1"1"0,-1-1 0,1 1 0,-1 0 0,0 0 0,0 0 0,0 0 0,0 1 0,0-1 0,0 1 0,0 0 0,0 0 0,0 1 0,-1-1 0,1 1 0,0 0 0,-1 0 0,-4 1 0,-2 1 0,0 0 0,0 0 0,0 1 0,0 0 0,-17 9 0,17-7 0,1 0 0,0 1 0,0 1 0,1 0 0,0 0 0,0 0 0,1 1 0,0 1 0,0-1 0,1 1 0,-10 15 0,15-20 0,0 0 0,0 0 0,0 0 0,1 0 0,-1 0 0,1 0 0,0 0 0,0 1 0,0-1 0,1 0 0,0 1 0,-1-1 0,1 0 0,1 1 0,-1-1 0,1 0 0,0 1 0,0-1 0,0 0 0,0 0 0,1 0 0,0 0 0,-1 0 0,2 0 0,-1 0 0,0-1 0,1 1 0,-1-1 0,1 1 0,0-1 0,0 0 0,1 0 0,3 2 0,5 4-114,1-2 1,-1 0-1,2 0 0,-1-1 0,1 0 1,0-2-1,0 1 0,0-2 0,1 0 1,-1 0-1,17-1 0,27 4-6712</inkml:trace>
+  <inkml:trace contextRef="#ctx0" brushRef="#br0">1 171 24575,'1'14'0,"2"1"0,0-1 0,0 0 0,1 0 0,1 0 0,1-1 0,6 13 0,5 14 0,-10-19 0,0 0 0,-2 0 0,0 1 0,2 23 0,-10-74 0,1 0 0,2-1 0,1 1 0,2 0 0,0-1 0,2 2 0,16-51 0,-17 67 0,1 0 0,1 0 0,0 0 0,0 1 0,1 0 0,1 0 0,0 0 0,17-17 0,-17 21 0,0 1 0,0 0 0,1 0 0,-1 1 0,1 0 0,0 0 0,1 1 0,-1 1 0,1-1 0,-1 2 0,1-1 0,20-2 0,-24 5 0,-1-1 0,0 1 0,1 0 0,-1 1 0,1-1 0,-1 1 0,0 0 0,0 0 0,1 1 0,-1-1 0,0 1 0,0 0 0,0 1 0,-1-1 0,9 6 0,-10-5 0,-1-1 0,1 1 0,-1 0 0,1-1 0,-1 1 0,0 0 0,0 0 0,-1 0 0,1 1 0,-1-1 0,1 0 0,-1 1 0,0-1 0,0 0 0,-1 1 0,1 0 0,-1-1 0,0 1 0,1-1 0,-2 1 0,1-1 0,0 1 0,-1-1 0,-1 8 0,-1-1 0,-1 0 0,0-1 0,-1 1 0,0-1 0,0 0 0,-1 0 0,-12 15 0,0-3 0,-38 33 0,43-43 0,8-8 0,0 0 0,1 1 0,-1 0 0,1 0 0,-6 7 0,10-10 0,-1 0 0,1-1 0,-1 1 0,1 0 0,0 0 0,0-1 0,-1 1 0,1 0 0,0 0 0,0 0 0,0-1 0,0 1 0,0 0 0,0 0 0,0 0 0,0 0 0,0-1 0,0 1 0,0 0 0,1 0 0,-1 0 0,0-1 0,1 1 0,-1 0 0,0-1 0,1 1 0,-1 0 0,1 0 0,-1-1 0,1 1 0,-1-1 0,1 1 0,0 0 0,-1-1 0,1 1 0,0-1 0,-1 0 0,1 1 0,0-1 0,-1 0 0,1 1 0,0-1 0,0 0 0,0 0 0,0 1 0,18 5 0,0 0 0,1-1 0,-1 0 0,1-2 0,24 1 0,16 4 0,-47-6 0,9 1 0,0 1 0,-1 1 0,1 1 0,24 10 0,-45-16 0,0 0 0,-1 0 0,1 1 0,0-1 0,-1 0 0,1 0 0,0 1 0,-1-1 0,1 0 0,0 1 0,-1-1 0,1 1 0,-1-1 0,1 1 0,-1-1 0,1 1 0,-1-1 0,1 1 0,-1 0 0,0-1 0,1 1 0,-1-1 0,0 1 0,1 0 0,-1 0 0,0-1 0,0 1 0,1 0 0,-1-1 0,0 1 0,0 0 0,0 0 0,0-1 0,0 1 0,0 0 0,0 0 0,-1-1 0,1 1 0,0 0 0,0-1 0,0 1 0,-1 0 0,1-1 0,0 1 0,-1 0 0,1-1 0,-1 1 0,1-1 0,-1 1 0,1 0 0,-1-1 0,1 1 0,-1-1 0,1 0 0,-2 1 0,-3 3 0,0 0 0,-1 0 0,0-1 0,1 0 0,-8 3 0,-76 25-203,-2-4 0,-131 23-1,172-40-551,-5 1-6071</inkml:trace>
 </inkml:ink>
 </file>
 
@@ -3663,14 +3620,14 @@
           <inkml:channelProperty channel="F" name="resolution" value="0" units="1/dev"/>
         </inkml:channelProperties>
       </inkml:inkSource>
-      <inkml:timestamp xml:id="ts0" timeString="2023-05-24T04:48:15.156"/>
+      <inkml:timestamp xml:id="ts0" timeString="2023-05-24T04:48:14.830"/>
     </inkml:context>
     <inkml:brush xml:id="br0">
       <inkml:brushProperty name="width" value="0.05" units="cm"/>
       <inkml:brushProperty name="height" value="0.05" units="cm"/>
     </inkml:brush>
   </inkml:definitions>
-  <inkml:trace contextRef="#ctx0" brushRef="#br0">0 17 24575,'0'-5'0,"5"-1"0,6 0 0,1 6 0,3 8 0,0 6 0,-4 11 0,2 6 0,2 7 0,0 6 0,-3 1 0,1-3 0,-2 1 0,-2-2 0,-3-9-8191</inkml:trace>
+  <inkml:trace contextRef="#ctx0" brushRef="#br0">296 25 24575,'-4'-3'0,"1"1"0,-1-1 0,1 1 0,-1 0 0,0 0 0,0 0 0,0 0 0,0 1 0,0-1 0,0 1 0,0 0 0,0 0 0,0 1 0,-1-1 0,1 1 0,0 0 0,-1 0 0,-4 1 0,-2 1 0,0 0 0,0 0 0,0 1 0,0 0 0,-17 9 0,17-7 0,1 0 0,0 1 0,0 1 0,1 0 0,0 0 0,0 0 0,1 1 0,0 1 0,0-1 0,1 1 0,-10 15 0,15-20 0,0 0 0,0 0 0,0 0 0,1 0 0,-1 0 0,1 0 0,0 0 0,0 1 0,0-1 0,1 0 0,0 1 0,-1-1 0,1 0 0,1 1 0,-1-1 0,1 0 0,0 1 0,0-1 0,0 0 0,0 0 0,1 0 0,0 0 0,-1 0 0,2 0 0,-1 0 0,0-1 0,1 1 0,-1-1 0,1 1 0,0-1 0,0 0 0,1 0 0,3 2 0,5 4-114,1-2 1,-1 0-1,2 0 0,-1-1 0,1 0 1,0-2-1,0 1 0,0-2 0,1 0 1,-1 0-1,17-1 0,27 4-6712</inkml:trace>
 </inkml:ink>
 </file>
 
@@ -3960,14 +3917,14 @@
           <inkml:channelProperty channel="F" name="resolution" value="0" units="1/dev"/>
         </inkml:channelProperties>
       </inkml:inkSource>
-      <inkml:timestamp xml:id="ts0" timeString="2023-05-24T04:48:15.513"/>
+      <inkml:timestamp xml:id="ts0" timeString="2023-05-24T04:48:15.156"/>
     </inkml:context>
     <inkml:brush xml:id="br0">
       <inkml:brushProperty name="width" value="0.05" units="cm"/>
       <inkml:brushProperty name="height" value="0.05" units="cm"/>
     </inkml:brush>
   </inkml:definitions>
-  <inkml:trace contextRef="#ctx0" brushRef="#br0">1 182 24575,'0'-11'0,"0"0"0,1-1 0,1 1 0,0 0 0,0 0 0,1 0 0,0 1 0,10-21 0,-11 27 0,0 0 0,1-1 0,0 1 0,0 1 0,0-1 0,0 0 0,1 1 0,-1-1 0,1 1 0,0 0 0,0 0 0,0 1 0,0-1 0,0 1 0,1 0 0,-1 0 0,1 0 0,-1 1 0,1-1 0,0 1 0,-1 0 0,1 1 0,5-1 0,2 2 0,0 0 0,0 0 0,0 1 0,0 1 0,-1 0 0,1 1 0,-1 0 0,0 0 0,0 1 0,-1 1 0,14 8 0,11 10 0,57 50 0,-71-56 0,-2 0 0,-1 2 0,0 0 0,-1 1 0,25 41 0,-38-54 0,1 1 0,-1 0 0,-1 0 0,0 0 0,0 0 0,-1 0 0,0 1 0,1 14 0,-3-18 0,-1 1 0,1-1 0,-1 1 0,0-1 0,0 1 0,-1-1 0,0 0 0,0 0 0,0 0 0,-1 0 0,0 0 0,0-1 0,-8 11 0,1-5-151,0 0-1,-1-1 0,-1 0 0,1-1 1,-2-1-1,1 1 0,-1-2 1,-18 9-1,-44 17-6674</inkml:trace>
+  <inkml:trace contextRef="#ctx0" brushRef="#br0">0 17 24575,'0'-5'0,"5"-1"0,6 0 0,1 6 0,3 8 0,0 6 0,-4 11 0,2 6 0,2 7 0,0 6 0,-3 1 0,1-3 0,-2 1 0,-2-2 0,-3-9-8191</inkml:trace>
 </inkml:ink>
 </file>
 
@@ -4257,14 +4214,14 @@
           <inkml:channelProperty channel="F" name="resolution" value="0" units="1/dev"/>
         </inkml:channelProperties>
       </inkml:inkSource>
-      <inkml:timestamp xml:id="ts0" timeString="2023-05-24T04:48:16.102"/>
+      <inkml:timestamp xml:id="ts0" timeString="2023-05-24T04:48:15.513"/>
     </inkml:context>
     <inkml:brush xml:id="br0">
       <inkml:brushProperty name="width" value="0.05" units="cm"/>
       <inkml:brushProperty name="height" value="0.05" units="cm"/>
     </inkml:brush>
   </inkml:definitions>
-  <inkml:trace contextRef="#ctx0" brushRef="#br0">1 78 24575,'0'-5'0,"5"-1"0,6 0 0,6 1 0,4 2 0,9-4 0,4 0 0,5 0 0,0-2 0,0 0 0,-4 1 0,-7 2-8191</inkml:trace>
+  <inkml:trace contextRef="#ctx0" brushRef="#br0">1 182 24575,'0'-11'0,"0"0"0,1-1 0,1 1 0,0 0 0,0 0 0,1 0 0,0 1 0,10-21 0,-11 27 0,0 0 0,1-1 0,0 1 0,0 1 0,0-1 0,0 0 0,1 1 0,-1-1 0,1 1 0,0 0 0,0 0 0,0 1 0,0-1 0,0 1 0,1 0 0,-1 0 0,1 0 0,-1 1 0,1-1 0,0 1 0,-1 0 0,1 1 0,5-1 0,2 2 0,0 0 0,0 0 0,0 1 0,0 1 0,-1 0 0,1 1 0,-1 0 0,0 0 0,0 1 0,-1 1 0,14 8 0,11 10 0,57 50 0,-71-56 0,-2 0 0,-1 2 0,0 0 0,-1 1 0,25 41 0,-38-54 0,1 1 0,-1 0 0,-1 0 0,0 0 0,0 0 0,-1 0 0,0 1 0,1 14 0,-3-18 0,-1 1 0,1-1 0,-1 1 0,0-1 0,0 1 0,-1-1 0,0 0 0,0 0 0,0 0 0,-1 0 0,0 0 0,0-1 0,-8 11 0,1-5-151,0 0-1,-1-1 0,-1 0 0,1-1 1,-2-1-1,1 1 0,-1-2 1,-18 9-1,-44 17-6674</inkml:trace>
 </inkml:ink>
 </file>
 
@@ -4555,14 +4512,14 @@
           <inkml:channelProperty channel="F" name="resolution" value="0" units="1/dev"/>
         </inkml:channelProperties>
       </inkml:inkSource>
-      <inkml:timestamp xml:id="ts0" timeString="2023-05-24T04:48:16.440"/>
+      <inkml:timestamp xml:id="ts0" timeString="2023-05-24T04:48:16.102"/>
     </inkml:context>
     <inkml:brush xml:id="br0">
       <inkml:brushProperty name="width" value="0.05" units="cm"/>
       <inkml:brushProperty name="height" value="0.05" units="cm"/>
     </inkml:brush>
   </inkml:definitions>
-  <inkml:trace contextRef="#ctx0" brushRef="#br0">13 7 24575,'-5'-5'0,"-1"3"0,4 3 0,4 5 0,0 6 0,1 6 0,4 9 0,1 10 0,-1 3 0,3 4 0,0-1 0,-2 2 0,-2-2 0,2-4 0,1-8-8191</inkml:trace>
+  <inkml:trace contextRef="#ctx0" brushRef="#br0">1 78 24575,'0'-5'0,"5"-1"0,6 0 0,6 1 0,4 2 0,9-4 0,4 0 0,5 0 0,0-2 0,0 0 0,-4 1 0,-7 2-8191</inkml:trace>
 </inkml:ink>
 </file>
 
@@ -4854,15 +4811,14 @@
           <inkml:channelProperty channel="F" name="resolution" value="0" units="1/dev"/>
         </inkml:channelProperties>
       </inkml:inkSource>
-      <inkml:timestamp xml:id="ts0" timeString="2023-05-24T04:48:16.815"/>
+      <inkml:timestamp xml:id="ts0" timeString="2023-05-24T04:48:16.440"/>
     </inkml:context>
     <inkml:brush xml:id="br0">
       <inkml:brushProperty name="width" value="0.05" units="cm"/>
       <inkml:brushProperty name="height" value="0.05" units="cm"/>
     </inkml:brush>
   </inkml:definitions>
-  <inkml:trace contextRef="#ctx0" brushRef="#br0">303 0 24575,'0'5'0,"0"6"0,-5 5 0,-1 6 0,-4 8 0,-6 4 0,0 0 0,4-5-8191</inkml:trace>
-  <inkml:trace contextRef="#ctx0" brushRef="#br0" timeOffset="1">0 193 24575,'0'-4'0,"5"-7"0,6-1 0,6 1 0,4 3 0,4 2 0,7 8 0,7 7 0,7 3 0,9 3 0,10 5 0,-7-2-8191</inkml:trace>
+  <inkml:trace contextRef="#ctx0" brushRef="#br0">13 7 24575,'-5'-5'0,"-1"3"0,4 3 0,4 5 0,0 6 0,1 6 0,4 9 0,1 10 0,-1 3 0,3 4 0,0-1 0,-2 2 0,-2-2 0,2-4 0,1-8-8191</inkml:trace>
 </inkml:ink>
 </file>
 
@@ -5152,14 +5108,15 @@
           <inkml:channelProperty channel="F" name="resolution" value="0" units="1/dev"/>
         </inkml:channelProperties>
       </inkml:inkSource>
-      <inkml:timestamp xml:id="ts0" timeString="2023-05-24T04:48:17.173"/>
+      <inkml:timestamp xml:id="ts0" timeString="2023-05-24T04:48:16.815"/>
     </inkml:context>
     <inkml:brush xml:id="br0">
       <inkml:brushProperty name="width" value="0.05" units="cm"/>
       <inkml:brushProperty name="height" value="0.05" units="cm"/>
     </inkml:brush>
   </inkml:definitions>
-  <inkml:trace contextRef="#ctx0" brushRef="#br0">7 45 24575,'0'-4'0,"-5"-2"0,3 0 0,7 1 0,7 1 0,7 2 0,9 1 0,4 1 0,2-5 0,-1-1 0,-5 1-8191</inkml:trace>
+  <inkml:trace contextRef="#ctx0" brushRef="#br0">303 0 24575,'0'5'0,"0"6"0,-5 5 0,-1 6 0,-4 8 0,-6 4 0,0 0 0,4-5-8191</inkml:trace>
+  <inkml:trace contextRef="#ctx0" brushRef="#br0" timeOffset="1">0 193 24575,'0'-4'0,"5"-7"0,6-1 0,6 1 0,4 3 0,4 2 0,7 8 0,7 7 0,7 3 0,9 3 0,10 5 0,-7-2-8191</inkml:trace>
 </inkml:ink>
 </file>
 
@@ -5450,15 +5407,14 @@
           <inkml:channelProperty channel="F" name="resolution" value="0" units="1/dev"/>
         </inkml:channelProperties>
       </inkml:inkSource>
-      <inkml:timestamp xml:id="ts0" timeString="2023-05-24T04:48:17.565"/>
+      <inkml:timestamp xml:id="ts0" timeString="2023-05-24T04:48:17.173"/>
     </inkml:context>
     <inkml:brush xml:id="br0">
       <inkml:brushProperty name="width" value="0.05" units="cm"/>
       <inkml:brushProperty name="height" value="0.05" units="cm"/>
     </inkml:brush>
   </inkml:definitions>
-  <inkml:trace contextRef="#ctx0" brushRef="#br0">65 1 24575,'-5'0'0,"-6"0"0,-6 0 0,0 5 0,7 1 0,6 4 0,8 6 0,3 9 0,1 5 0,-1 3 0,3 4 0,0 1 0,-3-1 0,-1-3 0,-2-2 0,-2-6-8191</inkml:trace>
-  <inkml:trace contextRef="#ctx0" brushRef="#br0" timeOffset="1">65 277 24575,'0'-4'0,"0"-7"0,0-6 0,0-5 0,0-3 0,0-2 0,0 8 0,0 12 0,0 12 0,0 14 0,-5 9 0,-1 9 0,0 3 0,1-5-8191</inkml:trace>
+  <inkml:trace contextRef="#ctx0" brushRef="#br0">7 45 24575,'0'-4'0,"-5"-2"0,3 0 0,7 1 0,7 1 0,7 2 0,9 1 0,4 1 0,2-5 0,-1-1 0,-5 1-8191</inkml:trace>
 </inkml:ink>
 </file>
 
@@ -5748,14 +5704,15 @@
           <inkml:channelProperty channel="F" name="resolution" value="0" units="1/dev"/>
         </inkml:channelProperties>
       </inkml:inkSource>
-      <inkml:timestamp xml:id="ts0" timeString="2023-05-24T04:48:31.744"/>
+      <inkml:timestamp xml:id="ts0" timeString="2023-05-24T04:48:17.565"/>
     </inkml:context>
     <inkml:brush xml:id="br0">
       <inkml:brushProperty name="width" value="0.05" units="cm"/>
       <inkml:brushProperty name="height" value="0.05" units="cm"/>
     </inkml:brush>
   </inkml:definitions>
-  <inkml:trace contextRef="#ctx0" brushRef="#br0">12645 7 24575,'0'-1'0,"0"1"0,0 0 0,0-1 0,0 1 0,0 0 0,0 0 0,0-1 0,-1 1 0,1 0 0,0 0 0,0-1 0,0 1 0,0 0 0,0 0 0,-1-1 0,1 1 0,0 0 0,0 0 0,0 0 0,-1-1 0,1 1 0,0 0 0,0 0 0,-1 0 0,1 0 0,0 0 0,0-1 0,-1 1 0,1 0 0,0 0 0,0 0 0,-1 0 0,1 0 0,0 0 0,-1 0 0,1 0 0,0 0 0,0 0 0,-1 0 0,1 0 0,0 0 0,-1 0 0,1 0 0,0 1 0,0-1 0,-1 0 0,-17 7 0,17-7 0,-287 139 0,-125 30-2393,-547 146-1,-460 38-3759,-540 67 4531,162-38-1159,-181 93 2600,14 27 370,1861-476-188,-1437 336 4395,1522-358-4199,-128 19 3466,126-25-2256,21 2-1357,0 0 0,0 0 1,0-1-1,0 1 0,0 0 1,0 0-1,0-1 0,0 1 0,0 0 1,0 0-1,0-1 0,0 1 0,0 0 1,0 0-1,0 0 0,0-1 0,0 1 1,0 0-1,0 0 0,0-1 1,0 1-1,1 0 0,-1 0 0,0 0 1,0-1-1,0 1 0,0 0 0,1 0 1,-1 0-1,0 0 0,0 0 0,0-1 1,1 1-1,-1 0 0,0 0 1,0 0-1,1 0 0,-1 0 0,0 0 1,36-18 1522,232-75 813,-162 60-3218,104-48 0,-174 63-5994</inkml:trace>
+  <inkml:trace contextRef="#ctx0" brushRef="#br0">65 1 24575,'-5'0'0,"-6"0"0,-6 0 0,0 5 0,7 1 0,6 4 0,8 6 0,3 9 0,1 5 0,-1 3 0,3 4 0,0 1 0,-3-1 0,-1-3 0,-2-2 0,-2-6-8191</inkml:trace>
+  <inkml:trace contextRef="#ctx0" brushRef="#br0" timeOffset="1">65 277 24575,'0'-4'0,"0"-7"0,0-6 0,0-5 0,0-3 0,0-2 0,0 8 0,0 12 0,0 12 0,0 14 0,-5 9 0,-1 9 0,0 3 0,1-5-8191</inkml:trace>
 </inkml:ink>
 </file>
 
@@ -6045,7 +6002,7 @@
           <inkml:channelProperty channel="T" name="resolution" value="1" units="1/dev"/>
         </inkml:channelProperties>
       </inkml:inkSource>
-      <inkml:timestamp xml:id="ts0" timeString="2023-05-24T04:07:30.219"/>
+      <inkml:timestamp xml:id="ts0" timeString="2023-06-22T05:48:22.511"/>
     </inkml:context>
     <inkml:brush xml:id="br0">
       <inkml:brushProperty name="width" value="0.05292" units="cm"/>
@@ -6053,151 +6010,251 @@
       <inkml:brushProperty name="color" value="#FF0000"/>
     </inkml:brush>
   </inkml:definitions>
-  <inkml:trace contextRef="#ctx0" brushRef="#br0">17286 8484 0,'0'0'0,"-18"0"16,1 36-1,-1-36 1,18 17-16,-35 54 15,17-18 1,18 35 0,0-70-16,36 34 15,34-16 1,1-36 0,70-36 15,-71 1-16,-34-53 1,-36 35 0,-18 18-16,-53-71 15,-34 53 17,69 53-32,19 0 0,-1 0 15,0 18-15,-35 35 16</inkml:trace>
-  <inkml:trace contextRef="#ctx0" brushRef="#br0" timeOffset="1098.91">17903 8520 0,'-52'52'31,"34"-16"-31,18 17 16,0-36-1,0 36 1,0-17-16,18 16 16,34-16-1,90-36 17,-90-18-17,-34-52 1,-18-19-1,-53 1 1,0 35 0,0 18-1,0 53 1,36 17 0,-1-18-1</inkml:trace>
-  <inkml:trace contextRef="#ctx0" brushRef="#br0" timeOffset="1638.11">18450 8520 0,'0'0'15,"-17"-18"-15,-1 18 16,0 18 15,1-1-31,-1 18 16,0 1-1,1-1-15,-1 18 16,18 18 0,35-36-1,1 0 1,52-35-1,0-35 1,-35-18 0,-53 18-1,0-1-15,-35-17 16,-36-35 0,1 53-1,34 35 16,1 35-15</inkml:trace>
-  <inkml:trace contextRef="#ctx0" brushRef="#br0" timeOffset="2132.88">18874 8608 0,'0'0'15,"0"-18"-15,0 0 16,-18 18-1,0 36 17,-17 17-17,17 70 17,18-105-32,0 17 0,18-17 0,0-1 15,35 19 1,35-36-1,18-53 17,-89 35-32,1-70 15,-36 0 1,-17 52 0,17 19-1,-52-1-15,-18 18 31,52 0-31</inkml:trace>
-  <inkml:trace contextRef="#ctx0" brushRef="#br0" timeOffset="4583.09">17410 8396 0,'0'0'0,"0"-18"31,0 1-15,17-1-1,1 1 1,35-36 15,-36 35-31,72-17 16,-1 17-1,-53 18 1,0 0 0,1 35-1,-19 18 17,1 0-17,17 18 1,-17-36-1,-1 18 1,-17-18 0,0-17-1,0-1 1,0 1 0,0-36 93,0 1-93,18 17-1,-18-35-15,0-36 31,18 53-15,-18 1-16,0-19 16,0 1-1,17 0 1,1 17 0,0 1-16,35-1 31,-36 0-31,54 1 31,-18 17-31,-18 0 16,18 0-1,-35 17 17,-1 1-32,1 17 31,-1-17-16,1 35 1,0-36-16,-18 1 16,17 35-1,1-18 1,-18 1 0,18-1 15,-18-18-31,0-34 62,0-1-30,0 1-32,0-1 31,0 0-16,0 1 1,17-1-16,-17 0 16,0-35-1,0 36 1,18-18 0,0-1-1,-1 19-15,1 17 16,17-18-1,-17 18 1,35 0 0,0 18-1,-18-1 1,-18-17 0,36 18-1,-35 17-15,0 0 31,17 18-15,-17-35 0,17 17-1,-35-17-15,18 0 16,-18 17 0,0 18-1,0-36 1,0 1-1,17 17 17,-34-35 15</inkml:trace>
-  <inkml:trace contextRef="#ctx0" brushRef="#br0" timeOffset="5350.92">18168 8220 0,'0'-18'47,"0"0"-31,0 1-1,0-54 16,0 36-15,0 17 0</inkml:trace>
-  <inkml:trace contextRef="#ctx0" brushRef="#br0" timeOffset="5867.11">18221 7743 0,'-53'18'32,"106"-36"-32,-124 36 0,36 17 31,17-17-31,1 0 0,-1-1 15,18 19-15,-35-1 16,35 0-16,18 36 16,17-18-1,53 0 1,-17-53 0,-18 0-1,-18-18 1,-18-35-1,-17 0 1,-17-35 0,-18 17-1,-1 18 1,-17 18 15,36 35-15,-1 18-16</inkml:trace>
-  <inkml:trace contextRef="#ctx0" brushRef="#br0" timeOffset="7217.84">19667 7867 0,'0'0'15,"0"-18"-15,0 1 0,0-1 16,-17 18 0,-54 18 15,36-1-31,17 1 0,1 17 0,-19 18 15,19 0 1,17 18 0,53-18 15,-36-36-31,54-17 0,-1 0 31,-34 0-31,17-35 16,17-18-1,-52 35-15,-18-52 16,0 52-16,-18-52 16,-17 17-1,17 35-15,-17-35 16,17 53 0,1 0-1</inkml:trace>
-  <inkml:trace contextRef="#ctx0" brushRef="#br0" timeOffset="8018.03">20585 7867 0,'-53'0'31,"35"0"-15,0 0-16,18 18 15,-17 17 1,-1-18-16,0 19 16,18 34-1,0-17 1,18-17 0,17-19-1,1 1 1,158-53 15,-177 17-31,36-35 16,-35 18-1,-18-1-15,0-17 16,-53-17 0,-18 35-1,1 35 1,17 35-1,53-17 1</inkml:trace>
-  <inkml:trace contextRef="#ctx0" brushRef="#br0" timeOffset="8600.91">21449 7849 0,'-18'0'16,"18"18"-1,-17-18 1,-1 0-16,-17 35 31,-18 0-15,53-17-16,-18 17 15,0 36 1,36-36 0,-18-17-16,53 0 15,53-1 1,-18-17 0,18-17-1,-36-36 1,-70-18-1,-17 0 1,-1 54-16,-17-36 16,-53 0-1,35 53 1,18 18 15,17-1-31</inkml:trace>
-  <inkml:trace contextRef="#ctx0" brushRef="#br0" timeOffset="9107.89">22225 7885 0,'18'0'16,"-36"0"-16,36-18 15,-36 18 1,0 0 0,1-18-1,-36 18 1,35 18-1,-17 35 1,17-18 0,18 36-1,18-18 1,35-18 0,0-17-1,-36-18-15,36 0 16,18-36-1,-18 1 1,-36-36 0,-34 18-1,-89-35 17,53 88-17,0 0 1</inkml:trace>
-  <inkml:trace contextRef="#ctx0" brushRef="#br0" timeOffset="11919.67">18327 7796 0,'0'-17'0,"0"-1"31,17 0-15,1 1-16,0-1 15,17-35 1,71-17-1,0 17 1,35-18 0,18 36-1,-18 17 1,-53 18 0,-35 18-16,53 17 15,-36 18 1,1 18-1,-18-18 1,-18-18 0,18 18-1,-18-18 1,-17 0 15,-1-17-15,-17 0-16,0-1 15,0 19 1,18-19 15,-18-34 16,0-1-16,0 0-15,35-35 0,-17-17-1,17 17 17,-17 35-32,35-35 15,-36 36-15,54-19 16,35 1-1,17 35 1,36 0 15,-124 0-31,1 18 0,34 17 16,-17 0 0,0 18-1,17 0 1,-52-18-1,35 1 1,-18 17 0,-35-36-1,18 1 1,-18 0 0,18-1-1,-18 1 1,0-1-1,0 1 1,0 0 15,-18-18-15,18-18 0,0 0 15,0 1-31,18-1 15,-1-17 1,-17 0-16,18-1 16,35-34-1,35 17 17,0 18-17,-70 35 1,35-18-1,17 18 1,-17 0 0,18 0-1,-36 18 1,-17-1 0,-1 1-16,1 17 15,0 0 1,-1-17-1,-17 0-15,18 17 16,-18 0 0,0 1-1,0-1 17,0-18-17,0 1 1,0 0 15,18-18-15,-18-18 46,17-17-46,18-18-1,1 0 1,17-18 0,-36 54-1,1-1 1,17 1 0,36-1-1,-1 0 1,1 1-1,-18-1 1,17 18 0,-34 0-1,17 35 1,-18-17 0,18 0-1,-18 17 16,-17-18-31,-1 19 16,1-19 0,-18 1-1,0 0-15,0 17 32,-18 0-17,18-17 1,-17-18-1,17-18 17</inkml:trace>
-  <inkml:trace contextRef="#ctx0" brushRef="#br0" timeOffset="13121.45">20144 7479 0,'0'-18'78,"35"-17"-47,-17 35-31,-1-53 16,36-18 0,0 1-1,-18 35 1,-35 17-16,18 0 15,-18 1 1,18 17 0,-18-18 62,-18 18-63</inkml:trace>
-  <inkml:trace contextRef="#ctx0" brushRef="#br0" timeOffset="13803.9">20585 6932 0,'-18'-18'31,"0"18"-15,1 18-16,-1 0 16,0-18-1,-17 35 1,17 18 0,1-35-16,17 17 15,17 0 1,36 0-1,-17-35-15,17 18 16,35-18 0,-18-18-1,-34 1 1,-19-19 0,-17-34-1,-17 35 1,-1-1-16,-35 1 15,35 35-15,-70-18 32,35 18-17,18 0-15</inkml:trace>
-  <inkml:trace contextRef="#ctx0" brushRef="#br0" timeOffset="15237.23">21766 6914 0,'-17'-17'15,"-1"-1"1,0 18-1,1 0 1,-18 35 0,17 1-1,0 34 1,1 1 0,34-36-1,54 0 1,17-35-1,0-17 1,-35-36 0,-18 0-1,-52-18 1,-36 18 0,-35 36-1,52 17 1</inkml:trace>
-  <inkml:trace contextRef="#ctx0" brushRef="#br0" timeOffset="15828.21">21661 7197 0,'0'-18'16,"0"36"15,-18-18-31,18 17 16,-18 1-16,-35 70 16,-17 0-1,-18 36 1,35-54-1,0-17 1,17-17 0,54-54 31</inkml:trace>
-  <inkml:trace contextRef="#ctx0" brushRef="#br0" timeOffset="16123.93">21802 7214 0,'0'0'0,"0"18"32,0 0-17,0-1 1,17 18-16,1 54 16,0-19-1,17 36 1,-18-35-1</inkml:trace>
-  <inkml:trace contextRef="#ctx0" brushRef="#br0" timeOffset="17873.38">20285 7020 0,'0'0'0,"-36"0"16,19-17-1,-71 17 1,-54 17-1,-69 1 1,34 17 0,-122-17 15,-37 35-15,37-18-1,69 18 1,124-35-1,1 17 1,69-18 0,19 1-1,-1-18 1,-17 18 0,17-1-1,0 1 1,1 0 31,-1-1-16,1 19-15,-19-19-1,36 1 1,0 0-1,0-1 1,18 1 0,-18-1-1,18-17-15,-18 18 16,0 0 0,0-1-1,17-17 1,-17 18-1,0 0 32,0-1-31,0 1 15,18-18-15</inkml:trace>
-  <inkml:trace contextRef="#ctx0" brushRef="#br0" timeOffset="19353.57">20655 6967 0,'0'-17'62,"18"17"-46,-18-18-16,17 0 15,1-17 1,-18 18 0,18-1-16,-1-17 15,19-1 1,34 1 0,-17 17-1,35 1 1,0 17-1,18-18 17,-53 18-17,-18 0-15,36 0 16,-18 18 0,18-18-1,-54 17-15,18-17 16,1 18-1,-1 0 1,-17-18-16,-1 17 16,1 1-1,17 0 1,-17-1 0,-18 1-16,17-18 15,1 35 1,0-17-1,-1-18 17,-17 17-32,18-17 15</inkml:trace>
-  <inkml:trace contextRef="#ctx0" brushRef="#br0" timeOffset="19981.9">21167 6738 0,'0'-18'47,"0"1"-32,0-1 1,0 0 0,0 1-16,0-18 15,0-36 1,0 53-1,0 1-15,17-1 16,-17 0 0</inkml:trace>
-  <inkml:trace contextRef="#ctx0" brushRef="#br0" timeOffset="20756.52">21184 6209 0,'0'0'0,"-17"0"15,-1 0 1,0 18 0,1-1-1,-1-17-15,0 18 16,-17 35 0,18-18-1,17 0 1,0 1 15,35 16-15,-18-52-16,19 18 15,17 0 1,-36-18-16,19 0 16,34 0-1,-35-18 1,-17-17-1,-18 0 1,0-36 0,-18 0-1,-17 19 1,-18 52 0,36-18-16,-36 18 15,-18 18 16,53-18-31,1 0 0</inkml:trace>
-  <inkml:trace contextRef="#ctx0" brushRef="#br0" timeOffset="24706.95">21167 6227 0,'0'-18'31,"17"18"-15,1 0-1,-18-18-15,35 1 31,18-1-31,-18 18 16,36-18 0,-36 1-16,36-1 15,17 0 1,-17 1 0,-36 17-1,-18 0 1,1 0 31,-18-18-16</inkml:trace>
-  <inkml:trace contextRef="#ctx0" brushRef="#br0" timeOffset="25794.76">21978 5927 0,'-18'0'31,"18"-18"-15,-35 18-1,-18 18 1,0 17 0,36-17-1,-1-1-15,0 18 16,18 36 0,18-18-1,17 18 16,1-36-15,34 0 0,54-17-1,-54-36 1,36-17 0,-53 17-1,17-52 1,-70-1-1,-17 0 1,-18 36 0,17 0-16,-17 17 15,-18-17 1,-18 35 0,36 0-1,17 0 1,-17 0-1,17 0 1,1 0 0,17 18-1</inkml:trace>
-  <inkml:trace contextRef="#ctx0" brushRef="#br0" timeOffset="39380.75">0 11606 0,'0'0'0,"35"0"0,18 0 16,0 18 0,-53 0-16,0 17 15,18 53 1,-36 18 0,18-88-16,-53 87 15,36-69-15,-54 105 16</inkml:trace>
-  <inkml:trace contextRef="#ctx0" brushRef="#br0" timeOffset="40359.07">0 12365 0,'0'0'0,"71"0"16,-19 0-16,178-35 16,-36 17-1,-88 18 1,-89 0-1,-158 88 17,106-70-32,-89 17 15,89-17-15,-53-1 16,123-17 0,-17 0-1,123-17-15,-70-1 16,140-35-16,-123 53 15,124-53-15,0 36 16,-71-1 15,-106 36-15,-17 52 0,-124 18-1,-229 53 16,299-123-31,178 0 32,-19-36-17,-35 0-15,142-17 16,-107 18-16,124-19 16,70 1-1,-175 17 1,-160 36 15,-53 0-15,-140 52-1,105-52 1,88-18 0,1 0-16,34 0 31,1 0-16,0 0 1</inkml:trace>
-  <inkml:trace contextRef="#ctx0" brushRef="#br0" timeOffset="48686.2">1305 11642 0,'0'17'62,"0"1"-46,0 0-16,-17 34 16,-1-34-16,0 53 15,1-1 1,-1-17 0,0-35-1,18-53 16,18-36-15,0 53-16,-1-88 16,19 1-1,17 52 1,-18 35 0,0 36-1,-17 52 16,17 36-15,-17-35 0,-18-54-16,17 36 15,-17-35-15</inkml:trace>
-  <inkml:trace contextRef="#ctx0" brushRef="#br0" timeOffset="48849.81">1288 11800 0,'0'0'0,"0"-17"16,17 17-16,1 0 31,0-18-31,-1 18 0,36 0 16,18-18-1</inkml:trace>
-  <inkml:trace contextRef="#ctx0" brushRef="#br0" timeOffset="49266.96">1676 11712 0,'0'0'0,"-18"-17"31,0 34-15,18 1-1,-17 52 1,17 36-1,0-53 1,0-35-16,0 17 16,17-70 15,-17-36-15,0 1 15,0 34-31,0-17 15,18 18-15,0-35 16,17 52 0,36 36-1,-36-1 1,-18 54 0,-34-18-1,-36 0 1,-18-36-1,54-17 1</inkml:trace>
-  <inkml:trace contextRef="#ctx0" brushRef="#br0" timeOffset="50089.78">2028 11659 0,'0'0'0,"0"-17"16,-17 17 0,17-18-1,17 18 1,19 0 0,17-18-1,0 18 1,-36 0-16,1 0 15,-1 0 1,-34 0 93,17 18-93,-18 0 0,18-1-1,-17 1-15,17 0 16,-18 17 0,18-18-1,-18-34 16,18-1-15,0 1 0,0 34 31,0 1-47,0 17 31,-17 18-16,-1-18 1,18-17-16,-18 17 16,18 1-1,-17-19 1,-1-17 15,0-17-31,-17-19 16,18 19-1,-1-1 1,18 0 0,0 36 31</inkml:trace>
-  <inkml:trace contextRef="#ctx0" brushRef="#br0" timeOffset="50671">2275 11536 0,'0'-18'0,"0"36"0,-35-53 16,35 17-1,-53-17-15,0-1 16,-123 1 15,-18 35-15,-88 53-1,88-18 1,141-17-16,-124 70 16,54 0-1,70 18 1,71 0 0,52 17-1,89 1 1,17-54-1,89-34 1,70-54 0,-35-70 15,-141 0-31,-18-106 31,-106-53-15,-53 88-1,-52 0 1,-107 89 0,-52 87-1</inkml:trace>
-  <inkml:trace contextRef="#ctx0" brushRef="#br0" timeOffset="51634.81">1870 12206 0,'0'0'0,"0"-18"16,17 1 15,-17 34-16,0 1 1,-17 35 0,-1 18-1,0-36-15,1 18 16,17 35 0,106-17 15,17-71-16,-52 0-15,246-36 32,36 19-32,-177 17 15,-17 0 1,-124 0 15,-52 17-15,-19-17-1,19 0-15,-1 0 0</inkml:trace>
-  <inkml:trace contextRef="#ctx0" brushRef="#br0" timeOffset="51968.18">3228 12277 0,'-18'0'15,"18"70"16,0-35-15,-17 89 0,17-89-16,-18 71 15,18-35 1,-18 34 0</inkml:trace>
-  <inkml:trace contextRef="#ctx0" brushRef="#br0" timeOffset="52618.93">3210 12294 0,'-17'0'0,"34"0"0,-52-17 16,35-1-1,-18 0-15,18 1 32,36 17-17,105 0 1,-53 0-16,141-18 16,-88 18-16,212 0 15,212-18 1,-213 18-1,1 0 1,-176 0 0,-125 18-1,-87-36 17,-18 18-1,18 0-16,17 0 1,18 18 15,0 0 1,0-1-17,0 1 1,0 17-1,18-17 1,-18 0-16,0-1 31,0 1-15,18-1-16,-18 19 31,-18-19-15,18 1-16,-18-18 0</inkml:trace>
-  <inkml:trace contextRef="#ctx0" brushRef="#br0" timeOffset="53234.65">2928 12718 0,'18'0'31,"17"17"-31,-17-17 16,87 0 0,213 0-1,670-17 1,-759 17-1,-35 0-15,176 0 16,-140 0 0,-71-18-1,-142 0 1,-52 18 0,-53-35-1,52 35 1</inkml:trace>
-  <inkml:trace contextRef="#ctx0" brushRef="#br0" timeOffset="53485.78">5327 12347 0,'0'0'0,"0"-17"0,0-1 15,18-17 1,-1 17 0,-17 36-1,0-1 1,0 1-16,18 17 16,-18 0-16,0 36 15,-18 0 1</inkml:trace>
-  <inkml:trace contextRef="#ctx0" brushRef="#br0" timeOffset="53986.78">3651 12347 0,'0'0'0,"18"-17"16,-18 34 15,0 1-15,-18 35-1,-17 17 1,35-52-16,0 0 16,-18 17-16,1 0 15,17-17 1</inkml:trace>
-  <inkml:trace contextRef="#ctx0" brushRef="#br0" timeOffset="54572.71">3757 12400 0,'0'-18'31,"18"18"-31,-18 36 16,0-1 0,0-17-16,0 35 15,0-18 1,0 35 0,0-52-1,0-53 16,0 17-31,17-70 32,1 35-32,0 0 15,-1 53 17,-17 18-17,18 17 1,0 18-1,-1 0 1,1-35 0,-18-1-16,17-17 15,19 0 1,-1-35 0,0-18-1,-17 18 1,0-36-1,-1 53 1,-17 36 15,0 17-15,0-17-16,0 0 0</inkml:trace>
-  <inkml:trace contextRef="#ctx0" brushRef="#br0" timeOffset="54788.87">4269 12418 0,'0'0'0,"-18"0"0,0 0 31,18 17-31,0 19 16,0-1-1,0 18 17,-17-35-32</inkml:trace>
-  <inkml:trace contextRef="#ctx0" brushRef="#br0" timeOffset="55037.83">4216 12488 0,'0'-17'15,"0"34"-15,0-52 0,0 0 16,0 17-16,17 0 16,36 1-1,0 17 1,-18 17-16,18 19 16,-17 34-1,-72 19 1,-69-37 15,16-34-15,72-18-16</inkml:trace>
-  <inkml:trace contextRef="#ctx0" brushRef="#br0" timeOffset="55242.81">4604 12347 0,'0'0'0,"0"18"16,-18 17 0,0-17-1,-17 17 1,35 18 0,-17 18-1,17-36 1</inkml:trace>
-  <inkml:trace contextRef="#ctx0" brushRef="#br0" timeOffset="55606.82">4745 12400 0,'0'0'0,"17"18"31,-17-1-16,0 54 17,-17-36-32,17 1 15,0-19 1,-18-17 0,18-17-16,18-1 15,35-123 16,-53 105-31,53-34 32,-36 70-32,1 0 15,17 18 1,1 70 0,-19 0-1,-17-35 1</inkml:trace>
-  <inkml:trace contextRef="#ctx0" brushRef="#br0" timeOffset="55739.62">4833 12541 0,'-18'-17'0,"36"34"0,-36-70 15,18 36 1,18-1-16,53 0 16,17 18-1,0 0 1</inkml:trace>
-  <inkml:trace contextRef="#ctx0" brushRef="#br0" timeOffset="56487.84">4780 12841 0,'0'0'0,"0"-18"16,0 1 0,0 34 31,0 1-32,0 0 1,-18 17-1,1 0 1,17-17-16,17 17 16,72 0-1,17-17 1,123-36 0,-159 18-16,89-17 15,-53-1 1</inkml:trace>
-  <inkml:trace contextRef="#ctx0" brushRef="#br0" timeOffset="56969.95">5768 12876 0,'-18'-17'31,"36"34"-31,-36-17 15,18 18 1,18 17 0,-18 53-1,0-17 1,0-53-16,-18 35 16,18-36-16</inkml:trace>
-  <inkml:trace contextRef="#ctx0" brushRef="#br0" timeOffset="57536.96">5821 12823 0,'0'0'0,"0"-17"16,-18-18-1,89 17 1,87 0-1,231 18 1,140-17 0,-159 17-1,159 0 1,-388 0 0,-70 0-1,-71 17 1,-18-17-1,1 36 1,-1 16 15,18 37-15,0-1 0,0-35-1,0 70 16,-18-87-31,-17-1 16,-18-18 0,-88 1-1,-123-18 1,-195-18 0,-88 1-1,230-1 1,34 18-1,213 0 1</inkml:trace>
-  <inkml:trace contextRef="#ctx0" brushRef="#br0" timeOffset="57906.75">6138 12929 0,'0'-17'32,"18"17"-17,-18 17 1,0 36-1,0 0 1,0-35 0</inkml:trace>
-  <inkml:trace contextRef="#ctx0" brushRef="#br0" timeOffset="58170.9">6032 12965 0,'18'-106'32,"-36"212"-32,71-230 0,-17 106 15,122 36 1,-122 0 0,52 52-1,-88-52-15,0 17 16,-106 36-1,-53-18 1,53-36 0,71-17-16,18 0 0</inkml:trace>
-  <inkml:trace contextRef="#ctx0" brushRef="#br0" timeOffset="58555.96">6473 13017 0,'0'0'0,"18"18"31,0-18-15,-1 0 0,1 0-1,0 0-15,-1 0 16,19-18-1,-19 1 1,-17-1 0,0 1-16,-17-1 15,-36 0 1,17 18 0,19 0-16,-89 88 46,106-52-46,35-1 32,18-17-32,0-18 15</inkml:trace>
-  <inkml:trace contextRef="#ctx0" brushRef="#br0" timeOffset="58787.61">6826 12894 0,'0'0'16,"-17"-18"-16,-1 18 16,18 18 15,0 0-15,0 17-16,0 35 15,18-52 1,-1 17-16,71 18 31,-35-53-15,-17 0-16</inkml:trace>
-  <inkml:trace contextRef="#ctx0" brushRef="#br0" timeOffset="59553.99">5027 13000 0,'0'17'15,"0"1"1,-18 35-1,-52 71 1,17-19 0,35-52-16,-17 35 15,35 1 1,0-72-16,53 36 16,88-35-1,124-36 1,-71 18-1,-106-17 1,88 17-16,-17-18 16,-124 18-1</inkml:trace>
-  <inkml:trace contextRef="#ctx0" brushRef="#br0" timeOffset="59821.11">5962 13441 0,'0'0'0,"-18"0"0,18 17 31,0 1-31,0 17 16,0-17-16,0 53 15,0 34 1,-17-16 0,17-54 15</inkml:trace>
-  <inkml:trace contextRef="#ctx0" brushRef="#br0" timeOffset="60342.58">5962 13494 0,'0'0'0,"-18"-36"0,-17 1 31,35 18-31,35 17 16,124-18 0,53 18-1,193 0 1,36 0-1,-53 18 1,-229-1 0,0 1 15,-141-1-15,-54 36-1,19 0 1,-1 18-1,18-18 1,0 70 0,0-70-1,0 35 1,-18-52 0,-17 17-1,-71-53 1,-105-18-1,-36-17 1,-283-1 15,-122 19-15,458 17 0,106 17-1</inkml:trace>
-  <inkml:trace contextRef="#ctx0" brushRef="#br0" timeOffset="60971.99">6156 13652 0,'0'0'0,"0"-17"16,0-1 0,-18 18-1,1 35 1,-19 18 0,36-17-1,0-1-15,0 0 16,18-17-1,-18-36 17,18-35-17,17-35 1,0 35 0,-17 36-16,0-19 15,-1 19-15,18 17 16,-17 53-1,0 17 17,-1-17-17,-17-35 1,18-54 15,35-17-15,-53 36-1,18-1-15,34 18 16,-16 18 0,-1 35-1,-35-18 1,18 0-16,-18 1 16,0-19-1</inkml:trace>
-  <inkml:trace contextRef="#ctx0" brushRef="#br0" timeOffset="61281.9">6667 13688 0,'18'-18'0,"-36"36"0,36-54 15,0 19-15,-1-18 16,1 35 0,-18 17-1,0 54 1,0-54-16,0 36 15,35-17 1,1-1 0,-1-35-1,-17-18-15,17-17 16,0-36 0,-17 36-1,-18-35 1,0 52-16,-18 71 31,0-36-15</inkml:trace>
-  <inkml:trace contextRef="#ctx0" brushRef="#br0" timeOffset="61788.95">7073 13635 0,'0'0'0,"-17"-18"16,17 36-1,-18-1 1,18 1-16,0 70 31,0-35-15,0-35-1,0 0 1,18-54 0,-1 19-1,1-1-15,-1-35 16,36-35 0,-17 53-1,-36 52 1,17 18-1,-17 18 1,18 0 0,17-53-1,-17-17 1,-1-1-16,1-17 16,35-18 15,-53 35-31,53 89 31,-53-36-31,18 18 16,-18-35-16</inkml:trace>
-  <inkml:trace contextRef="#ctx0" brushRef="#br0" timeOffset="62423.61">4851 13529 0,'0'0'15,"0"18"1,-18-1 0,18 1-16,-18 35 15,1 0-15,17 141 32,0-141-32,35 70 31,0-52-31,-17-18 15,17-53 17,18 0-17,-18 0-15,71 0 16,141-18 0,88 18-1,18 0 1,-71 18 15,-246-18-31,-72-18 31</inkml:trace>
-  <inkml:trace contextRef="#ctx0" brushRef="#br0" timeOffset="62642.75">6368 14058 0,'0'0'0,"-18"18"32,18-1-17,0 19 1,0-19-16,0 19 16,-18-1-16,18 0 15,0-17-15,0 52 16,-17-17-1,-1-35-15</inkml:trace>
-  <inkml:trace contextRef="#ctx0" brushRef="#br0" timeOffset="63238.35">6350 14129 0,'18'-18'0,"-36"36"0,36-71 16,-18 35-1,17 18 1,19 0 0,16 0-16,90 0 15,228 18 1,-70-1 0,-159 1-16,159-18 15,53 18 1,-106-36-1,-142 18 1,-87 0 0,-53 18-1,-1 17 1,36 18 0,0-18-1,18 71 16,0-53-31,-1 35 32,-17 0-17,0-52 1,-17-1 0,-19-35-16,-34 0 15,-142-35 1,-176-18-1,35 17 1,-229-16 0,124 34-1,211 36 1,194-1 0,53 1-1,17-18 1</inkml:trace>
-  <inkml:trace contextRef="#ctx0" brushRef="#br0" timeOffset="63856.31">6544 14270 0,'18'0'15,"-36"0"-15,53 0 0,-35 35 32,-17 0-17,-1-17-15,18 17 16,-18 1-16,18-1 16,0 0-1,36-35 1,-36-17 15,17-19-31,-17-34 16,36-19-1,-19 19 1,71 17 0,-35 35-1,-17 36 1,-19 17-1,-17 1 1,-35-19 0,17 1-1,1-1 1,52-17 0,-17 0-1,-1 0-15,19 0 16,-1 0-1,-141 89 32,88-72-31,1 1-16,-54-18 16,36 0-1,17-18 1</inkml:trace>
-  <inkml:trace contextRef="#ctx0" brushRef="#br0" timeOffset="64173.56">7020 14252 0,'18'0'0,"17"-17"31,-88 34-31,89-34 16,-54 34-1,18 1 17,0-1-32,-18 36 15,18-17 1,0-1 0,18-35 15,0 0-31,34-18 15,1 18 1,-17 18 0,-1 0-1</inkml:trace>
-  <inkml:trace contextRef="#ctx0" brushRef="#br0" timeOffset="64689.77">7373 14305 0,'18'0'16,"-36"0"-16,36-18 16,-18 36 15,0 17-15,0 18-1,0 0 1,0-35-16,0 17 15,0-17 1,0-36 0,17-17-1,1-36 1,70-70 15,-70 124-15,17-1-16,0-17 15,-17 35-15,0 35 32,-36 18-17,0-36 1,1-17-16,-19 18 16,19-18-16,-36 18 15,0-18 1,71 17-1,17 19 1,-17-19-16,52 36 16,36 18-1,-106-54-15</inkml:trace>
-  <inkml:trace contextRef="#ctx0" brushRef="#br0" timeOffset="67190.58">1940 12594 0,'18'18'16,"-18"17"-1,0 71 1,-18 0 0,18-36-16,0 142 31,18-53-31,-18-1 16,18 72 15,-18-36-31,0 0 31,-18-88-15,18-1-1,0-87-15,0 0 16,0-1 0,0 1 15,0 0-16,0-1 1,0 1 0,0 0-16,0-1 15,18-17-15,-1 0 16,54 0 15,-54 0-31,19 0 16,17 0-1,-18 0 1,53 0 0,71 0-1,70-17 1,-88 17 0,36 0-1,-124 0 1,-53 17-16,-18-17 62,18-17-62,-18 17 16</inkml:trace>
-  <inkml:trace contextRef="#ctx0" brushRef="#br0" timeOffset="67491.55">3087 14199 0,'0'0'0,"-18"0"0,18 18 31,0 17-15,0 36-1,0-36-15,-17 89 16,-36 70 0,35-18-1,18-70 1,0-71 15,0-53-15</inkml:trace>
-  <inkml:trace contextRef="#ctx0" brushRef="#br0" timeOffset="67825.57">3052 14270 0,'0'0'0,"0"-18"15,-18 1 1,36 17-1,87 0 1,195 17 0,18-17-1,-142 0-15,212 0 16,-211 18 0,158-18-16,35 17 15,-158 1 16,-142-18-15,-52 0 0,-53 0 15,17 0-15</inkml:trace>
-  <inkml:trace contextRef="#ctx0" brushRef="#br0" timeOffset="68325.43">3122 14940 0,'0'0'0,"-18"0"16,18 18 0,18-36 15,0 18-31,17 0 15,-17 0-15,52-18 16,142 18 0,141-17-1,123-1 1,-141 18 0,71-17-1,-177 17 16,-176 0-15,-35-18 0,-18 0 15,0 1-31</inkml:trace>
-  <inkml:trace contextRef="#ctx0" brushRef="#br0" timeOffset="68809.64">5415 14517 0,'0'0'0,"-18"-35"31,36 35-16,-18-18-15,18 18 16,-18-18 125,0 36-79,-36 88-31,19-18-15,17-35-16,-35 53 16,35-53-1,-18-36 1</inkml:trace>
-  <inkml:trace contextRef="#ctx0" brushRef="#br0" timeOffset="69891.83">3422 14587 0,'0'0'0,"18"0"16,-1-17-1,-17-1-15,18 0 16,-53 1 15,17 17-31,-17 35 16,17-17-16,-35 35 16,18 70-1,35-88 1,70 18-1,54-35 1</inkml:trace>
-  <inkml:trace contextRef="#ctx0" brushRef="#br0" timeOffset="70109.67">3757 14517 0,'-18'-18'0,"36"36"0,-36-71 31,18 35-31,0 36 32,0 17-17,0-17-15,-35 88 32,18-71-32,-1 0 15,18-17 1</inkml:trace>
-  <inkml:trace contextRef="#ctx0" brushRef="#br0" timeOffset="70359.6">3757 14640 0,'0'0'0,"18"-17"16,17-19-1,-17 36-15,-18-17 16,17 17 0,-17-18-1,36 0 1,16-34-1,-34 34 1,-18 0-16,18 1 16,-18-1-1,0 71 17,0-18-32,-18 53 15,0 53 1</inkml:trace>
-  <inkml:trace contextRef="#ctx0" brushRef="#br0" timeOffset="71058.28">4110 14940 0,'0'-18'16,"-18"18"0,1 18-1,17 17 1,-36 89 15,19-89-31,17 89 16,35-54-1,18-35 1,0-35 0,53 18-16,141-36 31,17-17-16,-87 18 1,-125 17 0</inkml:trace>
-  <inkml:trace contextRef="#ctx0" brushRef="#br0" timeOffset="71328.69">5133 15117 0,'-35'-18'16,"52"36"15,-17-1-16,18 71 1,-18 1 0,0-19-1,-18-17 1,18-35-16</inkml:trace>
-  <inkml:trace contextRef="#ctx0" brushRef="#br0" timeOffset="71942.13">5080 15134 0,'-18'-35'0,"36"70"0,-36-88 16,54 53 0,-19 0-1,89-17-15,-35 17 16,158-18-1,265-17 1,70-1 0,-246 19-1,-195 17-15,195-36 32,-265 36-32,-36 0 15,-17 18 32,0 0-47,0 35 16,0 35-1,0-18 1,0-34 0,0 34-16,0 18 31,0-17-16,0-53-15,0-1 16,-17 1 0,-36-18-1,-141 0 1,17-18 0,-228 18-1,228 0-15,-193 0 16,-1 0-1,-17 18 1,212-18 0,141 18-1,52-18 1</inkml:trace>
-  <inkml:trace contextRef="#ctx0" brushRef="#br0" timeOffset="72392.7">5574 15187 0,'0'-18'31,"-18"18"-15,1 0-1,-1 0-15,-17 18 16,-1 0-1,19-18-15,-1 35 16,53 0 0,36-17-1,-18 0-15,53-1 16,-71 1 0,-88 17-1,-35-17 1,17 17-1,18-35-15,18 0 16</inkml:trace>
-  <inkml:trace contextRef="#ctx0" brushRef="#br0" timeOffset="72625.31">5909 15134 0,'18'0'0,"-36"0"0,53 0 15,-35-17 1,0 34 0,0 1-1,-17 17 1,17-17-16,-18 35 16,0 0-1,18-36 1,0 1-1</inkml:trace>
-  <inkml:trace contextRef="#ctx0" brushRef="#br0" timeOffset="72909.64">5962 15205 0,'0'0'0,"18"-18"16,-1 0-16,-17 1 31,35 52-15,-17-17-1,17-1 1,1-34 0,-19-1-1,1-17 1,-18 17 0,0 1-16,18 17 15,-36 70 16,-17 36-15,17-71 0</inkml:trace>
-  <inkml:trace contextRef="#ctx0" brushRef="#br0" timeOffset="73950.63">3986 15187 0,'-17'0'16,"34"0"-16,-17 0 31,53 0-16,-17 0 1,-19 18 0,-34 17-1,17-17-15,-36 52 16,1 1 0,17-36-16,1 53 15,-1 18 1,-17 70 15,17-158-31,1 53 31,17-54-31,17 1 32,1-18-17,-1 0 1,1-18-1,-18 1 1,18-1 0,-1 0-1,36 18 1,194-17 15,-141-1-31,18 0 0,281-17 16,36 0 15,-370 17-31,17 1 31,-176 17-15,0 0 0</inkml:trace>
-  <inkml:trace contextRef="#ctx0" brushRef="#br0" timeOffset="74229.81">5362 15593 0,'-17'0'16,"34"0"-16,-34 17 15,17 1 1,0 35 0,0-35-1,0 17-15,0 0 0,0 18 16,-18 18 0,18-36-16,-18 18 15,18-18-15</inkml:trace>
-  <inkml:trace contextRef="#ctx0" brushRef="#br0" timeOffset="74930.73">5292 15646 0,'0'0'0,"-18"-18"0,36 18 47,52 0-47,71 0 31,89 0-31,-89 0 16,406-18-1,35 1 1,-265-1-1,36 18 1,-212-18 0,-123 18-1,-36 0 1,-17 0 0,35 18-16,-18 0 15,18 17 1,0 0-1,0 18 17,0-17-32,18 16 31,-18 19-15,17-18-1,-17-35-15,0 17 16,0 18-1,0-36 1,-35-17 0,-18 0-1,-70 0 1,-124-17 0,-141-1-1,70 0 1,-193-17-1,123 35 1,88 18 15,229-1-31</inkml:trace>
-  <inkml:trace contextRef="#ctx0" brushRef="#br0" timeOffset="80097.56">5962 15769 0,'0'-17'16,"0"34"31,-18-17-47,18 53 15,-17-18 1,17 18 0,0-35-1,35 0 1,0-18 0,18-36-1,-18-17 1,-35 36-1,18 17 1,-18 35 0,0 18 15,18-18-15,-1-17-16,19 17 15,17-35 1,17-53-1,-35 0 1,-35 18-16,18-18 16,-18-17-1,-18 34 1,1 54 15</inkml:trace>
-  <inkml:trace contextRef="#ctx0" brushRef="#br0" timeOffset="80436.59">6438 15769 0,'-17'18'16,"17"-1"15,0 1-15,0 0-1,0-1-15,0 36 16,0-17 0,17-19-1,18-17 1,1-17 0,-19 17-16,19-36 15,-1-17 1,-35 18 15,0 17-31,-18 18 47</inkml:trace>
-  <inkml:trace contextRef="#ctx0" brushRef="#br0" timeOffset="81446.53">6703 15716 0,'0'0'16,"17"-17"0,-17-1-1,0 36 1,0-1 0,-17 54-1,17-18 1,0-18-16,-18 36 31,18-54-31,18-17 16,-1-17 15,1-19-15,0 19-16,-1-1 15,19-17 1,-19 52-1,1 1 1,-18 0-16,18 35 16,-1-36-1,18 1 1,18-36 0,-17 1-1,-19-1-15,19-17 16,-19-1-1,-17 1 1,-17 0 0,-1 35 15,-35 35-15,18 18-1,35 0 1,17-35-1,19-18 1,-1-36 0,-17 19-16,17-36 31,-35 70 31,17-17-46,-17 18-16,36-18 31,-19-18-15,1 1 0,0-1-1,-1 18 1,-17 35 15,0 1-15,0 17-1,18-36 1,17-17 15,0-35-31,18 0 16,-35 17-16,35-35 31,-18 35-31,-17 36 16,-18 53 15,-18-18-31</inkml:trace>
-  <inkml:trace contextRef="#ctx0" brushRef="#br0" timeOffset="83194.97">3986 15946 0,'0'-18'31,"18"0"-15,-18 36 46,0 0-62,0 17 16,0 35-1,0-17-15,-18 35 16,1 36 0,-1-71-1,18 0 1,35-53 0,18 0-1,-35 0-15,35-18 16,53 18 15,-106-17-31</inkml:trace>
-  <inkml:trace contextRef="#ctx0" brushRef="#br0" timeOffset="83513.75">4145 16369 0,'0'18'31,"18"-18"-16,35 17 1,-18-17-16,88 0 16,213 0-1,-248 0 1,0 0-16,18 0 16,-18 0-1,-88-17 1,-18-1-1,1 18-15</inkml:trace>
-  <inkml:trace contextRef="#ctx0" brushRef="#br0" timeOffset="83729.87">5080 16281 0,'0'0'0,"18"0"47,-18 17-47,0 19 31,0-19-31,0 36 16,0 0 0,0-18-1,0-17-15</inkml:trace>
-  <inkml:trace contextRef="#ctx0" brushRef="#br0" timeOffset="84346.82">5133 16245 0,'0'0'16,"-18"0"-16,18-17 0,-17 17 15,34 0 16,54 17-15,-18 1-16,88 0 16,600-18-1,-565-18 1,300 18 0,-246-18-1,-54 18 1,-141 0-1,-35 18 17,0 0-17,18-1 1,-18 1 0,35 35-1,-17-35-15,-1-1 16,36 18-16,18 36 15,-18-36 17,-18-17-17,-105 0 17,34-18-32,-87 35 15,-177-18 1,-159 19-1,283-19 1,-177 1-16,53 0 16,0-18-1,212 0 1,53 0-16,17-18 16,36 18-1</inkml:trace>
-  <inkml:trace contextRef="#ctx0" brushRef="#br0" timeOffset="85049.6">5133 16457 0,'0'18'62,"-18"17"-62,18-17 16,-17 17 0,17 18-1,0-36-15,0 1 16,17 17 0,1-35-16,70 0 15,53-17 1,-35-1-1,18 18 1,-89 0 0,-35-18-16</inkml:trace>
-  <inkml:trace contextRef="#ctx0" brushRef="#br0" timeOffset="85703.73">5503 16439 0,'18'0'15,"-18"18"1,0 17 0,-18 18-1,1-17 1,17-1 0,0-18-1,0-34 16,0-1-15,0-35-16,0 0 16,0 0-1,35-35 1,36 35 15,-36 53-31,-18 0 0,36 53 16,-53-17-1,-17 16 1,-1-16 0,0-19-1,18 1 1,36-18 0,-1 0-1,18 18 1,-18-1-1,-88 19 17,-17-1-17,-18-18 1,70-17-16</inkml:trace>
-  <inkml:trace contextRef="#ctx0" brushRef="#br0" timeOffset="86081.95">5891 16492 0,'0'0'0,"18"0"0,0 0 47,-1 0-32,1 0-15,35 0 16,0 0-1,-36-17 17,-17-1-17,-17-17 1,-1 17 0,0 18-1,1 0-15,-1 35 16,1 1-1,17 34 17,17-52-32,-17 0 0,53 17 15,-53-18 1,18-17 0</inkml:trace>
-  <inkml:trace contextRef="#ctx0" brushRef="#br0" timeOffset="86316.22">6262 16510 0,'0'-18'16,"0"36"-16,17-53 16,-17 52-1,0 19 1,18 34-1,-18-35 1,0 1-16,0-1 16,-18-17-1,-34-18 1</inkml:trace>
-  <inkml:trace contextRef="#ctx0" brushRef="#br0" timeOffset="86452.68">6209 16387 0,'18'-18'0,"-36"36"0,53-36 31,-35 36-15,18-18 0</inkml:trace>
-  <inkml:trace contextRef="#ctx0" brushRef="#br0" timeOffset="86653.68">6421 16422 0,'0'0'0,"0"17"47,17 1-32,1 17 16,-1 1-31,-17-19 32</inkml:trace>
-  <inkml:trace contextRef="#ctx0" brushRef="#br0" timeOffset="87367.18">6544 16404 0,'0'0'16,"0"-17"15,0 34-16,0 1 1,0 17 15,18 0-15,-1-35 0,1 0-1,0 0 32,-1 0-16,1 18 16,-1-18-31,-17 18-16,36-18 31,-36 17-31,35-17 16,-17-17-1,35-19 1,-36 19 0,36-19-1,-35 19 1,-36 34 31,18 1-47,0 17 15,-17 36 1,-19 17 15,-17-17-15,-17-54-16,-1 19 0</inkml:trace>
-  <inkml:trace contextRef="#ctx0" brushRef="#br0" timeOffset="90232.76">864 11060 0,'0'0'0,"0"-18"15,0 36 17,0 17-17,0 71 1,0-71-16,-17 106 15,-36 124 1,35-177 0,18-71-16,-18 36 15,71-17 1,36-36 0,-19-36-1,-17 19 1</inkml:trace>
-  <inkml:trace contextRef="#ctx0" brushRef="#br0" timeOffset="91217.27">758 11765 0,'0'0'16,"0"18"-16,0-1 0,36 107 15,-36-71-15,35 106 16,-35-107-16,18 195 16,-18 0-1,0-176 1,-18 105-16,0 107 16,1 122 15,17-123-16,17-105 1,-17 87 0,-17 1-1,-19 0 1,72 87 15,-19-263-31,36 52 16,-35-71-1,-18-17 1,18-53 15,-18-18-31,35-17 16,-18 35 0,1-17-16,17-1 31,1 0-16,52 1 1,35-1 0,-52 18-1,17 0 1,-53 18 0,-35-1-16</inkml:trace>
-  <inkml:trace contextRef="#ctx0" brushRef="#br0" timeOffset="92116.78">1482 15240 0,'-18'0'15,"36"0"-15,-54 0 0,19 0 16,-1 18 0,18 17-1,0 53 1,0 36 0,-18 34-1,18 1 1,0-18-1,0-17 1,0-89 0,0 18-16,18 0 15,-18-71 32,0 0-31,18 18 15,17 0-15,141-17-1,-87-1 1,-1 1-16,141-19 16,18 1-1,-141 17-15,88 1 16,18 17-1,-177 0 1,-35-18 0,-35-17-1,-54-36 17,72 36-32,-19-124 31,36 53-16,0 36-15,18-89 16,0 89 0,-1 34-16,1-17 15,17 0 1,1 18 0,-36 18-1,-36-19 1,-70 1 15,-17 17-31,-159 18 16,-71 18-1,-53 17 17,336-17-32,-36 0 0,106-18 15,53 0 1</inkml:trace>
-  <inkml:trace contextRef="#ctx0" brushRef="#br0" timeOffset="92521.55">1693 15205 0,'-17'17'16,"34"-34"-16,-34 52 0,17 0 15,-18-17-15,18 35 16,-18 70 0,1-52 15,17-36-31,0 18 15,53 0 1,35-53 0,0-71-1,-17 36 1,-54 0-16,19 0 16,-36 17-1,-18 0 1,0 18-1,1 0 1</inkml:trace>
-  <inkml:trace contextRef="#ctx0" brushRef="#br0" timeOffset="92900.43">2028 15328 0,'0'0'16,"0"-35"-1,0 53 1,18-1 0,-18 1-16,0 35 15,35 88 16,-17-124-31,17 19 16,36-36 0,-18-71 15,-18 18-31,-35-123 31,0 141-15,-18-18-1,1 53 1,-1 17-16,18 1 0</inkml:trace>
-  <inkml:trace contextRef="#ctx0" brushRef="#br0" timeOffset="93240.95">1834 15434 0,'-17'-18'47,"-1"18"-32,18-35 17,18 35-32,52-35 15,-17 0 1,-17 17-16</inkml:trace>
-  <inkml:trace contextRef="#ctx0" brushRef="#br0" timeOffset="94068.08">2064 16245 0,'0'-17'16,"0"34"-16,0-52 0,0 17 16,0 1-1,17 17 17,-17 53-32,0-36 0,0 125 31,-17 34-16,-1 0 1,18-35 0,18-52-1,105-19 1,18-35 0,159-35-1,159 0 16,-406 0-31,17 0 16,-87 0 15,-19 0-31,1 0 16</inkml:trace>
-  <inkml:trace contextRef="#ctx0" brushRef="#br0" timeOffset="94417.86">3193 16792 0,'0'-17'0,"0"34"0,0-52 15,0 17-15,0-17 16,0 17 0,0 54 15,17-1-31,-17 0 16,0 71-1,0 70 1,0 1-1,0-89 1,18-53 0</inkml:trace>
-  <inkml:trace contextRef="#ctx0" brushRef="#br0" timeOffset="94904.95">3210 16792 0,'0'-35'0,"0"70"0,18-141 16,0 106 0,70 0-16,53 0 15,141 18 1,18 0 0,-71-18 15,-141 0-16,-52 0-15,-1 0 16,-17 35 0,17 18-1,-17 0 1,-1-18-16,1 18 16,17 35-1,-35-70-15,18 35 16,-18 17-1,-36-17 1,-16 0 0,-72-18-1,-105-17 1,-106-36 15,105 18-15,-70 0-1,159 18 1,124-18 0</inkml:trace>
-  <inkml:trace contextRef="#ctx0" brushRef="#br0" timeOffset="95154.57">3492 17039 0,'0'-17'15,"0"-1"-15,0 36 47,0-1-31,0 54-1,0-54-15,18 36 16,-18-17-16</inkml:trace>
-  <inkml:trace contextRef="#ctx0" brushRef="#br0" timeOffset="95391.43">3492 17022 0,'0'0'0,"0"-53"15,36 0 17,-19 35-32,54 36 15,-36-1-15,53 36 16,-52 53 15,-54-53-15,-17-18-1,17-35-15,-70 18 16</inkml:trace>
-  <inkml:trace contextRef="#ctx0" brushRef="#br0" timeOffset="95667.83">3986 16933 0,'0'0'0,"36"-17"16,-19-1 0,-34 18-1,-54 53 1,18 18 15,36 17-15,34-35-1,71-18 1,-52-35-16,17 0 16,-18 0-16</inkml:trace>
-  <inkml:trace contextRef="#ctx0" brushRef="#br0" timeOffset="95802.59">4004 17074 0,'0'0'0,"-18"0"15,36 0 1,53-17 0,-36-1-1</inkml:trace>
-  <inkml:trace contextRef="#ctx0" brushRef="#br0" timeOffset="96856.43">4127 17304 0,'0'17'16,"0"1"15,0 70 16,-17-53-47,-1 71 16,1-53-1,17-35-15,0 35 16,17-18 0,18-35-1,1 0-15,87-18 16,18 1-1,-70-1-15,105 1 16,54-19 0,-125 36-1,-34-17 17,-106 17-1</inkml:trace>
-  <inkml:trace contextRef="#ctx0" brushRef="#br0" timeOffset="97135.77">4974 17445 0,'-17'-18'16,"34"36"15,-17 17-31,18 36 31,-18-1-15,0-34-16,0 52 15,0-71-15</inkml:trace>
-  <inkml:trace contextRef="#ctx0" brushRef="#br0" timeOffset="97735.78">4957 17339 0,'0'0'0,"52"-18"16,-16 18-16,70-17 16,211 17-1,124-18 17,-123 18-17,87-18 1,-158 18-1,-123 0 1,-107 0 0,1 0-16,-18 18 31,18 35-15,-1-18-1,1 36 1,-1-18-1,1-18 1,-18-17 0,0-1-16,18 36 31,-18-17-15,-36-1-1,-34 0 1,-71-35-1,-36 18 1,-193-1 0,-124-17-1,71 18 1,229 0 0,123-18-16,1 0 15,52 0-15</inkml:trace>
-  <inkml:trace contextRef="#ctx0" brushRef="#br0" timeOffset="99619.77">5327 17480 0,'0'0'0,"-18"0"31,18 18 1,18-18-17,-18 17-15,0 1 16,18 53 0,-18-36-1,0 18 1,17-36-1,-34-52 32,-1-18-47,18-35 32,0 70-32,18-52 15,17 17 1,18 35-1,0 18 1,17 36 0,-52 16-1,-36 1 1,-17-17 0,0-19-1,35 1 1,17 0-1,1-18 1,0 35 0,-54 18-1,-17-18 17,0-17-17,36-18-15,-1 0 16</inkml:trace>
-  <inkml:trace contextRef="#ctx0" brushRef="#br0" timeOffset="99953.3">5592 17604 0,'17'0'16,"-34"0"-16,52 17 16,-18 1-1,1-18 1,17 0-1,-17 0-15,35-18 16,-18 1 0,-35-1 15,-17 18-15,-19-35-1,-17 35 1,0-18-1,53 53 1,-17 18 0,17-17-1,35-19 1,0 1 0</inkml:trace>
-  <inkml:trace contextRef="#ctx0" brushRef="#br0" timeOffset="100253.77">5891 17586 0,'0'0'0,"0"-18"0,0 1 16,0-1-1,36 18 17,34 35-17,18 1 1,-70 17-1,-36-53 1,1 0 0,-19-36-1,36 1 1,18 17-16,35-17 16,53 0-1,-18 35 1</inkml:trace>
-  <inkml:trace contextRef="#ctx0" brushRef="#br0" timeOffset="100753.67">4022 17657 0,'0'0'16,"-18"-18"-16,0 18 0,1 0 16,34 0 15,1 35-15,-18-17-16,35 35 15,-35-18-15,18 36 16,-18 34-1,0-34 1,18-36 0,87-35-1,107-35 1,17-18 0,-88 35-1,-88 18-15,0-17 16,-35 17-1</inkml:trace>
-  <inkml:trace contextRef="#ctx0" brushRef="#br0" timeOffset="100970.15">4939 17868 0,'-18'0'16,"36"0"-16,-71 18 15,35 17 1,18-17-16,18 17 16,35 36-1,0-1 1,-53-35 0</inkml:trace>
-  <inkml:trace contextRef="#ctx0" brushRef="#br0" timeOffset="101542.8">4939 17886 0,'0'0'0,"18"0"0,17-18 32,35 18-17,107 0 1,-36 0-1,88 0 1,-35 0 0,-88 0-1,-53 0-15,35 0 16,71-17 0,17 17-1,-17 0 1,-88 0-1,-19 17 1,-34 18 0,0 18 15,35 18-15,17-1-1,-17-17 1,-35 18-1,-18-18 1,-35-35 0,17-18-16,-35 0 15,-106 0 1,-88-36 0,-123 19-1,88-1 1,141 0-16,-89 18 15,1 18 1,123 0 15</inkml:trace>
-  <inkml:trace contextRef="#ctx0" brushRef="#br0" timeOffset="101804.21">5256 17992 0,'0'0'0,"-17"0"15,-1 17 1,18 54-1,0 17 17,18-35-32,-1-18 15</inkml:trace>
-  <inkml:trace contextRef="#ctx0" brushRef="#br0" timeOffset="101956.92">5274 18009 0,'35'-35'15,"1"35"1,-19 0-16,54 0 16</inkml:trace>
-  <inkml:trace contextRef="#ctx0" brushRef="#br0" timeOffset="102105.14">5345 18097 0,'0'0'0,"-18"18"0,0-18 16,54-18 15,-1 1-31,0 17 0</inkml:trace>
-  <inkml:trace contextRef="#ctx0" brushRef="#br0" timeOffset="102620.53">5662 17992 0,'-18'17'31,"18"1"0,18 17-15,-18 0-1,0 1 1,-18-1 0,18-53 15,0-35-15,18 18-1,17-53 1,-17 0-1,0 70 1,-1 18-16,1 0 16,0 18-1,17 17 1,-18-17 0,-17-1-1,-17-17 1,-1 0-1,18 18 32,-17 17-31,-1 18 0,0-35-16,18 17 15,53 0 1,71-17-16</inkml:trace>
-  <inkml:trace contextRef="#ctx0" brushRef="#br0" timeOffset="103939.97">1958 16916 0,'-18'-18'16,"36"36"0,0 52-1,17 54 1,-35-18 0,-18 88-1,-17-18 1,0-35-1,35-53 1,35-52 15,18-36-15,-36 0-16,107 0 16,-18 0-1,158 0 1,-193 0-1,-18 0-15,53 0 16,-53 0 0,-89 0 15</inkml:trace>
-  <inkml:trace contextRef="#ctx0" brushRef="#br0" timeOffset="104207.16">2787 17657 0,'-18'17'15,"36"-34"-15,-53 52 16,17 18-1,18-36-15,0 89 16,0-71-16,0 107 16,18-37-1,-18-34 1,0-53-16,0 17 16</inkml:trace>
-  <inkml:trace contextRef="#ctx0" brushRef="#br0" timeOffset="105021.64">2734 17657 0,'-18'0'16,"36"0"-16,-53 0 0,52 0 47,19 0-47,105-18 15,106 0 1,53 1 0,-124-1-1,18 18 1,-123 0-1,-54 0 1,1 0 0,-1 0 15,1 0-31,17 0 16,-17 0-1,0 0 1,-18 18 15,0-1-15,35 19-1,-35-1 1,18-18-16,-18 89 31,0-35-31,0 35 16,0 17 15,17-105-31,-17 17 16,0-17-16,0 17 15,0-17 1,-17-36 0,-19 0-1,19 18-15,-89-17 16,-35-1-1,88 18-15,-194 0 16,-18 0 0,89 0-1,35 0 1,105 0-16,-87 0 31,105 0-31,-35 18 0,36-1 31,34-17-15</inkml:trace>
-  <inkml:trace contextRef="#ctx0" brushRef="#br0" timeOffset="106439.69">3175 17780 0,'0'-18'16,"0"36"0,-18 17-1,1 53 1,34-35-1,1-35 1,0 0 0,-1-1-16,54-17 15,-18-35 1,-18-18 0,-35 35-1,0-34 1,-18 34-1,36 18 32</inkml:trace>
-  <inkml:trace contextRef="#ctx0" brushRef="#br0" timeOffset="106638.22">3510 17745 0,'0'0'0,"0"-18"0,18 18 16,-18 18 15,0 35-15,0 52 15,0-69-31,0-19 0,0 19 16,17 17-1,1-53-15</inkml:trace>
-  <inkml:trace contextRef="#ctx0" brushRef="#br0" timeOffset="106872.01">3598 17974 0,'18'-53'15,"-36"106"-15,36-159 16,-18 89-16,0-19 16,0 19-1,-18 52 1,1-17-1,-19-1 17,19 1-17,34-1 1,36 54 0,0-18-1,-17-18-15,16 36 16,-34-36-16</inkml:trace>
-  <inkml:trace contextRef="#ctx0" brushRef="#br0" timeOffset="108965.12">4075 18097 0,'0'0'16,"-18"18"-16,-17 0 15,17-18 1</inkml:trace>
-  <inkml:trace contextRef="#ctx0" brushRef="#br0" timeOffset="116675.68">17445 7937 0,'0'0'0,"35"0"15,-17 0-15,52 0 16,36 0-1,-35 0 1,-54 0 0</inkml:trace>
-  <inkml:trace contextRef="#ctx0" brushRef="#br0" timeOffset="117059.8">16775 8484 0,'-18'0'31,"53"0"-15,18 0 0,-35 0-16,52 0 15,1 0 1</inkml:trace>
-  <inkml:trace contextRef="#ctx0" brushRef="#br0" timeOffset="117878.79">19244 7620 0,'0'0'0,"18"0"15,17 0 1,0 18 0,0-1-1,-17-17 1,0 0-16</inkml:trace>
-  <inkml:trace contextRef="#ctx0" brushRef="#br0" timeOffset="118359.79">20002 7126 0,'18'-18'0,"0"18"16,17-17-16,36-1 16,-18 18-1,17-17 1,-35 17 0,-17 0-1</inkml:trace>
-  <inkml:trace contextRef="#ctx0" brushRef="#br0" timeOffset="119179.5">20832 6509 0,'17'0'0,"-34"0"0,52 0 16,-18 0-1,1 17-15</inkml:trace>
-  <inkml:trace contextRef="#ctx0" brushRef="#br0" timeOffset="123814.9">2857 11359 0,'0'0'15,"-17"18"17,17 0-32,0-1 0,0 36 15,35 124 16,-35-124-15,0-18-16,0 0 16,-18 0-1,1-35-15,-1-70 32,1-54-17,17 89 1,0-18-16,-18-35 15,36-35 1,52 52 0,1 53-1,-36 36-15,36 35 32,-54 35-32,-52-17 15,-36-18 1,54-18-16,-89 18 31,88-36-31,36-17 31,17 0-15,53 18 0,-17 0-1,-36-1-15,36 19 16,-36-1-1,0 0 1,-17 0 0,0 1-1,-1-36 1</inkml:trace>
-  <inkml:trace contextRef="#ctx0" brushRef="#br0" timeOffset="124162.42">2663 11342 0,'0'0'16,"-17"0"-16,-36 17 15,0 36 1,53 53 0,18-18-1,87 89 16,-16-107-31,-1-17 16,0-35 0</inkml:trace>
-  <inkml:trace contextRef="#ctx0" brushRef="#br0" timeOffset="124388.74">3404 11218 0,'0'0'0,"18"-17"16,0 17-16,34 35 15,-52 0 1,18 53-16,0 124 31,-18-177-31,0 106 16,0-52 15</inkml:trace>
-  <inkml:trace contextRef="#ctx0" brushRef="#br0" timeOffset="125015.79">5733 11853 0,'0'0'16,"17"0"-16,1-17 0,17 17 15,-17 17 17,-53 1-17,-18 70 1,-18 36 0,71 34-1,35-69 1,71-1-1,-18-71-15</inkml:trace>
-  <inkml:trace contextRef="#ctx0" brushRef="#br0" timeOffset="125279.51">6209 12083 0,'0'0'0,"0"-18"0,-18 0 0,1 1 15,-19-1 1,1 18 15,-36 53-15,54 35 0,34 0-1,54 1 1,0-54-1,17-35 1,-53 0-16,18 0 0</inkml:trace>
-  <inkml:trace contextRef="#ctx0" brushRef="#br0" timeOffset="125479.99">6473 12030 0,'-17'-71'0,"34"142"0,-52-212 31,53 141-15,17 35 0,-17-17-16,35 52 15,52 124 1,-87-88 0,-53-18-1,-36 0-15</inkml:trace>
-  <inkml:trace contextRef="#ctx0" brushRef="#br0" timeOffset="126329.32">8502 12612 0,'-18'0'31,"18"17"-15,0 1-1,-17 0 1,-1 35-1,0-18-15,-17 35 16,0 36 0,35 0 15,35-71-31,-17-35 0</inkml:trace>
-  <inkml:trace contextRef="#ctx0" brushRef="#br0" timeOffset="126615.73">8714 12771 0,'0'-36'15,"0"72"-15,0-89 16,-18 53-1,-17 0 1,35 17-16,-53 54 31,53-36-31,-18 0 16,53 18 0,36-17-1,0-54 1</inkml:trace>
-  <inkml:trace contextRef="#ctx0" brushRef="#br0" timeOffset="126847.37">8872 12647 0,'18'18'31,"0"-18"-31,-1 17 16,-17 1-16,53 35 31,-35-35-31,-36 70 16,-88 18 0,36-71-16</inkml:trace>
-  <inkml:trace contextRef="#ctx0" brushRef="#br0" timeOffset="139187.41">9966 12965 0,'18'0'63,"35"17"-47,35-17-1,176 35 1,124-35-1,-123 18 1,-142-18-16,71 18 16,18-18-1,-106 0 1,-71 0 15,-17 0-15,-36 0 46</inkml:trace>
-  <inkml:trace contextRef="#ctx0" brushRef="#br0" timeOffset="140601.87">10089 15046 0,'18'0'79,"352"0"-48,-211 0-31,406 18 15,-19-1 17,-281 1-32,-159-18 15,53 0-15,-54 0 32,-122-18-17,-1 1-15</inkml:trace>
-  <inkml:trace contextRef="#ctx0" brushRef="#br0" timeOffset="161030.43">22137 13952 0,'17'0'47,"1"0"-31,0 0-16,35 0 15,35 0 1,-53 0-16,71 0 15,17 0 1,-52 0 0,-53 0-1,-71-17 17,17 17-17,-34 0 1,-36-18-1,-17 18 1,34 0 0,54 0-1,17 0 1,36 0 0,35 0-1,-18 0-15,36 0 16,70 0-1,-18 18 1,-70-18 0,-35 0-16,-36 0 31,1 0-15,-54 0-1,1 0 1,17 0-16,-106-18 15,106 18 1,35 0 0,71 0 15,-35 0-31,105 18 16,-52-18-1,35 17 1,-89-17-1,1 0-15,-71 0 32,18 0-17,-36 0-15,-105-17 32,141 17-17,17 0 1,36 0 15,-1 0-15,1 0-16,17 0 15,0-18 1,36 18 0,-18 0-1,-35 0 1,-1 0-16,-34 18 47,-1-18-32,0 0-15,1 0 16,-1 0 15</inkml:trace>
-  <inkml:trace contextRef="#ctx0" brushRef="#br0" timeOffset="179667.27">22542 15134 0,'18'0'47,"0"0"-47,17 0 15,0-17-15,71 17 16,106 0-1,35 17 1,-159 1 0,53-18-16,-17 17 31,-107-17-31,-52-17 16,-124-1 15,18 1-16,-71-19 1,71 19 0,-70-1-1,69 0 1,107 18 0,53 18-1,17 0 1,36-1-1,35-17-15,88 18 16,-71 0 0,-52-18-16,34 17 15,-16-17 1,-72 0 15,-34 0-31,-19 0 0,1-17 16,-159-1-1,53 0 1,-71 1 0,106 17-1,124 0 1,70 17 0,106 1-1,36 0 1,-107-18-1,-70 0-15,18 0 16,-54 0 0,-211 0 15,53-18-15,70 0-16,-175-17 31,175 17-16,53 18 1,71 0 0,0 0-16,53 18 15,141 0 1,-141-18 0,0 0-1,-89 0 1,-105-18 15,53 18-15,-71-18-16,-18 18 15,54-17-15,-106-19 32,123 36-32,0-17 15,194 17 16,88 35-15,-123-35-16,0 0 0,158 18 31,-87-1-15,-124-17 0,-89 0-1,-17-17-15,-52 17 16,-142-18-1,0 0 1,106 1 0,17-1 15,230 36 0,-53-18-31,0 17 0,0-17 16,211 18 15,-228-18-31,34 0 16,-35 0-1,-52 0 1,-89-18 0,-53 1-1,-17-1 1,88 0-1,52 18-15,19 0 32,52 0-32,71 18 31,53 0-15,-1-18-1,-69 0 1,-37 0-1,-52-18 1,-52 18 0,-19-18-1</inkml:trace>
-  <inkml:trace contextRef="#ctx0" brushRef="#br0" timeOffset="182674.66">18538 15099 0,'0'0'0,"18"0"0,17-18 16,-17 18-16,88-17 31,-18-1-31,71 18 16,-53 0 15,-71 18-15,-53-18-1,-123 17 1,-71-17 0,18 0-1,89 0 1,34-17 0,89 17-1,70 0 1,18 0-1,-53 17-15,70-17 16,54 0 0,-107 18-1,-88-18 1,-17 18 0,-71-18-1,-158-18 1,87 0-1,160 1 1,105-1 15,-35 18-31,53 0 16,-36 0-16,54 0 16,-18 0-1,-71 0-15,-18 0 16,-87 18-1,-107-18 1,-17 0 0,89-18-1,52 0 17,70 18-32,36 0 15,53-17 1,88 17-1,-17 0 1,-36 0 15</inkml:trace>
-  <inkml:trace contextRef="#ctx0" brushRef="#br0" timeOffset="182856.48">18486 14993 0,'0'0'15,"-18"-18"-15,0 18 0,36-17 16,17 17-16,106 0 31,-17 0-31,52 0 16,-52 17 15,-107 1-31</inkml:trace>
+  <inkml:trace contextRef="#ctx0" brushRef="#br0">29245 3986 0,'-17'18'16,"34"-36"-16,-52 36 15,35-36 1,0 1-1,35 17 1,1 0 0,-1 0-16,212 0 31,-36 0-15,-105 0-16,0 0 0,106-18 15,-36 18 1,-52-18-1,-19 18 1,-87 0-16,0 0 16,-36 0 31</inkml:trace>
+  <inkml:trace contextRef="#ctx0" brushRef="#br0" timeOffset="603.89">29810 3986 0,'0'-17'0,"0"34"47,0 1-31,0 53-1,17 34 1,1 19-1,0-36 1,-18-53 0,0 1-16,0-19 0,0 54 31</inkml:trace>
+  <inkml:trace contextRef="#ctx0" brushRef="#br0" timeOffset="1139.5">29245 4516 0,'0'0'0,"-17"0"16,34 0-1,124 0 1,-52 0-16,140 0 15,194-18 1,-35 18 0,-176 0-1,-36-18 17,-140 18-17,-54 0-15</inkml:trace>
+  <inkml:trace contextRef="#ctx0" brushRef="#br0" timeOffset="1869.19">29333 4410 0,'0'-18'15,"-17"18"17,-1 0-17,1 0-15,-1 18 16,-53 17 0,18 0-1,-35 1 1,71-19-16,-19 1 15,19-1 1,52 1 0,36 0-1,-19-1-15,1 1 16</inkml:trace>
+  <inkml:trace contextRef="#ctx0" brushRef="#br0" timeOffset="2701.93">30745 4392 0,'52'0'78,"107"35"-47,-106-17 0,-35 17-15,-18-17-1,0 0-15,-18-1 0,-17 1 16,-18 17 0</inkml:trace>
+  <inkml:trace contextRef="#ctx0" brushRef="#br0" timeOffset="3451.92">29545 4533 0,'0'18'32,"18"-1"-17,-18 1-15,17 35 16,1 35-1,-18-70-15,18 52 16,-18-17 0</inkml:trace>
+  <inkml:trace contextRef="#ctx0" brushRef="#br0" timeOffset="3719.28">29545 4921 0,'0'0'0,"18"18"46,17-18-30,-17 0-16,-1 0 16,1 0-16</inkml:trace>
+  <inkml:trace contextRef="#ctx0" brushRef="#br0" timeOffset="3849.13">29739 4868 0,'0'-17'0,"0"34"0,0-52 31,-17 70-15,-1-35-16,0 36 16,-17-1-1</inkml:trace>
+  <inkml:trace contextRef="#ctx0" brushRef="#br0" timeOffset="4216.34">30127 4586 0,'0'0'0,"-35"-18"31,17 18-15,18 36-1,0-19-15,0 19 16,0 52-1,0-53-15,0 36 16,0-1 0,18-17-16</inkml:trace>
+  <inkml:trace contextRef="#ctx0" brushRef="#br0" timeOffset="4435.18">29986 4957 0,'-18'0'32,"36"0"-32,-18 0 31,53 0-16,-35 0-15,-1 0 0</inkml:trace>
+  <inkml:trace contextRef="#ctx0" brushRef="#br0" timeOffset="4583.85">30215 4904 0,'0'0'0,"0"-18"15,0 36 16,-17-1-15,17 1 0</inkml:trace>
+  <inkml:trace contextRef="#ctx0" brushRef="#br0" timeOffset="4857.3">30515 4604 0,'18'0'0,"-36"0"0,36 35 47,-36 36-16,18-54-31,-17 18 0,17-17 16,0 17-16,0-17 0,0 17 15,-18 36 1,18-53-16</inkml:trace>
+  <inkml:trace contextRef="#ctx0" brushRef="#br0" timeOffset="5202.85">30374 4992 0,'-17'-18'32,"34"36"-32,-17-36 15,35 1 1,36 17-1,17 0 1,-35 0 15,-35 0-31,-1-18 32,-17 0-17,-17 1-15,-1-1 31,0 18-15,-34 71 0</inkml:trace>
+  <inkml:trace contextRef="#ctx0" brushRef="#br0" timeOffset="5968.66">29792 5274 0,'0'0'0,"-18"-18"16,18 1-16,-17 17 0,-18 0 15,-54 17 1,54 1-16,-36 17 16,19 1-1,34-19 1,0 1-16,18 17 0,18 36 31,17-54-31,0 1 0,18 0 16,177-1-1,-54-17 1,71-53 0,-194 36-16,35-36 15,-105-35 1,-19 70-16,-17 0 15,-158-17 1,140 35-16,-70 0 16,35 18-1</inkml:trace>
+  <inkml:trace contextRef="#ctx0" brushRef="#br0" timeOffset="6501.91">30903 5274 0,'0'-18'0,"-17"1"31,-19 17-15,19 0-16,-19 0 16,-34 17-1,52-17 1,-17 36-16,0-1 15,17 53 17,53-53-17,1-17-15,-1 0 0,124-1 32,-89-17-32,1 0 0,-1-17 15,124-19 1,-141 19-16,35-19 15,-88-52 1,-88 18 0,35 52-16,-70-35 15,-53 36 1,123 17-16,17 17 16</inkml:trace>
+  <inkml:trace contextRef="#ctx0" brushRef="#br0" timeOffset="7170.94">30974 5680 0,'-18'0'0,"36"0"0,-89 17 16,54-17-16,-36 18 16,17 35-1,19-18 1,105 18 15,106-35 0,-70-18-31,52-53 16,-53 0 15,-123 0-15,-105 0 0,-107 53-1,141 0-15,1 0 16,-107 35-1</inkml:trace>
+  <inkml:trace contextRef="#ctx0" brushRef="#br0" timeOffset="7751.43">30092 5768 0,'0'-18'0,"0"36"16,18-36-16,-1 1 0,-52 17 31,-71 17-16,0 1 1,-35 0 15,106-1-31,-18 18 16,53 1 0,18-19-16,17 1 15,106 17 1,-70-35-16,52 0 15,89-35 1,-159 17-16,35-17 16,-18-53-1,-70 70-15,-53-35 16,-17 18 0</inkml:trace>
+  <inkml:trace contextRef="#ctx0" brushRef="#br0" timeOffset="8153.11">28998 5045 0,'0'0'0,"36"317"32,-19-229-32,36 265 31,-35-194-15,-18-106-16,17 53 15,-17-71-15</inkml:trace>
+  <inkml:trace contextRef="#ctx0" brushRef="#br0" timeOffset="8998.39">28963 5133 0,'-18'0'0,"36"0"0,-53-18 16,35 1-16,0-1 16,70 0-1,-17 1-15,35 17 16,353-36-1,-229 19-15,264-1 16,318-17 0,-335 35-1,299-35 1,-599 17 0,-141 18-1,-71 0 1,-36-18-1,54 18-15,-35 0 32,52 0-32,0 18 15,18 0-15,0-1 16,18 1 0,-18 0-16,18-1 0,-18 1 15,0 88 1,17-53-16,-17-1 15,36 142 1,-19-141 0,18 53-1,-17-70-15,-18 16 0,18 72 16,-18-36 0,-18-53-1,-17 1 16,17-36-31,-17 0 47,17 0-31,1 0-16,-36 0 16,-106 17-1,88-17-15,-34 18 16,-319 0-1,230-18-15,-264 17 16,-283 1 0,317-1-1,-17 19 17,406-19-32</inkml:trace>
+  <inkml:trace contextRef="#ctx0" brushRef="#br0" timeOffset="10088.33">27552 5133 0,'0'-35'15,"18"35"1,-18 70-1,-18 36 17,18-35-17,0-1 1,0-52-16,0-1 0,-18 1 16,18-106 30,18 0-30,-18 35-16,18-53 16,17-35-1,-35 106-15,17 17 16,54 53 0,-18 53-1,35 89 1,-17-36 15,-71 18-15</inkml:trace>
+  <inkml:trace contextRef="#ctx0" brushRef="#br0" timeOffset="10253.75">27534 5362 0,'0'0'0,"-35"-70"15,53-1 1,-1 53-16,1 1 16,105-18-1,-17 35 1,35 0 0</inkml:trace>
+  <inkml:trace contextRef="#ctx0" brushRef="#br0" timeOffset="10539.18">28081 5168 0,'35'-17'32,"-17"-1"-1,-18 0-31,-18 18 15,-52 18 1,52 0-16,-17-1 16,-18 54-1,53-54-15,0 36 16,53 0 0,0-18-1,35-17 1,-53-18-1</inkml:trace>
+  <inkml:trace contextRef="#ctx0" brushRef="#br0" timeOffset="10807.59">28240 5256 0,'-18'0'0,"36"0"0,-36-17 15,18-1 1,18 18-1,-1-18-15,-52 36 47,-18 35-31,18-35 0,35 52-1,71-17 1,87-35 15</inkml:trace>
+  <inkml:trace contextRef="#ctx0" brushRef="#br0" timeOffset="22776.53">20496 5856 0,'0'0'0,"0"18"47,18-18 0,70 0-16,-70 0-31,105 0 31,-52 0-31</inkml:trace>
+  <inkml:trace contextRef="#ctx0" brushRef="#br0" timeOffset="23390.61">22084 5856 0,'18'0'16,"-36"0"-16,106-18 16,-53 18-16,36-17 15,52-1 1,-70 1 0,0-1-16</inkml:trace>
+  <inkml:trace contextRef="#ctx0" brushRef="#br0" timeOffset="58093.1">12453 6385 0,'0'0'0,"-18"0"16,1 0-16,-1 0 0,0 0 16,-52 0-1,52 0-15,-17 18 16,-88 17 0,52 18-1,18 35 1,53-70-16,0 17 15,53 53 1,-18-70-16,71 35 16,70-35-1,-52-36 1,-71 0-16,0 1 16,53-107-1,-89 89 1,-17-53-1,-70-18 1,34 71-16,-52-1 16,-18 36-1,71 18-15</inkml:trace>
+  <inkml:trace contextRef="#ctx0" brushRef="#br0" timeOffset="58553.97">12171 6720 0,'17'0'47,"1"18"-16,-18 0-31,0-1 0,-53 124 47,18-17-31,0-71 15,17-18-31</inkml:trace>
+  <inkml:trace contextRef="#ctx0" brushRef="#br0" timeOffset="58987.35">12100 7056 0,'0'-18'0,"0"36"0,-17-36 31,87 36 1,71-1-17,-70 1-15,123-1 16,35 1 0,124 17-1,-177-17 1,-17-18-1,-141 0-15,-1 0 16,-70 0 0,-35-18-1,71 18 1</inkml:trace>
+  <inkml:trace contextRef="#ctx0" brushRef="#br0" timeOffset="59455.35">13511 7056 0,'0'0'0,"0"-36"15,-17 36-15,-1-17 16,-17 17 15,17 35-31,1-17 16,-36 123 15,88-36-15,-17-87-16,52 35 15,54-35 1,-36-54 0,18-52-1,-89-35 1,-70-1-1,-35 89 1,-35 35 0</inkml:trace>
+  <inkml:trace contextRef="#ctx0" brushRef="#br0" timeOffset="60188.12">12876 7144 0,'18'-36'31,"0"36"-15,-36 53 15,-17 18-15,35-36-16,-18 0 15,0 124 1,1-123-1,17-1-15,-18 53 16,1-17 15,17-54-31,0 1 0,52-1 47,72-52-16,-106 35-15,140 0 0,-87 0-16,105 0 15,106 35 1,-176-35-16,-35 18 16,-1-18-16,1 0 0,-36 18 15,36-18 1,-89 0-1,-17-18 1</inkml:trace>
+  <inkml:trace contextRef="#ctx0" brushRef="#br0" timeOffset="60622.5">14058 7691 0,'18'0'0,"-18"-18"16,-18 18 31,-17 18-32,17-1-15,-17 18 16,17 18-1,18-35-15,0 17 16,0-17-16,71 88 31,-18-89-31,-18-17 16,89-17 0,-89-1-1,18-17-15,-53-53 31,-36 17-15,-34 53 0,-1 18-1,54 0-15,-19 0 0,19 0 16,-1 18-16</inkml:trace>
+  <inkml:trace contextRef="#ctx0" brushRef="#br0" timeOffset="61491.54">12982 7620 0,'0'0'0,"18"0"15,-1 0-15,1 0 31,-36 35 1,-17 18-32,0 35 15,17 1 1,1-19 0,-1 1 15,18-54-31,-18 19 15,18 17 1,53-36 15,71 1-15,-71-1-16,70 1 16,106 0-1,-87-1 1,-19-17-1,-88 0-15,-17 0 16,0 0-16</inkml:trace>
+  <inkml:trace contextRef="#ctx0" brushRef="#br0" timeOffset="61905.15">13917 8202 0,'0'0'16,"18"0"0,-36 0 15,0 0-16,1 0-15,-18 18 16,-1 35 15,19-36-31,17 1 0,17 52 16,1-34 0,17 17-16,71-18 31,0-17-16,-36-54 1,-52 19-16,0-19 16,-18-52-1,-36 53 1,-52-18 0,53 53-16,-36-18 15,-17 36 1</inkml:trace>
+  <inkml:trace contextRef="#ctx0" brushRef="#br0" timeOffset="63673.37">12435 7161 0,'0'0'0,"0"-17"31,0 34 1,-17 19-17,-1-19-15,0 36 16,1 35-1,17-52 1,-18 70-16,-17 158 31,0-123-15,17-88-16,-35 212 31,35-212-31,-17 52 16,0 37-1,0-37 1,-18 1 0,53-70-16,-36 16 15,19-16 1,-1-19 0,1 1-1,34-18 16,1 0-15,-1 0-16,19 0 16,34 0-1,-34 0 1,69 18 0,-52-18-16,18 17 0,17-17 15,-17 0-15,246 18 31,-246 0-31,34-18 16,-16 0 0,-54 0-1,-35-18 1,0 0-16,-18 1 16,1-1-1,-1 18 1</inkml:trace>
+  <inkml:trace contextRef="#ctx0" brushRef="#br0" timeOffset="64056.35">13141 8802 0,'0'0'0,"0"-18"16,-35 18 15,-36 18-15,53-1-16,-17 19 16,18 34-1,17-34-15,0-19 16,52 54-1,-34-54-15,35 19 16,35-36 0,-35-36-1,0-34 1,-53-36 15,-18 18-15,1 70-16,-36 1 15,-18 17-15</inkml:trace>
+  <inkml:trace contextRef="#ctx0" brushRef="#br0" timeOffset="65891.58">14005 8431 0,'-17'71'79,"-1"-53"-64,18 17-15,-35 53 16,-1 0-1,36-52 1,0-1-16,0 0 16,0-17 15,18-18-31,17-18 31,18 0-15,-35 18-16,0 0 15,17 0-15,18 0 16,70 18 0,-70-18-16,18 0 15,-18 18 1,-18-18-16,-53-18 31</inkml:trace>
+  <inkml:trace contextRef="#ctx0" brushRef="#br0" timeOffset="66306.67">14482 8784 0,'0'0'0,"0"-17"16,17 17-1,-17-18 1,-17 36 15,-19 17-15,19-18-16,-1 19 16,0 17 15,36-36-31,17 19 0,-17-36 15,70 17 1,0-34 0,-52-36 15,-54-18-15,-17 53-16,17-17 0,-17 18 15,-53-1 1,35 18-16,-36 0 15</inkml:trace>
+  <inkml:trace contextRef="#ctx0" brushRef="#br0" timeOffset="67609.78">18115 6562 0,'0'-18'0,"0"36"0,18-71 16,-36 17-16,0 19 16,-34-1-1,34 18 1,0 0-16,1 0 0,-19 35 15,1 54 1,35-36 0,35 35-1,-17-71 1,53 19-16,34-19 31,1-70-15,-70 36-16,-1-19 15,-18 1-15,1 0 0,0 0 16,-18-71 0,-18 71-16,-35-1 15,0 36 1</inkml:trace>
+  <inkml:trace contextRef="#ctx0" brushRef="#br0" timeOffset="67942.88">17939 6826 0,'17'0'15,"1"-17"16,-71 34 1,-17 19-17,34-1-15,-17-18 0,0 19 16,-70 52 0,88-53-16,-36 0 15,18 36 16,36-53-31,17-1 0,-18 1 16</inkml:trace>
+  <inkml:trace contextRef="#ctx0" brushRef="#br0" timeOffset="68327.61">17462 7179 0,'-35'0'16,"18"0"-1,-19 18 1,19-18-16,-1 35 16,0 18-1,18-36-15,0 36 16,18 0-1,0-35 1,35 0-16,17-36 31,-17 0-31,-35-52 32,-18 34-32,-18-34 15,-53-1 1,54 54-16,-18-1 15,17 18-15,0 0 0,1 18 16,-1-18-16</inkml:trace>
+  <inkml:trace contextRef="#ctx0" brushRef="#br0" timeOffset="68708.57">18309 6879 0,'0'-17'16,"18"17"-16,-36 17 0,53-17 15,1 71 1,-1-18 0,36 70-1,-54-70-15,18-18 16,18 71-1,-35-88-15,0 17 16,-18-17 0</inkml:trace>
+  <inkml:trace contextRef="#ctx0" brushRef="#br0" timeOffset="69094.49">18627 7408 0,'17'0'31,"-52"0"16,0 0-47,17 18 15,0 0-15,18-1 0,-17 19 16,34-1 15,54 0-31,-36-17 16,18-18 0,35-18-1,-52 0-15,-19 1 16,-17-36-1,-17 35-15,-1-17 0,-17 17 16,-71-52 0,18 52-1,52 18-15</inkml:trace>
+  <inkml:trace contextRef="#ctx0" brushRef="#br0" timeOffset="69611.85">17551 7373 0,'0'0'0,"0"-18"16,-18 18 0,0 0-16,1 0 15,-1 18-15,0 0 0,-17-1 16,-88 89-1,70-71-15,-53 36 16,0 0 0,71-36-16,17 0 0,-17-17 15,17 17 1</inkml:trace>
+  <inkml:trace contextRef="#ctx0" brushRef="#br0" timeOffset="70047.67">16933 7832 0,'0'-18'16,"-17"0"15,-19 36-15,19-18-16,-19 35 15,-16 18 1,52-18 0,17 1-1,1-19-15,17 1 16,53-18-1,-17-18 1,-36-17 0,-35-35 15,-35 17-15,-18 0-1,35 53 1</inkml:trace>
+  <inkml:trace contextRef="#ctx0" brushRef="#br0" timeOffset="70376.24">17462 7461 0,'18'-17'16,"0"17"-16,-54 17 0,89 19 31,-35 52-16,-18-53-15,18 0 16,17 106 0,-17-105-1,-18-1-15,17 35 16,-17-34 0</inkml:trace>
+  <inkml:trace contextRef="#ctx0" brushRef="#br0" timeOffset="70778.57">17568 7973 0,'-53'0'47,"0"35"-31,36 0-1,17 18 1,17 0 0,19-35-1,52-18 1,18-35-1,-53-18 1,-36 0 0,-17 17-1,-35-17-15,-35 36 32,34 17-32,19 0 15,-36 17-15</inkml:trace>
+  <inkml:trace contextRef="#ctx0" brushRef="#br0" timeOffset="71097.84">17445 8237 0,'17'0'0,"-34"18"31,-18 0-15,17-1-16,-17 19 15,17-19-15,-17 18 0,-36 36 16,1 17-1,-1 36 1,36-54 0,35-34-1,17-36-15</inkml:trace>
+  <inkml:trace contextRef="#ctx0" brushRef="#br0" timeOffset="71560.62">17022 8714 0,'-18'0'31,"36"0"-31,-71 35 47,35-35-31,18 18-16,-18 17 15,1 18 1,17-18 0,35 18-1,-17-35-15,35-1 16,35-34-1,-53-1 1,0-53 0,-35 36-1,0 0 1,-53-18 0,18 35-16,0 18 15,0 18 1,70-18 15</inkml:trace>
+  <inkml:trace contextRef="#ctx0" brushRef="#br0" timeOffset="71909.28">17674 8290 0,'-17'-17'31,"34"34"-31,1-17 47,17 124-32,-17-71-15,-1 35 16,19 53 0,-19-53-1,1-53 1</inkml:trace>
+  <inkml:trace contextRef="#ctx0" brushRef="#br0" timeOffset="72309.5">17780 8855 0,'-18'0'16,"1"0"15,-1 0-15,18 17-16,-18 19 15,1-19-15,17 19 16,0 16 0,35-16-1,36-19 1,-36-17-16,35-17 31,1-36-15,-36 0-1,-52-18 1,-1 54-16,0-1 0,-17 18 16,17 0-16,-34 0 15,-1 18 1,53-1-1</inkml:trace>
+  <inkml:trace contextRef="#ctx0" brushRef="#br0" timeOffset="72892.67">18803 7796 0,'-53'124'78,"0"-1"-63,18-17 1,17 0 0,18-71-1</inkml:trace>
+  <inkml:trace contextRef="#ctx0" brushRef="#br0" timeOffset="73356.16">18644 8255 0,'-17'0'47,"-1"0"-16,0 0-31,1 18 0,-36 35 47,53 17-32,0-52-15,88 88 47,-35-106-31,-18 0-16,0-18 16,18-53-1,-35 54-15,-18-19 16,-18-34-1,1 52-15,-36 1 16,-18 17 0,54 17-16,-19 1 31</inkml:trace>
+  <inkml:trace contextRef="#ctx0" brushRef="#br0" timeOffset="73796.53">19138 7849 0,'0'-17'0,"0"34"0,18-34 31,-1 52-15,36 53 15,-17-17-15,34 70 0,-17-35-1,-35-89-15,-18 1 0,0 0 16,0-1-16</inkml:trace>
+  <inkml:trace contextRef="#ctx0" brushRef="#br0" timeOffset="74230.23">19262 8343 0,'0'35'63,"-18"18"-47,0-35-16,18 0 15,0 17 1,36 18-1,17-18 1,17-17 0,1-1-1,-1-34 1,-34 17-16,-19-36 16,-34-16-1,-19-19 1,-34 0 15,17 54-15,35 17-16,-17 0 0,0 17 15</inkml:trace>
+  <inkml:trace contextRef="#ctx0" brushRef="#br0" timeOffset="146290.89">9419 12629 0,'18'0'125,"17"-35"-47,18 0-62,-35 35-1,70-53 1,-35 18 0,-36 35-1,1-18-15,-36 36 47,1-18-31</inkml:trace>
+  <inkml:trace contextRef="#ctx0" brushRef="#br0" timeOffset="146693.4">9560 12400 0,'-17'-18'16,"17"36"15,17-18 0,-17 18-31,18-18 0,17 0 16,0 0 15,-17 0-31,0 0 0,-1 0 16,1 0-1,-18 17 17,0 1-17,0 0-15,0 17 16,0 0 0,0-17-16,18 0 0,-18-1 15,0 18 1,17-17-16,-17 0 15,0-1 1</inkml:trace>
+  <inkml:trace contextRef="#ctx0" brushRef="#br0" timeOffset="147806.54">9402 14746 0,'0'0'0,"-18"0"31,18-18-15,18 18 15,17-35-16,0 18-15,18-1 16,35-53 0,-70 54-1,17-1-15,18-17 16,-35 17 0,-1 1-16,-17-1 31</inkml:trace>
+  <inkml:trace contextRef="#ctx0" brushRef="#br0" timeOffset="148178.7">9596 14429 0,'17'0'78,"1"0"-62,-1 0-1,19 17 1,-19-17-16,1 0 16,35 0-1,-35 0-15,-1 0 32,-17 36-17,0-1-15,-17 18 16,-54 53-1</inkml:trace>
+  <inkml:trace contextRef="#ctx0" brushRef="#br0" timeOffset="155094.15">20779 14023 0,'0'-18'31,"0"1"-15,17 17 15,54-18-15,-1 18-1,54 0 17,17 0-17,0-18 1,-106 18-16,-17-17 15,17 17-15,-17 0 16,0 0 0,-18-18-16,-18 18 0</inkml:trace>
+  <inkml:trace contextRef="#ctx0" brushRef="#br0" timeOffset="155860.07">22490 14005 0,'0'-17'16,"0"34"-16,17-52 16,-17 17-1,35 1 1,18 17-1,36-18 1,16 18 0,72-18-1,-124 18 1,70-17 0,18 17-1,-105 0-15,17 0 16,-18 0-1,-18 0-15,-34 0 47</inkml:trace>
+  <inkml:trace contextRef="#ctx0" brushRef="#br0" timeOffset="162995.44">23301 15011 0,'0'0'0,"0"-18"46,35 36 48,336 17-63,-301-35-15,-17 0-16,53 0 16,-18 0-1,-70-18 1</inkml:trace>
+  <inkml:trace contextRef="#ctx0" brushRef="#br0" timeOffset="168166.73">1393 11659 0,'0'0'0,"0"-17"32,-17 17-32,-1-18 47,-17 18-32,17 0 1,1 18-1,-54 17 1,53-17-16,1-1 0,-18 36 16,-1 35-1,36-52-15,0-19 0,18 36 16,0-18-16,-1 1 0,36-1 16,18 18-1,-18-35-15,35-36 16,53-53-1,-88 36-15,0-18 16,-18 18-16,18-71 16,-71-35-1,-88 17 1,-52 72 0,52 69-1,88 1 1</inkml:trace>
+  <inkml:trace contextRef="#ctx0" brushRef="#br0" timeOffset="168956.56">1393 12171 0,'0'0'0,"0"-18"32,0 36 30,0-1-46,0 19-1,18 52 1,-18-53-16,0 0 16,18 71-1,-18-70-15,0 17 16,17-1 0,1-34-16,-18 17 15,18-35 1,-1 0-1,1-17 1,0-1 0,-1 0-1</inkml:trace>
+  <inkml:trace contextRef="#ctx0" brushRef="#br0" timeOffset="172902.93">1993 11536 0,'0'0'0,"0"-18"47,-17 36-31,17 17-1,0-17-15,17 17 16,18 36-1,-17-36 1,0 18 0,-1-36-1,1-17-15,0-35 47,-18 0-31,17 17-16,-17-17 15,0 17 1,36 36 15,16 17-15,19 0 0,-18-52-1,-18-1 1,-17-52-1,-18 52-15,-18-35 16,-35-17 0,-17 34-1,-1 36 17,36 18-32,17-18 0,18 18 15</inkml:trace>
+  <inkml:trace contextRef="#ctx0" brushRef="#br0" timeOffset="173315.51">2381 11483 0,'0'0'15,"0"-18"1,18 18-1,-18 18 1,18 0 0,-1 17-1,1 0 17,-1-17-32,1-1 0,17-17 31,-17 0-31,0-17 15,35-19 1,-53 19 0,-18-1-16,0 18 0,-52-35 31,-18 35-15,35 0-1,35 18 1,18-1-1</inkml:trace>
+  <inkml:trace contextRef="#ctx0" brushRef="#br0" timeOffset="173642.49">2505 11448 0,'0'0'0,"0"-18"16,0 0 15,17 18-15,1 0-16,17 0 15,36 18 1,-54 0-16,19 17 16,-19 18-1,-17-36 1,-35 1-1,17-18-15,1-18 16,-1-52 0,18-18-1,35 35 17,1 0-17</inkml:trace>
+  <inkml:trace contextRef="#ctx0" brushRef="#br0" timeOffset="173831.65">2734 11271 0,'0'-17'31,"0"34"-31,0-52 16,35 88 15,1 17-16,16 19 1,-16-54 0</inkml:trace>
+  <inkml:trace contextRef="#ctx0" brushRef="#br0" timeOffset="174198.44">2981 11359 0,'0'-35'47,"0"18"-47,0 69 0,-18-104 15,18 87 1,0 0 0,0 0-16,18-17 15,0 17 1,17-35-1,0-35 1,-17 17-16,-18-52 16,0-18-1,-35 17 1,-1 53 15,19 18-31,-1 0 0,18 71 31,35 17-15,-17-70-16,17 17 0</inkml:trace>
+  <inkml:trace contextRef="#ctx0" brushRef="#br0" timeOffset="175002.2">1411 12718 0,'-18'-18'31,"36"18"1,53 0-17,-36-18-15,35 18 16,248-17-1,-124-1 1,53 18 0,-194 0-16,17 0 15,-17 18 1,-53-1 0,-17 1-16</inkml:trace>
+  <inkml:trace contextRef="#ctx0" brushRef="#br0" timeOffset="176199.7">2434 12524 0,'0'-18'0,"0"0"0,-17-17 16,17 17-1,0 71 17,35 53-17,-18 0 1,1 35 15,0-88-31,-1 18 16,1-1-1,-18-35 1,0-52 0,-18-1-1,18-17 1,36 0 0,17 35-1,70 0 1,-70 0-16,70 0 15,107 0 1,-160 0 0,89 0-16,0 0 15,0 17 17,-124-17-32,18 0 15,-18-17 1,-17-1-1,-18 0 1,0 1 47,-36-36-48,19 35 1,-1-52-1,0 34 1,18 19 15,0-1-31,0-17 32,18-18-17,-18 35-15,0-17 16,0 17-16,0-17 0,18 17 15,-18-52 1,-18 17 0,-17 18-1,0 35 1,17-18-16,-70 0 16,52 18-16,-122 0 15,105 0 1,-71 18-16,-52 17 31,105-17-31,18-1 0,-52 19 31,69-19-31,1-17 0,17 0 32,1-17-17,-1-1 1,18 0-16,-18 1 15,1 17 1,-1 0-16</inkml:trace>
+  <inkml:trace contextRef="#ctx0" brushRef="#br0" timeOffset="176765.61">2469 12418 0,'-17'0'0,"34"0"0,-52 0 16,88 0 15,35-36-15,-35 19-16,18-1 15,-1 1 1,-34 17-16,-1 0 0,-18 0 16</inkml:trace>
+  <inkml:trace contextRef="#ctx0" brushRef="#br0" timeOffset="177185.5">2787 12594 0,'0'0'0,"0"-17"16,-18-1 15,-17 18-16,35 18-15,-35-1 16,-1 18 0,36 18-1,36 0 17,-19-35-32,19 0 15,34 17 1,-52-35-16,17-18 15</inkml:trace>
+  <inkml:trace contextRef="#ctx0" brushRef="#br0" timeOffset="177349.59">2716 12682 0,'18'18'31,"0"-36"-15,17 1-16,0-1 16,-17 18-1,-18-18-15</inkml:trace>
+  <inkml:trace contextRef="#ctx0" brushRef="#br0" timeOffset="177885.22">2893 12612 0,'0'-18'0,"0"36"78,17 17-63,1-17-15,-18-1 16,0 1-16,18 0 0,-18-1 16,35 19-1,-35-19-15,18 1 16,-18-53 15,-18-1-15,0-34-1,18 17 17,0 35-32,18 18 15,17-17 1,1 34-1,-19 18 1,1-35-16,-1 18 31,-17-36-15,0 1 0,18-18-1,0 17 1,-1 18-1,36 35 1,-17 36 0,-1-1 15,-18-34-15</inkml:trace>
+  <inkml:trace contextRef="#ctx0" brushRef="#br0" timeOffset="178504.12">3422 12524 0,'0'-18'0,"0"36"0,-18-54 32,18 19-32,-35 34 31,17 36-16,18-17-15,0-1 16,18 0-16,0 0 16,-1-17-1,1 0-15,52-1 16,-34-34 0</inkml:trace>
+  <inkml:trace contextRef="#ctx0" brushRef="#br0" timeOffset="178663.61">3369 12647 0,'0'0'0,"0"18"16,18-18 15,17-18-15,0 0-16</inkml:trace>
+  <inkml:trace contextRef="#ctx0" brushRef="#br0" timeOffset="178883.83">3528 12541 0,'0'0'0,"0"-17"32,17 34-1,1 19-16,17 16 1,-17 19 15,-18-53-31,18-1 16,-18 1 0</inkml:trace>
+  <inkml:trace contextRef="#ctx0" brushRef="#br0" timeOffset="180023.11">3598 12524 0,'-17'-18'31,"17"0"-15,53 18 15,17 36-15,-17-1 0,18 35-1,-54-52 1</inkml:trace>
+  <inkml:trace contextRef="#ctx0" brushRef="#br0" timeOffset="180221.16">3634 12753 0,'0'0'0,"-18"-18"16,18 1-1,71-1 1,-36 0-16,0 1 16,0 17-16</inkml:trace>
+  <inkml:trace contextRef="#ctx0" brushRef="#br0" timeOffset="181125.46">3157 12982 0,'18'-17'16,"-36"34"-16,36-52 0,0 35 16,-18 18 15,0 34-16,0-16-15,17 34 16,-17 71 0,18-35-1,0 18 1,-18-89-16,17 18 16,18-35 15,1-18-31,-1 0 0,212-36 47,18 89-16,-230-35-15,0-1-16,-17 1 0</inkml:trace>
+  <inkml:trace contextRef="#ctx0" brushRef="#br0" timeOffset="181663.79">4004 13194 0,'0'-18'16,"0"36"-16,0-53 0,35 158 62,1 53-46,-36-123-16,17 18 16,-17-1-16,35 36 15,1 0 1,-36-88-16</inkml:trace>
+  <inkml:trace contextRef="#ctx0" brushRef="#br0" timeOffset="182268.17">3969 13194 0,'0'-53'31,"0"106"-31,106-159 31,-54 106-31,19-18 0,0 18 16,17-17-16,106 17 16,123 0-1,-34 17 1,-213 1-16,18-18 15,-17 0-15,35 18 16,-36-1 0,18 36-1,-70-35 1,0 35 0,-18 17-1,0-34 1,0 52-1,-18 0 1,36 0 15,-18-70-31,0-1 16,17 36 0,-52-35-1,17 0-15,-17-18 16,-124 17-1,18 1 1,-176 0 0,-71 17-1,53-17 1,141-18 0,176 0-1</inkml:trace>
+  <inkml:trace contextRef="#ctx0" brushRef="#br0" timeOffset="182668.74">4427 13300 0,'0'0'16,"0"-18"0,-17 18-16,17 35 31,35 36-15,0-1-1,18 19 1,-35-36-16</inkml:trace>
+  <inkml:trace contextRef="#ctx0" brushRef="#br0" timeOffset="182935.63">4286 13388 0,'-17'-35'0,"34"70"0,-17-141 16,18 88-16,17 1 15,0-1-15,107 36 32,-90-1-32,54 19 15,0 52 1,-88 0 0,-54 0-1,1-52-15,-53-1 16,-35-35-1,87-18-15</inkml:trace>
+  <inkml:trace contextRef="#ctx0" brushRef="#br0" timeOffset="183219.95">4939 13247 0,'18'-35'32,"-36"35"-17,0 0 1,1 0-16,-1 17 0,18 1 16,-18 17-16,1 36 15,17 34 1,35-52-1,53 0 1,-53-53-16,36 0 16,-36-17-1</inkml:trace>
+  <inkml:trace contextRef="#ctx0" brushRef="#br0" timeOffset="183341.92">4886 13458 0,'-35'0'0,"70"0"0,-106 0 15,124-17 17,88-18-17,-88 35-15</inkml:trace>
+  <inkml:trace contextRef="#ctx0" brushRef="#br0" timeOffset="183921.35">5221 13811 0,'-18'-17'0,"36"34"0,-36-70 16,36 106 46,35 141-30,-35-176-32,52 52 31,-17-52-15,18-18-1,-18 0-15,-18-18 0,71 1 16,-53 17-16,-18-18 15</inkml:trace>
+  <inkml:trace contextRef="#ctx0" brushRef="#br0" timeOffset="184219.68">6121 13847 0,'-18'0'15,"0"0"-15,54 0 0,-89 35 32,106 35-17,-36-52-15,1 17 16,70 89-1,-53-89 1,-35-17-16,18 17 16</inkml:trace>
+  <inkml:trace contextRef="#ctx0" brushRef="#br0" timeOffset="184422.86">6191 13882 0,'0'-18'16,"0"-17"-1,0 88-15,0-124 0,0 54 16,18-19 0,0 19-16,34-1 15,37 0 1,-54 18-16</inkml:trace>
+  <inkml:trace contextRef="#ctx0" brushRef="#br0" timeOffset="184590.73">6297 13899 0,'-18'36'31,"36"-72"-31,-18 54 31,35-18-31,-17 0 16,35-18 0</inkml:trace>
+  <inkml:trace contextRef="#ctx0" brushRef="#br0" timeOffset="185086.47">6632 13811 0,'0'0'15,"0"-17"1,-17 17 0,34 35-1,1 18 1,-1-18 0,1 36-1,0-36 16,-18-17-31,0-36 32,-18-35-17,18 18-15,0-1 0,-18 1 16,18-106 0,-17 106-16,17-18 0,0 18 15,17-1 1,1 19-16,17 17 15,18 35 1,-17 35 0,-36-34-1,0-19-15,-18 19 16,-17-1 0,17-35-1,18 18 1,71 17 15,-18 18-15,-36-36-16</inkml:trace>
+  <inkml:trace contextRef="#ctx0" brushRef="#br0" timeOffset="185302.67">7091 13917 0,'0'0'31,"0"18"-15,0 35 0,0 17-1,0-52 1,0-1-16,0 1 15,-18 17-15</inkml:trace>
+  <inkml:trace contextRef="#ctx0" brushRef="#br0" timeOffset="185904.61">7285 13758 0,'0'18'47,"35"35"-15,-17-35-32,17 34 15,-35-34 1,-18-36 15,1-34-15,-1 16-16,18 1 0,0-89 31,18 36-15,-1 35-1,36 53 1,-35 18-1,17 35 1,-17 0 0,-18-18-1,0-17 17,0-1-1,18-17-31,-1 18 15,1 0 1,35-1 0,-36 1-16,-17 0 15,-53 17 1,-52 0 0,34-17-1,36-18-15,17 0 0</inkml:trace>
+  <inkml:trace contextRef="#ctx0" brushRef="#br0" timeOffset="186424.79">7638 13547 0,'17'0'31,"-34"0"-31,70 35 31,-53-17-31,17-1 0,-17 18 16,35 36-1,-17 0 1,-18-36 0,-35-70 15,0-36-16,17 18-15,0 18 16,18-18-16,0 0 0,0 0 16,0-70-1,36 87 1,34 54 15,-52 0-31,-1-1 0,36 54 16,-35-1 15,-53-34-15,17-19-1,-17-17 1,17 18-16,36-18 16,17 35-1,0-17-15,18 35 16,18 17-1,-54-34-15</inkml:trace>
+  <inkml:trace contextRef="#ctx0" brushRef="#br0" timeOffset="188106.69">3387 13529 0,'0'0'0,"0"18"47,0 17-32,0 0-15,0 36 16,17 17-1,-17-35-15,0 70 16,0 54 0,0-124-1,0 35-15,0-35 16,0-18 0,0-17-16,18-18 0,17 35 15,18-35 16,124 0-15,-125 0-16,19 0 16,105 0-1,-123 0-15,18 18 16</inkml:trace>
+  <inkml:trace contextRef="#ctx0" brushRef="#br0" timeOffset="188437.83">4286 14270 0,'0'-18'16,"0"36"-16,0-1 47,18 142-32,-18-88-15,18 88 16,-1-1 15</inkml:trace>
+  <inkml:trace contextRef="#ctx0" brushRef="#br0" timeOffset="189042.03">4233 14217 0,'106'-35'47,"71"-1"-31,-89 36-16,106 0 15,53 18 1,-89 17-1,19 53 1,-160-70 0,19 0-16,34 17 15,-34-17 1,17-1 15,-36-17-31,18 18 0,-17 35 47,-18 17-31,0-52-16,0 0 15,0 35 1,0 0 0,0-36-1,-18 1-15,1-1 16,-54 1-1,36 0-15,-71-1 16,-123 1 0,123-18-1,0 0-15,0 0 0,-88 0 16,-17-18 0,105-17-1,106 0 1</inkml:trace>
+  <inkml:trace contextRef="#ctx0" brushRef="#br0" timeOffset="189458.29">4621 14340 0,'-35'0'0,"70"0"0,-88 0 16,36 0-16,-18 18 15,-1 0 16,19-1-31,52 19 32,0-19-17,-17-17-15,17 18 0,-17 0 16,70 17 0,-70-18-16,-1 19 15,-52 17 1,-18-18-1,35-17-15,-52-1 16,17-17 0</inkml:trace>
+  <inkml:trace contextRef="#ctx0" brushRef="#br0" timeOffset="189973.61">4798 14411 0,'0'0'16,"17"0"0,-17 18-1,18-1 1,0 1-16,-1 17 16,19 18-1,-19-18 1,19 1-1,-19-72 17,-17-17-17,0 36-15,18-36 16,-18 18 0,17 35-1,1 53 16,0-18-15,35 0 0,-36-17-16,1-18 15,35-18 1,-18-17 0,-35 0-1,0 17-15,0-35 16,0 18-1,0 17-15,0 36 32,0-1-32</inkml:trace>
+  <inkml:trace contextRef="#ctx0" brushRef="#br0" timeOffset="190488.03">5309 14764 0,'0'0'16,"0"17"-1,0 1 1,0 0-16,18 35 16,17-1-1,0-16-15,-17-19 16,106 19 15,-54-36-31,-17 0 0,35 0 16,-17-18 15,-1 18-31</inkml:trace>
+  <inkml:trace contextRef="#ctx0" brushRef="#br0" timeOffset="191040.27">6156 14834 0,'0'-17'31,"0"34"0,18 54-15,-18-18 15,17 35-15,-17-53-16,0-17 0,0 0 0</inkml:trace>
+  <inkml:trace contextRef="#ctx0" brushRef="#br0" timeOffset="191593.63">6368 14781 0,'-18'0'0,"36"0"0,-36 18 16,18 17-1,0 1 1,0-19 0,18 18-16,-1 18 31,-17-17-31,18-36 15,-18 17 1,0-34 0,-18-36-1,18 17-15,0 1 16,0-18 15,0 36-31,18 17 0,17 35 31,36 35 1,-54-34-32,1-36 0,17 17 0,1 1 15,-1 0 1,-18-71 15,1-18-15,-18 36-16,0 17 15,18-70 1,-18 70-16,0 1 16,17 34-1</inkml:trace>
+  <inkml:trace contextRef="#ctx0" brushRef="#br0" timeOffset="192206.77">7073 14746 0,'0'0'0,"-35"0"16,35-18-16,-18 18 15,1 0 1,70-17 15,-18 17-15,0 0-16,0-18 15,1 18 1,-36 35 15,0 18-15,0-35 0,0 53-1,35-1 1,-35-52-16,18 17 15,-1-17 1,-34-36 15,-19-17-15,19 17-16,-19 0 16,19 1-16,-19 17 0,1 0 15,-53 17 1,17 36-1,71-17 1,36-36 0</inkml:trace>
+  <inkml:trace contextRef="#ctx0" brushRef="#br0" timeOffset="192550.84">7514 14623 0,'0'0'0,"-17"0"31,-1 53-15,0-36-16,18 36 15,53 35 1,0-17-1,0-54 1,-35-17-16,17-17 16,0-54-1,-35-35 1,-35 18 15,35 53-31,-35 0 16,-1 17-1,19 18-15</inkml:trace>
+  <inkml:trace contextRef="#ctx0" brushRef="#br0" timeOffset="196027.52">1411 12859 0,'0'0'0,"35"158"16,-17-87 0,35 141-1,-35-124-15,-1 194 16,-34-105-1,-19 69 1,36-175-16,-35 70 16,17 53 15,1-17-31,17-54 31,0-88-31,0 18 0,17-18 16,-17 54-16,18-72 15,0 36 1,-1-35-16,54-36 31,-1-17-15,-52 35-16,17 0 16,18 18-1,0 17 1,-18-17-1,36-1 1,17 1 0,-17-18-1,17 17 17,-70-17-32,34 0 15,-16 18-15</inkml:trace>
+  <inkml:trace contextRef="#ctx0" brushRef="#br0" timeOffset="196326.3">2381 14905 0,'0'-18'16,"0"36"0,18 35 15,17 123 0,-17-123-31,-18-18 16,0 106-1,0-105-15,0-1 16,17-17-16</inkml:trace>
+  <inkml:trace contextRef="#ctx0" brushRef="#br0" timeOffset="196876.34">2417 15046 0,'0'0'0,"17"-176"31,36 140-31,0 19 0,53-1 16,-36 18-1,19 0-15,-1 0 16,0 0-16,371 18 31,-248 35-15,-123-18-1,-17 53 1,-53-70-16,-1-1 16,1 36-1,0-35-15,-1 0 16,18 17 0,-17 0-1,0-17-15,-18-1 0,17 19 16,19 69-1,-36-69-15,0-1 16,-18-17 0,-17-18-1,-18-18 17,18 0-32,-1 18 0,-17-17 15,0 17-15,-88 17 16,-159 19-1,195-19-15,-19 1 16,-211 52 0,247-52-16,-71 0 15,53-1 1,89-34 0,17-1-16</inkml:trace>
+  <inkml:trace contextRef="#ctx0" brushRef="#br0" timeOffset="197342.71">2787 15152 0,'-18'-18'31,"1"36"-15,-1 35-1,18-18 1,0 36 0,0-54-1,0-52 16,0-18-15,0 35-16,0-35 16,18-35-1,17 35 17,35 71-17,-34 0-15,-19 17 16,1 0-16,35 36 15,0 35 1,-53-89-16,0 1 16,0-1-16</inkml:trace>
+  <inkml:trace contextRef="#ctx0" brushRef="#br0" timeOffset="197486.27">2787 15258 0,'-53'-18'31,"106"36"-31,-71-36 16,36 0 0,52 1-16,54-19 31,-89 36-31</inkml:trace>
+  <inkml:trace contextRef="#ctx0" brushRef="#br0" timeOffset="197863.41">3122 15099 0,'-18'0'0,"36"0"0,-53 0 15,17 0 17,53 53-17,-17-36 1,17 72 0,-35-36-1,0-36 1,-35-52 31,17-53-32,1 17-15,17-17 32,0 53-32,17 17 0,1 18 15,0 0-15,17 0 16,0 0-16,-35 18 15,36 35 1,-36-36 0,0 1-16,-53 17 15,-18-17 1</inkml:trace>
+  <inkml:trace contextRef="#ctx0" brushRef="#br0" timeOffset="198178.5">3369 14993 0,'18'0'47,"-1"0"-47,1 18 16,35 17-1,-36 0-15,1-17 16,35 105 0,-53-105-16,0 17 15,-35-17 1,-89-18 15,89-18-31,17 18 0,-70-17 16,35 17-1,36 17-15</inkml:trace>
+  <inkml:trace contextRef="#ctx0" brushRef="#br0" timeOffset="198858.39">3263 15699 0,'0'-18'15,"0"36"-15,0-54 0,0 19 0,0-1 31,35 36-15,-35-1 0,18 19-16,17 87 31,-35-70-31,18 53 16,0 17-1,-18-87-15,17-19 16,1 1-16,0-1 0,17 1 15,0-18-15,71 18 16,123-1 0,-52 1-1,34-18 1</inkml:trace>
+  <inkml:trace contextRef="#ctx0" brushRef="#br0" timeOffset="199213.79">4639 16016 0,'-18'0'0,"36"0"0,-53-18 15,35 36 17,17 35-17,1-18 1,-18 1-16,0 69 15,18-69 1,-18 17-16,0 0 31</inkml:trace>
+  <inkml:trace contextRef="#ctx0" brushRef="#br0" timeOffset="199709.34">4886 16051 0,'18'-17'31,"-36"52"-15,18 0 0,-18 53-1,18-17 1,0-36-1,18-70 17,0-36-1,-18 36-31,35-18 16,0-17-1,0 52 1,1 53-1,-1 18 1,0-17 0,1-19-1,-1-52 1,-35 17 0,17 1-16,1-36 15,0 17-15,17-52 16,-35 71-1,0-1-15,0 0 16,-35 54 0</inkml:trace>
+  <inkml:trace contextRef="#ctx0" brushRef="#br0" timeOffset="200496.51">5345 15734 0,'0'0'0,"-53"-53"15,17 35-15,1 1 16,-18-1-16,-123-17 16,-89 70-1,54 18 1,-107 35-1,159-35 1,89-18 0,34-17-16,1 70 31,106 0-15,35 18-1,-18 0 1,-35 0-1,-36-71 1,-17 0-16,0 1 0,0 17 16,0 17-1,0-35 1,0-17 0,18-18-16,35 0 15,53-18 1,-53 18-1,52-17-15,19-1 16,-54 1 0,89-1-1,71 0 1,-160 1-16,54 17 16,-72 0-16,-16 0 0,-1 0 15,-17 0-15,-1-53 31,1-35-15,17 17 0,-17 36-16,52-89 15,-34 54 1,-19 52-16,19-53 16,-54 1-1,-53-18 1,-17 17-1,18 36 1,-54 17 15,54 36-15,17 17-16</inkml:trace>
+  <inkml:trace contextRef="#ctx0" brushRef="#br0" timeOffset="200978.41">5733 16334 0,'-18'0'0,"53"-18"31,195 0 16,-72 18-47,-87-17 15,141 17 17,-177 17-32,-70 1 15</inkml:trace>
+  <inkml:trace contextRef="#ctx0" brushRef="#br0" timeOffset="202113.11">6756 16228 0,'0'-36'15,"-18"19"1,18 34-1,0 54 1,18-18 0,-1 18 15,-17-54-15,18-52 15,-18 0-16,35-54 1,1-16 0,-19 34-1,1 71 1,-1 18-16,-17-1 16,0 1-16,36 70 15,-36-70 1,17 35-16,1-18 31,0-53 0,-1-52-15,-17 34-16,18-16 16,0 16-1,-1 19-15,18 17 16,1 53-1,-36-36-15,17 54 16,-17-1 0,18-52-1</inkml:trace>
+  <inkml:trace contextRef="#ctx0" brushRef="#br0" timeOffset="202414.66">7338 16104 0,'0'0'0,"0"-17"16,0 34 0,0 19-1,0 16 1,0-34 0,53 35-1,-36-53-15,19 18 16,17-18-1,-18-18 1,-18-35 0,-17-17-1,0 34-15,0 1 16,0 0 0,-17 35-1,17 17-15,0 1 0</inkml:trace>
+  <inkml:trace contextRef="#ctx0" brushRef="#br0" timeOffset="202599.61">7761 16228 0,'0'0'0,"0"17"16,0 1-16,0 0 15,0 35 1,0-18-16,0-17 16,-18 17-16,18 0 0,-17 18 15,-1-35-15</inkml:trace>
+  <inkml:trace contextRef="#ctx0" brushRef="#br0" timeOffset="203043.77">8061 16034 0,'0'0'0,"0"-18"16,0 53 15,0 18-15,0-35-16,0 17 16,18 0-16,-18-17 0,0 17 15,17-17-15,-17 17 16,0 1-1</inkml:trace>
+  <inkml:trace contextRef="#ctx0" brushRef="#br0" timeOffset="203297.65">8008 16157 0,'0'-35'0,"0"70"0,-18-105 15,18 52-15,0 0 0,0-35 16,71 71 15,-36 0-31,-17-1 0,70 36 31,-70 0-15,-18-35-16,-18-1 16,0 1-16,-34 17 15,16-17-15,-52 17 16,35-35-1,35 0-15</inkml:trace>
+  <inkml:trace contextRef="#ctx0" brushRef="#br0" timeOffset="203566.61">8308 15981 0,'0'-18'0,"0"36"0,18-36 31,-1 18-31,71 53 31,-70 0-15,0 35 0,-54 0-1,36-70-15,-17 0 16,17-1-1,17-17-15,19 0 16,-19-17-16</inkml:trace>
+  <inkml:trace contextRef="#ctx0" brushRef="#br0" timeOffset="203796.93">8767 16228 0,'0'17'47,"0"1"-31,0 0-16,0-1 0,-18 54 31,18-36-16</inkml:trace>
+  <inkml:trace contextRef="#ctx0" brushRef="#br0" timeOffset="204393.76">8908 16104 0,'-18'-17'31,"18"34"-31,18-17 16,-36 18-1,36 52 1,-18-52-16,0 0 16,0-1-16,0 19 15,0-19 1,0-34-1,0-1-15,0-35 32,0 18-32,0 0 0,17-1 0,1-52 15,35-18 1,-36 71 0,19 35-1,-19 35 1,-17 36 15,0-54-31,0 19 16,0-19-16,0 1 31,18 0-15,17-1-1,18 1 1,-35 0-1,-18-1-15,0 1 16,0-1-16,-53 19 16,18-19-1,-1 1-15,1 0 0,-53-1 16,53-17-16,-18 0 16,35 0-16</inkml:trace>
+  <inkml:trace contextRef="#ctx0" brushRef="#br0" timeOffset="204700.7">9296 15893 0,'-18'17'15,"18"1"1,18 0-1,-1 34 1,-17-16-16,0-19 16,0 54-1,-17-36-15,-1 0 16,18 1 0,35-36-1,1 0 1,-1 0-1,18-18-15,17-17 32,-52 17-32</inkml:trace>
+  <inkml:trace contextRef="#ctx0" brushRef="#br0" timeOffset="205214.03">9560 16034 0,'36'-36'31,"-36"54"-16,17 35 17,-17-35-32,0-1 0,0 1 0,0 17 15,0-17 1,0-1-16,0 1 0,0 0 16,-17-18-1,-1-36 16,18-16 1,0 34-32,0-17 0,18-1 15,17-52 1,-35 53-16,35 17 16,18 1-1,-53 34-15,18-17 16,-18 53-1,0-35-15,0 17 16,-71 0 15,53-17-31,1 0 16,-1-18-16,1 17 16,34 1-1,18 35 16,-35-36-31,18 1 0,0 0 16,-18 17 0,17 0-16</inkml:trace>
+  <inkml:trace contextRef="#ctx0" brushRef="#br0" timeOffset="207128.64">3475 16316 0,'0'0'0,"-18"-18"16,1 1 15,17 17 0,35 194 0,53 300 1,-88-336-17,0 1 1,0-124-16,0 1 16,35-54 15,71-17-16,-35 17 1,35 18 0,-71 0-16,18 18 15,-18-18 1,-17 0-16,-1 0 16</inkml:trace>
+  <inkml:trace contextRef="#ctx0" brushRef="#br0" timeOffset="208128.86">4551 17127 0,'0'0'0,"35"-17"16,-17-1-16,-1 18 15,1-18 1,-18 1 0,-53 17-1,0-18 1,0 18-16,-35 18 16,-71 35-1,71-18 1,-35 53 15,105-35-15,0 0-1,18-35-15,18-1 0,-18 1 16,18 52 0,-1-34-1,19 17 1,-36-36-16,17 19 15,1-19-15,-1 36 16,1 35 0,-18-52-1,0 34 1,18-52 0,17 17-1,0-17 16,18-1-15,-35-17-16,17 18 16,89-18-1,-71 0-15,70-18 16,-52 1-16,87-19 16,-87 19-16,17-1 15,124-17 1,-36 0-1,-70 17 1,-18 0 0,-70 18-16,-1-17 15,19-1 1,-19 0-16,1 18 16,70-70 15,-70-1 0,-53 36-15,-36-36-1,0 1 1,19-54 0,34 72-16,-17-37 15,17 54-15,0 0 16,-70-18-1,0 88 1,-106 36 0,-35 17-1,70-35 1,88-36-16,36 1 16</inkml:trace>
+  <inkml:trace contextRef="#ctx0" brushRef="#br0" timeOffset="208469.79">4710 17498 0,'0'-18'0,"-53"-70"47,-36 123-15,54-17-32,-18 88 31,89 17 0,-19-105-31,1-1 16,-1-17-16,19 0 15,-1-17-15</inkml:trace>
+  <inkml:trace contextRef="#ctx0" brushRef="#br0" timeOffset="208662.26">4780 17462 0,'18'-17'16,"-36"34"-16,36-69 15,-18 69 1,0 18 0,0 36-1,35 0 1,36-18 0,-36-53-1</inkml:trace>
+  <inkml:trace contextRef="#ctx0" brushRef="#br0" timeOffset="209213.59">4957 17445 0,'0'0'16,"0"-18"-1,0 36 1,0 35 0,0-36-16,0 19 15,-18 17 1,0-18 0,1-35-1,-1 0 1,18-35-16,0-36 31,0 18-15,0 18-16,0 0 0,18 17 15,-1-35 1,1 53-16,17 0 16,18 53-1,0-18 1,-18 0-16,36 1 15,17-1 1,-17-35 0,-36-18-1,-18-17 1,-34-18 0,17 18-1,-18 17-15,-17-17 31,35 53 1</inkml:trace>
+  <inkml:trace contextRef="#ctx0" brushRef="#br0" timeOffset="209629.64">5980 17410 0,'-36'0'31,"72"0"-31,-36 0 16,35 0-16,35 0 16,72 0-1,-90 0 1,-16 0-16,-1 0 0,0 17 16</inkml:trace>
+  <inkml:trace contextRef="#ctx0" brushRef="#br0" timeOffset="210464.07">6703 17286 0,'0'-18'0,"0"36"0,0-36 47,-18 71-32,0-17-15,18 17 16,0 35 15,18-35-31,0-53 31,35-18-15,-36 0-16,19-17 16,-19-18-1,-17 36-15,0-1 16,18 0 0,0 36-1,17 35 1,0-36-1,36 19 17,-36-36-32,35-124 47,-105 18-16,35 89-31,-35 17 31,35 17-15</inkml:trace>
+  <inkml:trace contextRef="#ctx0" brushRef="#br0" timeOffset="210795.81">7197 17286 0,'0'0'0,"0"18"62,-18 52-46,18-52-16,18 17 16,17 18-1,-17-35 1,17-18-1,-18 0-15,1 0 16,70-36 0,-52-16-1,-19-37 1,-17 36 0,-17 1-1,-1 52 1,18 17-1</inkml:trace>
+  <inkml:trace contextRef="#ctx0" brushRef="#br0" timeOffset="211013.97">7620 17392 0,'35'53'31,"-70"-106"-31,106 141 16,-54-70-16,1 35 31,-53-18-15,-1-17 0,19-1-16</inkml:trace>
+  <inkml:trace contextRef="#ctx0" brushRef="#br0" timeOffset="211340.13">8008 17251 0,'-18'-35'31,"36"70"-31,-89-53 31,54 18-31,-1 18 0,1-18 16,17 17-16,-18 1 16,53 17-1,-17 1 1,52-19 0,-52 1-16,0 0 15,-18 17 1,-53 0-1,35-17-15,-17-1 16,-18 1 0,53-36-1</inkml:trace>
+  <inkml:trace contextRef="#ctx0" brushRef="#br0" timeOffset="211563.71">8184 17233 0,'18'53'63,"17"35"-48,-35-70-15,0 0 16,0 34-1,0-34-15</inkml:trace>
+  <inkml:trace contextRef="#ctx0" brushRef="#br0" timeOffset="211880.93">8326 17339 0,'0'-18'31,"17"18"-15,-17-17-16,35 17 16,18-36-1,-35 19 1,-18-1 0,-18 1-16,1-1 15,-1 18 1,18 18-1,0 17 1,18-18-16,-18 36 16,17 53-1,-17-18 1,0-70 0</inkml:trace>
+  <inkml:trace contextRef="#ctx0" brushRef="#br0" timeOffset="212167.52">8802 17462 0,'0'0'16,"17"0"-1,-17 18 17,0 35-17,-17-18-15,17-17 16,-18 17-1</inkml:trace>
+  <inkml:trace contextRef="#ctx0" brushRef="#br0" timeOffset="212883.14">9066 17268 0,'0'-17'47,"0"52"-31,0-17-16,0 17 15,0 53 1,18-35 0,-18 0-1,-18-106 16,1 0-15,17 18-16,-18 0 16,18-18-16,0 17 0,18-34 15,35-18 1,0 70 0,17 18-1,-52 0 1,17 35-1,-35 18 1,-18-35-16,-17 17 16,17 0-1,1-35-15,-1 18 16,36 0 0,17-1-1,18 19 1,-35-19-16,-18 1 15,0 17 1,-18-17-16,-17-1 16,-36 1-1,36-18 1,17 0-16,1-18 0</inkml:trace>
+  <inkml:trace contextRef="#ctx0" brushRef="#br0" timeOffset="213281.56">9490 17110 0,'-18'0'0,"36"0"0,-54 0 16,19 0-16,87-18 46,-52 0-30,17 18-16,89-17 16,-71-1 15,-36 18-31,-52 53 31,35-35-31,-35 35 16,35-36-16,-18 19 15,18-1-15,0 0 0,0-17 16,0 17-16,0 0 0,0-17 16,0 0-16,-18 17 15,-34-18 1,16-17-16,-17 0 16,0-17-16,-52-54 15,34 36-15</inkml:trace>
+  <inkml:trace contextRef="#ctx0" brushRef="#br0" timeOffset="-212029.34">3492 11307 0,'0'-18'0,"0"36"0,18-54 16,0 89 15,-1 35-15,1 1-1,0-37 1,-18-34 0,0 0-1,17-1 1,1-17-16,17-17 15,18-1 1,-18 0-16,36-17 16,17 18-1</inkml:trace>
+  <inkml:trace contextRef="#ctx0" brushRef="#br0" timeOffset="-211813.81">3845 11324 0,'0'0'0,"18"-106"16,0 89-1,-1 87 32,18 36-31,-17-53-16,35 18 15,-18-19-15</inkml:trace>
+  <inkml:trace contextRef="#ctx0" brushRef="#br0" timeOffset="-211347.45">4145 12400 0,'-18'-53'16,"36"106"-16,-53-141 16,35 70 15,17 54-15,-17-19-16,18 18 15,-18 36 1,18-18-1,-1 0 1,-17-35 0,36-1-16,17-17 15,0 0 1,52-35 15,-69 17-31,-19 1 0</inkml:trace>
+  <inkml:trace contextRef="#ctx0" brushRef="#br0" timeOffset="-211041.09">4445 12382 0,'0'-17'0,"0"34"0,-35-69 15,35 34 1,0 0-16,0 1 15,17-1-15,19 18 16,17 18 0,-18 17-1,-18 53 17,-17-70-32,0 17 0,-17-17 15,17-1-15,-18 19 16,18-19-1,18-17-15,52 0 16,89-35 0,-106 35-16</inkml:trace>
+  <inkml:trace contextRef="#ctx0" brushRef="#br0" timeOffset="-210493.48">5997 13017 0,'0'0'0,"0"-17"16,0-1-16,0 36 31,0 17 1,0-17-32,0 17 15,0 53 1,0-70-16,0 17 15,35 18 1,-17-53-16,0 0 16,52 0-1,-34 0-15,34-18 16,1 1 0</inkml:trace>
+  <inkml:trace contextRef="#ctx0" brushRef="#br0" timeOffset="-210079.3">6332 13070 0,'-17'-17'0,"34"34"0,-52-70 31,35 18-15,35 18-1,1-1 1,17 18 0,-36 18-16,1-1 15,-18 18 1,0-17-16,-35 0 16,17-1-1,0 1 1,18 0-1,36-1 1,16-17 0,19 18-1,-36 35 17,-52 0-17,-19-18 1,-34 18-16</inkml:trace>
+  <inkml:trace contextRef="#ctx0" brushRef="#br0" timeOffset="-209608.68">7814 13353 0,'18'0'16,"-36"0"-16,53 0 16,-35 17 15,18 36-15,-18 18-1,18-18 1,-18-36-16,17 36 15,1-18 1,17 1 0,0-36 15,-17 0-31,17-18 16,36 0-1,-36 1-15</inkml:trace>
+  <inkml:trace contextRef="#ctx0" brushRef="#br0" timeOffset="-209162.23">8184 13423 0,'0'18'78,"18"70"-47,17-53 0,-17-35-15,0 0-16,-1 0 0,-17-17 15,36-19 1,-19 1 0,-17-18-1,0 36-15,0-1 16,0 0 0,0 36-16,18 17 15,17 36 1,0-18-1,1 52 1,-36-87-16,0 17 16</inkml:trace>
+  <inkml:trace contextRef="#ctx0" brushRef="#br0" timeOffset="-156590.3">16986 16616 0,'36'-53'47,"-19"18"-15,-87 35-1,-72 70 0,125-52-31,-18 17 16,-54 71-1,89-36 1,71-17 0,-1-35-1,19 0 1,-72-36-16</inkml:trace>
+  <inkml:trace contextRef="#ctx0" brushRef="#br0" timeOffset="-156442.11">16792 16739 0,'0'0'0,"-35"-17"16,70 17-1,36-18 16,-36 18-31</inkml:trace>
+  <inkml:trace contextRef="#ctx0" brushRef="#br0" timeOffset="-156075.55">17251 16651 0,'0'0'15,"-18"-18"1,1 1-1,-1 34 1,18 19 0,-18 17-1,18 17 1,0-35 0,18 1-16,0 17 15,-1-53 1,1 0-16,-1 0 15,19-36 1,34-52 0,-70 53-16,36-18 15,-19-53 1,-17 71 0,-17 35-1,-1 18 1,18-1-16</inkml:trace>
+  <inkml:trace contextRef="#ctx0" brushRef="#br0" timeOffset="-155542.58">17692 16686 0,'-35'-17'31,"-1"17"-15,36 17-16,-17 1 16,-1 53-1,18-19 1,0 1 0,0-17-1,-18-54 16,18-53-15,0 36-16,18-35 16,53-36-1,-19 53 1,19 35 0,-53 36-1,-1 0-15,-17 52 31,-17-52-31,-1 17 16,0-17-16,-17 17 16,-18 0-1,36-17 1,34-18 0,18 17-1,18 36 1,-35-35-16,17 17 15,1 1 1</inkml:trace>
+  <inkml:trace contextRef="#ctx0" brushRef="#br0" timeOffset="-155203.91">18115 16704 0,'0'0'0,"-18"-71"31,1 71-15,-18 36-1,35 17 1,0 17 0,17-17-1,18-18 1,-17-35-16,17-17 15,-17-19 1,0 19-16,-18-54 16,0-17-1,0 70 1,-36 1-16,1 17 16,0 35-1,17 0 16,18-17-31</inkml:trace>
+  <inkml:trace contextRef="#ctx0" brushRef="#br0" timeOffset="-154775.16">18415 16651 0,'0'0'0,"0"-18"15,0 1 1,-35-1-1,17 36 1,18 35 0,0-36-16,0 36 15,18 35 17,-18-70-32,0 0 0,0-1 15,-18 1-15,0-36 31,18-17-15,0 17-16,0-17 0,18 0 16,17-89-1,1 89-15,-1-35 16,53 34 0,-53 54-1,-35 35 1,-17-35-16,-36 34 15,-35 1 1,52-35-16,19 0 16,-19-18-1</inkml:trace>
+  <inkml:trace contextRef="#ctx0" brushRef="#br0" timeOffset="-154491.91">19032 16545 0,'18'-35'16,"-36"70"-16,18-70 15,-17 17-15,-19 18 16,1 0 0,18 18-16,-19 0 15,1 70 1,17-71-16,18 19 15,0 87 1,18-70 0,53-18-1,-54-35 1,36 0-16,-35-17 16</inkml:trace>
+  <inkml:trace contextRef="#ctx0" brushRef="#br0" timeOffset="-154325.11">18927 16669 0,'-53'0'16,"106"0"-16,-177 0 16,106 0-16,-17 0 15,35 17 1,71 1 0,87 0-1,-105-18-15,71-18 16,-54 0-1</inkml:trace>
+  <inkml:trace contextRef="#ctx0" brushRef="#br0" timeOffset="-150820.96">19526 16528 0,'0'0'0,"18"-18"15,0 0-15,-1-35 32,1 53-17,-53 18 1,-36 53-1,53-36 1,-17 0-16,-18 89 16,35-89-1,18 0-15,0-17 0,36 35 32,-19-36-32,1-17 0,70-35 31,-52 17-31,-1-34 15,0-37 1,-35 72 0,0-1-16,0 0 15,0 36-15,0 0 16,0 70 0,-18-53-16,18 18 15,36-18 1,-19-35-1</inkml:trace>
+  <inkml:trace contextRef="#ctx0" brushRef="#br0" timeOffset="-150590.78">19967 16510 0,'0'0'0,"-53"-35"15,0 52 16,0 54-15,18-18 0,18 35-1,17-53-15,0 18 16,52 0 0,-34-53-16,17 0 15,-17 0-15,0-18 0,17 1 16</inkml:trace>
+  <inkml:trace contextRef="#ctx0" brushRef="#br0" timeOffset="-149906.14">19826 16669 0,'-18'0'0,"-17"0"16,88 0-16,-123 0 16,87 0 15,36-18-16,-18 18-15,36 0 16,35-18 0,-71 1-16,0-1 15,-17 1 1,-18-1-16,-18 18 31,1 0-15,17 18-1,-18 34 1,18-34 0,-18 17-16,18 1 0,-17 17 15,-1 17 1,0-52 0,18-36 15,0-17-16,0 0-15,36-71 16,-19 70-16,1 1 16,17-35-1,-17 34-15,17 19 0,-17-1 16,35 18 0,-53 18-16,0 17 15,-18 53 1,1-70-1,-1-1-15,-17 1 0,-1 17 16,-17-17 0,36-18-1,34-18 1,-17 1 0,36 17-1,17-18 1,-36 36-16,19-1 15,-19 19 1,1-19-16,-18 1 16,17 0-16</inkml:trace>
+  <inkml:trace contextRef="#ctx0" brushRef="#br0" timeOffset="-149156.89">20355 16704 0,'36'-71'31,"-19"54"-15,-70 105-16,106-194 0,-53 89 16,0 52-1,-17-18 1,-1 36-16,-17 36 31,35-72-31,0 18 16,-18-17-1,53-88 17,-17-19-17,0 54-15,-18 0 16,52-36 0,-52 54-16,36 17 15,-19 17 1,-17 19-1,18-1 1,0-18 15,-1-17-15,-17 18 15,0 0-15,0-1-16,0 19 15,-17 17 1,17-36-16,0 1 31,-18-36-15,18 1-16,0-1 16,0 0-16,0-17 15,53-36 1,-35 54-1,-1-1-15,1-17 0,17 0 16,18-1 0,-35 19-1,17 52 1,-17 0 15,-18 36-15,0-54-16,0 54 15,-53 0 1,17-19 0,19-34-16</inkml:trace>
+  <inkml:trace contextRef="#ctx0" brushRef="#br0" timeOffset="-148721.89">20973 16616 0,'0'-18'16,"-18"18"15,18 18-31,-18 17 31,1 18-15,-1-35-16,18-1 15,-35 54 1,17-54 0,36-17-1,17-52 1,-17 16-16,-1 1 16,36-71-1,-35 71-15,17-18 16,0 18-1,-35 52 1,0 1-16,-17 123 31,-1-70-31,1 34 32,17-69-32,-18-19 15</inkml:trace>
+  <inkml:trace contextRef="#ctx0" brushRef="#br0" timeOffset="-148585.77">20902 16722 0,'-18'-36'16,"36"72"-16,-36-107 15,18 53 1,53 18 0,18 0-1,17 0 1</inkml:trace>
+  <inkml:trace contextRef="#ctx0" brushRef="#br0" timeOffset="-148081.04">21184 16598 0,'18'-17'0,"-36"34"0,54-70 16,-54 36-1,0-1 17,1 53-1,17 36-16,-18-36-15,0 18 16,1 18 0,-1-54-16,0 18 15,1-35 1,34-35 0,19-53-1,-19 53 1,19-1-16,-1-16 15,-17 16-15,17 1 16,-18 35 0,-17 35-16,0 53 31,-17-35-31,17 36 31,0-72-31,0 18 16,35-35-1,0-35 1,18-71 0,-35 71-16,0-35 15,-1-1 1,-34 89 15,-19 35-15,36-36-16</inkml:trace>
+  <inkml:trace contextRef="#ctx0" brushRef="#br0" timeOffset="-147690.14">21590 16563 0,'0'0'0,"0"-18"16,0-17-16,0 17 15,-35 1 1,17 52 0,0 18-1,1 0 1,34 0 0,19-18-1,17-35 1,-36-18-1,1 1-15,35-36 16,-36 18-16,1-18 16,0-18 15,-54 142 0,-16 52-15,34-88-16,-17 54 15,-1-19-15</inkml:trace>
+  <inkml:trace contextRef="#ctx0" brushRef="#br0" timeOffset="-146136.1">22013 16598 0,'18'-17'32,"0"-19"-17,-1 1 1,-17 53 15,-35 35-15,35-36-16,-18 18 15,-17 54 1,17-54 0,18 0-1,18-52 16,-18-19-15,18 19 0,-18-1-16,17-17 15</inkml:trace>
+  <inkml:trace contextRef="#ctx0" brushRef="#br0" timeOffset="-144121.2">21925 16528 0,'-18'0'46,"18"-18"-14,36 0-1,-1 1-15,0 17-16,1-18 15,34 18 1,-35 0-16,1 18 15,-36 17 1,0-17-16,0-1 16,-53 36-1,35-35-15,-17-1 16,-36 1 0,54 0-1,-1-18 1,53 0-1,36 0 1,-18 0 0,17 0 15,-52 17-31,0 1 16,-36 35-1,-35-18 1,35-17-16,-17-1 0,0-17 15,-106-17 1,88-1 0,35-35-1,18 36-15,0-1 16,18 0-16</inkml:trace>
+  <inkml:trace contextRef="#ctx0" brushRef="#br0" timeOffset="-143870.92">22472 16616 0,'0'0'0,"18"-18"31,-71 1-15,0-1-1,17 18-15,19 18 16,-36 17-1,53 0-15,-18 18 16,36 18 0,0-36-16,-1-18 15,1 1-15,35 0 16,0-18 0</inkml:trace>
+  <inkml:trace contextRef="#ctx0" brushRef="#br0" timeOffset="-143200.81">22401 16686 0,'-17'0'16,"34"0"-16,-105-17 16,71 17-1,52 0 17,71 0-17,-71 0-15,53-18 16,0 0-1,-70 1 1,-18-1 0,-18 1-16,1 17 15,-1 0 1,18 17-16,-35 1 16,35 17-1,-18 36 1,18-54-16,-18 19 15,18-1 1,0-18 0,0-34 15,0-36-15,18 18-16,0-54 15,-1 54-15,1 0 16,0 0-16,-1 17 15,19-17-15,-19 35 16,36 35 0,-35-17-16,-18 17 15,-18 35 1,-35-34 0,-17-1-1,17-35 1,35 0-1,36 0 17,-1 0-17,-17 18-15,18-18 0,0 17 16,17 36 0,-17-35-16,-1-1 15,19 1 1,-19-18-16</inkml:trace>
+  <inkml:trace contextRef="#ctx0" brushRef="#br0" timeOffset="-142886.68">23019 16616 0,'-71'-53'31,"142"106"-31,-177-106 15,106 71 17,0 87-1,-18-87-15,1 0-16,17-1 0,-18 1 15,0 35 1,18-36-16,0 1 15,36 0 1,17-18 0,17 0-1,-35-18-15,-17 0 16,17 18-16</inkml:trace>
+  <inkml:trace contextRef="#ctx0" brushRef="#br0" timeOffset="-142636.75">23248 16598 0,'0'-17'0,"-35"17"31,17-18-15,18 36-1,0 52 1,0-52-1,0 17-15,0-17 0,-18 35 16,1-1 0,-1 1-1</inkml:trace>
+  <inkml:trace contextRef="#ctx0" brushRef="#br0" timeOffset="-142430.8">23407 16651 0,'0'-35'31,"-18"35"-15,18 17-16,0 1 16,-17 53-1,-1-36-15,-17 35 31,-1-34-15</inkml:trace>
+  <inkml:trace contextRef="#ctx0" brushRef="#br0" timeOffset="-142121.91">23389 16633 0,'18'-17'0,"35"-18"46,-53 105-30,0-52 0,17 35-16,19 35 31,-19-71-31,-17 1 16,53-18-1,-35 0-15,-1-18 0,1 1 16,0-71-1,-18 52-15,0 1 16,0-71 0,-18 106-1,0 18 1,18 0 0,0 17-16</inkml:trace>
+  <inkml:trace contextRef="#ctx0" brushRef="#br0" timeOffset="-136564.7">16545 16351 0,'-17'0'16,"-1"0"0,-17 18-1,17 70 1,18-53-16,0 18 15,0 194 1,18-17 0,-36 299-1,0-282 1,18 70 0,0-229-1,18 53-15,0 1 16,-1-72-1,-17-52 1</inkml:trace>
+  <inkml:trace contextRef="#ctx0" brushRef="#br0" timeOffset="-134484.91">16616 16351 0,'0'0'0,"-18"0"47,1-17-31,-19 17 0,1 17-1,17-17 1,1 0 15,17 18-15,53-18-1,-18-18-15,35 18 16,107-35 15,-107 35-31,142-35 0,-88 17 0,34 18 16,371-53-1,-105 35 1,264-17 0,-459 18-16,212 17 15,123 0 1,-70 0 0,-211-18-1,-142 18 1,123 0-16,89 0 31,-230 0-31,72 0 16,-37 0-1,-87 18-15,-1-18 0,54 0 16,-1 0 0,71 17-1,-123-17-15,52 0 16,1 0-1,17 0 1,-106 0-16,18 0 16,-35 0 15,17 0 16,-17 0-32,-1 18-15,19-18 16,-19 0 0,19 0 46,16 0-46,-34 0-1,0 0 1,-1 0 0,1 0-1,35 0 1,35 17 0,-17 1-1,-36-18 1,-17 0-1,-1 0-15,-17 18 0,-17-18 32,-36 0-17,35 0 1,18 17 15,18-17-15,-18 18-16,17-18 15,-17 35 1,0-17 0,0 53-1,-17 70 1,17-88 0,-71 335 15,18 53 0,53-371-31,0 18 0,18 36 16,-1-71-16,-17 70 15,-17-35 1,-1-88-16,-35 18 16,36-18-16</inkml:trace>
+  <inkml:trace contextRef="#ctx0" brushRef="#br0" timeOffset="-132678.97">16581 17163 0,'35'0'0,"-18"0"16,19 0-1,17 0 1,-18 0-1,35 0 1,-34 0-16,52 0 16,-17 0-1,-1 0-15,318-18 16,-159 0 0,107 1 15,-231 17-31,107 0 0,106 0 31,-19 0-15,37-18-1,-248 18-15,18 0 16,176 0 0,-35 0-1,-88 18 1,52-18 15,-123 0-31,142 0 16,-142 0-16,-18 0 0,142 0 31,-141 0-31,-18 0 16,158-18-1,-158 18-15,18 0 0,105-18 31,18 18-15,-123 0-16,-18-17 0,105 17 31,-34 0-15,-1 0 0,18 0-1,-105 0 1,34 0-16,107 0 15,-1 0 1,-88-18 0,18 18-1,-35-17 1,-36 17-16,0 0 16,106-18-1,-105 18 1,-19 0-16,1 0 15,17 0 1,36 0 47,-54 0-63,1 0 0,0 0 15,-1 18-15,-52-18 31,-18-18-15</inkml:trace>
+  <inkml:trace contextRef="#ctx0" brushRef="#br0" timeOffset="-86981.35">19226 16404 0,'-17'-17'31,"-1"-1"0,18 0-15,0 1-1,-18-1 1,18 0 0,-17-17-1,17 17 1,0 1 15,17 34-15,-17 19-1,18 70 1,0 88 15,-18 0-15,17-106-16,-17 18 0,0-1 15,36 195 1,-36-229-16,17 88 16,36 158-1,-35-246 1,-18-36-16,0 0 0,0 36 16,0-54-16</inkml:trace>
+  <inkml:trace contextRef="#ctx0" brushRef="#br0" timeOffset="-85464.52">21749 16334 0,'-18'-18'31,"18"0"-16,0 1 17,-18-1 15,18 0 15,18 1-31,0 34-15,17 107 15,-17 35-15,-1 17-1,1-88-15,0 18 0,-1 18 16,1-19-16,17 125 16,18 122-1,-35-281-15,-18 0 0,17 34 16,1 107 0,-18-177-16,18 36 15,-18-53-15</inkml:trace>
+  <inkml:trace contextRef="#ctx0" brushRef="#br0" timeOffset="-80311.95">18168 16016 0,'-18'-18'15,"1"1"1,-1 17-16,0-18 15,-17 18 1,0 18 0,0-1-1,35 1 1,-18 17 0,36 36-1,-1-53-15,36 17 16,53-18-1,-18-34 1</inkml:trace>
+  <inkml:trace contextRef="#ctx0" brushRef="#br0" timeOffset="-80128.42">18344 15981 0,'-17'-35'16,"34"70"-16,-52-88 15,35 35-15,18 54 31,35 52-15,-18-35 0,0 35 15,-17-71-31</inkml:trace>
+  <inkml:trace contextRef="#ctx0" brushRef="#br0" timeOffset="-79609.78">19738 16034 0,'18'-18'31,"-18"0"-15,-36 1 0,-17 17-1,0 17 1,18 1-16,18 0 15,-1-1-15,0 54 16,36-1 0,0-52-1,34 17 1,-16-17-16,-1-18 16,106-18-16</inkml:trace>
+  <inkml:trace contextRef="#ctx0" brushRef="#br0" timeOffset="-79327.02">19914 16069 0,'0'0'0,"-53"0"15,36 0-15,-19-18 16,54 18 0,17-17-1,-17 17-15,53 0 16,-36 0-1,0 17-15,-17 36 16,-36-35 0,0 17-16,-52 18 31,52-35-31,1 17 16,52-17-1,0-18-15,0 0 16,195-36-1</inkml:trace>
+  <inkml:trace contextRef="#ctx0" brushRef="#br0" timeOffset="-78875.74">21837 15875 0,'18'-35'16,"-36"70"-16,53-88 15,-35 35-15,-17 1 16,-36 34 0,-18 54-1,18-18 1,36-35-16,17 34 15,52 19 1,-16-53 0,52-1-1,-35-17-15,0 0 0,17-17 16</inkml:trace>
+  <inkml:trace contextRef="#ctx0" brushRef="#br0" timeOffset="-78478.74">22243 15875 0,'0'0'0,"-36"-18"15,1 1 1,53-1 0,-1 18-1,36-18 1,-17 36-1,-36 17 1,0-17 0,-53 35 15,17-35-15,36-1-16,36 1 31,87-1-16,-52-17 1,-18 36 0,-71 17-1,-53-18 1,18-17-16,-70 34 16,52-52-16</inkml:trace>
+  <inkml:trace contextRef="#ctx0" brushRef="#br0" timeOffset="-77827.8">25082 15628 0,'0'0'0,"0"-18"0,0-52 32,-17 105-1,17 36-15,0 70-1,17-88-15,-17-18 16,18 36-1</inkml:trace>
+  <inkml:trace contextRef="#ctx0" brushRef="#br0" timeOffset="-77495.54">25047 15769 0,'0'-17'31,"0"34"-31,88-70 15,1 36 1,-1-1 0,-53 0-1,0 1 1,-35-36 0,0 35-16,-17-35 15,-1 36 1,18-1-1,0 71 1,0 70 0,18-17-1,-18 18 1,17-107-16,-17 19 16</inkml:trace>
+  <inkml:trace contextRef="#ctx0" brushRef="#br0" timeOffset="-76995.07">25753 15452 0,'0'0'0,"0"-18"16,-18 0-1,18 36 1,0 17 15,0 36-15,0-36-16,0-17 0,-18 17 16,-17 71-1,18-36 1,17-34-1,35-19 1,35-17 0,-34 0-16,52 0 15,53-17 1,-88 17 0</inkml:trace>
+  <inkml:trace contextRef="#ctx0" brushRef="#br0" timeOffset="-76122.42">27358 15610 0,'0'0'0,"18"0"0,-18-35 15,0 0 1,-18 17 0,0 18-16,1-17 0,-54 17 31,36 0-31,0 17 0,-18 1 0,35-1 15,-17 19-15,17-1 16,0 0-16,18-17 16,18 88-1,17-71-15,36 0 16,70-17 0,-70-18-16</inkml:trace>
+  <inkml:trace contextRef="#ctx0" brushRef="#br0" timeOffset="-75912.2">27640 15540 0,'0'0'0,"-18"-35"15,18 17-15,0 36 32,0 52-17,0 18 1,0 18-1,0-53 1,-17 0-16,17 35 16</inkml:trace>
+  <inkml:trace contextRef="#ctx0" brushRef="#br0" timeOffset="-75473.62">27411 16104 0,'0'0'0,"-18"0"0,18-17 16,-17 17 0,17 17-1,-18 19 1,18-1-1,-18 53 1,18-53-16,18 1 0,0-19 16,-1 1-16,36 17 15,106-17 1,-53-18 0,35-35-1,-106 17-15</inkml:trace>
+  <inkml:trace contextRef="#ctx0" brushRef="#br0" timeOffset="-75127.08">28240 16281 0,'0'-18'16,"-18"0"0,1 18-16,-1-17 15,0 17-15,1-18 16,-19 18-16,-34 18 16,35-18-1,17 17-15,0 1 0,1 17 16,-1 18-1,36-17 1,35-1 0,35 0-1,-53-35-15,53 0 16,0 0-16</inkml:trace>
+  <inkml:trace contextRef="#ctx0" brushRef="#br0" timeOffset="-74822.81">28434 16245 0,'-18'0'0,"36"0"0,-71-17 15,106 17 17,35 0-17,-35 35 1,-18 0-1,-52 36 1,-36-18 15,35-36-31,18 1 16,0 17 0,18-35-1,17 0-15,0 0 0,71 0 16,18-17-1</inkml:trace>
+  <inkml:trace contextRef="#ctx0" brushRef="#br0" timeOffset="-74309.63">28169 16669 0,'0'0'15,"18"0"-15,0 53 78,-18 123-46,17-123-17,1 18 1,-1-54-16,54 1 16,-18-1-16,-18-17 15,18 0-15,71-17 16,-1-18-1,-88 17-15</inkml:trace>
+  <inkml:trace contextRef="#ctx0" brushRef="#br0" timeOffset="-73989.86">29210 16969 0,'0'0'0,"-35"-18"16,17 0-16,18 1 16,-18 17-16,1-18 0,-1 18 15,1 0-15,-36 0 16,-18 18-1,18 17 1,18 36 0,52-1-1,89-17 17,-70-35-32,69-18 0</inkml:trace>
+  <inkml:trace contextRef="#ctx0" brushRef="#br0" timeOffset="-73626.49">29316 16880 0,'-18'-17'0,"36"34"0,-53-34 16,35-1-1,52 18 1,-16 0-1,-19 0-15,54 18 16,-18 17 0,-36 0-1,1 1 1,0-19 0,35 19 15,-18-1-31,-17-35 15,-1 17-15,19 19 32,-125-1-17,36-35-15,-105-18 16,69 18-16</inkml:trace>
+  <inkml:trace contextRef="#ctx0" brushRef="#br0" timeOffset="-59152.1">14764 16281 0,'0'0'0,"-18"0"0,-17 0 31,35-18-31,17 18 0,1 0 16,176 18-1,106-18 17,-18-18-17,-123 18-15,0 0 0,-1 0 16,266 18-1,-336-1-15,35 1 16,-87 17 0,-89-35-1,18 18-15</inkml:trace>
+  <inkml:trace contextRef="#ctx0" brushRef="#br0" timeOffset="-58668.23">14693 16228 0,'0'0'15,"0"-36"1,0 54 0,0 0-16,0 35 15,-17 123 16,-1 0-31,-53 301 32,54-354-32,-1-17 15,-17 0-15,-36 335 32,71-406-32,0 18 15,0-35-15,0-1 0,18 19 16,0-19-1,-1-34-15,36-36 16,-35 35-16</inkml:trace>
+  <inkml:trace contextRef="#ctx0" brushRef="#br0" timeOffset="-58168.16">14446 17057 0,'-35'0'0,"-36"-18"16,71 1-1,36 17 1,87 0-16,248-18 31,-213 18-31,19-18 0,405 18 32,-406 0-32,142 18 15,-36 0 1,-212-1-1,-70-17 1,-35 0-16,-53-17 16</inkml:trace>
+  <inkml:trace contextRef="#ctx0" brushRef="#br0" timeOffset="-57820.84">15240 16510 0,'0'-53'32,"0"106"-32,18-53 47,-1 159-32,-17-53 1,0-71-1</inkml:trace>
+  <inkml:trace contextRef="#ctx0" brushRef="#br0" timeOffset="-57604.29">15487 16457 0,'0'0'15,"0"-18"-15,0 36 32,0 35-17,0-18-15,18 18 16,17 35 0,-18-52-16</inkml:trace>
+  <inkml:trace contextRef="#ctx0" brushRef="#br0" timeOffset="-57337.65">15469 16492 0,'0'-17'15,"0"34"-15,-17-87 16,34 52-1,1 18-15,35 18 16,106 35 0,-1 35-1,-87 0 1,-124-17 0,-141 34-1,106-87 1,-89 17-16</inkml:trace>
+  <inkml:trace contextRef="#ctx0" brushRef="#br0" timeOffset="-56820.75">15328 17163 0,'0'0'0,"0"-18"16,0 0-16,-17 18 15,-19-35 1,19 35-1,-1 0-15,-53 53 16,19 0 0,16-35-16,19 52 15,17 36 1,88-53 0,53-36-1,-53-34 1,-53-1-1</inkml:trace>
+  <inkml:trace contextRef="#ctx0" brushRef="#br0" timeOffset="-56600.85">15064 17286 0,'-18'0'15,"36"0"-15,-18 0 16,105-18 0,-69 18-1,17 0-15,70-17 16,-88 17-16,1 0 16,-1 0-1</inkml:trace>
+  <inkml:trace contextRef="#ctx0" brushRef="#br0" timeOffset="-56219.23">15575 17163 0,'-18'0'46,"1"70"-30,17 1 0,0-1-1,0-34-15,35 16 16,18 1 0,18-35-1,17-53 1,-35-18-1,0-53 17,-53 71-32,17-36 0,-17 36 15,-17-18 1,17 35-16,-18 18 16,0 53-1,1-35-15</inkml:trace>
+  <inkml:trace contextRef="#ctx0" brushRef="#br0" timeOffset="-55153.91">17180 17392 0,'0'0'0,"0"-18"0,0 1 16,0-1 0,0 0 15,-35 18-16,-18 18 1,0 17 15,36-35-31,-19 36 16,19-19-16,17 18 16,-18-17-16,18 53 15,0 17 1,18-70-16,35 17 15,17-18 1,-35-17-16,18 0 0,-17-17 16,52-18-1</inkml:trace>
+  <inkml:trace contextRef="#ctx0" brushRef="#br0" timeOffset="-54701.91">17427 17445 0,'0'0'0,"0"-18"16,-17 18 0,-1 35 15,18-17-15,0 53-1,18-18 1,-1-36-1,18 1 1,-17-18 0,0 0-1,-1-35 1,1 35-16,-18-18 16,18 0-1,-18 1 1,-18 17-16</inkml:trace>
+  <inkml:trace contextRef="#ctx0" brushRef="#br0" timeOffset="-52963.55">15275 17833 0,'0'-18'16,"0"1"-1,0 70 48,-17 17-48,17-52-15,-18 17 16,18 53 0,-18 0-1,1 1 1,17-72-1,0 36 1,0-35 0,0-1-16,0 1 15,0-36 1,17 1 0,-17-18-1,0-18 1</inkml:trace>
+  <inkml:trace contextRef="#ctx0" brushRef="#br0" timeOffset="-52117.87">15487 17851 0,'0'0'0,"18"35"62,-18-18-62,0 1 0,-18 123 32,18-106-32,0-17 0,0 17 15,0 18 1,0-35 15,0-36-15,0 1-1,18-1-15,-18 0 0,0 1 16,0-1-16,17 0 16,-17 1-1</inkml:trace>
+  <inkml:trace contextRef="#ctx0" brushRef="#br0" timeOffset="-43225.61">15610 15963 0,'18'0'31,"-18"-17"63,-71 17-63,54 17-31,-54 36 31,54-35-31,-1 35 16,0 0 0,18-18-16,0-18 0,18 1 15,35 35 1,-18-53-16,18 0 16,53-18-1</inkml:trace>
+  <inkml:trace contextRef="#ctx0" brushRef="#br0" timeOffset="-42345.37">15875 15981 0,'0'0'15,"0"-18"-15,0 1 47,0 34-31,-18 18 0,1 36-1,17-53-15,0 35 16,0-18-1,0-18-15,0 19 16,17-54 31,-17-35-31,18 36-1,-18-19 1,0-17-1,0 36-15,0-19 16,-18 89 31,18 0-31,0-17-1,0 16 1,18-69 15,0-18-15,-1-1-1,-17-17 1,0 89 15</inkml:trace>
+  <inkml:trace contextRef="#ctx0" brushRef="#br0" timeOffset="-39664.07">18627 16051 0,'35'0'125,"35"0"-110,-17-17 1,-17 17 0,-19 0-1,-52 17 16,0-17-15,17 18-16,0-18 16</inkml:trace>
+  <inkml:trace contextRef="#ctx0" brushRef="#br0" timeOffset="-39380.57">18997 15928 0,'-18'0'0,"36"0"0,-53 0 31,52 0 0,-17 18-31,18-1 0,0 18 16,-18 18-1,0 18 17,0-53-32,0-1 0,0 1 0,0-1 15</inkml:trace>
+  <inkml:trace contextRef="#ctx0" brushRef="#br0" timeOffset="-39164.78">18962 16087 0,'0'0'0,"-18"-36"15,18 19-15,0-19 16,18-34 0,17 52-16,18-17 15,53 17 1,-36 89 0,-52-1-1,-18-34-15,-53 34 16,-123 18-1,-71-35 1</inkml:trace>
+  <inkml:trace contextRef="#ctx0" brushRef="#br0" timeOffset="-34027.85">28205 15293 0,'-36'35'79,"-17"18"-64,18-35-15,-18 52 16,0 18-1,53-52-15,0 34 16,71 19 0,-36-72-16,0 1 15</inkml:trace>
+  <inkml:trace contextRef="#ctx0" brushRef="#br0" timeOffset="-33478.73">28452 15557 0,'0'0'0,"17"-17"32,-17-1-17,0-17 16,-53 17-15,18 18-16,0 0 16,-18 18-1,35 0-15,-17 17 16,17 18 0,18-36-1,35 1-15,36 17 16,-53-35-1,17 0-15,-17 0 16,17-35 0,-17 17-16,-1-35 15,1-52 1,-18 34 0,0-17-1,0 70-15,0 1 16,17 17-16,-17 35 15,0 35 1,18 19 0,-18 16-1,0-69-15,0 17 16,0-36-16,18 1 16</inkml:trace>
+  <inkml:trace contextRef="#ctx0" brushRef="#br0" timeOffset="-33128.02">28681 15540 0,'0'0'15,"17"-18"1,54 1 31,-53-1-32,70 0 1,-35 1 0,-36-1-1,-34-17 1,-1 17 0,-17 0-16,0 18 0,-18 0 15,-53 36 1,53 34-1,53-34 1,0-1 0,18 0-1,52 18 1,-35-53-16,18 0 0</inkml:trace>
+  <inkml:trace contextRef="#ctx0" brushRef="#br0" timeOffset="-32774.89">29192 15381 0,'0'-18'0,"0"36"0,0-53 16,0 17-1,-35 18 1,17 0-16,-17-17 16,-18 34-1,18 1 1,35 35-1,0-36 1,35 19-16,36 17 31,17-18-15,-70 0 0,-18 0-1,-89-17 1,54-18-16,-53 18 15,-18-36 1,71 18-16,17-18 16,18 1-16,0-1 15</inkml:trace>
+  <inkml:trace contextRef="#ctx0" brushRef="#br0" timeOffset="-32444.77">29563 15416 0,'0'0'0,"0"-17"16,17-1 15,-34 36-15,-1-1-1,-52 1 1,52 0-16,0-18 0,18 17 16,0 19-1,53-1 1,0-18 0,-18 1-16,1-18 15,-1 0 1,-17-18-1</inkml:trace>
+  <inkml:trace contextRef="#ctx0" brushRef="#br0" timeOffset="-31590.95">29810 15434 0,'-18'0'16,"71"18"62,35-18-62,-53 0-16,18 0 15,18 0 1,-53 0-1</inkml:trace>
+  <inkml:trace contextRef="#ctx0" brushRef="#br0" timeOffset="-30859.76">30639 15363 0,'17'0'0,"-34"0"0,52 0 16,-17-17 0,-18-1-1,-18-17 1,-35 35 0,35 0-16,-34 18 15,-37 17 1,72 0-1,-19 0-15,36 1 16,0-1 0,36 35-1,-1-34-15,36-1 16,34-17 0,-52-18-16,-17-18 0</inkml:trace>
+  <inkml:trace contextRef="#ctx0" brushRef="#br0" timeOffset="-30610.87">30903 15363 0,'0'18'62,"0"0"-62,0 88 32,0-18-17,0-53-15,0 18 16,0 18 0,18-71-16</inkml:trace>
+  <inkml:trace contextRef="#ctx0" brushRef="#br0" timeOffset="-30240.68">31150 15452 0,'0'0'15,"-17"0"-15,17 17 47,0 1 0,17 0-31,-17 17-1,0 18 1,0-36-16,0 19 15,0-1 1,0-17 0,-17-1-1,17-34 1,17 17-16</inkml:trace>
+  <inkml:trace contextRef="#ctx0" brushRef="#br0" timeOffset="-29776.94">31115 15469 0,'-18'0'15,"1"-17"17,17-19-17,0 19 1,17-1-16,54 0 15,-18 1 17,53 34-17,-71 1-15,0 17 16,-17 36 0,-36-18-1,-70 0 1,53-36-16,-36 19 15,-17-1 1,53-35-16,17 18 16,0-18-1</inkml:trace>
+  <inkml:trace contextRef="#ctx0" brushRef="#br0" timeOffset="-29402.95">31609 15311 0,'0'0'0,"0"-36"16,18 54 15,70 52-15,-18 72-1,-52 16 17,-36-105-32,-17-17 15,-36-1-15,1 0 0</inkml:trace>
+  <inkml:trace contextRef="#ctx0" brushRef="#br0" timeOffset="-25633.84">17621 15963 0,'0'0'0,"0"-17"15,0-1 1,0 36 15,0 17 0,18-18-31,0 54 16,17 17 0,-18-53-16,-17 18 15,0-17 1,0-19-16</inkml:trace>
+  <inkml:trace contextRef="#ctx0" brushRef="#br0" timeOffset="-25290.79">17586 16245 0,'0'0'0,"0"-17"15,-18 17 1,18-18-16,36 36 31,17 17 0,17-17-15,-17-18 0,-35 0-1,-1-18 1,-17 0-16,18 1 16,-18-19-1,18 19 1,-36 34-1,0 1 1,-17 17-16,-53 36 16</inkml:trace>
+  <inkml:trace contextRef="#ctx0" brushRef="#br0" timeOffset="1868.56">11148 15998 0,'0'0'0,"-36"18"78,-16 0-63,34-18-15,0 0 16,-88 53 0,71-18-1,18 0 1,17-17-16,17-18 16,18 17-16,18-17 15,71 0 1,-54 18-1,-70 17 1,-53 1 0,-88-1-1,88-17 1,-52-1-16</inkml:trace>
+  <inkml:trace contextRef="#ctx0" brushRef="#br0" timeOffset="3802.31">10601 16722 0,'0'-18'47,"-18"0"-32,1 18 1,-54 0 0,53 0-1,-34 18-15,-1 0 16,35-1 15,18 1-31,0 0 0,0-1 16,35 54-1,-17-54-15,17 36 16,0 36 0,-17-72-16,-18 1 15,35 35 1,-35-36-16,18 19 16,0-19-1,-1-17 1,19-17-1</inkml:trace>
+  <inkml:trace contextRef="#ctx0" brushRef="#br0" timeOffset="4024.33">10495 16969 0,'-18'17'0,"36"-34"0,-71 34 15,36 1 1,34-18 0,54 0-1,-54-18-15,54 1 16,52-19 15,-105 19-31,17-1 0</inkml:trace>
+  <inkml:trace contextRef="#ctx0" brushRef="#br0" timeOffset="4435.65">10742 16810 0,'18'-53'47,"-36"106"-47,36-88 31,-1 70-15,-17-18-16,0 1 15,36 106 1,-19-71 0,1 17-1,0-52-15,17-36 31,0-17-15,-35 0-16,18-36 16,-18-53-1,0 36 17,-18 53-17,0 35 1,18 18-1</inkml:trace>
+  <inkml:trace contextRef="#ctx0" brushRef="#br0" timeOffset="4848.22">11130 16827 0,'0'18'31,"0"-36"-31,18 36 47,-1-36-31,1 18-16,0 0 0,17-17 31,-17 17-31,-1 0 0</inkml:trace>
+  <inkml:trace contextRef="#ctx0" brushRef="#br0" timeOffset="6336.83">11483 16651 0,'18'0'16,"-1"-18"-1,-17 1 1,18-1 0,-36 36 46,-17 105-31,88 1 1,0-107-17,-18-17 1,0-17-1,-17-36 1,-18 0 0,0 0-1,0 18 1,18 52 0,-1 54-1,18-18 1,-35-18-16,18 36 15,0-1 1,-18-34 0</inkml:trace>
+  <inkml:trace contextRef="#ctx0" brushRef="#br0" timeOffset="7037.52">11501 16669 0,'0'-18'16,"0"36"-16,0-54 15,0 54 32,35 70-31,0-17-1,0-1 1,1 36 0,-19-53-1,-34-18 1,-1-52-1,-17-36 17,17 18-32,0-36 15,1 18-15,17 18 0,-18-18 16,18-35 0,35 52-1,71 54 1,-35 17-1,17 36 1,-70-36-16,-1 0 16,19 54-1,-36-54-15,-36 0 16,-70-17 0,-35-18-1,71-53 1</inkml:trace>
+  <inkml:trace contextRef="#ctx0" brushRef="#br0" timeOffset="7337.98">11959 16651 0,'18'0'0,"-36"0"0,36-18 15,-18 1-15,0-1 32,-18 36-17,1-1-15,17 19 16,-18 52 0,36-35-1,-1-18-15,18 18 16,36 0 15,0-53-31,-54 0 16,18-18-16</inkml:trace>
+  <inkml:trace contextRef="#ctx0" brushRef="#br0" timeOffset="7546.75">11977 16739 0,'35'18'31,"-35"-36"-31,124 1 47,-1-1-16</inkml:trace>
+  <inkml:trace contextRef="#ctx0" brushRef="#br0" timeOffset="8022.93">12418 16739 0,'0'18'16,"0"-36"-1,17 36-15,36-36 47,18 1-31,-36 17-16,0 0 15,1-18 1,-19 18-16,-34 0 63,-1 0-63,0 0 0</inkml:trace>
+  <inkml:trace contextRef="#ctx0" brushRef="#br0" timeOffset="9339.67">12982 16528 0,'0'0'0,"-17"-18"31,34 53 1,1 36-17,-1-1 1,1 36-1,-18-71 1,-53-87 31,-17-142-16,70 70 0,105 89 1,-69 52-32,-19-17 15,54 36 1,-53-19-16,-18 1 16,-18 53-1,-17-54 1,17 1-1,18-1 1,35-17 0,36 36-1,-36-36 1,0 17-16,1-17 0,-1 36 16,-17-1-1,-71-17 1,-53-1-1,53-17 1,-35-17-16,35-1 16</inkml:trace>
+  <inkml:trace contextRef="#ctx0" brushRef="#br0" timeOffset="9623.28">13317 16439 0,'124'-35'47,"-248"70"-47,301-52 16,-142 87 0,-35-17-1,0 0-15,0 18 16,18 17 15,-1-70-31,71-1 16,-35-34-16,89-36 31,-90 35-31</inkml:trace>
+  <inkml:trace contextRef="#ctx0" brushRef="#br0" timeOffset="11832.39">11271 16669 0,'0'-18'15,"0"0"16,0 1 1,-88 17-1,17 35-15,36 0-16,-18 36 15,36-18 1,-1-18-16,18 18 0,0 35 15,88 0 1,0-52 0,71-36-1,-124-18 1,36-17-16,-36 0 16,-35-1-16,-35-123 15,0 124 1,-124-88 15,71 105-15,70 18-16</inkml:trace>
+  <inkml:trace contextRef="#ctx0" brushRef="#br0" timeOffset="12644.63">12330 16510 0,'0'-18'31,"-18"18"-15,-17 18-1,-18 35 1,53-35-16,-18 17 16,18 71-1,18-71-15,35 18 16,88 17 0,-88-52-1,70-18-15,-35-18 16,1-52-1,-72 35 1,-17-36 0,-88-88-1,53 124-15,-106-18 32,-1 71-17,90 17-15</inkml:trace>
+  <inkml:trace contextRef="#ctx0" brushRef="#br0" timeOffset="16965.58">11236 16633 0,'0'0'32,"0"18"-17,18 17-15,-1 54 16,19 140 0,-19-123-16,18 123 15,36 194 1,-53-334-16,-1-1 0,1-18 0,17 36 15,-17-53-15,17 35 16,-17 18 0</inkml:trace>
+  <inkml:trace contextRef="#ctx0" brushRef="#br0" timeOffset="17593.37">12471 16545 0,'17'18'32,"1"0"-17,35 70 1,-35-18-16,34 160 16,-34 87-1,0-211 1,-1 194-1,-17 17 1,0-264-16,18 53 16,-18-88-16</inkml:trace>
+  <inkml:trace contextRef="#ctx0" brushRef="#br0" timeOffset="20283.53">10266 17462 0,'-18'0'16,"1"0"-1,52 0 48,0 0-63,0 0 0,248-52 15,299-54 1,-318 70 0,336-69-1,-283 52-15,1 0 0,476-71 16,-371 54 15,-352 52-31,-36 0 16,-17 18-16,-36 0 0</inkml:trace>
+  <inkml:trace contextRef="#ctx0" brushRef="#br0" timeOffset="20864.5">11236 17427 0,'-35'-17'31,"17"17"-31,71 17 0,-229 1 31,105-1-31,-17 19 0,-18-1 16,-494 177-1,283-106-15,158-54 16,-229 90 0,212-72-1,105-35-15,-17-17 16,53-18-16</inkml:trace>
+  <inkml:trace contextRef="#ctx0" brushRef="#br0" timeOffset="21279.59">9102 18062 0,'0'-17'0,"0"34"0,0-52 16,0 17 0,17 1-16,-52 52 46,-194 124-14,88-53-1,211-89-15,1-17-16,17 0 0</inkml:trace>
 </inkml:ink>
 </file>
 
@@ -6217,14 +6274,14 @@
           <inkml:channelProperty channel="F" name="resolution" value="0" units="1/dev"/>
         </inkml:channelProperties>
       </inkml:inkSource>
-      <inkml:timestamp xml:id="ts0" timeString="2023-05-24T04:48:32.114"/>
+      <inkml:timestamp xml:id="ts0" timeString="2023-05-24T04:48:31.744"/>
     </inkml:context>
     <inkml:brush xml:id="br0">
       <inkml:brushProperty name="width" value="0.05" units="cm"/>
       <inkml:brushProperty name="height" value="0.05" units="cm"/>
     </inkml:brush>
   </inkml:definitions>
-  <inkml:trace contextRef="#ctx0" brushRef="#br0">732 29 24575,'0'-1'0,"0"0"0,-1 0 0,1 0 0,0 0 0,-1 0 0,1 0 0,-1 0 0,1 0 0,-1 0 0,0 0 0,1 0 0,-1 0 0,0 1 0,1-1 0,-1 0 0,0 1 0,0-1 0,0 0 0,0 1 0,0-1 0,1 1 0,-1 0 0,0-1 0,0 1 0,0-1 0,0 1 0,-2 0 0,-32-6 0,31 6 0,-7-2 0,0 2 0,0-1 0,0 1 0,0 1 0,0 0 0,0 1 0,0 0 0,0 0 0,1 1 0,-1 1 0,1-1 0,0 2 0,-1 0 0,2 0 0,-1 0 0,1 1 0,0 1 0,-15 13 0,-36 38 0,3 2 0,3 3 0,2 3 0,-49 80 0,89-127 0,-17 25 0,-30 65 0,53-96 0,0-1 0,1 2 0,1-1 0,0 0 0,1 1 0,0 0 0,1 0 0,1 0 0,0 0 0,1 17 0,1-24 9,0 0 1,1-1-1,0 0 0,0 1 0,0-1 0,1 0 0,-1 0 1,2 0-1,-1 0 0,1-1 0,-1 1 0,9 8 1,-2-5-258,0 1 1,1-2-1,0 1 1,0-2-1,13 7 1,19 10-6579</inkml:trace>
+  <inkml:trace contextRef="#ctx0" brushRef="#br0">12645 7 24575,'0'-1'0,"0"1"0,0 0 0,0-1 0,0 1 0,0 0 0,0 0 0,0-1 0,-1 1 0,1 0 0,0 0 0,0-1 0,0 1 0,0 0 0,0 0 0,-1-1 0,1 1 0,0 0 0,0 0 0,0 0 0,-1-1 0,1 1 0,0 0 0,0 0 0,-1 0 0,1 0 0,0 0 0,0-1 0,-1 1 0,1 0 0,0 0 0,0 0 0,-1 0 0,1 0 0,0 0 0,-1 0 0,1 0 0,0 0 0,0 0 0,-1 0 0,1 0 0,0 0 0,-1 0 0,1 0 0,0 1 0,0-1 0,-1 0 0,-17 7 0,17-7 0,-287 139 0,-125 30-2393,-547 146-1,-460 38-3759,-540 67 4531,162-38-1159,-181 93 2600,14 27 370,1861-476-188,-1437 336 4395,1522-358-4199,-128 19 3466,126-25-2256,21 2-1357,0 0 0,0 0 1,0-1-1,0 1 0,0 0 1,0 0-1,0-1 0,0 1 0,0 0 1,0 0-1,0-1 0,0 1 0,0 0 1,0 0-1,0 0 0,0-1 0,0 1 1,0 0-1,0 0 0,0-1 1,0 1-1,1 0 0,-1 0 0,0 0 1,0-1-1,0 1 0,0 0 0,1 0 1,-1 0-1,0 0 0,0 0 0,0-1 1,1 1-1,-1 0 0,0 0 1,0 0-1,1 0 0,-1 0 0,0 0 1,36-18 1522,232-75 813,-162 60-3218,104-48 0,-174 63-5994</inkml:trace>
 </inkml:ink>
 </file>
 
@@ -6514,14 +6571,14 @@
           <inkml:channelProperty channel="F" name="resolution" value="0" units="1/dev"/>
         </inkml:channelProperties>
       </inkml:inkSource>
-      <inkml:timestamp xml:id="ts0" timeString="2023-05-24T04:48:29.742"/>
+      <inkml:timestamp xml:id="ts0" timeString="2023-05-24T04:48:32.114"/>
     </inkml:context>
     <inkml:brush xml:id="br0">
       <inkml:brushProperty name="width" value="0.05" units="cm"/>
       <inkml:brushProperty name="height" value="0.05" units="cm"/>
     </inkml:brush>
   </inkml:definitions>
-  <inkml:trace contextRef="#ctx0" brushRef="#br0">164 333 24575,'-1'-8'0,"0"0"0,-1 0 0,0 0 0,-6-14 0,0-3 0,8 23 0,-1 0 0,1 0 0,-1-1 0,0 1 0,0 0 0,0 0 0,0 0 0,0 0 0,0 0 0,-3-3 0,4 5 0,0 0 0,-1 0 0,1 0 0,0 0 0,-1-1 0,1 1 0,0 0 0,-1 0 0,1 0 0,0 0 0,-1 0 0,1 0 0,0 0 0,-1 0 0,1 0 0,0 0 0,-1 0 0,1 0 0,0 0 0,-1 0 0,1 0 0,0 0 0,-1 0 0,1 1 0,0-1 0,0 0 0,-1 0 0,1 0 0,0 0 0,-1 1 0,1-1 0,0 0 0,0 0 0,0 1 0,-1-1 0,1 0 0,0 0 0,-1 1 0,-2 5 0,0 0 0,0 1 0,0-1 0,1 1 0,-3 10 0,-27 121 0,-15 152 0,29-164 0,16-112 0,4-14 0,3-25 0,104-558 0,-106 565 0,-1 4 0,1 1 0,0-1 0,0 1 0,2 0 0,-1 0 0,2 0 0,0 1 0,13-22 0,-18 32 0,0 1 0,1-1 0,-1 1 0,0 0 0,0 0 0,1 0 0,-1 0 0,1 0 0,-1 0 0,1 0 0,-1 0 0,1 0 0,0 1 0,-1-1 0,1 1 0,0-1 0,0 1 0,-1 0 0,1-1 0,0 1 0,0 0 0,-1 0 0,1 0 0,0 0 0,0 1 0,-1-1 0,1 0 0,0 1 0,0 0 0,-1-1 0,1 1 0,-1 0 0,1 0 0,0-1 0,-1 1 0,0 0 0,1 1 0,1 0 0,6 6 0,-1 0 0,0 1 0,0-1 0,10 17 0,-17-24 0,130 199 0,-9-13 0,-92-145 0,3-2 0,46 47 0,-74-83 0,-1 1 0,1-1 0,0-1 0,0 1 0,0-1 0,0 0 0,1 0 0,-1 0 0,1-1 0,-1 1 0,1-2 0,6 3 0,-8-4 0,-1 0 0,0 0 0,0 0 0,0 0 0,0-1 0,1 1 0,-1-1 0,0 0 0,0 0 0,0 0 0,0 0 0,0 0 0,-1-1 0,1 1 0,0-1 0,-1 0 0,1 0 0,-1 0 0,1 0 0,-1 0 0,0 0 0,0-1 0,0 1 0,0-1 0,1-3 0,5-6 0,-2-1 0,1 0 0,-2 0 0,0 0 0,0-1 0,-1 0 0,-1 0 0,2-15 0,5-118 0,-10 128 0,-2-362 0,2 378-115,1-7 363,-1 10-270,0 0-1,0 0 0,0 0 1,0 0-1,0 0 0,0 0 0,0 1 1,0-1-1,0 0 0,0 0 1,0 0-1,0 0 0,0 0 1,0 0-1,0 0 0,0 0 0,0 0 1,0 0-1,0 0 0,0 1 1,0-1-1,0 0 0,1 0 0,-1 0 1,0 0-1,0 0 0,0 0 1,0 0-1,0 0 0,0 0 1,0 0-1,0 0 0,0 0 0,0 0 1,1 0-1,-1 0 0,0 0 1,0 0-1,0 0 0,0 0 1,0 0-1,0 0 0,0 0 0,0 0 1,0 0-1,0 0 0,1 0 1,-1 0-1,0 0 0,0 0 1,0 0-1,0 0 0,0-1 0,0 1 1,0 0-1,0 0 0,0 0 1,0 0-1,0 0 0,0 0 1,0 0-1,0 0 0,0 0 0,1 0 1,-1-1-1,5 11-6803</inkml:trace>
+  <inkml:trace contextRef="#ctx0" brushRef="#br0">732 29 24575,'0'-1'0,"0"0"0,-1 0 0,1 0 0,0 0 0,-1 0 0,1 0 0,-1 0 0,1 0 0,-1 0 0,0 0 0,1 0 0,-1 0 0,0 1 0,1-1 0,-1 0 0,0 1 0,0-1 0,0 0 0,0 1 0,0-1 0,1 1 0,-1 0 0,0-1 0,0 1 0,0-1 0,0 1 0,-2 0 0,-32-6 0,31 6 0,-7-2 0,0 2 0,0-1 0,0 1 0,0 1 0,0 0 0,0 1 0,0 0 0,0 0 0,1 1 0,-1 1 0,1-1 0,0 2 0,-1 0 0,2 0 0,-1 0 0,1 1 0,0 1 0,-15 13 0,-36 38 0,3 2 0,3 3 0,2 3 0,-49 80 0,89-127 0,-17 25 0,-30 65 0,53-96 0,0-1 0,1 2 0,1-1 0,0 0 0,1 1 0,0 0 0,1 0 0,1 0 0,0 0 0,1 17 0,1-24 9,0 0 1,1-1-1,0 0 0,0 1 0,0-1 0,1 0 0,-1 0 1,2 0-1,-1 0 0,1-1 0,-1 1 0,9 8 1,-2-5-258,0 1 1,1-2-1,0 1 1,0-2-1,13 7 1,19 10-6579</inkml:trace>
 </inkml:ink>
 </file>
 
@@ -6811,14 +6868,14 @@
           <inkml:channelProperty channel="F" name="resolution" value="0" units="1/dev"/>
         </inkml:channelProperties>
       </inkml:inkSource>
-      <inkml:timestamp xml:id="ts0" timeString="2023-05-24T04:48:30.100"/>
+      <inkml:timestamp xml:id="ts0" timeString="2023-05-24T04:48:29.742"/>
     </inkml:context>
     <inkml:brush xml:id="br0">
       <inkml:brushProperty name="width" value="0.05" units="cm"/>
       <inkml:brushProperty name="height" value="0.05" units="cm"/>
     </inkml:brush>
   </inkml:definitions>
-  <inkml:trace contextRef="#ctx0" brushRef="#br0">4 298 24575,'-1'8'0,"1"0"0,1 1 0,-1-1 0,1 0 0,1 0 0,3 15 0,-3-21 0,-1 0 0,0 1 0,1-1 0,-1 0 0,1 0 0,0 0 0,0 0 0,0 0 0,0 0 0,0 0 0,0-1 0,0 1 0,1-1 0,-1 0 0,0 1 0,1-1 0,-1 0 0,1-1 0,0 1 0,-1 0 0,1-1 0,0 1 0,-1-1 0,5 0 0,6 1 0,0-2 0,0 1 0,-1-2 0,1 0 0,0 0 0,-1-1 0,1-1 0,-1 0 0,0 0 0,0-1 0,0-1 0,-1 0 0,11-8 0,-11 7 0,0-1 0,0 0 0,-1 0 0,0-1 0,-1-1 0,0 1 0,-1-2 0,1 1 0,-2-1 0,0 0 0,0-1 0,8-18 0,-14 24 0,1 1 0,0-1 0,-1 0 0,0 1 0,-1-1 0,1 0 0,-1 0 0,0 0 0,0 1 0,-1-1 0,0 0 0,0 0 0,0 1 0,-1-1 0,0 1 0,-3-8 0,2 6 0,-1 1 0,-1-1 0,1 1 0,-1 0 0,0 0 0,0 0 0,0 1 0,-1 0 0,0 0 0,0 0 0,-10-5 0,9 6 0,0 0 0,-1 0 0,1 1 0,-1-1 0,0 2 0,0-1 0,0 1 0,0 1 0,0-1 0,0 1 0,-1 1 0,1-1 0,0 1 0,0 1 0,-1 0 0,1 0 0,0 0 0,0 1 0,0 1 0,0-1 0,0 1 0,1 0 0,-12 7 0,11-4 0,0 0 0,1 1 0,0-1 0,0 2 0,0-1 0,1 1 0,0 0 0,1 0 0,0 0 0,0 1 0,1 0 0,0 0 0,-5 15 0,6-11 0,0 0 0,0 1 0,2 0 0,0 0 0,0 0 0,1-1 0,1 1 0,0 0 0,4 16 0,-2-13 0,2-2 0,0 1 0,0 0 0,2-1 0,0 0 0,0 0 0,17 22 0,-17-27 0,0-1 0,2 1 0,-1-1 0,1-1 0,0 0 0,1 0 0,0 0 0,0-2 0,0 1 0,16 6 0,-15-9-195,0 0 0,0-1 0,0-1 0,1 0 0,-1 0 0,18-1 0,15-1-6631</inkml:trace>
+  <inkml:trace contextRef="#ctx0" brushRef="#br0">164 333 24575,'-1'-8'0,"0"0"0,-1 0 0,0 0 0,-6-14 0,0-3 0,8 23 0,-1 0 0,1 0 0,-1-1 0,0 1 0,0 0 0,0 0 0,0 0 0,0 0 0,0 0 0,-3-3 0,4 5 0,0 0 0,-1 0 0,1 0 0,0 0 0,-1-1 0,1 1 0,0 0 0,-1 0 0,1 0 0,0 0 0,-1 0 0,1 0 0,0 0 0,-1 0 0,1 0 0,0 0 0,-1 0 0,1 0 0,0 0 0,-1 0 0,1 0 0,0 0 0,-1 0 0,1 1 0,0-1 0,0 0 0,-1 0 0,1 0 0,0 0 0,-1 1 0,1-1 0,0 0 0,0 0 0,0 1 0,-1-1 0,1 0 0,0 0 0,-1 1 0,-2 5 0,0 0 0,0 1 0,0-1 0,1 1 0,-3 10 0,-27 121 0,-15 152 0,29-164 0,16-112 0,4-14 0,3-25 0,104-558 0,-106 565 0,-1 4 0,1 1 0,0-1 0,0 1 0,2 0 0,-1 0 0,2 0 0,0 1 0,13-22 0,-18 32 0,0 1 0,1-1 0,-1 1 0,0 0 0,0 0 0,1 0 0,-1 0 0,1 0 0,-1 0 0,1 0 0,-1 0 0,1 0 0,0 1 0,-1-1 0,1 1 0,0-1 0,0 1 0,-1 0 0,1-1 0,0 1 0,0 0 0,-1 0 0,1 0 0,0 0 0,0 1 0,-1-1 0,1 0 0,0 1 0,0 0 0,-1-1 0,1 1 0,-1 0 0,1 0 0,0-1 0,-1 1 0,0 0 0,1 1 0,1 0 0,6 6 0,-1 0 0,0 1 0,0-1 0,10 17 0,-17-24 0,130 199 0,-9-13 0,-92-145 0,3-2 0,46 47 0,-74-83 0,-1 1 0,1-1 0,0-1 0,0 1 0,0-1 0,0 0 0,1 0 0,-1 0 0,1-1 0,-1 1 0,1-2 0,6 3 0,-8-4 0,-1 0 0,0 0 0,0 0 0,0 0 0,0-1 0,1 1 0,-1-1 0,0 0 0,0 0 0,0 0 0,0 0 0,0 0 0,-1-1 0,1 1 0,0-1 0,-1 0 0,1 0 0,-1 0 0,1 0 0,-1 0 0,0 0 0,0-1 0,0 1 0,0-1 0,1-3 0,5-6 0,-2-1 0,1 0 0,-2 0 0,0 0 0,0-1 0,-1 0 0,-1 0 0,2-15 0,5-118 0,-10 128 0,-2-362 0,2 378-115,1-7 363,-1 10-270,0 0-1,0 0 0,0 0 1,0 0-1,0 0 0,0 0 0,0 1 1,0-1-1,0 0 0,0 0 1,0 0-1,0 0 0,0 0 1,0 0-1,0 0 0,0 0 0,0 0 1,0 0-1,0 0 0,0 1 1,0-1-1,0 0 0,1 0 0,-1 0 1,0 0-1,0 0 0,0 0 1,0 0-1,0 0 0,0 0 1,0 0-1,0 0 0,0 0 0,0 0 1,1 0-1,-1 0 0,0 0 1,0 0-1,0 0 0,0 0 1,0 0-1,0 0 0,0 0 0,0 0 1,0 0-1,0 0 0,1 0 1,-1 0-1,0 0 0,0 0 1,0 0-1,0 0 0,0-1 0,0 1 1,0 0-1,0 0 0,0 0 1,0 0-1,0 0 0,0 0 1,0 0-1,0 0 0,0 0 0,1 0 1,-1-1-1,5 11-6803</inkml:trace>
 </inkml:ink>
 </file>
 
@@ -7108,14 +7165,14 @@
           <inkml:channelProperty channel="F" name="resolution" value="0" units="1/dev"/>
         </inkml:channelProperties>
       </inkml:inkSource>
-      <inkml:timestamp xml:id="ts0" timeString="2023-05-24T04:48:30.519"/>
+      <inkml:timestamp xml:id="ts0" timeString="2023-05-24T04:48:30.100"/>
     </inkml:context>
     <inkml:brush xml:id="br0">
       <inkml:brushProperty name="width" value="0.05" units="cm"/>
       <inkml:brushProperty name="height" value="0.05" units="cm"/>
     </inkml:brush>
   </inkml:definitions>
-  <inkml:trace contextRef="#ctx0" brushRef="#br0">0 610 24575,'5'-10'0,"-1"0"0,-1 0 0,0 0 0,0-1 0,-1 1 0,1-15 0,2-67 0,-5 58 0,3-94 0,-3 128 0,0 0 0,0-1 0,0 1 0,0 0 0,0-1 0,0 1 0,0 0 0,0-1 0,0 1 0,0 0 0,0-1 0,0 1 0,0 0 0,0-1 0,0 1 0,0 0 0,1-1 0,-1 1 0,0 0 0,0-1 0,0 1 0,1 0 0,-1 0 0,0-1 0,0 1 0,1 0 0,-1 0 0,0-1 0,0 1 0,1 0 0,-1 0 0,1 0 0,7 8 0,11 30 0,-15-29 0,15 28 0,38 57 0,-46-78 0,1-1 0,0-1 0,1 0 0,0-1 0,1 0 0,17 11 0,-28-21 0,0-1 0,0-1 0,-1 1 0,2 0 0,-1-1 0,0 0 0,0 1 0,0-1 0,0 0 0,1-1 0,-1 1 0,1-1 0,-1 1 0,0-1 0,1 0 0,-1 0 0,1 0 0,-1-1 0,0 1 0,1-1 0,-1 0 0,0 0 0,5-2 0,-2 0 0,-1-1 0,0 0 0,0 0 0,0 0 0,0 0 0,-1-1 0,0 0 0,0 0 0,0 0 0,0 0 0,5-11 0,1-6 0,-1 0 0,-1-1 0,10-42 0,-11 36 0,17-43 0,-23 70 0,-1 1 0,1 0 0,-1-1 0,1 1 0,0 0 0,-1-1 0,1 1 0,0 0 0,0 0 0,0 0 0,0 0 0,0-1 0,1 2 0,-1-1 0,0 0 0,0 0 0,1 0 0,1-1 0,-2 2 0,0 0 0,1 0 0,-1 0 0,0 0 0,0 0 0,0 0 0,0 0 0,1 1 0,-1-1 0,0 0 0,0 1 0,0-1 0,0 0 0,0 1 0,0 0 0,0-1 0,0 1 0,2 1 0,3 4 0,1 0 0,-1 0 0,-1 1 0,11 15 0,-12-16 0,9 12 0,4 9 0,2-1 0,1-1 0,2-1 0,30 29 0,-46-48 0,0 0 0,1 0 0,0-1 0,-1 1 0,1-2 0,1 1 0,-1-1 0,0 0 0,1 0 0,0-1 0,-1 0 0,1 0 0,0-1 0,0 0 0,0-1 0,0 0 0,0 0 0,0 0 0,0-1 0,0 0 0,0-1 0,15-4 0,-14 2 0,0 0 0,0-1 0,0 0 0,0 0 0,-1-1 0,0 0 0,0-1 0,0 0 0,-1 0 0,0 0 0,9-14 0,-7 8 0,-1 1 0,-1-2 0,0 1 0,-1-1 0,0 0 0,-1 0 0,6-26 0,-9 26 0,0 0 0,0 0 0,-1 0 0,-1 0 0,0 0 0,-1 0 0,-1-1 0,-4-16 0,4 22 0,0 0 0,-2 1 0,1-1 0,-1 0 0,0 1 0,0 0 0,-1 0 0,-1 0 0,1 1 0,-1 0 0,0 0 0,-13-11 0,12 13-91,1 0 0,-1 1 0,0 0 0,0 0 0,0 1 0,0 0 0,0 0 0,-1 1 0,1 0 0,-1 0 0,0 1 0,0 0 0,1 0 0,-13 1 0,-16 3-6735</inkml:trace>
+  <inkml:trace contextRef="#ctx0" brushRef="#br0">4 298 24575,'-1'8'0,"1"0"0,1 1 0,-1-1 0,1 0 0,1 0 0,3 15 0,-3-21 0,-1 0 0,0 1 0,1-1 0,-1 0 0,1 0 0,0 0 0,0 0 0,0 0 0,0 0 0,0 0 0,0-1 0,0 1 0,1-1 0,-1 0 0,0 1 0,1-1 0,-1 0 0,1-1 0,0 1 0,-1 0 0,1-1 0,0 1 0,-1-1 0,5 0 0,6 1 0,0-2 0,0 1 0,-1-2 0,1 0 0,0 0 0,-1-1 0,1-1 0,-1 0 0,0 0 0,0-1 0,0-1 0,-1 0 0,11-8 0,-11 7 0,0-1 0,0 0 0,-1 0 0,0-1 0,-1-1 0,0 1 0,-1-2 0,1 1 0,-2-1 0,0 0 0,0-1 0,8-18 0,-14 24 0,1 1 0,0-1 0,-1 0 0,0 1 0,-1-1 0,1 0 0,-1 0 0,0 0 0,0 1 0,-1-1 0,0 0 0,0 0 0,0 1 0,-1-1 0,0 1 0,-3-8 0,2 6 0,-1 1 0,-1-1 0,1 1 0,-1 0 0,0 0 0,0 0 0,0 1 0,-1 0 0,0 0 0,0 0 0,-10-5 0,9 6 0,0 0 0,-1 0 0,1 1 0,-1-1 0,0 2 0,0-1 0,0 1 0,0 1 0,0-1 0,0 1 0,-1 1 0,1-1 0,0 1 0,0 1 0,-1 0 0,1 0 0,0 0 0,0 1 0,0 1 0,0-1 0,0 1 0,1 0 0,-12 7 0,11-4 0,0 0 0,1 1 0,0-1 0,0 2 0,0-1 0,1 1 0,0 0 0,1 0 0,0 0 0,0 1 0,1 0 0,0 0 0,-5 15 0,6-11 0,0 0 0,0 1 0,2 0 0,0 0 0,0 0 0,1-1 0,1 1 0,0 0 0,4 16 0,-2-13 0,2-2 0,0 1 0,0 0 0,2-1 0,0 0 0,0 0 0,17 22 0,-17-27 0,0-1 0,2 1 0,-1-1 0,1-1 0,0 0 0,1 0 0,0 0 0,0-2 0,0 1 0,16 6 0,-15-9-195,0 0 0,0-1 0,0-1 0,1 0 0,-1 0 0,18-1 0,15-1-6631</inkml:trace>
 </inkml:ink>
 </file>
 
@@ -7405,14 +7462,14 @@
           <inkml:channelProperty channel="F" name="resolution" value="0" units="1/dev"/>
         </inkml:channelProperties>
       </inkml:inkSource>
-      <inkml:timestamp xml:id="ts0" timeString="2023-05-24T04:48:33.324"/>
+      <inkml:timestamp xml:id="ts0" timeString="2023-05-24T04:48:30.519"/>
     </inkml:context>
     <inkml:brush xml:id="br0">
       <inkml:brushProperty name="width" value="0.05" units="cm"/>
       <inkml:brushProperty name="height" value="0.05" units="cm"/>
     </inkml:brush>
   </inkml:definitions>
-  <inkml:trace contextRef="#ctx0" brushRef="#br0">134 263 24575,'1'-1'0,"-1"-1"0,0 0 0,0 1 0,-1-1 0,1 0 0,0 1 0,0-1 0,-1 0 0,1 1 0,-1-1 0,0 1 0,1-1 0,-1 1 0,0-1 0,0 1 0,0-1 0,0 1 0,0 0 0,0 0 0,0-1 0,-1 1 0,1 0 0,0 0 0,-1 0 0,-1-1 0,2 2 0,-1 0 0,1 0 0,0-1 0,-1 1 0,1 0 0,0 0 0,-1 1 0,1-1 0,0 0 0,-1 0 0,1 1 0,0-1 0,0 1 0,-1-1 0,1 1 0,0-1 0,0 1 0,0 0 0,0 0 0,0-1 0,0 1 0,0 0 0,0 0 0,0 0 0,0 0 0,0 0 0,0 0 0,1 0 0,-1 1 0,0-1 0,1 0 0,-1 2 0,-7 15 0,0 0 0,2 0 0,0 1 0,1 0 0,-4 35 0,-2 102 0,8-91 0,-7 33 0,-2 27 0,15-120 0,2-14 0,6-17 0,59-187 0,64-165 0,-124 353 0,1 0 0,2 1 0,0 0 0,30-38 0,-38 56 0,0 1 0,0 0 0,0 1 0,0-1 0,1 1 0,0 0 0,0 0 0,0 1 0,0 0 0,9-4 0,-10 6 0,-1 0 0,1 0 0,1 0 0,-1 1 0,0-1 0,0 1 0,0 0 0,0 1 0,0-1 0,0 1 0,0 0 0,0 0 0,0 1 0,0 0 0,8 3 0,1 3 0,0 1 0,-1 0 0,0 1 0,0 0 0,-1 1 0,-1 0 0,0 1 0,0 0 0,14 24 0,5 10 0,34 74 0,14 57 120,-69-151-417,-1 1 0,-1-1 0,-1 1 0,4 53 0,-10-33-6529</inkml:trace>
+  <inkml:trace contextRef="#ctx0" brushRef="#br0">0 610 24575,'5'-10'0,"-1"0"0,-1 0 0,0 0 0,0-1 0,-1 1 0,1-15 0,2-67 0,-5 58 0,3-94 0,-3 128 0,0 0 0,0-1 0,0 1 0,0 0 0,0-1 0,0 1 0,0 0 0,0-1 0,0 1 0,0 0 0,0-1 0,0 1 0,0 0 0,0-1 0,0 1 0,0 0 0,1-1 0,-1 1 0,0 0 0,0-1 0,0 1 0,1 0 0,-1 0 0,0-1 0,0 1 0,1 0 0,-1 0 0,0-1 0,0 1 0,1 0 0,-1 0 0,1 0 0,7 8 0,11 30 0,-15-29 0,15 28 0,38 57 0,-46-78 0,1-1 0,0-1 0,1 0 0,0-1 0,1 0 0,17 11 0,-28-21 0,0-1 0,0-1 0,-1 1 0,2 0 0,-1-1 0,0 0 0,0 1 0,0-1 0,0 0 0,1-1 0,-1 1 0,1-1 0,-1 1 0,0-1 0,1 0 0,-1 0 0,1 0 0,-1-1 0,0 1 0,1-1 0,-1 0 0,0 0 0,5-2 0,-2 0 0,-1-1 0,0 0 0,0 0 0,0 0 0,0 0 0,-1-1 0,0 0 0,0 0 0,0 0 0,0 0 0,5-11 0,1-6 0,-1 0 0,-1-1 0,10-42 0,-11 36 0,17-43 0,-23 70 0,-1 1 0,1 0 0,-1-1 0,1 1 0,0 0 0,-1-1 0,1 1 0,0 0 0,0 0 0,0 0 0,0 0 0,0-1 0,1 2 0,-1-1 0,0 0 0,0 0 0,1 0 0,1-1 0,-2 2 0,0 0 0,1 0 0,-1 0 0,0 0 0,0 0 0,0 0 0,0 0 0,1 1 0,-1-1 0,0 0 0,0 1 0,0-1 0,0 0 0,0 1 0,0 0 0,0-1 0,0 1 0,2 1 0,3 4 0,1 0 0,-1 0 0,-1 1 0,11 15 0,-12-16 0,9 12 0,4 9 0,2-1 0,1-1 0,2-1 0,30 29 0,-46-48 0,0 0 0,1 0 0,0-1 0,-1 1 0,1-2 0,1 1 0,-1-1 0,0 0 0,1 0 0,0-1 0,-1 0 0,1 0 0,0-1 0,0 0 0,0-1 0,0 0 0,0 0 0,0 0 0,0-1 0,0 0 0,0-1 0,15-4 0,-14 2 0,0 0 0,0-1 0,0 0 0,0 0 0,-1-1 0,0 0 0,0-1 0,0 0 0,-1 0 0,0 0 0,9-14 0,-7 8 0,-1 1 0,-1-2 0,0 1 0,-1-1 0,0 0 0,-1 0 0,6-26 0,-9 26 0,0 0 0,0 0 0,-1 0 0,-1 0 0,0 0 0,-1 0 0,-1-1 0,-4-16 0,4 22 0,0 0 0,-2 1 0,1-1 0,-1 0 0,0 1 0,0 0 0,-1 0 0,-1 0 0,1 1 0,-1 0 0,0 0 0,-13-11 0,12 13-91,1 0 0,-1 1 0,0 0 0,0 0 0,0 1 0,0 0 0,0 0 0,-1 1 0,1 0 0,-1 0 0,0 1 0,0 0 0,1 0 0,-13 1 0,-16 3-6735</inkml:trace>
 </inkml:ink>
 </file>
 
@@ -7702,14 +7759,14 @@
           <inkml:channelProperty channel="F" name="resolution" value="0" units="1/dev"/>
         </inkml:channelProperties>
       </inkml:inkSource>
-      <inkml:timestamp xml:id="ts0" timeString="2023-05-24T04:48:33.668"/>
+      <inkml:timestamp xml:id="ts0" timeString="2023-05-24T04:48:33.324"/>
     </inkml:context>
     <inkml:brush xml:id="br0">
       <inkml:brushProperty name="width" value="0.05" units="cm"/>
       <inkml:brushProperty name="height" value="0.05" units="cm"/>
     </inkml:brush>
   </inkml:definitions>
-  <inkml:trace contextRef="#ctx0" brushRef="#br0">67 385 24575,'-9'-9'0,"-8"-13"0,-1-7 0,3-3 0,8-6 0,10-1 0,9 1 0,18 3 0,11 2 0,19 3 0,18 1 0,14 1 0,-9 5-8191</inkml:trace>
+  <inkml:trace contextRef="#ctx0" brushRef="#br0">134 263 24575,'1'-1'0,"-1"-1"0,0 0 0,0 1 0,-1-1 0,1 0 0,0 1 0,0-1 0,-1 0 0,1 1 0,-1-1 0,0 1 0,1-1 0,-1 1 0,0-1 0,0 1 0,0-1 0,0 1 0,0 0 0,0 0 0,0-1 0,-1 1 0,1 0 0,0 0 0,-1 0 0,-1-1 0,2 2 0,-1 0 0,1 0 0,0-1 0,-1 1 0,1 0 0,0 0 0,-1 1 0,1-1 0,0 0 0,-1 0 0,1 1 0,0-1 0,0 1 0,-1-1 0,1 1 0,0-1 0,0 1 0,0 0 0,0 0 0,0-1 0,0 1 0,0 0 0,0 0 0,0 0 0,0 0 0,0 0 0,0 0 0,1 0 0,-1 1 0,0-1 0,1 0 0,-1 2 0,-7 15 0,0 0 0,2 0 0,0 1 0,1 0 0,-4 35 0,-2 102 0,8-91 0,-7 33 0,-2 27 0,15-120 0,2-14 0,6-17 0,59-187 0,64-165 0,-124 353 0,1 0 0,2 1 0,0 0 0,30-38 0,-38 56 0,0 1 0,0 0 0,0 1 0,0-1 0,1 1 0,0 0 0,0 0 0,0 1 0,0 0 0,9-4 0,-10 6 0,-1 0 0,1 0 0,1 0 0,-1 1 0,0-1 0,0 1 0,0 0 0,0 1 0,0-1 0,0 1 0,0 0 0,0 0 0,0 1 0,0 0 0,8 3 0,1 3 0,0 1 0,-1 0 0,0 1 0,0 0 0,-1 1 0,-1 0 0,0 1 0,0 0 0,14 24 0,5 10 0,34 74 0,14 57 120,-69-151-417,-1 1 0,-1-1 0,-1 1 0,4 53 0,-10-33-6529</inkml:trace>
 </inkml:ink>
 </file>
 
@@ -7864,6 +7921,33 @@
           <inkml:channelProperty channel="F" name="resolution" value="0" units="1/dev"/>
         </inkml:channelProperties>
       </inkml:inkSource>
+      <inkml:timestamp xml:id="ts0" timeString="2023-05-24T04:48:33.668"/>
+    </inkml:context>
+    <inkml:brush xml:id="br0">
+      <inkml:brushProperty name="width" value="0.05" units="cm"/>
+      <inkml:brushProperty name="height" value="0.05" units="cm"/>
+    </inkml:brush>
+  </inkml:definitions>
+  <inkml:trace contextRef="#ctx0" brushRef="#br0">67 385 24575,'-9'-9'0,"-8"-13"0,-1-7 0,3-3 0,8-6 0,10-1 0,9 1 0,18 3 0,11 2 0,19 3 0,18 1 0,14 1 0,-9 5-8191</inkml:trace>
+</inkml:ink>
+</file>
+
+<file path=ppt/ink/ink27.xml><?xml version="1.0" encoding="utf-8"?>
+<inkml:ink xmlns:inkml="http://www.w3.org/2003/InkML">
+  <inkml:definitions>
+    <inkml:context xml:id="ctx0">
+      <inkml:inkSource xml:id="inkSrc0">
+        <inkml:traceFormat>
+          <inkml:channel name="X" type="integer" min="-2.14748E9" max="2.14748E9" units="cm"/>
+          <inkml:channel name="Y" type="integer" min="-2.14748E9" max="2.14748E9" units="cm"/>
+          <inkml:channel name="F" type="integer" max="32767" units="dev"/>
+        </inkml:traceFormat>
+        <inkml:channelProperties>
+          <inkml:channelProperty channel="X" name="resolution" value="1000" units="1/cm"/>
+          <inkml:channelProperty channel="Y" name="resolution" value="1000" units="1/cm"/>
+          <inkml:channelProperty channel="F" name="resolution" value="0" units="1/dev"/>
+        </inkml:channelProperties>
+      </inkml:inkSource>
       <inkml:timestamp xml:id="ts0" timeString="2023-05-24T04:48:34.040"/>
     </inkml:context>
     <inkml:brush xml:id="br0">
@@ -7875,7 +7959,7 @@
 </inkml:ink>
 </file>
 
-<file path=ppt/ink/ink27.xml><?xml version="1.0" encoding="utf-8"?>
+<file path=ppt/ink/ink28.xml><?xml version="1.0" encoding="utf-8"?>
 <inkml:ink xmlns:inkml="http://www.w3.org/2003/InkML">
   <inkml:definitions>
     <inkml:context xml:id="ctx0">
@@ -7902,7 +7986,7 @@
 </inkml:ink>
 </file>
 
-<file path=ppt/ink/ink28.xml><?xml version="1.0" encoding="utf-8"?>
+<file path=ppt/ink/ink29.xml><?xml version="1.0" encoding="utf-8"?>
 <inkml:ink xmlns:inkml="http://www.w3.org/2003/InkML">
   <inkml:definitions>
     <inkml:context xml:id="ctx0">
@@ -7926,33 +8010,6 @@
     </inkml:brush>
   </inkml:definitions>
   <inkml:trace contextRef="#ctx0" brushRef="#br0">48 0 24575,'-4'0'0,"-7"0"0,-6 0 0,4 5 0,10 6 0,10 10 0,8 12 0,6 9 0,9 12 0,5 5 0,0 8 0,-1 1 0,-1-1 0,-7-3 0,-7-3 0,-7-11-8191</inkml:trace>
-</inkml:ink>
-</file>
-
-<file path=ppt/ink/ink29.xml><?xml version="1.0" encoding="utf-8"?>
-<inkml:ink xmlns:inkml="http://www.w3.org/2003/InkML">
-  <inkml:definitions>
-    <inkml:context xml:id="ctx0">
-      <inkml:inkSource xml:id="inkSrc0">
-        <inkml:traceFormat>
-          <inkml:channel name="X" type="integer" min="-2.14748E9" max="2.14748E9" units="cm"/>
-          <inkml:channel name="Y" type="integer" min="-2.14748E9" max="2.14748E9" units="cm"/>
-          <inkml:channel name="F" type="integer" max="32767" units="dev"/>
-        </inkml:traceFormat>
-        <inkml:channelProperties>
-          <inkml:channelProperty channel="X" name="resolution" value="1000" units="1/cm"/>
-          <inkml:channelProperty channel="Y" name="resolution" value="1000" units="1/cm"/>
-          <inkml:channelProperty channel="F" name="resolution" value="0" units="1/dev"/>
-        </inkml:channelProperties>
-      </inkml:inkSource>
-      <inkml:timestamp xml:id="ts0" timeString="2023-05-24T04:48:35.084"/>
-    </inkml:context>
-    <inkml:brush xml:id="br0">
-      <inkml:brushProperty name="width" value="0.05" units="cm"/>
-      <inkml:brushProperty name="height" value="0.05" units="cm"/>
-    </inkml:brush>
-  </inkml:definitions>
-  <inkml:trace contextRef="#ctx0" brushRef="#br0">160 663 24575,'-17'-31'0,"1"0"0,2-2 0,1 0 0,-15-60 0,13 43 0,13 43 0,-39-142 0,36 127 0,1 1 0,1-1 0,2 0 0,1-42 0,0 60 0,0 1 0,0-1 0,1 1 0,0-1 0,-1 0 0,1 1 0,1-1 0,-1 1 0,0 0 0,1-1 0,0 1 0,0 0 0,0 0 0,0 0 0,0 0 0,0 0 0,1 0 0,-1 1 0,1-1 0,0 1 0,0 0 0,0 0 0,0 0 0,0 0 0,1 0 0,-1 1 0,0 0 0,1-1 0,-1 1 0,1 0 0,-1 1 0,1-1 0,0 1 0,-1-1 0,5 1 0,7 1 0,0 0 0,0 1 0,0 0 0,0 1 0,-1 1 0,1 0 0,17 9 0,15 7 0,0 3 0,-1 1 0,-2 3 0,71 55 0,-84-57 0,-2 1 0,-1 1 0,-1 2 0,-1 1 0,-2 1 0,38 63 0,-55-81 0,0 1 0,-1 0 0,-1 0 0,0 0 0,-1 1 0,0 0 0,2 23 0,-5-27 0,-1-1 0,0 0 0,-1 0 0,0 0 0,0 0 0,-1 0 0,-1-1 0,0 1 0,0 0 0,0-1 0,-1 0 0,-8 13 0,2-7 11,-1 1 0,-1-1 0,-1-1-1,0 0 1,-1-1 0,0 0 0,-1-1-1,-22 13 1,-6 2-742,-88 37 0,-3-10-6095</inkml:trace>
 </inkml:ink>
 </file>
 
@@ -8001,6 +8058,33 @@
           <inkml:channelProperty channel="F" name="resolution" value="0" units="1/dev"/>
         </inkml:channelProperties>
       </inkml:inkSource>
+      <inkml:timestamp xml:id="ts0" timeString="2023-05-24T04:48:35.084"/>
+    </inkml:context>
+    <inkml:brush xml:id="br0">
+      <inkml:brushProperty name="width" value="0.05" units="cm"/>
+      <inkml:brushProperty name="height" value="0.05" units="cm"/>
+    </inkml:brush>
+  </inkml:definitions>
+  <inkml:trace contextRef="#ctx0" brushRef="#br0">160 663 24575,'-17'-31'0,"1"0"0,2-2 0,1 0 0,-15-60 0,13 43 0,13 43 0,-39-142 0,36 127 0,1 1 0,1-1 0,2 0 0,1-42 0,0 60 0,0 1 0,0-1 0,1 1 0,0-1 0,-1 0 0,1 1 0,1-1 0,-1 1 0,0 0 0,1-1 0,0 1 0,0 0 0,0 0 0,0 0 0,0 0 0,0 0 0,1 0 0,-1 1 0,1-1 0,0 1 0,0 0 0,0 0 0,0 0 0,0 0 0,1 0 0,-1 1 0,0 0 0,1-1 0,-1 1 0,1 0 0,-1 1 0,1-1 0,0 1 0,-1-1 0,5 1 0,7 1 0,0 0 0,0 1 0,0 0 0,0 1 0,-1 1 0,1 0 0,17 9 0,15 7 0,0 3 0,-1 1 0,-2 3 0,71 55 0,-84-57 0,-2 1 0,-1 1 0,-1 2 0,-1 1 0,-2 1 0,38 63 0,-55-81 0,0 1 0,-1 0 0,-1 0 0,0 0 0,-1 1 0,0 0 0,2 23 0,-5-27 0,-1-1 0,0 0 0,-1 0 0,0 0 0,0 0 0,-1 0 0,-1-1 0,0 1 0,0 0 0,0-1 0,-1 0 0,-8 13 0,2-7 11,-1 1 0,-1-1 0,-1-1-1,0 0 1,-1-1 0,0 0 0,-1-1-1,-22 13 1,-6 2-742,-88 37 0,-3-10-6095</inkml:trace>
+</inkml:ink>
+</file>
+
+<file path=ppt/ink/ink31.xml><?xml version="1.0" encoding="utf-8"?>
+<inkml:ink xmlns:inkml="http://www.w3.org/2003/InkML">
+  <inkml:definitions>
+    <inkml:context xml:id="ctx0">
+      <inkml:inkSource xml:id="inkSrc0">
+        <inkml:traceFormat>
+          <inkml:channel name="X" type="integer" min="-2.14748E9" max="2.14748E9" units="cm"/>
+          <inkml:channel name="Y" type="integer" min="-2.14748E9" max="2.14748E9" units="cm"/>
+          <inkml:channel name="F" type="integer" max="32767" units="dev"/>
+        </inkml:traceFormat>
+        <inkml:channelProperties>
+          <inkml:channelProperty channel="X" name="resolution" value="1000" units="1/cm"/>
+          <inkml:channelProperty channel="Y" name="resolution" value="1000" units="1/cm"/>
+          <inkml:channelProperty channel="F" name="resolution" value="0" units="1/dev"/>
+        </inkml:channelProperties>
+      </inkml:inkSource>
       <inkml:timestamp xml:id="ts0" timeString="2023-05-24T04:48:36.897"/>
     </inkml:context>
     <inkml:brush xml:id="br0">
@@ -8012,7 +8096,7 @@
 </inkml:ink>
 </file>
 
-<file path=ppt/ink/ink31.xml><?xml version="1.0" encoding="utf-8"?>
+<file path=ppt/ink/ink32.xml><?xml version="1.0" encoding="utf-8"?>
 <inkml:ink xmlns:inkml="http://www.w3.org/2003/InkML">
   <inkml:definitions>
     <inkml:context xml:id="ctx0">
@@ -8039,7 +8123,7 @@
 </inkml:ink>
 </file>
 
-<file path=ppt/ink/ink32.xml><?xml version="1.0" encoding="utf-8"?>
+<file path=ppt/ink/ink33.xml><?xml version="1.0" encoding="utf-8"?>
 <inkml:ink xmlns:inkml="http://www.w3.org/2003/InkML">
   <inkml:definitions>
     <inkml:context xml:id="ctx0">
@@ -8066,7 +8150,7 @@
 </inkml:ink>
 </file>
 
-<file path=ppt/ink/ink33.xml><?xml version="1.0" encoding="utf-8"?>
+<file path=ppt/ink/ink34.xml><?xml version="1.0" encoding="utf-8"?>
 <inkml:ink xmlns:inkml="http://www.w3.org/2003/InkML">
   <inkml:definitions>
     <inkml:context xml:id="ctx0">
@@ -8093,7 +8177,7 @@
 </inkml:ink>
 </file>
 
-<file path=ppt/ink/ink34.xml><?xml version="1.0" encoding="utf-8"?>
+<file path=ppt/ink/ink35.xml><?xml version="1.0" encoding="utf-8"?>
 <inkml:ink xmlns:inkml="http://www.w3.org/2003/InkML">
   <inkml:definitions>
     <inkml:context xml:id="ctx0">
@@ -8120,7 +8204,7 @@
 </inkml:ink>
 </file>
 
-<file path=ppt/ink/ink35.xml><?xml version="1.0" encoding="utf-8"?>
+<file path=ppt/ink/ink36.xml><?xml version="1.0" encoding="utf-8"?>
 <inkml:ink xmlns:inkml="http://www.w3.org/2003/InkML">
   <inkml:definitions>
     <inkml:context xml:id="ctx0">
@@ -8147,7 +8231,7 @@
 </inkml:ink>
 </file>
 
-<file path=ppt/ink/ink36.xml><?xml version="1.0" encoding="utf-8"?>
+<file path=ppt/ink/ink37.xml><?xml version="1.0" encoding="utf-8"?>
 <inkml:ink xmlns:inkml="http://www.w3.org/2003/InkML">
   <inkml:definitions>
     <inkml:context xml:id="ctx0">
@@ -8175,7 +8259,7 @@
 </inkml:ink>
 </file>
 
-<file path=ppt/ink/ink37.xml><?xml version="1.0" encoding="utf-8"?>
+<file path=ppt/ink/ink38.xml><?xml version="1.0" encoding="utf-8"?>
 <inkml:ink xmlns:inkml="http://www.w3.org/2003/InkML">
   <inkml:definitions>
     <inkml:context xml:id="ctx0">
@@ -8202,7 +8286,7 @@
 </inkml:ink>
 </file>
 
-<file path=ppt/ink/ink38.xml><?xml version="1.0" encoding="utf-8"?>
+<file path=ppt/ink/ink39.xml><?xml version="1.0" encoding="utf-8"?>
 <inkml:ink xmlns:inkml="http://www.w3.org/2003/InkML">
   <inkml:definitions>
     <inkml:context xml:id="ctx0">
@@ -8229,7 +8313,42 @@
 </inkml:ink>
 </file>
 
-<file path=ppt/ink/ink39.xml><?xml version="1.0" encoding="utf-8"?>
+<file path=ppt/ink/ink4.xml><?xml version="1.0" encoding="utf-8"?>
+<inkml:ink xmlns:inkml="http://www.w3.org/2003/InkML">
+  <inkml:definitions>
+    <inkml:context xml:id="ctx0">
+      <inkml:inkSource xml:id="inkSrc0">
+        <inkml:traceFormat>
+          <inkml:channel name="X" type="integer" max="1920" units="cm"/>
+          <inkml:channel name="Y" type="integer" max="1080" units="cm"/>
+          <inkml:channel name="T" type="integer" max="2.14748E9" units="dev"/>
+        </inkml:traceFormat>
+        <inkml:channelProperties>
+          <inkml:channelProperty channel="X" name="resolution" value="55.81395" units="1/cm"/>
+          <inkml:channelProperty channel="Y" name="resolution" value="55.6701" units="1/cm"/>
+          <inkml:channelProperty channel="T" name="resolution" value="1" units="1/dev"/>
+        </inkml:channelProperties>
+      </inkml:inkSource>
+      <inkml:timestamp xml:id="ts0" timeString="2023-06-22T05:56:51.074"/>
+    </inkml:context>
+    <inkml:brush xml:id="br0">
+      <inkml:brushProperty name="width" value="0.05292" units="cm"/>
+      <inkml:brushProperty name="height" value="0.05292" units="cm"/>
+      <inkml:brushProperty name="color" value="#FF0000"/>
+    </inkml:brush>
+  </inkml:definitions>
+  <inkml:trace contextRef="#ctx0" brushRef="#br0">9013 8590 0,'18'0'47,"53"0"-31,17 0-16,18 0 0,105 0 16,54 0-1,388 0-15,-36 35 16,-282-17 15,-264-18-15</inkml:trace>
+  <inkml:trace contextRef="#ctx0" brushRef="#br0" timeOffset="1383.76">23689 8678 0,'141'0'47,"265"0"-31,-159 0 0,0 0-16,17 0 15,54 0-15,-54 0 16,336 0-1,-529-17 1,-54-1 47</inkml:trace>
+  <inkml:trace contextRef="#ctx0" brushRef="#br0" timeOffset="2383.71">24130 9631 0,'141'0'31,"177"0"-15,-71 0 0,229-53-1,141 0 17,-546 53-32,-36 0 15,-17-18 16</inkml:trace>
+  <inkml:trace contextRef="#ctx0" brushRef="#br0" timeOffset="5484.53">2558 12277 0,'35'0'47,"159"0"-32,-71 53 1,89-36-16,53 36 16,352 18-1,-17 35 1,-265-89 0,-247-17-1</inkml:trace>
+  <inkml:trace contextRef="#ctx0" brushRef="#br0" timeOffset="6168.63">10283 12435 0,'0'0'0,"36"0"0,87 0 15,142 18 17,140 35-32,125-53 31,-389 0-31,-18 0 15,-35 0 1</inkml:trace>
+  <inkml:trace contextRef="#ctx0" brushRef="#br0" timeOffset="21061.31">8943 14464 0,'88'0'47,"0"0"-31,247 0-1,248 0 1,193 0 0,-141 0-1,-424 0 1,-70 0-16,-17-71 16,-106 71-1</inkml:trace>
+  <inkml:trace contextRef="#ctx0" brushRef="#br0" timeOffset="33432.92">18027 14446 0,'53'0'47,"-18"0"-32,53 0-15,71 0 16,300 18-1,-195-18-15,107 18 16,387-18 0,-581 17-1,-125-17-15,1 0 16</inkml:trace>
+  <inkml:trace contextRef="#ctx0" brushRef="#br0" timeOffset="33861.71">22895 14499 0,'36'0'31,"34"0"-31,142-35 31,387 35-15,-281-18-1,-124 1 1,-88-19 0,-71 36-1</inkml:trace>
+</inkml:ink>
+</file>
+
+<file path=ppt/ink/ink40.xml><?xml version="1.0" encoding="utf-8"?>
 <inkml:ink xmlns:inkml="http://www.w3.org/2003/InkML">
   <inkml:definitions>
     <inkml:context xml:id="ctx0">
@@ -8256,34 +8375,7 @@
 </inkml:ink>
 </file>
 
-<file path=ppt/ink/ink4.xml><?xml version="1.0" encoding="utf-8"?>
-<inkml:ink xmlns:inkml="http://www.w3.org/2003/InkML">
-  <inkml:definitions>
-    <inkml:context xml:id="ctx0">
-      <inkml:inkSource xml:id="inkSrc0">
-        <inkml:traceFormat>
-          <inkml:channel name="X" type="integer" min="-2.14748E9" max="2.14748E9" units="cm"/>
-          <inkml:channel name="Y" type="integer" min="-2.14748E9" max="2.14748E9" units="cm"/>
-          <inkml:channel name="F" type="integer" max="32767" units="dev"/>
-        </inkml:traceFormat>
-        <inkml:channelProperties>
-          <inkml:channelProperty channel="X" name="resolution" value="1000" units="1/cm"/>
-          <inkml:channelProperty channel="Y" name="resolution" value="1000" units="1/cm"/>
-          <inkml:channelProperty channel="F" name="resolution" value="0" units="1/dev"/>
-        </inkml:channelProperties>
-      </inkml:inkSource>
-      <inkml:timestamp xml:id="ts0" timeString="2023-05-24T04:48:10.583"/>
-    </inkml:context>
-    <inkml:brush xml:id="br0">
-      <inkml:brushProperty name="width" value="0.05" units="cm"/>
-      <inkml:brushProperty name="height" value="0.05" units="cm"/>
-    </inkml:brush>
-  </inkml:definitions>
-  <inkml:trace contextRef="#ctx0" brushRef="#br0">190 392 24575,'1'3'0,"-1"1"0,1 0 0,0-1 0,0 1 0,0 0 0,3 6 0,4 13 0,21 137 0,-8 1 0,-7 1 0,-11 262 0,-7-353 0,-3-1 0,-28 117 0,-65 130 0,100-317 0,-2 5 0,0 1 0,0-1 0,0 1 0,1 0 0,-1 9 0,2-14 0,0 1 0,0-1 0,0 1 0,0-1 0,1 1 0,-1-1 0,0 0 0,1 1 0,-1-1 0,1 1 0,0-1 0,-1 0 0,1 1 0,0-1 0,0 0 0,0 0 0,0 1 0,0-1 0,0 0 0,0 0 0,0 0 0,0 0 0,0-1 0,1 1 0,-1 0 0,0 0 0,2 0 0,22 7 0,0 0 0,0-2 0,0-1 0,42 3 0,-38-4 0,315 19 0,-236-18 0,896-13-2735,-679-3 2255,3670 44-6039,-3019-5 6775,-330-26 6406,-610-6-4972,-36 4-1665,1 0 0,-1 0-1,0 0 1,0 0 0,1 0 0,-1 0-1,0 0 1,0 0 0,1 0 0,-1-1 0,0 1-1,0 0 1,0 0 0,1 0 0,-1 0-1,0-1 1,0 1 0,0 0 0,0 0-1,1 0 1,-1-1 0,0 1 0,0 0-1,0 0 1,0-1 0,0 1 0,0 0 0,0 0-1,0-1 1,0 1 0,0 0 0,0 0-1,0-1 1,0 1 0,-12-12 234,-50-22-259,42 24 0,1 0 0,0-2 0,1 0 0,0 0 0,-25-25 0,28 21 0,0-1 0,0-1 0,-12-22 0,21 30 0,0 0 0,1-1 0,1 0 0,0 0 0,0-1 0,1 1 0,-2-23 0,1-29 0,4 0 0,2 0 0,20-118 0,0 5 0,-10-611 0,-13 780 0,-1-55 0,-13-80 0,12 125 0,0 0 0,-1 0 0,-1 1 0,-1 0 0,0 0 0,-1 0 0,-1 1 0,0 0 0,-19-24 0,20 31 0,-1 1 0,0 0 0,-1 0 0,1 1 0,-1 0 0,0 1 0,-1 0 0,1 0 0,-1 1 0,0 0 0,0 1 0,-12-3 0,-18-2 0,-71-5 0,107 12 0,-493-13-578,-3 35-143,406-16 694,-656 32-501,-1089 61-1534,1363-67 1867,-1089 66-1230,718-53 2275,675-42 1980,-36 1-974,187 0-1856,1 1 0,0 1 0,0 0 0,-30 14 0,5-3 0,40-14-1365</inkml:trace>
-</inkml:ink>
-</file>
-
-<file path=ppt/ink/ink40.xml><?xml version="1.0" encoding="utf-8"?>
+<file path=ppt/ink/ink41.xml><?xml version="1.0" encoding="utf-8"?>
 <inkml:ink xmlns:inkml="http://www.w3.org/2003/InkML">
   <inkml:definitions>
     <inkml:context xml:id="ctx0">
@@ -8311,7 +8403,7 @@
 </inkml:ink>
 </file>
 
-<file path=ppt/ink/ink41.xml><?xml version="1.0" encoding="utf-8"?>
+<file path=ppt/ink/ink42.xml><?xml version="1.0" encoding="utf-8"?>
 <inkml:ink xmlns:inkml="http://www.w3.org/2003/InkML">
   <inkml:definitions>
     <inkml:context xml:id="ctx0">
@@ -8338,7 +8430,7 @@
 </inkml:ink>
 </file>
 
-<file path=ppt/ink/ink42.xml><?xml version="1.0" encoding="utf-8"?>
+<file path=ppt/ink/ink43.xml><?xml version="1.0" encoding="utf-8"?>
 <inkml:ink xmlns:inkml="http://www.w3.org/2003/InkML">
   <inkml:definitions>
     <inkml:context xml:id="ctx0">
@@ -8365,7 +8457,7 @@
 </inkml:ink>
 </file>
 
-<file path=ppt/ink/ink43.xml><?xml version="1.0" encoding="utf-8"?>
+<file path=ppt/ink/ink44.xml><?xml version="1.0" encoding="utf-8"?>
 <inkml:ink xmlns:inkml="http://www.w3.org/2003/InkML">
   <inkml:definitions>
     <inkml:context xml:id="ctx0">
@@ -8392,7 +8484,7 @@
 </inkml:ink>
 </file>
 
-<file path=ppt/ink/ink44.xml><?xml version="1.0" encoding="utf-8"?>
+<file path=ppt/ink/ink45.xml><?xml version="1.0" encoding="utf-8"?>
 <inkml:ink xmlns:inkml="http://www.w3.org/2003/InkML">
   <inkml:definitions>
     <inkml:context xml:id="ctx0">
@@ -8419,7 +8511,7 @@
 </inkml:ink>
 </file>
 
-<file path=ppt/ink/ink45.xml><?xml version="1.0" encoding="utf-8"?>
+<file path=ppt/ink/ink46.xml><?xml version="1.0" encoding="utf-8"?>
 <inkml:ink xmlns:inkml="http://www.w3.org/2003/InkML">
   <inkml:definitions>
     <inkml:context xml:id="ctx0">
@@ -8447,7 +8539,7 @@
 </inkml:ink>
 </file>
 
-<file path=ppt/ink/ink46.xml><?xml version="1.0" encoding="utf-8"?>
+<file path=ppt/ink/ink47.xml><?xml version="1.0" encoding="utf-8"?>
 <inkml:ink xmlns:inkml="http://www.w3.org/2003/InkML">
   <inkml:definitions>
     <inkml:context xml:id="ctx0">
@@ -8474,7 +8566,7 @@
 </inkml:ink>
 </file>
 
-<file path=ppt/ink/ink47.xml><?xml version="1.0" encoding="utf-8"?>
+<file path=ppt/ink/ink48.xml><?xml version="1.0" encoding="utf-8"?>
 <inkml:ink xmlns:inkml="http://www.w3.org/2003/InkML">
   <inkml:definitions>
     <inkml:context xml:id="ctx0">
@@ -8501,7 +8593,7 @@
 </inkml:ink>
 </file>
 
-<file path=ppt/ink/ink48.xml><?xml version="1.0" encoding="utf-8"?>
+<file path=ppt/ink/ink49.xml><?xml version="1.0" encoding="utf-8"?>
 <inkml:ink xmlns:inkml="http://www.w3.org/2003/InkML">
   <inkml:definitions>
     <inkml:context xml:id="ctx0">
@@ -8528,7 +8620,34 @@
 </inkml:ink>
 </file>
 
-<file path=ppt/ink/ink49.xml><?xml version="1.0" encoding="utf-8"?>
+<file path=ppt/ink/ink5.xml><?xml version="1.0" encoding="utf-8"?>
+<inkml:ink xmlns:inkml="http://www.w3.org/2003/InkML">
+  <inkml:definitions>
+    <inkml:context xml:id="ctx0">
+      <inkml:inkSource xml:id="inkSrc0">
+        <inkml:traceFormat>
+          <inkml:channel name="X" type="integer" min="-2.14748E9" max="2.14748E9" units="cm"/>
+          <inkml:channel name="Y" type="integer" min="-2.14748E9" max="2.14748E9" units="cm"/>
+          <inkml:channel name="F" type="integer" max="32767" units="dev"/>
+        </inkml:traceFormat>
+        <inkml:channelProperties>
+          <inkml:channelProperty channel="X" name="resolution" value="1000" units="1/cm"/>
+          <inkml:channelProperty channel="Y" name="resolution" value="1000" units="1/cm"/>
+          <inkml:channelProperty channel="F" name="resolution" value="0" units="1/dev"/>
+        </inkml:channelProperties>
+      </inkml:inkSource>
+      <inkml:timestamp xml:id="ts0" timeString="2023-05-24T04:48:10.583"/>
+    </inkml:context>
+    <inkml:brush xml:id="br0">
+      <inkml:brushProperty name="width" value="0.05" units="cm"/>
+      <inkml:brushProperty name="height" value="0.05" units="cm"/>
+    </inkml:brush>
+  </inkml:definitions>
+  <inkml:trace contextRef="#ctx0" brushRef="#br0">190 392 24575,'1'3'0,"-1"1"0,1 0 0,0-1 0,0 1 0,0 0 0,3 6 0,4 13 0,21 137 0,-8 1 0,-7 1 0,-11 262 0,-7-353 0,-3-1 0,-28 117 0,-65 130 0,100-317 0,-2 5 0,0 1 0,0-1 0,0 1 0,1 0 0,-1 9 0,2-14 0,0 1 0,0-1 0,0 1 0,0-1 0,1 1 0,-1-1 0,0 0 0,1 1 0,-1-1 0,1 1 0,0-1 0,-1 0 0,1 1 0,0-1 0,0 0 0,0 0 0,0 1 0,0-1 0,0 0 0,0 0 0,0 0 0,0 0 0,0-1 0,1 1 0,-1 0 0,0 0 0,2 0 0,22 7 0,0 0 0,0-2 0,0-1 0,42 3 0,-38-4 0,315 19 0,-236-18 0,896-13-2735,-679-3 2255,3670 44-6039,-3019-5 6775,-330-26 6406,-610-6-4972,-36 4-1665,1 0 0,-1 0-1,0 0 1,0 0 0,1 0 0,-1 0-1,0 0 1,0 0 0,1 0 0,-1-1 0,0 1-1,0 0 1,0 0 0,1 0 0,-1 0-1,0-1 1,0 1 0,0 0 0,0 0-1,1 0 1,-1-1 0,0 1 0,0 0-1,0 0 1,0-1 0,0 1 0,0 0 0,0 0-1,0-1 1,0 1 0,0 0 0,0 0-1,0-1 1,0 1 0,-12-12 234,-50-22-259,42 24 0,1 0 0,0-2 0,1 0 0,0 0 0,-25-25 0,28 21 0,0-1 0,0-1 0,-12-22 0,21 30 0,0 0 0,1-1 0,1 0 0,0 0 0,0-1 0,1 1 0,-2-23 0,1-29 0,4 0 0,2 0 0,20-118 0,0 5 0,-10-611 0,-13 780 0,-1-55 0,-13-80 0,12 125 0,0 0 0,-1 0 0,-1 1 0,-1 0 0,0 0 0,-1 0 0,-1 1 0,0 0 0,-19-24 0,20 31 0,-1 1 0,0 0 0,-1 0 0,1 1 0,-1 0 0,0 1 0,-1 0 0,1 0 0,-1 1 0,0 0 0,0 1 0,-12-3 0,-18-2 0,-71-5 0,107 12 0,-493-13-578,-3 35-143,406-16 694,-656 32-501,-1089 61-1534,1363-67 1867,-1089 66-1230,718-53 2275,675-42 1980,-36 1-974,187 0-1856,1 1 0,0 1 0,0 0 0,-30 14 0,5-3 0,40-14-1365</inkml:trace>
+</inkml:ink>
+</file>
+
+<file path=ppt/ink/ink50.xml><?xml version="1.0" encoding="utf-8"?>
 <inkml:ink xmlns:inkml="http://www.w3.org/2003/InkML">
   <inkml:definitions>
     <inkml:context xml:id="ctx0">
@@ -8555,34 +8674,7 @@
 </inkml:ink>
 </file>
 
-<file path=ppt/ink/ink5.xml><?xml version="1.0" encoding="utf-8"?>
-<inkml:ink xmlns:inkml="http://www.w3.org/2003/InkML">
-  <inkml:definitions>
-    <inkml:context xml:id="ctx0">
-      <inkml:inkSource xml:id="inkSrc0">
-        <inkml:traceFormat>
-          <inkml:channel name="X" type="integer" min="-2.14748E9" max="2.14748E9" units="cm"/>
-          <inkml:channel name="Y" type="integer" min="-2.14748E9" max="2.14748E9" units="cm"/>
-          <inkml:channel name="F" type="integer" max="32767" units="dev"/>
-        </inkml:traceFormat>
-        <inkml:channelProperties>
-          <inkml:channelProperty channel="X" name="resolution" value="1000" units="1/cm"/>
-          <inkml:channelProperty channel="Y" name="resolution" value="1000" units="1/cm"/>
-          <inkml:channelProperty channel="F" name="resolution" value="0" units="1/dev"/>
-        </inkml:channelProperties>
-      </inkml:inkSource>
-      <inkml:timestamp xml:id="ts0" timeString="2023-05-24T04:48:11.159"/>
-    </inkml:context>
-    <inkml:brush xml:id="br0">
-      <inkml:brushProperty name="width" value="0.05" units="cm"/>
-      <inkml:brushProperty name="height" value="0.05" units="cm"/>
-    </inkml:brush>
-  </inkml:definitions>
-  <inkml:trace contextRef="#ctx0" brushRef="#br0">1 0 24575,'0'208'0,"23"677"0,16-505 0,6 79 0,-40-381-1365,-4-60-5461</inkml:trace>
-</inkml:ink>
-</file>
-
-<file path=ppt/ink/ink50.xml><?xml version="1.0" encoding="utf-8"?>
+<file path=ppt/ink/ink51.xml><?xml version="1.0" encoding="utf-8"?>
 <inkml:ink xmlns:inkml="http://www.w3.org/2003/InkML">
   <inkml:definitions>
     <inkml:context xml:id="ctx0">
@@ -8606,33 +8698,6 @@
     </inkml:brush>
   </inkml:definitions>
   <inkml:trace contextRef="#ctx0" brushRef="#br0">92 362 24575,'-27'-23'0,"21"19"0,1-1 0,-1 1 0,1-1 0,-9-11 0,13 16 0,-2-5 0,-1 0 0,0 0 0,1 0 0,0-1 0,0 1 0,-3-11 0,5 14 0,1 0 0,0 0 0,0 0 0,0 0 0,0 0 0,0 0 0,0 0 0,1 0 0,-1 0 0,1 0 0,-1 0 0,1 0 0,0 0 0,0 1 0,0-1 0,0 0 0,0 0 0,0 1 0,0-1 0,0 1 0,1-1 0,-1 1 0,1-1 0,1 0 0,59-51 0,99-63 0,-110 81 0,-50 35 0,0-1 0,0 0 0,0 0 0,0 1 0,0-1 0,0 1 0,0-1 0,1 1 0,-1-1 0,0 1 0,0 0 0,1-1 0,-1 1 0,0 0 0,1 0 0,-1 0 0,0 0 0,1 0 0,-1 0 0,0 0 0,0 1 0,1-1 0,-1 0 0,0 1 0,0-1 0,1 1 0,-1 0 0,0-1 0,0 1 0,0 0 0,0-1 0,0 1 0,0 0 0,0 0 0,0 0 0,0 0 0,0 0 0,-1 0 0,1 0 0,0 0 0,-1 0 0,1 1 0,-1-1 0,1 0 0,0 2 0,4 9 0,-1 1 0,-1-1 0,5 25 0,-4-17 0,36 150-682,26 247-1,-59-336-6143</inkml:trace>
-</inkml:ink>
-</file>
-
-<file path=ppt/ink/ink51.xml><?xml version="1.0" encoding="utf-8"?>
-<inkml:ink xmlns:inkml="http://www.w3.org/2003/InkML">
-  <inkml:definitions>
-    <inkml:context xml:id="ctx0">
-      <inkml:inkSource xml:id="inkSrc0">
-        <inkml:traceFormat>
-          <inkml:channel name="X" type="integer" min="-2.14748E9" max="2.14748E9" units="cm"/>
-          <inkml:channel name="Y" type="integer" min="-2.14748E9" max="2.14748E9" units="cm"/>
-          <inkml:channel name="F" type="integer" max="32767" units="dev"/>
-        </inkml:traceFormat>
-        <inkml:channelProperties>
-          <inkml:channelProperty channel="X" name="resolution" value="1000" units="1/cm"/>
-          <inkml:channelProperty channel="Y" name="resolution" value="1000" units="1/cm"/>
-          <inkml:channelProperty channel="F" name="resolution" value="0" units="1/dev"/>
-        </inkml:channelProperties>
-      </inkml:inkSource>
-      <inkml:timestamp xml:id="ts0" timeString="2023-05-24T05:26:12.646"/>
-    </inkml:context>
-    <inkml:brush xml:id="br0">
-      <inkml:brushProperty name="width" value="0.05" units="cm"/>
-      <inkml:brushProperty name="height" value="0.05" units="cm"/>
-    </inkml:brush>
-  </inkml:definitions>
-  <inkml:trace contextRef="#ctx0" brushRef="#br0">1 1 24575,'355'-1'-116,"847"8"-573,-9 55-744,-1100-53-4520</inkml:trace>
 </inkml:ink>
 </file>
 
@@ -8868,14 +8933,14 @@
           <inkml:channelProperty channel="F" name="resolution" value="0" units="1/dev"/>
         </inkml:channelProperties>
       </inkml:inkSource>
-      <inkml:timestamp xml:id="ts0" timeString="2023-05-24T04:48:11.919"/>
+      <inkml:timestamp xml:id="ts0" timeString="2023-05-24T04:48:11.159"/>
     </inkml:context>
     <inkml:brush xml:id="br0">
       <inkml:brushProperty name="width" value="0.05" units="cm"/>
       <inkml:brushProperty name="height" value="0.05" units="cm"/>
     </inkml:brush>
   </inkml:definitions>
-  <inkml:trace contextRef="#ctx0" brushRef="#br0">30 74 24575,'-8'-9'0,"-5"-1"0,12 11 0,0 0 0,1 0 0,-1 0 0,0 0 0,1 0 0,-1-1 0,1 1 0,-1 0 0,1 0 0,0 0 0,-1 0 0,1 1 0,0-1 0,0 0 0,0 0 0,0 0 0,0 0 0,0 0 0,0 2 0,-2 149 0,3-103 0,2-42 0,3-17 0,4-21 0,-1-5 0,-5 14 0,2 0 0,0 0 0,1 1 0,1 0 0,1 1 0,18-30 0,-26 48 0,1 0 0,-1 0 0,1 0 0,0 0 0,0 0 0,0 0 0,0 1 0,0-1 0,0 0 0,0 1 0,0 0 0,1-1 0,-1 1 0,0 0 0,1 0 0,-1 1 0,1-1 0,-1 0 0,1 1 0,0-1 0,4 1 0,-3 1 0,0-1 0,0 1 0,-1 1 0,1-1 0,0 0 0,-1 1 0,1 0 0,-1 0 0,1 0 0,-1 0 0,0 0 0,6 6 0,5 7 0,-1 0 0,0 1 0,-1 1 0,14 25 0,-5-4-341,-1 1 0,-3 1-1,15 46 1,-19-43-6485</inkml:trace>
+  <inkml:trace contextRef="#ctx0" brushRef="#br0">1 0 24575,'0'208'0,"23"677"0,16-505 0,6 79 0,-40-381-1365,-4-60-5461</inkml:trace>
 </inkml:ink>
 </file>
 
@@ -9165,14 +9230,14 @@
           <inkml:channelProperty channel="F" name="resolution" value="0" units="1/dev"/>
         </inkml:channelProperties>
       </inkml:inkSource>
-      <inkml:timestamp xml:id="ts0" timeString="2023-05-24T04:48:12.300"/>
+      <inkml:timestamp xml:id="ts0" timeString="2023-05-24T04:48:11.919"/>
     </inkml:context>
     <inkml:brush xml:id="br0">
       <inkml:brushProperty name="width" value="0.05" units="cm"/>
       <inkml:brushProperty name="height" value="0.05" units="cm"/>
     </inkml:brush>
   </inkml:definitions>
-  <inkml:trace contextRef="#ctx0" brushRef="#br0">0 253 24575,'0'-4'0,"0"-12"0,0-7 0,5-9 0,2-4 0,4-1 0,4 7 0,10 2 0,5 8 0,7 6 0,2 6 0,-6 4-8191</inkml:trace>
+  <inkml:trace contextRef="#ctx0" brushRef="#br0">30 74 24575,'-8'-9'0,"-5"-1"0,12 11 0,0 0 0,1 0 0,-1 0 0,0 0 0,1 0 0,-1-1 0,1 1 0,-1 0 0,1 0 0,0 0 0,-1 0 0,1 1 0,0-1 0,0 0 0,0 0 0,0 0 0,0 0 0,0 0 0,0 2 0,-2 149 0,3-103 0,2-42 0,3-17 0,4-21 0,-1-5 0,-5 14 0,2 0 0,0 0 0,1 1 0,1 0 0,1 1 0,18-30 0,-26 48 0,1 0 0,-1 0 0,1 0 0,0 0 0,0 0 0,0 0 0,0 1 0,0-1 0,0 0 0,0 1 0,0 0 0,1-1 0,-1 1 0,0 0 0,1 0 0,-1 1 0,1-1 0,-1 0 0,1 1 0,0-1 0,4 1 0,-3 1 0,0-1 0,0 1 0,-1 1 0,1-1 0,0 0 0,-1 1 0,1 0 0,-1 0 0,1 0 0,-1 0 0,0 0 0,6 6 0,5 7 0,-1 0 0,0 1 0,-1 1 0,14 25 0,-5-4-341,-1 1 0,-3 1-1,15 46 1,-19-43-6485</inkml:trace>
 </inkml:ink>
 </file>
 
@@ -9463,14 +9528,14 @@
           <inkml:channelProperty channel="F" name="resolution" value="0" units="1/dev"/>
         </inkml:channelProperties>
       </inkml:inkSource>
-      <inkml:timestamp xml:id="ts0" timeString="2023-05-24T04:48:12.745"/>
+      <inkml:timestamp xml:id="ts0" timeString="2023-05-24T04:48:12.300"/>
     </inkml:context>
     <inkml:brush xml:id="br0">
       <inkml:brushProperty name="width" value="0.05" units="cm"/>
       <inkml:brushProperty name="height" value="0.05" units="cm"/>
     </inkml:brush>
   </inkml:definitions>
-  <inkml:trace contextRef="#ctx0" brushRef="#br0">1 1 24575,'9'13'0,"4"16"0,24 65 0,-4 1 0,27 126 0,40 285 0,-75-337 0,3 175 0,-12-80 43,-8-145-1451,-6-90-5418</inkml:trace>
+  <inkml:trace contextRef="#ctx0" brushRef="#br0">0 253 24575,'0'-4'0,"0"-12"0,0-7 0,5-9 0,2-4 0,4-1 0,4 7 0,10 2 0,5 8 0,7 6 0,2 6 0,-6 4-8191</inkml:trace>
 </inkml:ink>
 </file>
 
@@ -9760,14 +9825,14 @@
           <inkml:channelProperty channel="F" name="resolution" value="0" units="1/dev"/>
         </inkml:channelProperties>
       </inkml:inkSource>
-      <inkml:timestamp xml:id="ts0" timeString="2023-05-24T04:48:13.260"/>
+      <inkml:timestamp xml:id="ts0" timeString="2023-05-24T04:48:12.745"/>
     </inkml:context>
     <inkml:brush xml:id="br0">
       <inkml:brushProperty name="width" value="0.05" units="cm"/>
       <inkml:brushProperty name="height" value="0.05" units="cm"/>
     </inkml:brush>
   </inkml:definitions>
-  <inkml:trace contextRef="#ctx0" brushRef="#br0">1 8 24575,'0'0'0,"1"-1"0,-1 0 0,1 1 0,0-1 0,-1 1 0,1-1 0,0 1 0,-1-1 0,1 1 0,0-1 0,0 1 0,-1 0 0,1-1 0,0 1 0,0 0 0,0 0 0,-1-1 0,1 1 0,0 0 0,0 0 0,0 0 0,0 0 0,0 0 0,-1 0 0,1 1 0,0-1 0,0 0 0,0 0 0,1 1 0,-1 0 0,1 0 0,-1 1 0,1-1 0,-1 1 0,0-1 0,1 1 0,-1-1 0,0 1 0,0 0 0,0-1 0,-1 1 0,2 3 0,2 6 0,-1 1 0,0 0 0,1 13 0,-3-25 0,52 493 0,-12-99 0,-5-137 0,24 243 0,-54-229-1365,-7-242-5461</inkml:trace>
+  <inkml:trace contextRef="#ctx0" brushRef="#br0">1 1 24575,'9'13'0,"4"16"0,24 65 0,-4 1 0,27 126 0,40 285 0,-75-337 0,3 175 0,-12-80 43,-8-145-1451,-6-90-5418</inkml:trace>
 </inkml:ink>
 </file>
 
@@ -10123,7 +10188,7 @@
           <a:p>
             <a:fld id="{4AF2A06D-4991-4208-8C88-4E8BAD69A8B8}" type="datetimeFigureOut">
               <a:rPr lang="en-US" smtClean="0"/>
-              <a:t>6/20/2023</a:t>
+              <a:t>6/22/2023</a:t>
             </a:fld>
             <a:endParaRPr lang="en-US"/>
           </a:p>
@@ -10747,7 +10812,7 @@
           <a:p>
             <a:fld id="{E26E0DA5-0C76-4851-AA82-0B75261F9EB4}" type="datetimeFigureOut">
               <a:rPr lang="en-US" smtClean="0"/>
-              <a:t>6/20/2023</a:t>
+              <a:t>6/22/2023</a:t>
             </a:fld>
             <a:endParaRPr lang="en-US"/>
           </a:p>
@@ -10915,7 +10980,7 @@
           <a:p>
             <a:fld id="{E26E0DA5-0C76-4851-AA82-0B75261F9EB4}" type="datetimeFigureOut">
               <a:rPr lang="en-US" smtClean="0"/>
-              <a:t>6/20/2023</a:t>
+              <a:t>6/22/2023</a:t>
             </a:fld>
             <a:endParaRPr lang="en-US"/>
           </a:p>
@@ -11093,7 +11158,7 @@
           <a:p>
             <a:fld id="{E26E0DA5-0C76-4851-AA82-0B75261F9EB4}" type="datetimeFigureOut">
               <a:rPr lang="en-US" smtClean="0"/>
-              <a:t>6/20/2023</a:t>
+              <a:t>6/22/2023</a:t>
             </a:fld>
             <a:endParaRPr lang="en-US"/>
           </a:p>
@@ -11494,7 +11559,7 @@
             <a:fld id="{9578D6DB-6798-42D2-B9AD-FC6F1C72FC30}" type="datetimeFigureOut">
               <a:rPr lang="en-US" smtClean="0"/>
               <a:pPr/>
-              <a:t>6/20/2023</a:t>
+              <a:t>6/22/2023</a:t>
             </a:fld>
             <a:endParaRPr lang="en-US"/>
           </a:p>
@@ -11736,7 +11801,7 @@
             <a:fld id="{425404F2-BE9A-4460-8815-8F645183555F}" type="datetimeFigureOut">
               <a:rPr lang="en-US" smtClean="0"/>
               <a:pPr/>
-              <a:t>6/20/2023</a:t>
+              <a:t>6/22/2023</a:t>
             </a:fld>
             <a:endParaRPr lang="en-US"/>
           </a:p>
@@ -11864,7 +11929,7 @@
             <a:fld id="{425404F2-BE9A-4460-8815-8F645183555F}" type="datetimeFigureOut">
               <a:rPr lang="en-US" smtClean="0"/>
               <a:pPr/>
-              <a:t>6/20/2023</a:t>
+              <a:t>6/22/2023</a:t>
             </a:fld>
             <a:endParaRPr lang="en-US"/>
           </a:p>
@@ -12114,7 +12179,7 @@
             <a:fld id="{425404F2-BE9A-4460-8815-8F645183555F}" type="datetimeFigureOut">
               <a:rPr lang="en-US" smtClean="0"/>
               <a:pPr/>
-              <a:t>6/20/2023</a:t>
+              <a:t>6/22/2023</a:t>
             </a:fld>
             <a:endParaRPr lang="en-US"/>
           </a:p>
@@ -12284,7 +12349,7 @@
             <a:fld id="{425404F2-BE9A-4460-8815-8F645183555F}" type="datetimeFigureOut">
               <a:rPr lang="en-US" smtClean="0"/>
               <a:pPr/>
-              <a:t>6/20/2023</a:t>
+              <a:t>6/22/2023</a:t>
             </a:fld>
             <a:endParaRPr lang="en-US"/>
           </a:p>
@@ -12571,7 +12636,7 @@
             <a:fld id="{425404F2-BE9A-4460-8815-8F645183555F}" type="datetimeFigureOut">
               <a:rPr lang="en-US" smtClean="0"/>
               <a:pPr/>
-              <a:t>6/20/2023</a:t>
+              <a:t>6/22/2023</a:t>
             </a:fld>
             <a:endParaRPr lang="en-US"/>
           </a:p>
@@ -12992,7 +13057,7 @@
             <a:fld id="{425404F2-BE9A-4460-8815-8F645183555F}" type="datetimeFigureOut">
               <a:rPr lang="en-US" smtClean="0"/>
               <a:pPr/>
-              <a:t>6/20/2023</a:t>
+              <a:t>6/22/2023</a:t>
             </a:fld>
             <a:endParaRPr lang="en-US"/>
           </a:p>
@@ -13161,7 +13226,7 @@
           <a:p>
             <a:fld id="{E26E0DA5-0C76-4851-AA82-0B75261F9EB4}" type="datetimeFigureOut">
               <a:rPr lang="en-US" smtClean="0"/>
-              <a:t>6/20/2023</a:t>
+              <a:t>6/22/2023</a:t>
             </a:fld>
             <a:endParaRPr lang="en-US"/>
           </a:p>
@@ -13285,7 +13350,7 @@
             <a:fld id="{425404F2-BE9A-4460-8815-8F645183555F}" type="datetimeFigureOut">
               <a:rPr lang="en-US" smtClean="0"/>
               <a:pPr/>
-              <a:t>6/20/2023</a:t>
+              <a:t>6/22/2023</a:t>
             </a:fld>
             <a:endParaRPr lang="en-US"/>
           </a:p>
@@ -13467,7 +13532,7 @@
             <a:fld id="{425404F2-BE9A-4460-8815-8F645183555F}" type="datetimeFigureOut">
               <a:rPr lang="en-US" smtClean="0"/>
               <a:pPr/>
-              <a:t>6/20/2023</a:t>
+              <a:t>6/22/2023</a:t>
             </a:fld>
             <a:endParaRPr lang="en-US"/>
           </a:p>
@@ -14014,7 +14079,7 @@
             <a:fld id="{425404F2-BE9A-4460-8815-8F645183555F}" type="datetimeFigureOut">
               <a:rPr lang="en-US" smtClean="0"/>
               <a:pPr/>
-              <a:t>6/20/2023</a:t>
+              <a:t>6/22/2023</a:t>
             </a:fld>
             <a:endParaRPr lang="en-US"/>
           </a:p>
@@ -14162,7 +14227,7 @@
             <a:fld id="{425404F2-BE9A-4460-8815-8F645183555F}" type="datetimeFigureOut">
               <a:rPr lang="en-US" smtClean="0"/>
               <a:pPr/>
-              <a:t>6/20/2023</a:t>
+              <a:t>6/22/2023</a:t>
             </a:fld>
             <a:endParaRPr lang="en-US"/>
           </a:p>
@@ -14395,7 +14460,7 @@
             <a:fld id="{425404F2-BE9A-4460-8815-8F645183555F}" type="datetimeFigureOut">
               <a:rPr lang="en-US" smtClean="0"/>
               <a:pPr/>
-              <a:t>6/20/2023</a:t>
+              <a:t>6/22/2023</a:t>
             </a:fld>
             <a:endParaRPr lang="en-US"/>
           </a:p>
@@ -14633,7 +14698,7 @@
             <a:fld id="{425404F2-BE9A-4460-8815-8F645183555F}" type="datetimeFigureOut">
               <a:rPr lang="en-US" smtClean="0"/>
               <a:pPr/>
-              <a:t>6/20/2023</a:t>
+              <a:t>6/22/2023</a:t>
             </a:fld>
             <a:endParaRPr lang="en-US"/>
           </a:p>
@@ -14815,7 +14880,7 @@
             <a:fld id="{425404F2-BE9A-4460-8815-8F645183555F}" type="datetimeFigureOut">
               <a:rPr lang="en-US" smtClean="0"/>
               <a:pPr/>
-              <a:t>6/20/2023</a:t>
+              <a:t>6/22/2023</a:t>
             </a:fld>
             <a:endParaRPr lang="en-US"/>
           </a:p>
@@ -15092,7 +15157,7 @@
             <a:fld id="{425404F2-BE9A-4460-8815-8F645183555F}" type="datetimeFigureOut">
               <a:rPr lang="en-US" smtClean="0"/>
               <a:pPr/>
-              <a:t>6/20/2023</a:t>
+              <a:t>6/22/2023</a:t>
             </a:fld>
             <a:endParaRPr lang="en-US"/>
           </a:p>
@@ -15346,7 +15411,7 @@
             <a:fld id="{425404F2-BE9A-4460-8815-8F645183555F}" type="datetimeFigureOut">
               <a:rPr lang="en-US" smtClean="0"/>
               <a:pPr/>
-              <a:t>6/20/2023</a:t>
+              <a:t>6/22/2023</a:t>
             </a:fld>
             <a:endParaRPr lang="en-US"/>
           </a:p>
@@ -15516,7 +15581,7 @@
             <a:fld id="{425404F2-BE9A-4460-8815-8F645183555F}" type="datetimeFigureOut">
               <a:rPr lang="en-US" smtClean="0"/>
               <a:pPr/>
-              <a:t>6/20/2023</a:t>
+              <a:t>6/22/2023</a:t>
             </a:fld>
             <a:endParaRPr lang="en-US"/>
           </a:p>
@@ -15762,7 +15827,7 @@
           <a:p>
             <a:fld id="{E26E0DA5-0C76-4851-AA82-0B75261F9EB4}" type="datetimeFigureOut">
               <a:rPr lang="en-US" smtClean="0"/>
-              <a:t>6/20/2023</a:t>
+              <a:t>6/22/2023</a:t>
             </a:fld>
             <a:endParaRPr lang="en-US"/>
           </a:p>
@@ -15941,7 +16006,7 @@
             <a:fld id="{425404F2-BE9A-4460-8815-8F645183555F}" type="datetimeFigureOut">
               <a:rPr lang="en-US" smtClean="0"/>
               <a:pPr/>
-              <a:t>6/20/2023</a:t>
+              <a:t>6/22/2023</a:t>
             </a:fld>
             <a:endParaRPr lang="en-US"/>
           </a:p>
@@ -16171,7 +16236,7 @@
           <a:p>
             <a:fld id="{E26E0DA5-0C76-4851-AA82-0B75261F9EB4}" type="datetimeFigureOut">
               <a:rPr lang="en-US" smtClean="0"/>
-              <a:t>6/20/2023</a:t>
+              <a:t>6/22/2023</a:t>
             </a:fld>
             <a:endParaRPr lang="en-US"/>
           </a:p>
@@ -16535,7 +16600,7 @@
           <a:p>
             <a:fld id="{E26E0DA5-0C76-4851-AA82-0B75261F9EB4}" type="datetimeFigureOut">
               <a:rPr lang="en-US" smtClean="0"/>
-              <a:t>6/20/2023</a:t>
+              <a:t>6/22/2023</a:t>
             </a:fld>
             <a:endParaRPr lang="en-US"/>
           </a:p>
@@ -16652,7 +16717,7 @@
           <a:p>
             <a:fld id="{E26E0DA5-0C76-4851-AA82-0B75261F9EB4}" type="datetimeFigureOut">
               <a:rPr lang="en-US" smtClean="0"/>
-              <a:t>6/20/2023</a:t>
+              <a:t>6/22/2023</a:t>
             </a:fld>
             <a:endParaRPr lang="en-US"/>
           </a:p>
@@ -16747,7 +16812,7 @@
           <a:p>
             <a:fld id="{E26E0DA5-0C76-4851-AA82-0B75261F9EB4}" type="datetimeFigureOut">
               <a:rPr lang="en-US" smtClean="0"/>
-              <a:t>6/20/2023</a:t>
+              <a:t>6/22/2023</a:t>
             </a:fld>
             <a:endParaRPr lang="en-US"/>
           </a:p>
@@ -17022,7 +17087,7 @@
           <a:p>
             <a:fld id="{E26E0DA5-0C76-4851-AA82-0B75261F9EB4}" type="datetimeFigureOut">
               <a:rPr lang="en-US" smtClean="0"/>
-              <a:t>6/20/2023</a:t>
+              <a:t>6/22/2023</a:t>
             </a:fld>
             <a:endParaRPr lang="en-US"/>
           </a:p>
@@ -17274,7 +17339,7 @@
           <a:p>
             <a:fld id="{E26E0DA5-0C76-4851-AA82-0B75261F9EB4}" type="datetimeFigureOut">
               <a:rPr lang="en-US" smtClean="0"/>
-              <a:t>6/20/2023</a:t>
+              <a:t>6/22/2023</a:t>
             </a:fld>
             <a:endParaRPr lang="en-US"/>
           </a:p>
@@ -17485,7 +17550,7 @@
           <a:p>
             <a:fld id="{E26E0DA5-0C76-4851-AA82-0B75261F9EB4}" type="datetimeFigureOut">
               <a:rPr lang="en-US" smtClean="0"/>
-              <a:t>6/20/2023</a:t>
+              <a:t>6/22/2023</a:t>
             </a:fld>
             <a:endParaRPr lang="en-US"/>
           </a:p>
@@ -18043,7 +18108,7 @@
             <a:fld id="{425404F2-BE9A-4460-8815-8F645183555F}" type="datetimeFigureOut">
               <a:rPr lang="en-US" smtClean="0"/>
               <a:pPr/>
-              <a:t>6/20/2023</a:t>
+              <a:t>6/22/2023</a:t>
             </a:fld>
             <a:endParaRPr lang="en-US"/>
           </a:p>
@@ -21649,57 +21714,6 @@
           </mc:Fallback>
         </mc:AlternateContent>
       </p:grpSp>
-      <mc:AlternateContent xmlns:mc="http://schemas.openxmlformats.org/markup-compatibility/2006" xmlns:p14="http://schemas.microsoft.com/office/powerpoint/2010/main">
-        <mc:Choice Requires="p14">
-          <p:contentPart p14:bwMode="auto" r:id="rId97">
-            <p14:nvContentPartPr>
-              <p14:cNvPr id="65" name="Ink 64">
-                <a:extLst>
-                  <a:ext uri="{FF2B5EF4-FFF2-40B4-BE49-F238E27FC236}">
-                    <a16:creationId xmlns:a16="http://schemas.microsoft.com/office/drawing/2014/main" id="{EA90B964-2DCC-65D1-3A9F-3973192A51D3}"/>
-                  </a:ext>
-                </a:extLst>
-              </p14:cNvPr>
-              <p14:cNvContentPartPr/>
-              <p14:nvPr/>
-            </p14:nvContentPartPr>
-            <p14:xfrm>
-              <a:off x="218207" y="1421092"/>
-              <a:ext cx="1023840" cy="28440"/>
-            </p14:xfrm>
-          </p:contentPart>
-        </mc:Choice>
-        <mc:Fallback xmlns="">
-          <p:pic>
-            <p:nvPicPr>
-              <p:cNvPr id="65" name="Ink 64">
-                <a:extLst>
-                  <a:ext uri="{FF2B5EF4-FFF2-40B4-BE49-F238E27FC236}">
-                    <a16:creationId xmlns:a16="http://schemas.microsoft.com/office/drawing/2014/main" id="{EA90B964-2DCC-65D1-3A9F-3973192A51D3}"/>
-                  </a:ext>
-                </a:extLst>
-              </p:cNvPr>
-              <p:cNvPicPr/>
-              <p:nvPr/>
-            </p:nvPicPr>
-            <p:blipFill>
-              <a:blip r:embed="rId98"/>
-              <a:stretch>
-                <a:fillRect/>
-              </a:stretch>
-            </p:blipFill>
-            <p:spPr>
-              <a:xfrm>
-                <a:off x="209567" y="1412092"/>
-                <a:ext cx="1041480" cy="46080"/>
-              </a:xfrm>
-              <a:prstGeom prst="rect">
-                <a:avLst/>
-              </a:prstGeom>
-            </p:spPr>
-          </p:pic>
-        </mc:Fallback>
-      </mc:AlternateContent>
     </p:spTree>
     <p:extLst>
       <p:ext uri="{BB962C8B-B14F-4D97-AF65-F5344CB8AC3E}">
@@ -37990,14 +38004,14 @@
           </a:p>
         </p:txBody>
       </p:sp>
-      <mc:AlternateContent xmlns:mc="http://schemas.openxmlformats.org/markup-compatibility/2006" xmlns:p14="http://schemas.microsoft.com/office/powerpoint/2010/main">
-        <mc:Choice Requires="p14">
+      <mc:AlternateContent xmlns:mc="http://schemas.openxmlformats.org/markup-compatibility/2006">
+        <mc:Choice xmlns:p14="http://schemas.microsoft.com/office/powerpoint/2010/main" Requires="p14">
           <p:contentPart p14:bwMode="auto" r:id="rId3">
             <p14:nvContentPartPr>
-              <p14:cNvPr id="2" name="Ink 1">
+              <p14:cNvPr id="3" name="Ink 2">
                 <a:extLst>
                   <a:ext uri="{FF2B5EF4-FFF2-40B4-BE49-F238E27FC236}">
-                    <a16:creationId xmlns:a16="http://schemas.microsoft.com/office/drawing/2014/main" id="{C41F9940-2405-688F-5A88-7574B7C7459F}"/>
+                    <a16:creationId xmlns:a16="http://schemas.microsoft.com/office/drawing/2014/main" id="{EFEFED3F-B808-129A-4C82-3AFF3468AFE9}"/>
                   </a:ext>
                 </a:extLst>
               </p14:cNvPr>
@@ -38005,18 +38019,18 @@
               <p14:nvPr/>
             </p14:nvContentPartPr>
             <p14:xfrm>
-              <a:off x="120600" y="781200"/>
-              <a:ext cx="11805120" cy="5924880"/>
+              <a:off x="76320" y="799920"/>
+              <a:ext cx="10725480" cy="5810760"/>
             </p14:xfrm>
           </p:contentPart>
         </mc:Choice>
-        <mc:Fallback xmlns="">
+        <mc:Fallback>
           <p:pic>
             <p:nvPicPr>
-              <p:cNvPr id="2" name="Ink 1">
+              <p:cNvPr id="3" name="Ink 2">
                 <a:extLst>
                   <a:ext uri="{FF2B5EF4-FFF2-40B4-BE49-F238E27FC236}">
-                    <a16:creationId xmlns:a16="http://schemas.microsoft.com/office/drawing/2014/main" id="{C41F9940-2405-688F-5A88-7574B7C7459F}"/>
+                    <a16:creationId xmlns:a16="http://schemas.microsoft.com/office/drawing/2014/main" id="{EFEFED3F-B808-129A-4C82-3AFF3468AFE9}"/>
                   </a:ext>
                 </a:extLst>
               </p:cNvPr>
@@ -38031,8 +38045,8 @@
             </p:blipFill>
             <p:spPr>
               <a:xfrm>
-                <a:off x="111240" y="771840"/>
-                <a:ext cx="11823840" cy="5943600"/>
+                <a:off x="66960" y="790560"/>
+                <a:ext cx="10744200" cy="5829480"/>
               </a:xfrm>
               <a:prstGeom prst="rect">
                 <a:avLst/>
@@ -39244,14 +39258,14 @@
           </a:p>
         </p:txBody>
       </p:sp>
-      <mc:AlternateContent xmlns:mc="http://schemas.openxmlformats.org/markup-compatibility/2006" xmlns:p14="http://schemas.microsoft.com/office/powerpoint/2010/main">
-        <mc:Choice Requires="p14">
+      <mc:AlternateContent xmlns:mc="http://schemas.openxmlformats.org/markup-compatibility/2006">
+        <mc:Choice xmlns:p14="http://schemas.microsoft.com/office/powerpoint/2010/main" Requires="p14">
           <p:contentPart p14:bwMode="auto" r:id="rId3">
             <p14:nvContentPartPr>
-              <p14:cNvPr id="3" name="Ink 2">
+              <p14:cNvPr id="4" name="Ink 3">
                 <a:extLst>
                   <a:ext uri="{FF2B5EF4-FFF2-40B4-BE49-F238E27FC236}">
-                    <a16:creationId xmlns:a16="http://schemas.microsoft.com/office/drawing/2014/main" id="{8C87DD3C-DE6D-6892-A86D-CA68BE0AFA80}"/>
+                    <a16:creationId xmlns:a16="http://schemas.microsoft.com/office/drawing/2014/main" id="{8BC4CF04-D080-C1B9-E8C0-A6FBAD1B7A79}"/>
                   </a:ext>
                 </a:extLst>
               </p14:cNvPr>
@@ -39259,18 +39273,18 @@
               <p14:nvPr/>
             </p14:nvContentPartPr>
             <p14:xfrm>
-              <a:off x="0" y="2127240"/>
-              <a:ext cx="8534880" cy="4458240"/>
+              <a:off x="399960" y="1415880"/>
+              <a:ext cx="11284560" cy="5271120"/>
             </p14:xfrm>
           </p:contentPart>
         </mc:Choice>
-        <mc:Fallback xmlns="">
+        <mc:Fallback>
           <p:pic>
             <p:nvPicPr>
-              <p:cNvPr id="3" name="Ink 2">
+              <p:cNvPr id="4" name="Ink 3">
                 <a:extLst>
                   <a:ext uri="{FF2B5EF4-FFF2-40B4-BE49-F238E27FC236}">
-                    <a16:creationId xmlns:a16="http://schemas.microsoft.com/office/drawing/2014/main" id="{8C87DD3C-DE6D-6892-A86D-CA68BE0AFA80}"/>
+                    <a16:creationId xmlns:a16="http://schemas.microsoft.com/office/drawing/2014/main" id="{8BC4CF04-D080-C1B9-E8C0-A6FBAD1B7A79}"/>
                   </a:ext>
                 </a:extLst>
               </p:cNvPr>
@@ -39285,8 +39299,8 @@
             </p:blipFill>
             <p:spPr>
               <a:xfrm>
-                <a:off x="-9360" y="2117880"/>
-                <a:ext cx="8553600" cy="4476960"/>
+                <a:off x="390600" y="1406520"/>
+                <a:ext cx="11303280" cy="5289840"/>
               </a:xfrm>
               <a:prstGeom prst="rect">
                 <a:avLst/>
@@ -40459,6 +40473,57 @@
               <a:xfrm>
                 <a:off x="5826240" y="5546880"/>
                 <a:ext cx="2660760" cy="419040"/>
+              </a:xfrm>
+              <a:prstGeom prst="rect">
+                <a:avLst/>
+              </a:prstGeom>
+            </p:spPr>
+          </p:pic>
+        </mc:Fallback>
+      </mc:AlternateContent>
+      <mc:AlternateContent xmlns:mc="http://schemas.openxmlformats.org/markup-compatibility/2006">
+        <mc:Choice xmlns:p14="http://schemas.microsoft.com/office/powerpoint/2010/main" Requires="p14">
+          <p:contentPart p14:bwMode="auto" r:id="rId5">
+            <p14:nvContentPartPr>
+              <p14:cNvPr id="10" name="Ink 9">
+                <a:extLst>
+                  <a:ext uri="{FF2B5EF4-FFF2-40B4-BE49-F238E27FC236}">
+                    <a16:creationId xmlns:a16="http://schemas.microsoft.com/office/drawing/2014/main" id="{D7AF1D59-6FED-5D38-9B27-B9BE6A97BD53}"/>
+                  </a:ext>
+                </a:extLst>
+              </p14:cNvPr>
+              <p14:cNvContentPartPr/>
+              <p14:nvPr/>
+            </p14:nvContentPartPr>
+            <p14:xfrm>
+              <a:off x="920880" y="3092400"/>
+              <a:ext cx="8534520" cy="2127600"/>
+            </p14:xfrm>
+          </p:contentPart>
+        </mc:Choice>
+        <mc:Fallback>
+          <p:pic>
+            <p:nvPicPr>
+              <p:cNvPr id="10" name="Ink 9">
+                <a:extLst>
+                  <a:ext uri="{FF2B5EF4-FFF2-40B4-BE49-F238E27FC236}">
+                    <a16:creationId xmlns:a16="http://schemas.microsoft.com/office/drawing/2014/main" id="{D7AF1D59-6FED-5D38-9B27-B9BE6A97BD53}"/>
+                  </a:ext>
+                </a:extLst>
+              </p:cNvPr>
+              <p:cNvPicPr/>
+              <p:nvPr/>
+            </p:nvPicPr>
+            <p:blipFill>
+              <a:blip r:embed="rId6"/>
+              <a:stretch>
+                <a:fillRect/>
+              </a:stretch>
+            </p:blipFill>
+            <p:spPr>
+              <a:xfrm>
+                <a:off x="911520" y="3083040"/>
+                <a:ext cx="8553240" cy="2146320"/>
               </a:xfrm>
               <a:prstGeom prst="rect">
                 <a:avLst/>

</xml_diff>